<commit_message>
DCPAM EXEC is now DCPAM RDP (Remote Data Processor). Updated README files and created one for DCPAM RDP.
</commit_message>
<xml_diff>
--- a/docs/dwh.pptx
+++ b/docs/dwh.pptx
@@ -6,6 +6,7 @@
   </p:sldMasterIdLst>
   <p:sldIdLst>
     <p:sldId id="256" r:id="rId2"/>
+    <p:sldId id="257" r:id="rId3"/>
   </p:sldIdLst>
   <p:sldSz cx="12192000" cy="6858000"/>
   <p:notesSz cx="6858000" cy="9144000"/>
@@ -104,6 +105,11 @@
       </a:defRPr>
     </a:lvl9pPr>
   </p:defaultTextStyle>
+  <p:extLst>
+    <p:ext uri="{EFAFB233-063F-42B5-8137-9DF3F51BA10A}">
+      <p15:sldGuideLst xmlns:p15="http://schemas.microsoft.com/office/powerpoint/2012/main"/>
+    </p:ext>
+  </p:extLst>
 </p:presentation>
 </file>
 
@@ -254,7 +260,7 @@
           <a:p>
             <a:fld id="{4FD404D1-5F19-478C-80D6-07287D7F4AD9}" type="datetimeFigureOut">
               <a:rPr lang="pl-PL" smtClean="0"/>
-              <a:t>2020-07-28</a:t>
+              <a:t>2020-08-07</a:t>
             </a:fld>
             <a:endParaRPr lang="pl-PL"/>
           </a:p>
@@ -452,7 +458,7 @@
           <a:p>
             <a:fld id="{4FD404D1-5F19-478C-80D6-07287D7F4AD9}" type="datetimeFigureOut">
               <a:rPr lang="pl-PL" smtClean="0"/>
-              <a:t>2020-07-28</a:t>
+              <a:t>2020-08-07</a:t>
             </a:fld>
             <a:endParaRPr lang="pl-PL"/>
           </a:p>
@@ -660,7 +666,7 @@
           <a:p>
             <a:fld id="{4FD404D1-5F19-478C-80D6-07287D7F4AD9}" type="datetimeFigureOut">
               <a:rPr lang="pl-PL" smtClean="0"/>
-              <a:t>2020-07-28</a:t>
+              <a:t>2020-08-07</a:t>
             </a:fld>
             <a:endParaRPr lang="pl-PL"/>
           </a:p>
@@ -858,7 +864,7 @@
           <a:p>
             <a:fld id="{4FD404D1-5F19-478C-80D6-07287D7F4AD9}" type="datetimeFigureOut">
               <a:rPr lang="pl-PL" smtClean="0"/>
-              <a:t>2020-07-28</a:t>
+              <a:t>2020-08-07</a:t>
             </a:fld>
             <a:endParaRPr lang="pl-PL"/>
           </a:p>
@@ -1133,7 +1139,7 @@
           <a:p>
             <a:fld id="{4FD404D1-5F19-478C-80D6-07287D7F4AD9}" type="datetimeFigureOut">
               <a:rPr lang="pl-PL" smtClean="0"/>
-              <a:t>2020-07-28</a:t>
+              <a:t>2020-08-07</a:t>
             </a:fld>
             <a:endParaRPr lang="pl-PL"/>
           </a:p>
@@ -1398,7 +1404,7 @@
           <a:p>
             <a:fld id="{4FD404D1-5F19-478C-80D6-07287D7F4AD9}" type="datetimeFigureOut">
               <a:rPr lang="pl-PL" smtClean="0"/>
-              <a:t>2020-07-28</a:t>
+              <a:t>2020-08-07</a:t>
             </a:fld>
             <a:endParaRPr lang="pl-PL"/>
           </a:p>
@@ -1810,7 +1816,7 @@
           <a:p>
             <a:fld id="{4FD404D1-5F19-478C-80D6-07287D7F4AD9}" type="datetimeFigureOut">
               <a:rPr lang="pl-PL" smtClean="0"/>
-              <a:t>2020-07-28</a:t>
+              <a:t>2020-08-07</a:t>
             </a:fld>
             <a:endParaRPr lang="pl-PL"/>
           </a:p>
@@ -1951,7 +1957,7 @@
           <a:p>
             <a:fld id="{4FD404D1-5F19-478C-80D6-07287D7F4AD9}" type="datetimeFigureOut">
               <a:rPr lang="pl-PL" smtClean="0"/>
-              <a:t>2020-07-28</a:t>
+              <a:t>2020-08-07</a:t>
             </a:fld>
             <a:endParaRPr lang="pl-PL"/>
           </a:p>
@@ -2064,7 +2070,7 @@
           <a:p>
             <a:fld id="{4FD404D1-5F19-478C-80D6-07287D7F4AD9}" type="datetimeFigureOut">
               <a:rPr lang="pl-PL" smtClean="0"/>
-              <a:t>2020-07-28</a:t>
+              <a:t>2020-08-07</a:t>
             </a:fld>
             <a:endParaRPr lang="pl-PL"/>
           </a:p>
@@ -2375,7 +2381,7 @@
           <a:p>
             <a:fld id="{4FD404D1-5F19-478C-80D6-07287D7F4AD9}" type="datetimeFigureOut">
               <a:rPr lang="pl-PL" smtClean="0"/>
-              <a:t>2020-07-28</a:t>
+              <a:t>2020-08-07</a:t>
             </a:fld>
             <a:endParaRPr lang="pl-PL"/>
           </a:p>
@@ -2663,7 +2669,7 @@
           <a:p>
             <a:fld id="{4FD404D1-5F19-478C-80D6-07287D7F4AD9}" type="datetimeFigureOut">
               <a:rPr lang="pl-PL" smtClean="0"/>
-              <a:t>2020-07-28</a:t>
+              <a:t>2020-08-07</a:t>
             </a:fld>
             <a:endParaRPr lang="pl-PL"/>
           </a:p>
@@ -2904,7 +2910,7 @@
           <a:p>
             <a:fld id="{4FD404D1-5F19-478C-80D6-07287D7F4AD9}" type="datetimeFigureOut">
               <a:rPr lang="pl-PL" smtClean="0"/>
-              <a:t>2020-07-28</a:t>
+              <a:t>2020-08-07</a:t>
             </a:fld>
             <a:endParaRPr lang="pl-PL"/>
           </a:p>
@@ -4100,6 +4106,2477 @@
 </p:sld>
 </file>
 
+<file path=ppt/slides/slide2.xml><?xml version="1.0" encoding="utf-8"?>
+<p:sld xmlns:a="http://schemas.openxmlformats.org/drawingml/2006/main" xmlns:r="http://schemas.openxmlformats.org/officeDocument/2006/relationships" xmlns:p="http://schemas.openxmlformats.org/presentationml/2006/main">
+  <p:cSld>
+    <p:spTree>
+      <p:nvGrpSpPr>
+        <p:cNvPr id="1" name=""/>
+        <p:cNvGrpSpPr/>
+        <p:nvPr/>
+      </p:nvGrpSpPr>
+      <p:grpSpPr>
+        <a:xfrm>
+          <a:off x="0" y="0"/>
+          <a:ext cx="0" cy="0"/>
+          <a:chOff x="0" y="0"/>
+          <a:chExt cx="0" cy="0"/>
+        </a:xfrm>
+      </p:grpSpPr>
+      <p:sp>
+        <p:nvSpPr>
+          <p:cNvPr id="14" name="Prostokąt: zaokrąglone rogi 13">
+            <a:extLst>
+              <a:ext uri="{FF2B5EF4-FFF2-40B4-BE49-F238E27FC236}">
+                <a16:creationId xmlns:a16="http://schemas.microsoft.com/office/drawing/2014/main" id="{DB819128-1E3E-4241-8922-CD7D0E26CBD3}"/>
+              </a:ext>
+            </a:extLst>
+          </p:cNvPr>
+          <p:cNvSpPr/>
+          <p:nvPr/>
+        </p:nvSpPr>
+        <p:spPr>
+          <a:xfrm>
+            <a:off x="1947741" y="500935"/>
+            <a:ext cx="2909717" cy="2556718"/>
+          </a:xfrm>
+          <a:prstGeom prst="roundRect">
+            <a:avLst/>
+          </a:prstGeom>
+          <a:solidFill>
+            <a:schemeClr val="accent5">
+              <a:alpha val="21000"/>
+            </a:schemeClr>
+          </a:solidFill>
+          <a:ln>
+            <a:noFill/>
+          </a:ln>
+        </p:spPr>
+        <p:style>
+          <a:lnRef idx="0">
+            <a:scrgbClr r="0" g="0" b="0"/>
+          </a:lnRef>
+          <a:fillRef idx="0">
+            <a:scrgbClr r="0" g="0" b="0"/>
+          </a:fillRef>
+          <a:effectRef idx="0">
+            <a:scrgbClr r="0" g="0" b="0"/>
+          </a:effectRef>
+          <a:fontRef idx="minor">
+            <a:schemeClr val="lt1"/>
+          </a:fontRef>
+        </p:style>
+        <p:txBody>
+          <a:bodyPr rtlCol="0" anchor="ctr"/>
+          <a:lstStyle/>
+          <a:p>
+            <a:pPr algn="ctr"/>
+            <a:endParaRPr lang="pl-PL" dirty="0">
+              <a:latin typeface="Tahoma" panose="020B0604030504040204" pitchFamily="34" charset="0"/>
+              <a:ea typeface="Tahoma" panose="020B0604030504040204" pitchFamily="34" charset="0"/>
+              <a:cs typeface="Tahoma" panose="020B0604030504040204" pitchFamily="34" charset="0"/>
+            </a:endParaRPr>
+          </a:p>
+        </p:txBody>
+      </p:sp>
+      <p:sp>
+        <p:nvSpPr>
+          <p:cNvPr id="155" name="Prostokąt 154">
+            <a:extLst>
+              <a:ext uri="{FF2B5EF4-FFF2-40B4-BE49-F238E27FC236}">
+                <a16:creationId xmlns:a16="http://schemas.microsoft.com/office/drawing/2014/main" id="{69EC0BFB-B5E0-4E53-984B-8040575228AE}"/>
+              </a:ext>
+            </a:extLst>
+          </p:cNvPr>
+          <p:cNvSpPr/>
+          <p:nvPr/>
+        </p:nvSpPr>
+        <p:spPr>
+          <a:xfrm>
+            <a:off x="2459650" y="1985079"/>
+            <a:ext cx="1964284" cy="915677"/>
+          </a:xfrm>
+          <a:prstGeom prst="rect">
+            <a:avLst/>
+          </a:prstGeom>
+          <a:solidFill>
+            <a:schemeClr val="accent5">
+              <a:alpha val="50000"/>
+            </a:schemeClr>
+          </a:solidFill>
+          <a:ln>
+            <a:noFill/>
+          </a:ln>
+        </p:spPr>
+        <p:style>
+          <a:lnRef idx="0">
+            <a:scrgbClr r="0" g="0" b="0"/>
+          </a:lnRef>
+          <a:fillRef idx="0">
+            <a:scrgbClr r="0" g="0" b="0"/>
+          </a:fillRef>
+          <a:effectRef idx="0">
+            <a:scrgbClr r="0" g="0" b="0"/>
+          </a:effectRef>
+          <a:fontRef idx="minor">
+            <a:schemeClr val="lt1"/>
+          </a:fontRef>
+        </p:style>
+        <p:txBody>
+          <a:bodyPr rtlCol="0" anchor="ctr"/>
+          <a:lstStyle/>
+          <a:p>
+            <a:pPr algn="ctr"/>
+            <a:endParaRPr lang="pl-PL">
+              <a:latin typeface="Tahoma" panose="020B0604030504040204" pitchFamily="34" charset="0"/>
+              <a:ea typeface="Tahoma" panose="020B0604030504040204" pitchFamily="34" charset="0"/>
+              <a:cs typeface="Tahoma" panose="020B0604030504040204" pitchFamily="34" charset="0"/>
+            </a:endParaRPr>
+          </a:p>
+        </p:txBody>
+      </p:sp>
+      <p:sp>
+        <p:nvSpPr>
+          <p:cNvPr id="94" name="pole tekstowe 93">
+            <a:extLst>
+              <a:ext uri="{FF2B5EF4-FFF2-40B4-BE49-F238E27FC236}">
+                <a16:creationId xmlns:a16="http://schemas.microsoft.com/office/drawing/2014/main" id="{9F2D0134-A5F2-4C6C-B59F-F258570A4A53}"/>
+              </a:ext>
+            </a:extLst>
+          </p:cNvPr>
+          <p:cNvSpPr txBox="1"/>
+          <p:nvPr/>
+        </p:nvSpPr>
+        <p:spPr>
+          <a:xfrm>
+            <a:off x="1947741" y="2525684"/>
+            <a:ext cx="2909717" cy="307777"/>
+          </a:xfrm>
+          <a:prstGeom prst="rect">
+            <a:avLst/>
+          </a:prstGeom>
+          <a:noFill/>
+        </p:spPr>
+        <p:txBody>
+          <a:bodyPr wrap="square" rtlCol="0">
+            <a:spAutoFit/>
+          </a:bodyPr>
+          <a:lstStyle/>
+          <a:p>
+            <a:pPr algn="ctr"/>
+            <a:r>
+              <a:rPr lang="pl-PL" sz="700" dirty="0">
+                <a:latin typeface="Tahoma" panose="020B0604030504040204" pitchFamily="34" charset="0"/>
+                <a:ea typeface="Tahoma" panose="020B0604030504040204" pitchFamily="34" charset="0"/>
+                <a:cs typeface="Tahoma" panose="020B0604030504040204" pitchFamily="34" charset="0"/>
+              </a:rPr>
+              <a:t>LOCAL</a:t>
+            </a:r>
+          </a:p>
+          <a:p>
+            <a:pPr algn="ctr"/>
+            <a:r>
+              <a:rPr lang="pl-PL" sz="700" dirty="0">
+                <a:latin typeface="Tahoma" panose="020B0604030504040204" pitchFamily="34" charset="0"/>
+                <a:ea typeface="Tahoma" panose="020B0604030504040204" pitchFamily="34" charset="0"/>
+                <a:cs typeface="Tahoma" panose="020B0604030504040204" pitchFamily="34" charset="0"/>
+              </a:rPr>
+              <a:t>TRANSFORM SCRIPTS/APPLICATIONS</a:t>
+            </a:r>
+          </a:p>
+        </p:txBody>
+      </p:sp>
+      <p:pic>
+        <p:nvPicPr>
+          <p:cNvPr id="3" name="Grafika 2" descr="Serwer">
+            <a:extLst>
+              <a:ext uri="{FF2B5EF4-FFF2-40B4-BE49-F238E27FC236}">
+                <a16:creationId xmlns:a16="http://schemas.microsoft.com/office/drawing/2014/main" id="{9A8521AF-C8A2-4D84-A7B8-4E28DF47D730}"/>
+              </a:ext>
+            </a:extLst>
+          </p:cNvPr>
+          <p:cNvPicPr>
+            <a:picLocks noChangeAspect="1"/>
+          </p:cNvPicPr>
+          <p:nvPr/>
+        </p:nvPicPr>
+        <p:blipFill>
+          <a:blip r:embed="rId2">
+            <a:extLst>
+              <a:ext uri="{28A0092B-C50C-407E-A947-70E740481C1C}">
+                <a14:useLocalDpi xmlns:a14="http://schemas.microsoft.com/office/drawing/2010/main" val="0"/>
+              </a:ext>
+              <a:ext uri="{96DAC541-7B7A-43D3-8B79-37D633B846F1}">
+                <asvg:svgBlip xmlns:asvg="http://schemas.microsoft.com/office/drawing/2016/SVG/main" r:embed="rId3"/>
+              </a:ext>
+            </a:extLst>
+          </a:blip>
+          <a:stretch>
+            <a:fillRect/>
+          </a:stretch>
+        </p:blipFill>
+        <p:spPr>
+          <a:xfrm>
+            <a:off x="2945399" y="610511"/>
+            <a:ext cx="914400" cy="914400"/>
+          </a:xfrm>
+          <a:prstGeom prst="rect">
+            <a:avLst/>
+          </a:prstGeom>
+        </p:spPr>
+      </p:pic>
+      <p:sp>
+        <p:nvSpPr>
+          <p:cNvPr id="4" name="pole tekstowe 3">
+            <a:extLst>
+              <a:ext uri="{FF2B5EF4-FFF2-40B4-BE49-F238E27FC236}">
+                <a16:creationId xmlns:a16="http://schemas.microsoft.com/office/drawing/2014/main" id="{EE89D9F0-A945-4533-895B-253DC4E73B08}"/>
+              </a:ext>
+            </a:extLst>
+          </p:cNvPr>
+          <p:cNvSpPr txBox="1"/>
+          <p:nvPr/>
+        </p:nvSpPr>
+        <p:spPr>
+          <a:xfrm flipH="1">
+            <a:off x="2711337" y="1524911"/>
+            <a:ext cx="1313297" cy="307777"/>
+          </a:xfrm>
+          <a:prstGeom prst="rect">
+            <a:avLst/>
+          </a:prstGeom>
+          <a:noFill/>
+        </p:spPr>
+        <p:txBody>
+          <a:bodyPr wrap="square" rtlCol="0">
+            <a:spAutoFit/>
+          </a:bodyPr>
+          <a:lstStyle/>
+          <a:p>
+            <a:pPr algn="ctr"/>
+            <a:r>
+              <a:rPr lang="pl-PL" sz="1400" b="1" dirty="0">
+                <a:latin typeface="Tahoma" panose="020B0604030504040204" pitchFamily="34" charset="0"/>
+                <a:ea typeface="Tahoma" panose="020B0604030504040204" pitchFamily="34" charset="0"/>
+                <a:cs typeface="Tahoma" panose="020B0604030504040204" pitchFamily="34" charset="0"/>
+              </a:rPr>
+              <a:t>DCPAM ETL</a:t>
+            </a:r>
+            <a:endParaRPr lang="pl-PL" sz="1050" b="1" dirty="0">
+              <a:latin typeface="Tahoma" panose="020B0604030504040204" pitchFamily="34" charset="0"/>
+              <a:ea typeface="Tahoma" panose="020B0604030504040204" pitchFamily="34" charset="0"/>
+              <a:cs typeface="Tahoma" panose="020B0604030504040204" pitchFamily="34" charset="0"/>
+            </a:endParaRPr>
+          </a:p>
+        </p:txBody>
+      </p:sp>
+      <p:pic>
+        <p:nvPicPr>
+          <p:cNvPr id="92" name="Grafika 91" descr="Priorytety">
+            <a:extLst>
+              <a:ext uri="{FF2B5EF4-FFF2-40B4-BE49-F238E27FC236}">
+                <a16:creationId xmlns:a16="http://schemas.microsoft.com/office/drawing/2014/main" id="{1EE29D95-A2E1-421D-82CD-ACE69FC69BCA}"/>
+              </a:ext>
+            </a:extLst>
+          </p:cNvPr>
+          <p:cNvPicPr>
+            <a:picLocks noChangeAspect="1"/>
+          </p:cNvPicPr>
+          <p:nvPr/>
+        </p:nvPicPr>
+        <p:blipFill>
+          <a:blip r:embed="rId4">
+            <a:extLst>
+              <a:ext uri="{28A0092B-C50C-407E-A947-70E740481C1C}">
+                <a14:useLocalDpi xmlns:a14="http://schemas.microsoft.com/office/drawing/2010/main" val="0"/>
+              </a:ext>
+              <a:ext uri="{96DAC541-7B7A-43D3-8B79-37D633B846F1}">
+                <asvg:svgBlip xmlns:asvg="http://schemas.microsoft.com/office/drawing/2016/SVG/main" r:embed="rId5"/>
+              </a:ext>
+            </a:extLst>
+          </a:blip>
+          <a:stretch>
+            <a:fillRect/>
+          </a:stretch>
+        </p:blipFill>
+        <p:spPr>
+          <a:xfrm>
+            <a:off x="3785737" y="2086593"/>
+            <a:ext cx="529022" cy="529022"/>
+          </a:xfrm>
+          <a:prstGeom prst="rect">
+            <a:avLst/>
+          </a:prstGeom>
+        </p:spPr>
+      </p:pic>
+      <p:cxnSp>
+        <p:nvCxnSpPr>
+          <p:cNvPr id="109" name="Łącznik: łamany 108">
+            <a:extLst>
+              <a:ext uri="{FF2B5EF4-FFF2-40B4-BE49-F238E27FC236}">
+                <a16:creationId xmlns:a16="http://schemas.microsoft.com/office/drawing/2014/main" id="{FB7E8BF3-A62D-422A-B95F-E11F092F7087}"/>
+              </a:ext>
+            </a:extLst>
+          </p:cNvPr>
+          <p:cNvCxnSpPr>
+            <a:cxnSpLocks/>
+            <a:stCxn id="3" idx="3"/>
+            <a:endCxn id="155" idx="3"/>
+          </p:cNvCxnSpPr>
+          <p:nvPr/>
+        </p:nvCxnSpPr>
+        <p:spPr>
+          <a:xfrm>
+            <a:off x="3859799" y="1067711"/>
+            <a:ext cx="564135" cy="1375207"/>
+          </a:xfrm>
+          <a:prstGeom prst="bentConnector3">
+            <a:avLst>
+              <a:gd name="adj1" fmla="val 140522"/>
+            </a:avLst>
+          </a:prstGeom>
+          <a:ln>
+            <a:tailEnd type="triangle"/>
+          </a:ln>
+        </p:spPr>
+        <p:style>
+          <a:lnRef idx="2">
+            <a:schemeClr val="accent2"/>
+          </a:lnRef>
+          <a:fillRef idx="0">
+            <a:schemeClr val="accent2"/>
+          </a:fillRef>
+          <a:effectRef idx="1">
+            <a:schemeClr val="accent2"/>
+          </a:effectRef>
+          <a:fontRef idx="minor">
+            <a:schemeClr val="tx1"/>
+          </a:fontRef>
+        </p:style>
+      </p:cxnSp>
+      <p:cxnSp>
+        <p:nvCxnSpPr>
+          <p:cNvPr id="111" name="Łącznik: łamany 110">
+            <a:extLst>
+              <a:ext uri="{FF2B5EF4-FFF2-40B4-BE49-F238E27FC236}">
+                <a16:creationId xmlns:a16="http://schemas.microsoft.com/office/drawing/2014/main" id="{0C804CC7-F3C5-4D73-9B06-FB953C30B2EA}"/>
+              </a:ext>
+            </a:extLst>
+          </p:cNvPr>
+          <p:cNvCxnSpPr>
+            <a:cxnSpLocks/>
+            <a:stCxn id="3" idx="1"/>
+            <a:endCxn id="155" idx="1"/>
+          </p:cNvCxnSpPr>
+          <p:nvPr/>
+        </p:nvCxnSpPr>
+        <p:spPr>
+          <a:xfrm rot="10800000" flipV="1">
+            <a:off x="2459651" y="1067710"/>
+            <a:ext cx="485749" cy="1375207"/>
+          </a:xfrm>
+          <a:prstGeom prst="bentConnector3">
+            <a:avLst>
+              <a:gd name="adj1" fmla="val 147061"/>
+            </a:avLst>
+          </a:prstGeom>
+          <a:ln>
+            <a:tailEnd type="triangle"/>
+          </a:ln>
+        </p:spPr>
+        <p:style>
+          <a:lnRef idx="2">
+            <a:schemeClr val="accent2"/>
+          </a:lnRef>
+          <a:fillRef idx="0">
+            <a:schemeClr val="accent2"/>
+          </a:fillRef>
+          <a:effectRef idx="1">
+            <a:schemeClr val="accent2"/>
+          </a:effectRef>
+          <a:fontRef idx="minor">
+            <a:schemeClr val="tx1"/>
+          </a:fontRef>
+        </p:style>
+      </p:cxnSp>
+      <p:grpSp>
+        <p:nvGrpSpPr>
+          <p:cNvPr id="123" name="Grupa 122">
+            <a:extLst>
+              <a:ext uri="{FF2B5EF4-FFF2-40B4-BE49-F238E27FC236}">
+                <a16:creationId xmlns:a16="http://schemas.microsoft.com/office/drawing/2014/main" id="{913BA849-AFB8-4D8F-A28F-A2A5F3007D27}"/>
+              </a:ext>
+            </a:extLst>
+          </p:cNvPr>
+          <p:cNvGrpSpPr/>
+          <p:nvPr/>
+        </p:nvGrpSpPr>
+        <p:grpSpPr>
+          <a:xfrm>
+            <a:off x="5429786" y="510519"/>
+            <a:ext cx="2909717" cy="2556718"/>
+            <a:chOff x="6903376" y="975047"/>
+            <a:chExt cx="2909717" cy="2556718"/>
+          </a:xfrm>
+        </p:grpSpPr>
+        <p:sp>
+          <p:nvSpPr>
+            <p:cNvPr id="13" name="Prostokąt: zaokrąglone rogi 12">
+              <a:extLst>
+                <a:ext uri="{FF2B5EF4-FFF2-40B4-BE49-F238E27FC236}">
+                  <a16:creationId xmlns:a16="http://schemas.microsoft.com/office/drawing/2014/main" id="{8C12477C-6E81-4541-893F-A09CE085051E}"/>
+                </a:ext>
+              </a:extLst>
+            </p:cNvPr>
+            <p:cNvSpPr/>
+            <p:nvPr/>
+          </p:nvSpPr>
+          <p:spPr>
+            <a:xfrm>
+              <a:off x="6903376" y="975047"/>
+              <a:ext cx="2909717" cy="2556718"/>
+            </a:xfrm>
+            <a:prstGeom prst="roundRect">
+              <a:avLst/>
+            </a:prstGeom>
+            <a:solidFill>
+              <a:schemeClr val="accent5">
+                <a:alpha val="21000"/>
+              </a:schemeClr>
+            </a:solidFill>
+            <a:ln>
+              <a:noFill/>
+            </a:ln>
+          </p:spPr>
+          <p:style>
+            <a:lnRef idx="0">
+              <a:scrgbClr r="0" g="0" b="0"/>
+            </a:lnRef>
+            <a:fillRef idx="0">
+              <a:scrgbClr r="0" g="0" b="0"/>
+            </a:fillRef>
+            <a:effectRef idx="0">
+              <a:scrgbClr r="0" g="0" b="0"/>
+            </a:effectRef>
+            <a:fontRef idx="minor">
+              <a:schemeClr val="lt1"/>
+            </a:fontRef>
+          </p:style>
+          <p:txBody>
+            <a:bodyPr rtlCol="0" anchor="ctr"/>
+            <a:lstStyle/>
+            <a:p>
+              <a:pPr algn="ctr"/>
+              <a:endParaRPr lang="pl-PL">
+                <a:latin typeface="Tahoma" panose="020B0604030504040204" pitchFamily="34" charset="0"/>
+                <a:ea typeface="Tahoma" panose="020B0604030504040204" pitchFamily="34" charset="0"/>
+                <a:cs typeface="Tahoma" panose="020B0604030504040204" pitchFamily="34" charset="0"/>
+              </a:endParaRPr>
+            </a:p>
+          </p:txBody>
+        </p:sp>
+        <p:sp>
+          <p:nvSpPr>
+            <p:cNvPr id="72" name="Prostokąt 71">
+              <a:extLst>
+                <a:ext uri="{FF2B5EF4-FFF2-40B4-BE49-F238E27FC236}">
+                  <a16:creationId xmlns:a16="http://schemas.microsoft.com/office/drawing/2014/main" id="{ECD09F5B-AE6C-4192-9B8A-5B323C055F63}"/>
+                </a:ext>
+              </a:extLst>
+            </p:cNvPr>
+            <p:cNvSpPr/>
+            <p:nvPr/>
+          </p:nvSpPr>
+          <p:spPr>
+            <a:xfrm>
+              <a:off x="7124374" y="2416027"/>
+              <a:ext cx="2453058" cy="966119"/>
+            </a:xfrm>
+            <a:prstGeom prst="rect">
+              <a:avLst/>
+            </a:prstGeom>
+            <a:solidFill>
+              <a:schemeClr val="accent5">
+                <a:alpha val="50000"/>
+              </a:schemeClr>
+            </a:solidFill>
+            <a:ln>
+              <a:noFill/>
+            </a:ln>
+          </p:spPr>
+          <p:style>
+            <a:lnRef idx="0">
+              <a:scrgbClr r="0" g="0" b="0"/>
+            </a:lnRef>
+            <a:fillRef idx="0">
+              <a:scrgbClr r="0" g="0" b="0"/>
+            </a:fillRef>
+            <a:effectRef idx="0">
+              <a:scrgbClr r="0" g="0" b="0"/>
+            </a:effectRef>
+            <a:fontRef idx="minor">
+              <a:schemeClr val="lt1"/>
+            </a:fontRef>
+          </p:style>
+          <p:txBody>
+            <a:bodyPr rtlCol="0" anchor="ctr"/>
+            <a:lstStyle/>
+            <a:p>
+              <a:pPr algn="ctr"/>
+              <a:endParaRPr lang="pl-PL">
+                <a:latin typeface="Tahoma" panose="020B0604030504040204" pitchFamily="34" charset="0"/>
+                <a:ea typeface="Tahoma" panose="020B0604030504040204" pitchFamily="34" charset="0"/>
+                <a:cs typeface="Tahoma" panose="020B0604030504040204" pitchFamily="34" charset="0"/>
+              </a:endParaRPr>
+            </a:p>
+          </p:txBody>
+        </p:sp>
+        <p:sp>
+          <p:nvSpPr>
+            <p:cNvPr id="74" name="Prostokąt 73">
+              <a:extLst>
+                <a:ext uri="{FF2B5EF4-FFF2-40B4-BE49-F238E27FC236}">
+                  <a16:creationId xmlns:a16="http://schemas.microsoft.com/office/drawing/2014/main" id="{70F572F0-CD10-4BC9-85F2-E0AD8B857AF7}"/>
+                </a:ext>
+              </a:extLst>
+            </p:cNvPr>
+            <p:cNvSpPr/>
+            <p:nvPr/>
+          </p:nvSpPr>
+          <p:spPr>
+            <a:xfrm>
+              <a:off x="7572644" y="1084277"/>
+              <a:ext cx="1520782" cy="1331751"/>
+            </a:xfrm>
+            <a:prstGeom prst="rect">
+              <a:avLst/>
+            </a:prstGeom>
+            <a:solidFill>
+              <a:schemeClr val="accent5">
+                <a:alpha val="50000"/>
+              </a:schemeClr>
+            </a:solidFill>
+            <a:ln>
+              <a:noFill/>
+            </a:ln>
+          </p:spPr>
+          <p:style>
+            <a:lnRef idx="0">
+              <a:scrgbClr r="0" g="0" b="0"/>
+            </a:lnRef>
+            <a:fillRef idx="0">
+              <a:scrgbClr r="0" g="0" b="0"/>
+            </a:fillRef>
+            <a:effectRef idx="0">
+              <a:scrgbClr r="0" g="0" b="0"/>
+            </a:effectRef>
+            <a:fontRef idx="minor">
+              <a:schemeClr val="lt1"/>
+            </a:fontRef>
+          </p:style>
+          <p:txBody>
+            <a:bodyPr rtlCol="0" anchor="ctr"/>
+            <a:lstStyle/>
+            <a:p>
+              <a:pPr algn="ctr"/>
+              <a:endParaRPr lang="pl-PL">
+                <a:latin typeface="Tahoma" panose="020B0604030504040204" pitchFamily="34" charset="0"/>
+                <a:ea typeface="Tahoma" panose="020B0604030504040204" pitchFamily="34" charset="0"/>
+                <a:cs typeface="Tahoma" panose="020B0604030504040204" pitchFamily="34" charset="0"/>
+              </a:endParaRPr>
+            </a:p>
+          </p:txBody>
+        </p:sp>
+        <p:pic>
+          <p:nvPicPr>
+            <p:cNvPr id="11" name="Grafika 10" descr="Serwer">
+              <a:extLst>
+                <a:ext uri="{FF2B5EF4-FFF2-40B4-BE49-F238E27FC236}">
+                  <a16:creationId xmlns:a16="http://schemas.microsoft.com/office/drawing/2014/main" id="{DE8C10B5-984F-4591-8895-DAA4E6470ED9}"/>
+                </a:ext>
+              </a:extLst>
+            </p:cNvPr>
+            <p:cNvPicPr>
+              <a:picLocks noChangeAspect="1"/>
+            </p:cNvPicPr>
+            <p:nvPr/>
+          </p:nvPicPr>
+          <p:blipFill>
+            <a:blip r:embed="rId6">
+              <a:extLst>
+                <a:ext uri="{28A0092B-C50C-407E-A947-70E740481C1C}">
+                  <a14:useLocalDpi xmlns:a14="http://schemas.microsoft.com/office/drawing/2010/main" val="0"/>
+                </a:ext>
+                <a:ext uri="{96DAC541-7B7A-43D3-8B79-37D633B846F1}">
+                  <asvg:svgBlip xmlns:asvg="http://schemas.microsoft.com/office/drawing/2016/SVG/main" r:embed="rId7"/>
+                </a:ext>
+              </a:extLst>
+            </a:blip>
+            <a:stretch>
+              <a:fillRect/>
+            </a:stretch>
+          </p:blipFill>
+          <p:spPr>
+            <a:xfrm>
+              <a:off x="7903011" y="1073206"/>
+              <a:ext cx="914400" cy="914400"/>
+            </a:xfrm>
+            <a:prstGeom prst="rect">
+              <a:avLst/>
+            </a:prstGeom>
+          </p:spPr>
+        </p:pic>
+        <p:sp>
+          <p:nvSpPr>
+            <p:cNvPr id="12" name="pole tekstowe 11">
+              <a:extLst>
+                <a:ext uri="{FF2B5EF4-FFF2-40B4-BE49-F238E27FC236}">
+                  <a16:creationId xmlns:a16="http://schemas.microsoft.com/office/drawing/2014/main" id="{09A6A15B-3A6E-49D8-9720-0AA58C1EFADD}"/>
+                </a:ext>
+              </a:extLst>
+            </p:cNvPr>
+            <p:cNvSpPr txBox="1"/>
+            <p:nvPr/>
+          </p:nvSpPr>
+          <p:spPr>
+            <a:xfrm flipH="1">
+              <a:off x="7614587" y="1998676"/>
+              <a:ext cx="1478839" cy="307777"/>
+            </a:xfrm>
+            <a:prstGeom prst="rect">
+              <a:avLst/>
+            </a:prstGeom>
+            <a:noFill/>
+          </p:spPr>
+          <p:txBody>
+            <a:bodyPr wrap="square" rtlCol="0">
+              <a:spAutoFit/>
+            </a:bodyPr>
+            <a:lstStyle/>
+            <a:p>
+              <a:pPr algn="ctr"/>
+              <a:r>
+                <a:rPr lang="pl-PL" sz="1400" b="1" dirty="0">
+                  <a:latin typeface="Tahoma" panose="020B0604030504040204" pitchFamily="34" charset="0"/>
+                  <a:ea typeface="Tahoma" panose="020B0604030504040204" pitchFamily="34" charset="0"/>
+                  <a:cs typeface="Tahoma" panose="020B0604030504040204" pitchFamily="34" charset="0"/>
+                </a:rPr>
+                <a:t>DCPAM EXEC</a:t>
+              </a:r>
+              <a:endParaRPr lang="pl-PL" sz="1050" b="1" dirty="0">
+                <a:latin typeface="Tahoma" panose="020B0604030504040204" pitchFamily="34" charset="0"/>
+                <a:ea typeface="Tahoma" panose="020B0604030504040204" pitchFamily="34" charset="0"/>
+                <a:cs typeface="Tahoma" panose="020B0604030504040204" pitchFamily="34" charset="0"/>
+              </a:endParaRPr>
+            </a:p>
+          </p:txBody>
+        </p:sp>
+        <p:pic>
+          <p:nvPicPr>
+            <p:cNvPr id="16" name="Grafika 15" descr="Priorytety">
+              <a:extLst>
+                <a:ext uri="{FF2B5EF4-FFF2-40B4-BE49-F238E27FC236}">
+                  <a16:creationId xmlns:a16="http://schemas.microsoft.com/office/drawing/2014/main" id="{95BD1765-8642-4FEC-9237-4C065C07C852}"/>
+                </a:ext>
+              </a:extLst>
+            </p:cNvPr>
+            <p:cNvPicPr>
+              <a:picLocks noChangeAspect="1"/>
+            </p:cNvPicPr>
+            <p:nvPr/>
+          </p:nvPicPr>
+          <p:blipFill>
+            <a:blip r:embed="rId4">
+              <a:extLst>
+                <a:ext uri="{28A0092B-C50C-407E-A947-70E740481C1C}">
+                  <a14:useLocalDpi xmlns:a14="http://schemas.microsoft.com/office/drawing/2010/main" val="0"/>
+                </a:ext>
+                <a:ext uri="{96DAC541-7B7A-43D3-8B79-37D633B846F1}">
+                  <asvg:svgBlip xmlns:asvg="http://schemas.microsoft.com/office/drawing/2016/SVG/main" r:embed="rId8"/>
+                </a:ext>
+              </a:extLst>
+            </a:blip>
+            <a:stretch>
+              <a:fillRect/>
+            </a:stretch>
+          </p:blipFill>
+          <p:spPr>
+            <a:xfrm>
+              <a:off x="7234552" y="2551121"/>
+              <a:ext cx="448270" cy="448270"/>
+            </a:xfrm>
+            <a:prstGeom prst="rect">
+              <a:avLst/>
+            </a:prstGeom>
+          </p:spPr>
+        </p:pic>
+        <p:pic>
+          <p:nvPicPr>
+            <p:cNvPr id="17" name="Grafika 16" descr="Priorytety">
+              <a:extLst>
+                <a:ext uri="{FF2B5EF4-FFF2-40B4-BE49-F238E27FC236}">
+                  <a16:creationId xmlns:a16="http://schemas.microsoft.com/office/drawing/2014/main" id="{0083060B-5492-47FF-A444-EC49EC39C0D6}"/>
+                </a:ext>
+              </a:extLst>
+            </p:cNvPr>
+            <p:cNvPicPr>
+              <a:picLocks noChangeAspect="1"/>
+            </p:cNvPicPr>
+            <p:nvPr/>
+          </p:nvPicPr>
+          <p:blipFill>
+            <a:blip r:embed="rId4">
+              <a:extLst>
+                <a:ext uri="{28A0092B-C50C-407E-A947-70E740481C1C}">
+                  <a14:useLocalDpi xmlns:a14="http://schemas.microsoft.com/office/drawing/2010/main" val="0"/>
+                </a:ext>
+                <a:ext uri="{96DAC541-7B7A-43D3-8B79-37D633B846F1}">
+                  <asvg:svgBlip xmlns:asvg="http://schemas.microsoft.com/office/drawing/2016/SVG/main" r:embed="rId8"/>
+                </a:ext>
+              </a:extLst>
+            </a:blip>
+            <a:stretch>
+              <a:fillRect/>
+            </a:stretch>
+          </p:blipFill>
+          <p:spPr>
+            <a:xfrm>
+              <a:off x="7682822" y="2551121"/>
+              <a:ext cx="448270" cy="448270"/>
+            </a:xfrm>
+            <a:prstGeom prst="rect">
+              <a:avLst/>
+            </a:prstGeom>
+          </p:spPr>
+        </p:pic>
+        <p:pic>
+          <p:nvPicPr>
+            <p:cNvPr id="18" name="Grafika 17" descr="Priorytety">
+              <a:extLst>
+                <a:ext uri="{FF2B5EF4-FFF2-40B4-BE49-F238E27FC236}">
+                  <a16:creationId xmlns:a16="http://schemas.microsoft.com/office/drawing/2014/main" id="{9E3DD022-DD40-46F5-9D8E-A8BFCF358F01}"/>
+                </a:ext>
+              </a:extLst>
+            </p:cNvPr>
+            <p:cNvPicPr>
+              <a:picLocks noChangeAspect="1"/>
+            </p:cNvPicPr>
+            <p:nvPr/>
+          </p:nvPicPr>
+          <p:blipFill>
+            <a:blip r:embed="rId4">
+              <a:extLst>
+                <a:ext uri="{28A0092B-C50C-407E-A947-70E740481C1C}">
+                  <a14:useLocalDpi xmlns:a14="http://schemas.microsoft.com/office/drawing/2010/main" val="0"/>
+                </a:ext>
+                <a:ext uri="{96DAC541-7B7A-43D3-8B79-37D633B846F1}">
+                  <asvg:svgBlip xmlns:asvg="http://schemas.microsoft.com/office/drawing/2016/SVG/main" r:embed="rId8"/>
+                </a:ext>
+              </a:extLst>
+            </a:blip>
+            <a:stretch>
+              <a:fillRect/>
+            </a:stretch>
+          </p:blipFill>
+          <p:spPr>
+            <a:xfrm>
+              <a:off x="8131092" y="2540050"/>
+              <a:ext cx="448270" cy="448270"/>
+            </a:xfrm>
+            <a:prstGeom prst="rect">
+              <a:avLst/>
+            </a:prstGeom>
+          </p:spPr>
+        </p:pic>
+        <p:pic>
+          <p:nvPicPr>
+            <p:cNvPr id="19" name="Grafika 18" descr="Priorytety">
+              <a:extLst>
+                <a:ext uri="{FF2B5EF4-FFF2-40B4-BE49-F238E27FC236}">
+                  <a16:creationId xmlns:a16="http://schemas.microsoft.com/office/drawing/2014/main" id="{3934FFC2-1DE8-424C-9D05-6F8D4EEB8F6A}"/>
+                </a:ext>
+              </a:extLst>
+            </p:cNvPr>
+            <p:cNvPicPr>
+              <a:picLocks noChangeAspect="1"/>
+            </p:cNvPicPr>
+            <p:nvPr/>
+          </p:nvPicPr>
+          <p:blipFill>
+            <a:blip r:embed="rId4">
+              <a:extLst>
+                <a:ext uri="{28A0092B-C50C-407E-A947-70E740481C1C}">
+                  <a14:useLocalDpi xmlns:a14="http://schemas.microsoft.com/office/drawing/2010/main" val="0"/>
+                </a:ext>
+                <a:ext uri="{96DAC541-7B7A-43D3-8B79-37D633B846F1}">
+                  <asvg:svgBlip xmlns:asvg="http://schemas.microsoft.com/office/drawing/2016/SVG/main" r:embed="rId8"/>
+                </a:ext>
+              </a:extLst>
+            </a:blip>
+            <a:stretch>
+              <a:fillRect/>
+            </a:stretch>
+          </p:blipFill>
+          <p:spPr>
+            <a:xfrm>
+              <a:off x="8579362" y="2551121"/>
+              <a:ext cx="448270" cy="448270"/>
+            </a:xfrm>
+            <a:prstGeom prst="rect">
+              <a:avLst/>
+            </a:prstGeom>
+          </p:spPr>
+        </p:pic>
+        <p:pic>
+          <p:nvPicPr>
+            <p:cNvPr id="21" name="Grafika 20" descr="Priorytety">
+              <a:extLst>
+                <a:ext uri="{FF2B5EF4-FFF2-40B4-BE49-F238E27FC236}">
+                  <a16:creationId xmlns:a16="http://schemas.microsoft.com/office/drawing/2014/main" id="{FEA4F20D-702C-4B14-A68C-AD0D89E7446D}"/>
+                </a:ext>
+              </a:extLst>
+            </p:cNvPr>
+            <p:cNvPicPr>
+              <a:picLocks noChangeAspect="1"/>
+            </p:cNvPicPr>
+            <p:nvPr/>
+          </p:nvPicPr>
+          <p:blipFill>
+            <a:blip r:embed="rId4">
+              <a:extLst>
+                <a:ext uri="{28A0092B-C50C-407E-A947-70E740481C1C}">
+                  <a14:useLocalDpi xmlns:a14="http://schemas.microsoft.com/office/drawing/2010/main" val="0"/>
+                </a:ext>
+                <a:ext uri="{96DAC541-7B7A-43D3-8B79-37D633B846F1}">
+                  <asvg:svgBlip xmlns:asvg="http://schemas.microsoft.com/office/drawing/2016/SVG/main" r:embed="rId8"/>
+                </a:ext>
+              </a:extLst>
+            </a:blip>
+            <a:stretch>
+              <a:fillRect/>
+            </a:stretch>
+          </p:blipFill>
+          <p:spPr>
+            <a:xfrm>
+              <a:off x="9027632" y="2540050"/>
+              <a:ext cx="448270" cy="448270"/>
+            </a:xfrm>
+            <a:prstGeom prst="rect">
+              <a:avLst/>
+            </a:prstGeom>
+          </p:spPr>
+        </p:pic>
+        <p:sp>
+          <p:nvSpPr>
+            <p:cNvPr id="63" name="pole tekstowe 62">
+              <a:extLst>
+                <a:ext uri="{FF2B5EF4-FFF2-40B4-BE49-F238E27FC236}">
+                  <a16:creationId xmlns:a16="http://schemas.microsoft.com/office/drawing/2014/main" id="{CD67C160-7520-4F7D-983B-9FA2534CEB0D}"/>
+                </a:ext>
+              </a:extLst>
+            </p:cNvPr>
+            <p:cNvSpPr txBox="1"/>
+            <p:nvPr/>
+          </p:nvSpPr>
+          <p:spPr>
+            <a:xfrm>
+              <a:off x="6903376" y="2990108"/>
+              <a:ext cx="2909717" cy="307777"/>
+            </a:xfrm>
+            <a:prstGeom prst="rect">
+              <a:avLst/>
+            </a:prstGeom>
+            <a:noFill/>
+          </p:spPr>
+          <p:txBody>
+            <a:bodyPr wrap="square" rtlCol="0">
+              <a:spAutoFit/>
+            </a:bodyPr>
+            <a:lstStyle/>
+            <a:p>
+              <a:pPr algn="ctr"/>
+              <a:r>
+                <a:rPr lang="pl-PL" sz="700" dirty="0">
+                  <a:latin typeface="Tahoma" panose="020B0604030504040204" pitchFamily="34" charset="0"/>
+                  <a:ea typeface="Tahoma" panose="020B0604030504040204" pitchFamily="34" charset="0"/>
+                  <a:cs typeface="Tahoma" panose="020B0604030504040204" pitchFamily="34" charset="0"/>
+                </a:rPr>
+                <a:t>REMOTE</a:t>
+              </a:r>
+            </a:p>
+            <a:p>
+              <a:pPr algn="ctr"/>
+              <a:r>
+                <a:rPr lang="pl-PL" sz="700" dirty="0">
+                  <a:latin typeface="Tahoma" panose="020B0604030504040204" pitchFamily="34" charset="0"/>
+                  <a:ea typeface="Tahoma" panose="020B0604030504040204" pitchFamily="34" charset="0"/>
+                  <a:cs typeface="Tahoma" panose="020B0604030504040204" pitchFamily="34" charset="0"/>
+                </a:rPr>
+                <a:t>TRANSFORM SCRIPTS/APPLICATIONS</a:t>
+              </a:r>
+            </a:p>
+          </p:txBody>
+        </p:sp>
+      </p:grpSp>
+      <p:grpSp>
+        <p:nvGrpSpPr>
+          <p:cNvPr id="101" name="Grupa 100">
+            <a:extLst>
+              <a:ext uri="{FF2B5EF4-FFF2-40B4-BE49-F238E27FC236}">
+                <a16:creationId xmlns:a16="http://schemas.microsoft.com/office/drawing/2014/main" id="{B5055BC6-7553-4342-B7C8-096A113FEF1C}"/>
+              </a:ext>
+            </a:extLst>
+          </p:cNvPr>
+          <p:cNvGrpSpPr/>
+          <p:nvPr/>
+        </p:nvGrpSpPr>
+        <p:grpSpPr>
+          <a:xfrm>
+            <a:off x="5429785" y="3491699"/>
+            <a:ext cx="2909719" cy="2556718"/>
+            <a:chOff x="6552657" y="975047"/>
+            <a:chExt cx="2909719" cy="2556718"/>
+          </a:xfrm>
+        </p:grpSpPr>
+        <p:sp>
+          <p:nvSpPr>
+            <p:cNvPr id="96" name="Prostokąt: zaokrąglone rogi 95">
+              <a:extLst>
+                <a:ext uri="{FF2B5EF4-FFF2-40B4-BE49-F238E27FC236}">
+                  <a16:creationId xmlns:a16="http://schemas.microsoft.com/office/drawing/2014/main" id="{2A5227B6-5D61-4D75-A205-DA13BB905CAB}"/>
+                </a:ext>
+              </a:extLst>
+            </p:cNvPr>
+            <p:cNvSpPr/>
+            <p:nvPr/>
+          </p:nvSpPr>
+          <p:spPr>
+            <a:xfrm>
+              <a:off x="6552659" y="975047"/>
+              <a:ext cx="2909717" cy="2556718"/>
+            </a:xfrm>
+            <a:prstGeom prst="roundRect">
+              <a:avLst/>
+            </a:prstGeom>
+            <a:solidFill>
+              <a:schemeClr val="accent5">
+                <a:alpha val="21000"/>
+              </a:schemeClr>
+            </a:solidFill>
+            <a:ln>
+              <a:noFill/>
+            </a:ln>
+          </p:spPr>
+          <p:style>
+            <a:lnRef idx="0">
+              <a:scrgbClr r="0" g="0" b="0"/>
+            </a:lnRef>
+            <a:fillRef idx="0">
+              <a:scrgbClr r="0" g="0" b="0"/>
+            </a:fillRef>
+            <a:effectRef idx="0">
+              <a:scrgbClr r="0" g="0" b="0"/>
+            </a:effectRef>
+            <a:fontRef idx="minor">
+              <a:schemeClr val="lt1"/>
+            </a:fontRef>
+          </p:style>
+          <p:txBody>
+            <a:bodyPr rtlCol="0" anchor="ctr"/>
+            <a:lstStyle/>
+            <a:p>
+              <a:pPr algn="ctr"/>
+              <a:endParaRPr lang="pl-PL" dirty="0">
+                <a:latin typeface="Tahoma" panose="020B0604030504040204" pitchFamily="34" charset="0"/>
+                <a:ea typeface="Tahoma" panose="020B0604030504040204" pitchFamily="34" charset="0"/>
+                <a:cs typeface="Tahoma" panose="020B0604030504040204" pitchFamily="34" charset="0"/>
+              </a:endParaRPr>
+            </a:p>
+          </p:txBody>
+        </p:sp>
+        <p:pic>
+          <p:nvPicPr>
+            <p:cNvPr id="98" name="Grafika 97" descr="Baza danych">
+              <a:extLst>
+                <a:ext uri="{FF2B5EF4-FFF2-40B4-BE49-F238E27FC236}">
+                  <a16:creationId xmlns:a16="http://schemas.microsoft.com/office/drawing/2014/main" id="{3B846E8B-1B5B-4EDE-AE5B-F62766AFE8CF}"/>
+                </a:ext>
+              </a:extLst>
+            </p:cNvPr>
+            <p:cNvPicPr>
+              <a:picLocks noChangeAspect="1"/>
+            </p:cNvPicPr>
+            <p:nvPr/>
+          </p:nvPicPr>
+          <p:blipFill>
+            <a:blip r:embed="rId9">
+              <a:extLst>
+                <a:ext uri="{28A0092B-C50C-407E-A947-70E740481C1C}">
+                  <a14:useLocalDpi xmlns:a14="http://schemas.microsoft.com/office/drawing/2010/main" val="0"/>
+                </a:ext>
+                <a:ext uri="{96DAC541-7B7A-43D3-8B79-37D633B846F1}">
+                  <asvg:svgBlip xmlns:asvg="http://schemas.microsoft.com/office/drawing/2016/SVG/main" r:embed="rId10"/>
+                </a:ext>
+              </a:extLst>
+            </a:blip>
+            <a:stretch>
+              <a:fillRect/>
+            </a:stretch>
+          </p:blipFill>
+          <p:spPr>
+            <a:xfrm>
+              <a:off x="7124983" y="1105073"/>
+              <a:ext cx="1765065" cy="1765065"/>
+            </a:xfrm>
+            <a:prstGeom prst="rect">
+              <a:avLst/>
+            </a:prstGeom>
+          </p:spPr>
+        </p:pic>
+        <p:sp>
+          <p:nvSpPr>
+            <p:cNvPr id="100" name="pole tekstowe 99">
+              <a:extLst>
+                <a:ext uri="{FF2B5EF4-FFF2-40B4-BE49-F238E27FC236}">
+                  <a16:creationId xmlns:a16="http://schemas.microsoft.com/office/drawing/2014/main" id="{A511CBDB-917D-484C-BA3E-CD6E707F0C67}"/>
+                </a:ext>
+              </a:extLst>
+            </p:cNvPr>
+            <p:cNvSpPr txBox="1"/>
+            <p:nvPr/>
+          </p:nvSpPr>
+          <p:spPr>
+            <a:xfrm flipH="1">
+              <a:off x="6552657" y="2733877"/>
+              <a:ext cx="2909718" cy="307777"/>
+            </a:xfrm>
+            <a:prstGeom prst="rect">
+              <a:avLst/>
+            </a:prstGeom>
+            <a:noFill/>
+          </p:spPr>
+          <p:txBody>
+            <a:bodyPr wrap="square" rtlCol="0">
+              <a:spAutoFit/>
+            </a:bodyPr>
+            <a:lstStyle/>
+            <a:p>
+              <a:pPr algn="ctr"/>
+              <a:r>
+                <a:rPr lang="pl-PL" sz="1400" b="1" dirty="0">
+                  <a:latin typeface="Tahoma" panose="020B0604030504040204" pitchFamily="34" charset="0"/>
+                  <a:ea typeface="Tahoma" panose="020B0604030504040204" pitchFamily="34" charset="0"/>
+                  <a:cs typeface="Tahoma" panose="020B0604030504040204" pitchFamily="34" charset="0"/>
+                </a:rPr>
+                <a:t>DCPAM DATABASE</a:t>
+              </a:r>
+              <a:endParaRPr lang="pl-PL" sz="1050" b="1" dirty="0">
+                <a:latin typeface="Tahoma" panose="020B0604030504040204" pitchFamily="34" charset="0"/>
+                <a:ea typeface="Tahoma" panose="020B0604030504040204" pitchFamily="34" charset="0"/>
+                <a:cs typeface="Tahoma" panose="020B0604030504040204" pitchFamily="34" charset="0"/>
+              </a:endParaRPr>
+            </a:p>
+          </p:txBody>
+        </p:sp>
+      </p:grpSp>
+      <p:grpSp>
+        <p:nvGrpSpPr>
+          <p:cNvPr id="126" name="Grupa 125">
+            <a:extLst>
+              <a:ext uri="{FF2B5EF4-FFF2-40B4-BE49-F238E27FC236}">
+                <a16:creationId xmlns:a16="http://schemas.microsoft.com/office/drawing/2014/main" id="{23B52747-8E70-4224-ACFC-725EAA1BAEFE}"/>
+              </a:ext>
+            </a:extLst>
+          </p:cNvPr>
+          <p:cNvGrpSpPr/>
+          <p:nvPr/>
+        </p:nvGrpSpPr>
+        <p:grpSpPr>
+          <a:xfrm>
+            <a:off x="387453" y="3583241"/>
+            <a:ext cx="2909717" cy="2556718"/>
+            <a:chOff x="6903376" y="975047"/>
+            <a:chExt cx="2909717" cy="2556718"/>
+          </a:xfrm>
+        </p:grpSpPr>
+        <p:sp>
+          <p:nvSpPr>
+            <p:cNvPr id="127" name="Prostokąt: zaokrąglone rogi 126">
+              <a:extLst>
+                <a:ext uri="{FF2B5EF4-FFF2-40B4-BE49-F238E27FC236}">
+                  <a16:creationId xmlns:a16="http://schemas.microsoft.com/office/drawing/2014/main" id="{35780E79-62D5-44BD-8242-E86C18ED3C4A}"/>
+                </a:ext>
+              </a:extLst>
+            </p:cNvPr>
+            <p:cNvSpPr/>
+            <p:nvPr/>
+          </p:nvSpPr>
+          <p:spPr>
+            <a:xfrm>
+              <a:off x="6903376" y="975047"/>
+              <a:ext cx="2909717" cy="2556718"/>
+            </a:xfrm>
+            <a:prstGeom prst="roundRect">
+              <a:avLst/>
+            </a:prstGeom>
+            <a:solidFill>
+              <a:schemeClr val="accent5">
+                <a:alpha val="21000"/>
+              </a:schemeClr>
+            </a:solidFill>
+            <a:ln>
+              <a:noFill/>
+            </a:ln>
+          </p:spPr>
+          <p:style>
+            <a:lnRef idx="0">
+              <a:scrgbClr r="0" g="0" b="0"/>
+            </a:lnRef>
+            <a:fillRef idx="0">
+              <a:scrgbClr r="0" g="0" b="0"/>
+            </a:fillRef>
+            <a:effectRef idx="0">
+              <a:scrgbClr r="0" g="0" b="0"/>
+            </a:effectRef>
+            <a:fontRef idx="minor">
+              <a:schemeClr val="lt1"/>
+            </a:fontRef>
+          </p:style>
+          <p:txBody>
+            <a:bodyPr rtlCol="0" anchor="ctr"/>
+            <a:lstStyle/>
+            <a:p>
+              <a:pPr algn="ctr"/>
+              <a:endParaRPr lang="pl-PL">
+                <a:latin typeface="Tahoma" panose="020B0604030504040204" pitchFamily="34" charset="0"/>
+                <a:ea typeface="Tahoma" panose="020B0604030504040204" pitchFamily="34" charset="0"/>
+                <a:cs typeface="Tahoma" panose="020B0604030504040204" pitchFamily="34" charset="0"/>
+              </a:endParaRPr>
+            </a:p>
+          </p:txBody>
+        </p:sp>
+        <p:sp>
+          <p:nvSpPr>
+            <p:cNvPr id="128" name="Prostokąt 127">
+              <a:extLst>
+                <a:ext uri="{FF2B5EF4-FFF2-40B4-BE49-F238E27FC236}">
+                  <a16:creationId xmlns:a16="http://schemas.microsoft.com/office/drawing/2014/main" id="{A9A9AA0F-3040-4BC6-995C-9ADE35544A05}"/>
+                </a:ext>
+              </a:extLst>
+            </p:cNvPr>
+            <p:cNvSpPr/>
+            <p:nvPr/>
+          </p:nvSpPr>
+          <p:spPr>
+            <a:xfrm>
+              <a:off x="7124374" y="2416027"/>
+              <a:ext cx="2453058" cy="966119"/>
+            </a:xfrm>
+            <a:prstGeom prst="rect">
+              <a:avLst/>
+            </a:prstGeom>
+            <a:solidFill>
+              <a:schemeClr val="accent5">
+                <a:alpha val="50000"/>
+              </a:schemeClr>
+            </a:solidFill>
+            <a:ln>
+              <a:noFill/>
+            </a:ln>
+          </p:spPr>
+          <p:style>
+            <a:lnRef idx="0">
+              <a:scrgbClr r="0" g="0" b="0"/>
+            </a:lnRef>
+            <a:fillRef idx="0">
+              <a:scrgbClr r="0" g="0" b="0"/>
+            </a:fillRef>
+            <a:effectRef idx="0">
+              <a:scrgbClr r="0" g="0" b="0"/>
+            </a:effectRef>
+            <a:fontRef idx="minor">
+              <a:schemeClr val="lt1"/>
+            </a:fontRef>
+          </p:style>
+          <p:txBody>
+            <a:bodyPr rtlCol="0" anchor="ctr"/>
+            <a:lstStyle/>
+            <a:p>
+              <a:pPr algn="ctr"/>
+              <a:endParaRPr lang="pl-PL">
+                <a:latin typeface="Tahoma" panose="020B0604030504040204" pitchFamily="34" charset="0"/>
+                <a:ea typeface="Tahoma" panose="020B0604030504040204" pitchFamily="34" charset="0"/>
+                <a:cs typeface="Tahoma" panose="020B0604030504040204" pitchFamily="34" charset="0"/>
+              </a:endParaRPr>
+            </a:p>
+          </p:txBody>
+        </p:sp>
+        <p:sp>
+          <p:nvSpPr>
+            <p:cNvPr id="129" name="Prostokąt 128">
+              <a:extLst>
+                <a:ext uri="{FF2B5EF4-FFF2-40B4-BE49-F238E27FC236}">
+                  <a16:creationId xmlns:a16="http://schemas.microsoft.com/office/drawing/2014/main" id="{6429D2E6-3169-4E04-930F-2507A6AF40BD}"/>
+                </a:ext>
+              </a:extLst>
+            </p:cNvPr>
+            <p:cNvSpPr/>
+            <p:nvPr/>
+          </p:nvSpPr>
+          <p:spPr>
+            <a:xfrm>
+              <a:off x="7572644" y="1084277"/>
+              <a:ext cx="1520782" cy="1331751"/>
+            </a:xfrm>
+            <a:prstGeom prst="rect">
+              <a:avLst/>
+            </a:prstGeom>
+            <a:solidFill>
+              <a:schemeClr val="accent5">
+                <a:alpha val="50000"/>
+              </a:schemeClr>
+            </a:solidFill>
+            <a:ln>
+              <a:noFill/>
+            </a:ln>
+          </p:spPr>
+          <p:style>
+            <a:lnRef idx="0">
+              <a:scrgbClr r="0" g="0" b="0"/>
+            </a:lnRef>
+            <a:fillRef idx="0">
+              <a:scrgbClr r="0" g="0" b="0"/>
+            </a:fillRef>
+            <a:effectRef idx="0">
+              <a:scrgbClr r="0" g="0" b="0"/>
+            </a:effectRef>
+            <a:fontRef idx="minor">
+              <a:schemeClr val="lt1"/>
+            </a:fontRef>
+          </p:style>
+          <p:txBody>
+            <a:bodyPr rtlCol="0" anchor="ctr"/>
+            <a:lstStyle/>
+            <a:p>
+              <a:pPr algn="ctr"/>
+              <a:endParaRPr lang="pl-PL">
+                <a:latin typeface="Tahoma" panose="020B0604030504040204" pitchFamily="34" charset="0"/>
+                <a:ea typeface="Tahoma" panose="020B0604030504040204" pitchFamily="34" charset="0"/>
+                <a:cs typeface="Tahoma" panose="020B0604030504040204" pitchFamily="34" charset="0"/>
+              </a:endParaRPr>
+            </a:p>
+          </p:txBody>
+        </p:sp>
+        <p:pic>
+          <p:nvPicPr>
+            <p:cNvPr id="130" name="Grafika 129" descr="Serwer">
+              <a:extLst>
+                <a:ext uri="{FF2B5EF4-FFF2-40B4-BE49-F238E27FC236}">
+                  <a16:creationId xmlns:a16="http://schemas.microsoft.com/office/drawing/2014/main" id="{48B8AF7A-D230-43B5-B61A-CAC5E7BEE138}"/>
+                </a:ext>
+              </a:extLst>
+            </p:cNvPr>
+            <p:cNvPicPr>
+              <a:picLocks noChangeAspect="1"/>
+            </p:cNvPicPr>
+            <p:nvPr/>
+          </p:nvPicPr>
+          <p:blipFill>
+            <a:blip r:embed="rId6">
+              <a:extLst>
+                <a:ext uri="{28A0092B-C50C-407E-A947-70E740481C1C}">
+                  <a14:useLocalDpi xmlns:a14="http://schemas.microsoft.com/office/drawing/2010/main" val="0"/>
+                </a:ext>
+                <a:ext uri="{96DAC541-7B7A-43D3-8B79-37D633B846F1}">
+                  <asvg:svgBlip xmlns:asvg="http://schemas.microsoft.com/office/drawing/2016/SVG/main" r:embed="rId11"/>
+                </a:ext>
+              </a:extLst>
+            </a:blip>
+            <a:stretch>
+              <a:fillRect/>
+            </a:stretch>
+          </p:blipFill>
+          <p:spPr>
+            <a:xfrm>
+              <a:off x="7903011" y="1073206"/>
+              <a:ext cx="914400" cy="914400"/>
+            </a:xfrm>
+            <a:prstGeom prst="rect">
+              <a:avLst/>
+            </a:prstGeom>
+          </p:spPr>
+        </p:pic>
+        <p:sp>
+          <p:nvSpPr>
+            <p:cNvPr id="131" name="pole tekstowe 130">
+              <a:extLst>
+                <a:ext uri="{FF2B5EF4-FFF2-40B4-BE49-F238E27FC236}">
+                  <a16:creationId xmlns:a16="http://schemas.microsoft.com/office/drawing/2014/main" id="{3289EE11-DC72-47CB-891B-2BBE3163BCB0}"/>
+                </a:ext>
+              </a:extLst>
+            </p:cNvPr>
+            <p:cNvSpPr txBox="1"/>
+            <p:nvPr/>
+          </p:nvSpPr>
+          <p:spPr>
+            <a:xfrm flipH="1">
+              <a:off x="7614587" y="1998676"/>
+              <a:ext cx="1478839" cy="307777"/>
+            </a:xfrm>
+            <a:prstGeom prst="rect">
+              <a:avLst/>
+            </a:prstGeom>
+            <a:noFill/>
+          </p:spPr>
+          <p:txBody>
+            <a:bodyPr wrap="square" rtlCol="0">
+              <a:spAutoFit/>
+            </a:bodyPr>
+            <a:lstStyle/>
+            <a:p>
+              <a:pPr algn="ctr"/>
+              <a:r>
+                <a:rPr lang="pl-PL" sz="1400" b="1" dirty="0">
+                  <a:latin typeface="Tahoma" panose="020B0604030504040204" pitchFamily="34" charset="0"/>
+                  <a:ea typeface="Tahoma" panose="020B0604030504040204" pitchFamily="34" charset="0"/>
+                  <a:cs typeface="Tahoma" panose="020B0604030504040204" pitchFamily="34" charset="0"/>
+                </a:rPr>
+                <a:t>DCPAM EXEC</a:t>
+              </a:r>
+              <a:endParaRPr lang="pl-PL" sz="1050" b="1" dirty="0">
+                <a:latin typeface="Tahoma" panose="020B0604030504040204" pitchFamily="34" charset="0"/>
+                <a:ea typeface="Tahoma" panose="020B0604030504040204" pitchFamily="34" charset="0"/>
+                <a:cs typeface="Tahoma" panose="020B0604030504040204" pitchFamily="34" charset="0"/>
+              </a:endParaRPr>
+            </a:p>
+          </p:txBody>
+        </p:sp>
+        <p:pic>
+          <p:nvPicPr>
+            <p:cNvPr id="132" name="Grafika 131" descr="Priorytety">
+              <a:extLst>
+                <a:ext uri="{FF2B5EF4-FFF2-40B4-BE49-F238E27FC236}">
+                  <a16:creationId xmlns:a16="http://schemas.microsoft.com/office/drawing/2014/main" id="{1BBEA98C-9446-43C3-A25A-5B01E6AC20EB}"/>
+                </a:ext>
+              </a:extLst>
+            </p:cNvPr>
+            <p:cNvPicPr>
+              <a:picLocks noChangeAspect="1"/>
+            </p:cNvPicPr>
+            <p:nvPr/>
+          </p:nvPicPr>
+          <p:blipFill>
+            <a:blip r:embed="rId4">
+              <a:extLst>
+                <a:ext uri="{28A0092B-C50C-407E-A947-70E740481C1C}">
+                  <a14:useLocalDpi xmlns:a14="http://schemas.microsoft.com/office/drawing/2010/main" val="0"/>
+                </a:ext>
+                <a:ext uri="{96DAC541-7B7A-43D3-8B79-37D633B846F1}">
+                  <asvg:svgBlip xmlns:asvg="http://schemas.microsoft.com/office/drawing/2016/SVG/main" r:embed="rId12"/>
+                </a:ext>
+              </a:extLst>
+            </a:blip>
+            <a:stretch>
+              <a:fillRect/>
+            </a:stretch>
+          </p:blipFill>
+          <p:spPr>
+            <a:xfrm>
+              <a:off x="7234552" y="2551121"/>
+              <a:ext cx="448270" cy="448270"/>
+            </a:xfrm>
+            <a:prstGeom prst="rect">
+              <a:avLst/>
+            </a:prstGeom>
+          </p:spPr>
+        </p:pic>
+        <p:pic>
+          <p:nvPicPr>
+            <p:cNvPr id="133" name="Grafika 132" descr="Priorytety">
+              <a:extLst>
+                <a:ext uri="{FF2B5EF4-FFF2-40B4-BE49-F238E27FC236}">
+                  <a16:creationId xmlns:a16="http://schemas.microsoft.com/office/drawing/2014/main" id="{493A1242-ECAB-41B6-8B64-31DDE31F62C7}"/>
+                </a:ext>
+              </a:extLst>
+            </p:cNvPr>
+            <p:cNvPicPr>
+              <a:picLocks noChangeAspect="1"/>
+            </p:cNvPicPr>
+            <p:nvPr/>
+          </p:nvPicPr>
+          <p:blipFill>
+            <a:blip r:embed="rId4">
+              <a:extLst>
+                <a:ext uri="{28A0092B-C50C-407E-A947-70E740481C1C}">
+                  <a14:useLocalDpi xmlns:a14="http://schemas.microsoft.com/office/drawing/2010/main" val="0"/>
+                </a:ext>
+                <a:ext uri="{96DAC541-7B7A-43D3-8B79-37D633B846F1}">
+                  <asvg:svgBlip xmlns:asvg="http://schemas.microsoft.com/office/drawing/2016/SVG/main" r:embed="rId12"/>
+                </a:ext>
+              </a:extLst>
+            </a:blip>
+            <a:stretch>
+              <a:fillRect/>
+            </a:stretch>
+          </p:blipFill>
+          <p:spPr>
+            <a:xfrm>
+              <a:off x="7682822" y="2551121"/>
+              <a:ext cx="448270" cy="448270"/>
+            </a:xfrm>
+            <a:prstGeom prst="rect">
+              <a:avLst/>
+            </a:prstGeom>
+          </p:spPr>
+        </p:pic>
+        <p:pic>
+          <p:nvPicPr>
+            <p:cNvPr id="134" name="Grafika 133" descr="Priorytety">
+              <a:extLst>
+                <a:ext uri="{FF2B5EF4-FFF2-40B4-BE49-F238E27FC236}">
+                  <a16:creationId xmlns:a16="http://schemas.microsoft.com/office/drawing/2014/main" id="{1F0800DB-7086-4D76-87B7-D88F25A8C0DE}"/>
+                </a:ext>
+              </a:extLst>
+            </p:cNvPr>
+            <p:cNvPicPr>
+              <a:picLocks noChangeAspect="1"/>
+            </p:cNvPicPr>
+            <p:nvPr/>
+          </p:nvPicPr>
+          <p:blipFill>
+            <a:blip r:embed="rId4">
+              <a:extLst>
+                <a:ext uri="{28A0092B-C50C-407E-A947-70E740481C1C}">
+                  <a14:useLocalDpi xmlns:a14="http://schemas.microsoft.com/office/drawing/2010/main" val="0"/>
+                </a:ext>
+                <a:ext uri="{96DAC541-7B7A-43D3-8B79-37D633B846F1}">
+                  <asvg:svgBlip xmlns:asvg="http://schemas.microsoft.com/office/drawing/2016/SVG/main" r:embed="rId12"/>
+                </a:ext>
+              </a:extLst>
+            </a:blip>
+            <a:stretch>
+              <a:fillRect/>
+            </a:stretch>
+          </p:blipFill>
+          <p:spPr>
+            <a:xfrm>
+              <a:off x="8131092" y="2540050"/>
+              <a:ext cx="448270" cy="448270"/>
+            </a:xfrm>
+            <a:prstGeom prst="rect">
+              <a:avLst/>
+            </a:prstGeom>
+          </p:spPr>
+        </p:pic>
+        <p:pic>
+          <p:nvPicPr>
+            <p:cNvPr id="135" name="Grafika 134" descr="Priorytety">
+              <a:extLst>
+                <a:ext uri="{FF2B5EF4-FFF2-40B4-BE49-F238E27FC236}">
+                  <a16:creationId xmlns:a16="http://schemas.microsoft.com/office/drawing/2014/main" id="{2A5E7F00-D1AF-40ED-9435-8753116C5708}"/>
+                </a:ext>
+              </a:extLst>
+            </p:cNvPr>
+            <p:cNvPicPr>
+              <a:picLocks noChangeAspect="1"/>
+            </p:cNvPicPr>
+            <p:nvPr/>
+          </p:nvPicPr>
+          <p:blipFill>
+            <a:blip r:embed="rId4">
+              <a:extLst>
+                <a:ext uri="{28A0092B-C50C-407E-A947-70E740481C1C}">
+                  <a14:useLocalDpi xmlns:a14="http://schemas.microsoft.com/office/drawing/2010/main" val="0"/>
+                </a:ext>
+                <a:ext uri="{96DAC541-7B7A-43D3-8B79-37D633B846F1}">
+                  <asvg:svgBlip xmlns:asvg="http://schemas.microsoft.com/office/drawing/2016/SVG/main" r:embed="rId12"/>
+                </a:ext>
+              </a:extLst>
+            </a:blip>
+            <a:stretch>
+              <a:fillRect/>
+            </a:stretch>
+          </p:blipFill>
+          <p:spPr>
+            <a:xfrm>
+              <a:off x="8579362" y="2551121"/>
+              <a:ext cx="448270" cy="448270"/>
+            </a:xfrm>
+            <a:prstGeom prst="rect">
+              <a:avLst/>
+            </a:prstGeom>
+          </p:spPr>
+        </p:pic>
+        <p:pic>
+          <p:nvPicPr>
+            <p:cNvPr id="136" name="Grafika 135" descr="Priorytety">
+              <a:extLst>
+                <a:ext uri="{FF2B5EF4-FFF2-40B4-BE49-F238E27FC236}">
+                  <a16:creationId xmlns:a16="http://schemas.microsoft.com/office/drawing/2014/main" id="{B7EA24AA-001F-49CD-8358-7503984B3365}"/>
+                </a:ext>
+              </a:extLst>
+            </p:cNvPr>
+            <p:cNvPicPr>
+              <a:picLocks noChangeAspect="1"/>
+            </p:cNvPicPr>
+            <p:nvPr/>
+          </p:nvPicPr>
+          <p:blipFill>
+            <a:blip r:embed="rId4">
+              <a:extLst>
+                <a:ext uri="{28A0092B-C50C-407E-A947-70E740481C1C}">
+                  <a14:useLocalDpi xmlns:a14="http://schemas.microsoft.com/office/drawing/2010/main" val="0"/>
+                </a:ext>
+                <a:ext uri="{96DAC541-7B7A-43D3-8B79-37D633B846F1}">
+                  <asvg:svgBlip xmlns:asvg="http://schemas.microsoft.com/office/drawing/2016/SVG/main" r:embed="rId12"/>
+                </a:ext>
+              </a:extLst>
+            </a:blip>
+            <a:stretch>
+              <a:fillRect/>
+            </a:stretch>
+          </p:blipFill>
+          <p:spPr>
+            <a:xfrm>
+              <a:off x="9027632" y="2540050"/>
+              <a:ext cx="448270" cy="448270"/>
+            </a:xfrm>
+            <a:prstGeom prst="rect">
+              <a:avLst/>
+            </a:prstGeom>
+          </p:spPr>
+        </p:pic>
+        <p:sp>
+          <p:nvSpPr>
+            <p:cNvPr id="137" name="pole tekstowe 136">
+              <a:extLst>
+                <a:ext uri="{FF2B5EF4-FFF2-40B4-BE49-F238E27FC236}">
+                  <a16:creationId xmlns:a16="http://schemas.microsoft.com/office/drawing/2014/main" id="{2AD69936-B9DA-4C4C-B944-8731AE0BC21B}"/>
+                </a:ext>
+              </a:extLst>
+            </p:cNvPr>
+            <p:cNvSpPr txBox="1"/>
+            <p:nvPr/>
+          </p:nvSpPr>
+          <p:spPr>
+            <a:xfrm>
+              <a:off x="6903376" y="2990108"/>
+              <a:ext cx="2909717" cy="307777"/>
+            </a:xfrm>
+            <a:prstGeom prst="rect">
+              <a:avLst/>
+            </a:prstGeom>
+            <a:noFill/>
+          </p:spPr>
+          <p:txBody>
+            <a:bodyPr wrap="square" rtlCol="0">
+              <a:spAutoFit/>
+            </a:bodyPr>
+            <a:lstStyle/>
+            <a:p>
+              <a:pPr algn="ctr"/>
+              <a:r>
+                <a:rPr lang="pl-PL" sz="700" dirty="0">
+                  <a:latin typeface="Tahoma" panose="020B0604030504040204" pitchFamily="34" charset="0"/>
+                  <a:ea typeface="Tahoma" panose="020B0604030504040204" pitchFamily="34" charset="0"/>
+                  <a:cs typeface="Tahoma" panose="020B0604030504040204" pitchFamily="34" charset="0"/>
+                </a:rPr>
+                <a:t>REMOTE</a:t>
+              </a:r>
+            </a:p>
+            <a:p>
+              <a:pPr algn="ctr"/>
+              <a:r>
+                <a:rPr lang="pl-PL" sz="700" dirty="0">
+                  <a:latin typeface="Tahoma" panose="020B0604030504040204" pitchFamily="34" charset="0"/>
+                  <a:ea typeface="Tahoma" panose="020B0604030504040204" pitchFamily="34" charset="0"/>
+                  <a:cs typeface="Tahoma" panose="020B0604030504040204" pitchFamily="34" charset="0"/>
+                </a:rPr>
+                <a:t>TRANSFORM SCRIPTS/APPLICATIONS</a:t>
+              </a:r>
+            </a:p>
+          </p:txBody>
+        </p:sp>
+      </p:grpSp>
+      <p:cxnSp>
+        <p:nvCxnSpPr>
+          <p:cNvPr id="139" name="Łącznik: łamany 138">
+            <a:extLst>
+              <a:ext uri="{FF2B5EF4-FFF2-40B4-BE49-F238E27FC236}">
+                <a16:creationId xmlns:a16="http://schemas.microsoft.com/office/drawing/2014/main" id="{F4B7BA2E-46E0-4B16-BB49-46A9C623BC63}"/>
+              </a:ext>
+            </a:extLst>
+          </p:cNvPr>
+          <p:cNvCxnSpPr>
+            <a:cxnSpLocks/>
+            <a:stCxn id="3" idx="3"/>
+            <a:endCxn id="74" idx="1"/>
+          </p:cNvCxnSpPr>
+          <p:nvPr/>
+        </p:nvCxnSpPr>
+        <p:spPr>
+          <a:xfrm>
+            <a:off x="3859799" y="1067711"/>
+            <a:ext cx="2239255" cy="217914"/>
+          </a:xfrm>
+          <a:prstGeom prst="bentConnector3">
+            <a:avLst/>
+          </a:prstGeom>
+          <a:ln>
+            <a:tailEnd type="triangle"/>
+          </a:ln>
+        </p:spPr>
+        <p:style>
+          <a:lnRef idx="2">
+            <a:schemeClr val="accent2"/>
+          </a:lnRef>
+          <a:fillRef idx="0">
+            <a:schemeClr val="accent2"/>
+          </a:fillRef>
+          <a:effectRef idx="1">
+            <a:schemeClr val="accent2"/>
+          </a:effectRef>
+          <a:fontRef idx="minor">
+            <a:schemeClr val="tx1"/>
+          </a:fontRef>
+        </p:style>
+      </p:cxnSp>
+      <p:cxnSp>
+        <p:nvCxnSpPr>
+          <p:cNvPr id="147" name="Łącznik: łamany 146">
+            <a:extLst>
+              <a:ext uri="{FF2B5EF4-FFF2-40B4-BE49-F238E27FC236}">
+                <a16:creationId xmlns:a16="http://schemas.microsoft.com/office/drawing/2014/main" id="{185B5641-193A-40B7-A459-ED963C75A46A}"/>
+              </a:ext>
+            </a:extLst>
+          </p:cNvPr>
+          <p:cNvCxnSpPr>
+            <a:stCxn id="72" idx="3"/>
+            <a:endCxn id="96" idx="3"/>
+          </p:cNvCxnSpPr>
+          <p:nvPr/>
+        </p:nvCxnSpPr>
+        <p:spPr>
+          <a:xfrm>
+            <a:off x="8103842" y="2434559"/>
+            <a:ext cx="235662" cy="2335499"/>
+          </a:xfrm>
+          <a:prstGeom prst="bentConnector3">
+            <a:avLst>
+              <a:gd name="adj1" fmla="val 197003"/>
+            </a:avLst>
+          </a:prstGeom>
+          <a:ln>
+            <a:tailEnd type="triangle"/>
+          </a:ln>
+        </p:spPr>
+        <p:style>
+          <a:lnRef idx="2">
+            <a:schemeClr val="accent4"/>
+          </a:lnRef>
+          <a:fillRef idx="0">
+            <a:schemeClr val="accent4"/>
+          </a:fillRef>
+          <a:effectRef idx="1">
+            <a:schemeClr val="accent4"/>
+          </a:effectRef>
+          <a:fontRef idx="minor">
+            <a:schemeClr val="tx1"/>
+          </a:fontRef>
+        </p:style>
+      </p:cxnSp>
+      <p:cxnSp>
+        <p:nvCxnSpPr>
+          <p:cNvPr id="149" name="Łącznik: łamany 148">
+            <a:extLst>
+              <a:ext uri="{FF2B5EF4-FFF2-40B4-BE49-F238E27FC236}">
+                <a16:creationId xmlns:a16="http://schemas.microsoft.com/office/drawing/2014/main" id="{059802CC-7C5F-420F-B94D-C940BE11A3D2}"/>
+              </a:ext>
+            </a:extLst>
+          </p:cNvPr>
+          <p:cNvCxnSpPr>
+            <a:cxnSpLocks/>
+            <a:stCxn id="128" idx="3"/>
+            <a:endCxn id="96" idx="1"/>
+          </p:cNvCxnSpPr>
+          <p:nvPr/>
+        </p:nvCxnSpPr>
+        <p:spPr>
+          <a:xfrm flipV="1">
+            <a:off x="3061509" y="4770058"/>
+            <a:ext cx="2368278" cy="737223"/>
+          </a:xfrm>
+          <a:prstGeom prst="bentConnector3">
+            <a:avLst>
+              <a:gd name="adj1" fmla="val 50000"/>
+            </a:avLst>
+          </a:prstGeom>
+          <a:ln>
+            <a:tailEnd type="triangle"/>
+          </a:ln>
+        </p:spPr>
+        <p:style>
+          <a:lnRef idx="2">
+            <a:schemeClr val="accent4"/>
+          </a:lnRef>
+          <a:fillRef idx="0">
+            <a:schemeClr val="accent4"/>
+          </a:fillRef>
+          <a:effectRef idx="1">
+            <a:schemeClr val="accent4"/>
+          </a:effectRef>
+          <a:fontRef idx="minor">
+            <a:schemeClr val="tx1"/>
+          </a:fontRef>
+        </p:style>
+      </p:cxnSp>
+      <p:cxnSp>
+        <p:nvCxnSpPr>
+          <p:cNvPr id="157" name="Łącznik: łamany 156">
+            <a:extLst>
+              <a:ext uri="{FF2B5EF4-FFF2-40B4-BE49-F238E27FC236}">
+                <a16:creationId xmlns:a16="http://schemas.microsoft.com/office/drawing/2014/main" id="{7B16BF67-E74A-4977-A39E-E799BEF93506}"/>
+              </a:ext>
+            </a:extLst>
+          </p:cNvPr>
+          <p:cNvCxnSpPr>
+            <a:cxnSpLocks/>
+            <a:stCxn id="155" idx="2"/>
+            <a:endCxn id="96" idx="1"/>
+          </p:cNvCxnSpPr>
+          <p:nvPr/>
+        </p:nvCxnSpPr>
+        <p:spPr>
+          <a:xfrm rot="16200000" flipH="1">
+            <a:off x="3501138" y="2841409"/>
+            <a:ext cx="1869302" cy="1987995"/>
+          </a:xfrm>
+          <a:prstGeom prst="bentConnector2">
+            <a:avLst/>
+          </a:prstGeom>
+          <a:ln>
+            <a:tailEnd type="triangle"/>
+          </a:ln>
+        </p:spPr>
+        <p:style>
+          <a:lnRef idx="2">
+            <a:schemeClr val="accent4"/>
+          </a:lnRef>
+          <a:fillRef idx="0">
+            <a:schemeClr val="accent4"/>
+          </a:fillRef>
+          <a:effectRef idx="1">
+            <a:schemeClr val="accent4"/>
+          </a:effectRef>
+          <a:fontRef idx="minor">
+            <a:schemeClr val="tx1"/>
+          </a:fontRef>
+        </p:style>
+      </p:cxnSp>
+      <p:grpSp>
+        <p:nvGrpSpPr>
+          <p:cNvPr id="167" name="Grupa 166">
+            <a:extLst>
+              <a:ext uri="{FF2B5EF4-FFF2-40B4-BE49-F238E27FC236}">
+                <a16:creationId xmlns:a16="http://schemas.microsoft.com/office/drawing/2014/main" id="{E66CBD36-F82E-4C69-A540-3B254EE13641}"/>
+              </a:ext>
+            </a:extLst>
+          </p:cNvPr>
+          <p:cNvGrpSpPr/>
+          <p:nvPr/>
+        </p:nvGrpSpPr>
+        <p:grpSpPr>
+          <a:xfrm>
+            <a:off x="9695020" y="3499882"/>
+            <a:ext cx="1870996" cy="1639097"/>
+            <a:chOff x="4971729" y="1536169"/>
+            <a:chExt cx="1870996" cy="1639097"/>
+          </a:xfrm>
+        </p:grpSpPr>
+        <p:sp>
+          <p:nvSpPr>
+            <p:cNvPr id="163" name="Prostokąt: zaokrąglone rogi 162">
+              <a:extLst>
+                <a:ext uri="{FF2B5EF4-FFF2-40B4-BE49-F238E27FC236}">
+                  <a16:creationId xmlns:a16="http://schemas.microsoft.com/office/drawing/2014/main" id="{2AA89DC7-2B63-4954-AC3B-29AF26D83612}"/>
+                </a:ext>
+              </a:extLst>
+            </p:cNvPr>
+            <p:cNvSpPr/>
+            <p:nvPr/>
+          </p:nvSpPr>
+          <p:spPr>
+            <a:xfrm>
+              <a:off x="4971730" y="1536169"/>
+              <a:ext cx="1870995" cy="1639097"/>
+            </a:xfrm>
+            <a:prstGeom prst="roundRect">
+              <a:avLst/>
+            </a:prstGeom>
+            <a:solidFill>
+              <a:schemeClr val="accent5">
+                <a:alpha val="21000"/>
+              </a:schemeClr>
+            </a:solidFill>
+            <a:ln>
+              <a:noFill/>
+            </a:ln>
+          </p:spPr>
+          <p:style>
+            <a:lnRef idx="0">
+              <a:scrgbClr r="0" g="0" b="0"/>
+            </a:lnRef>
+            <a:fillRef idx="0">
+              <a:scrgbClr r="0" g="0" b="0"/>
+            </a:fillRef>
+            <a:effectRef idx="0">
+              <a:scrgbClr r="0" g="0" b="0"/>
+            </a:effectRef>
+            <a:fontRef idx="minor">
+              <a:schemeClr val="lt1"/>
+            </a:fontRef>
+          </p:style>
+          <p:txBody>
+            <a:bodyPr rtlCol="0" anchor="ctr"/>
+            <a:lstStyle/>
+            <a:p>
+              <a:pPr algn="ctr"/>
+              <a:endParaRPr lang="pl-PL" dirty="0">
+                <a:latin typeface="Tahoma" panose="020B0604030504040204" pitchFamily="34" charset="0"/>
+                <a:ea typeface="Tahoma" panose="020B0604030504040204" pitchFamily="34" charset="0"/>
+                <a:cs typeface="Tahoma" panose="020B0604030504040204" pitchFamily="34" charset="0"/>
+              </a:endParaRPr>
+            </a:p>
+          </p:txBody>
+        </p:sp>
+        <p:grpSp>
+          <p:nvGrpSpPr>
+            <p:cNvPr id="166" name="Grupa 165">
+              <a:extLst>
+                <a:ext uri="{FF2B5EF4-FFF2-40B4-BE49-F238E27FC236}">
+                  <a16:creationId xmlns:a16="http://schemas.microsoft.com/office/drawing/2014/main" id="{47E97F05-902D-4239-9CD9-118E55B8FEF4}"/>
+                </a:ext>
+              </a:extLst>
+            </p:cNvPr>
+            <p:cNvGrpSpPr/>
+            <p:nvPr/>
+          </p:nvGrpSpPr>
+          <p:grpSpPr>
+            <a:xfrm>
+              <a:off x="4971729" y="1619528"/>
+              <a:ext cx="1870995" cy="1351994"/>
+              <a:chOff x="4971729" y="1619528"/>
+              <a:chExt cx="1870995" cy="1351994"/>
+            </a:xfrm>
+          </p:grpSpPr>
+          <p:pic>
+            <p:nvPicPr>
+              <p:cNvPr id="164" name="Grafika 163" descr="Baza danych">
+                <a:extLst>
+                  <a:ext uri="{FF2B5EF4-FFF2-40B4-BE49-F238E27FC236}">
+                    <a16:creationId xmlns:a16="http://schemas.microsoft.com/office/drawing/2014/main" id="{9EAF04B2-2452-46E3-9689-FCCAB3C24817}"/>
+                  </a:ext>
+                </a:extLst>
+              </p:cNvPr>
+              <p:cNvPicPr>
+                <a:picLocks noChangeAspect="1"/>
+              </p:cNvPicPr>
+              <p:nvPr/>
+            </p:nvPicPr>
+            <p:blipFill>
+              <a:blip r:embed="rId13">
+                <a:extLst>
+                  <a:ext uri="{28A0092B-C50C-407E-A947-70E740481C1C}">
+                    <a14:useLocalDpi xmlns:a14="http://schemas.microsoft.com/office/drawing/2010/main" val="0"/>
+                  </a:ext>
+                  <a:ext uri="{96DAC541-7B7A-43D3-8B79-37D633B846F1}">
+                    <asvg:svgBlip xmlns:asvg="http://schemas.microsoft.com/office/drawing/2016/SVG/main" r:embed="rId14"/>
+                  </a:ext>
+                </a:extLst>
+              </a:blip>
+              <a:stretch>
+                <a:fillRect/>
+              </a:stretch>
+            </p:blipFill>
+            <p:spPr>
+              <a:xfrm>
+                <a:off x="5339744" y="1619528"/>
+                <a:ext cx="1134965" cy="1131573"/>
+              </a:xfrm>
+              <a:prstGeom prst="rect">
+                <a:avLst/>
+              </a:prstGeom>
+            </p:spPr>
+          </p:pic>
+          <p:sp>
+            <p:nvSpPr>
+              <p:cNvPr id="165" name="pole tekstowe 164">
+                <a:extLst>
+                  <a:ext uri="{FF2B5EF4-FFF2-40B4-BE49-F238E27FC236}">
+                    <a16:creationId xmlns:a16="http://schemas.microsoft.com/office/drawing/2014/main" id="{C9B0EC43-A30F-4057-A8B3-AE849A9BF867}"/>
+                  </a:ext>
+                </a:extLst>
+              </p:cNvPr>
+              <p:cNvSpPr txBox="1"/>
+              <p:nvPr/>
+            </p:nvSpPr>
+            <p:spPr>
+              <a:xfrm flipH="1">
+                <a:off x="4971729" y="2663745"/>
+                <a:ext cx="1870995" cy="307777"/>
+              </a:xfrm>
+              <a:prstGeom prst="rect">
+                <a:avLst/>
+              </a:prstGeom>
+              <a:noFill/>
+            </p:spPr>
+            <p:txBody>
+              <a:bodyPr wrap="square" rtlCol="0">
+                <a:spAutoFit/>
+              </a:bodyPr>
+              <a:lstStyle/>
+              <a:p>
+                <a:pPr algn="ctr"/>
+                <a:r>
+                  <a:rPr lang="pl-PL" sz="1400" b="1" dirty="0">
+                    <a:latin typeface="Tahoma" panose="020B0604030504040204" pitchFamily="34" charset="0"/>
+                    <a:ea typeface="Tahoma" panose="020B0604030504040204" pitchFamily="34" charset="0"/>
+                    <a:cs typeface="Tahoma" panose="020B0604030504040204" pitchFamily="34" charset="0"/>
+                  </a:rPr>
+                  <a:t>STAGING AREA</a:t>
+                </a:r>
+                <a:endParaRPr lang="pl-PL" sz="1050" b="1" dirty="0">
+                  <a:latin typeface="Tahoma" panose="020B0604030504040204" pitchFamily="34" charset="0"/>
+                  <a:ea typeface="Tahoma" panose="020B0604030504040204" pitchFamily="34" charset="0"/>
+                  <a:cs typeface="Tahoma" panose="020B0604030504040204" pitchFamily="34" charset="0"/>
+                </a:endParaRPr>
+              </a:p>
+            </p:txBody>
+          </p:sp>
+        </p:grpSp>
+      </p:grpSp>
+      <p:pic>
+        <p:nvPicPr>
+          <p:cNvPr id="192" name="Grafika 191" descr="Priorytety">
+            <a:extLst>
+              <a:ext uri="{FF2B5EF4-FFF2-40B4-BE49-F238E27FC236}">
+                <a16:creationId xmlns:a16="http://schemas.microsoft.com/office/drawing/2014/main" id="{20310D52-DA04-4D9C-BB06-5979C6F5533A}"/>
+              </a:ext>
+            </a:extLst>
+          </p:cNvPr>
+          <p:cNvPicPr>
+            <a:picLocks noChangeAspect="1"/>
+          </p:cNvPicPr>
+          <p:nvPr/>
+        </p:nvPicPr>
+        <p:blipFill>
+          <a:blip r:embed="rId4">
+            <a:extLst>
+              <a:ext uri="{28A0092B-C50C-407E-A947-70E740481C1C}">
+                <a14:useLocalDpi xmlns:a14="http://schemas.microsoft.com/office/drawing/2010/main" val="0"/>
+              </a:ext>
+              <a:ext uri="{96DAC541-7B7A-43D3-8B79-37D633B846F1}">
+                <asvg:svgBlip xmlns:asvg="http://schemas.microsoft.com/office/drawing/2016/SVG/main" r:embed="rId15"/>
+              </a:ext>
+            </a:extLst>
+          </a:blip>
+          <a:stretch>
+            <a:fillRect/>
+          </a:stretch>
+        </p:blipFill>
+        <p:spPr>
+          <a:xfrm>
+            <a:off x="2562907" y="2081451"/>
+            <a:ext cx="529022" cy="529022"/>
+          </a:xfrm>
+          <a:prstGeom prst="rect">
+            <a:avLst/>
+          </a:prstGeom>
+        </p:spPr>
+      </p:pic>
+      <p:pic>
+        <p:nvPicPr>
+          <p:cNvPr id="195" name="Grafika 194" descr="Priorytety">
+            <a:extLst>
+              <a:ext uri="{FF2B5EF4-FFF2-40B4-BE49-F238E27FC236}">
+                <a16:creationId xmlns:a16="http://schemas.microsoft.com/office/drawing/2014/main" id="{29E43417-D22B-460A-A711-FD97DB786DD5}"/>
+              </a:ext>
+            </a:extLst>
+          </p:cNvPr>
+          <p:cNvPicPr>
+            <a:picLocks noChangeAspect="1"/>
+          </p:cNvPicPr>
+          <p:nvPr/>
+        </p:nvPicPr>
+        <p:blipFill>
+          <a:blip r:embed="rId4">
+            <a:extLst>
+              <a:ext uri="{28A0092B-C50C-407E-A947-70E740481C1C}">
+                <a14:useLocalDpi xmlns:a14="http://schemas.microsoft.com/office/drawing/2010/main" val="0"/>
+              </a:ext>
+              <a:ext uri="{96DAC541-7B7A-43D3-8B79-37D633B846F1}">
+                <asvg:svgBlip xmlns:asvg="http://schemas.microsoft.com/office/drawing/2016/SVG/main" r:embed="rId15"/>
+              </a:ext>
+            </a:extLst>
+          </a:blip>
+          <a:stretch>
+            <a:fillRect/>
+          </a:stretch>
+        </p:blipFill>
+        <p:spPr>
+          <a:xfrm>
+            <a:off x="3168233" y="2072645"/>
+            <a:ext cx="529022" cy="529022"/>
+          </a:xfrm>
+          <a:prstGeom prst="rect">
+            <a:avLst/>
+          </a:prstGeom>
+        </p:spPr>
+      </p:pic>
+      <p:cxnSp>
+        <p:nvCxnSpPr>
+          <p:cNvPr id="200" name="Łącznik: łamany 199">
+            <a:extLst>
+              <a:ext uri="{FF2B5EF4-FFF2-40B4-BE49-F238E27FC236}">
+                <a16:creationId xmlns:a16="http://schemas.microsoft.com/office/drawing/2014/main" id="{C8ED0ACB-0849-4C38-8A08-D4C03D7E3E4D}"/>
+              </a:ext>
+            </a:extLst>
+          </p:cNvPr>
+          <p:cNvCxnSpPr>
+            <a:stCxn id="163" idx="0"/>
+            <a:endCxn id="13" idx="3"/>
+          </p:cNvCxnSpPr>
+          <p:nvPr/>
+        </p:nvCxnSpPr>
+        <p:spPr>
+          <a:xfrm rot="16200000" flipV="1">
+            <a:off x="8629509" y="1498872"/>
+            <a:ext cx="1711004" cy="2291016"/>
+          </a:xfrm>
+          <a:prstGeom prst="bentConnector2">
+            <a:avLst/>
+          </a:prstGeom>
+        </p:spPr>
+        <p:style>
+          <a:lnRef idx="2">
+            <a:schemeClr val="accent1"/>
+          </a:lnRef>
+          <a:fillRef idx="0">
+            <a:schemeClr val="accent1"/>
+          </a:fillRef>
+          <a:effectRef idx="1">
+            <a:schemeClr val="accent1"/>
+          </a:effectRef>
+          <a:fontRef idx="minor">
+            <a:schemeClr val="tx1"/>
+          </a:fontRef>
+        </p:style>
+      </p:cxnSp>
+      <p:cxnSp>
+        <p:nvCxnSpPr>
+          <p:cNvPr id="202" name="Łącznik: łamany 201">
+            <a:extLst>
+              <a:ext uri="{FF2B5EF4-FFF2-40B4-BE49-F238E27FC236}">
+                <a16:creationId xmlns:a16="http://schemas.microsoft.com/office/drawing/2014/main" id="{F056A029-26D2-41D5-9A77-3FB7DEFB0FD0}"/>
+              </a:ext>
+            </a:extLst>
+          </p:cNvPr>
+          <p:cNvCxnSpPr>
+            <a:stCxn id="163" idx="0"/>
+            <a:endCxn id="14" idx="0"/>
+          </p:cNvCxnSpPr>
+          <p:nvPr/>
+        </p:nvCxnSpPr>
+        <p:spPr>
+          <a:xfrm rot="16200000" flipV="1">
+            <a:off x="5517087" y="-1613551"/>
+            <a:ext cx="2998947" cy="7227919"/>
+          </a:xfrm>
+          <a:prstGeom prst="bentConnector3">
+            <a:avLst>
+              <a:gd name="adj1" fmla="val 107623"/>
+            </a:avLst>
+          </a:prstGeom>
+        </p:spPr>
+        <p:style>
+          <a:lnRef idx="2">
+            <a:schemeClr val="accent1"/>
+          </a:lnRef>
+          <a:fillRef idx="0">
+            <a:schemeClr val="accent1"/>
+          </a:fillRef>
+          <a:effectRef idx="1">
+            <a:schemeClr val="accent1"/>
+          </a:effectRef>
+          <a:fontRef idx="minor">
+            <a:schemeClr val="tx1"/>
+          </a:fontRef>
+        </p:style>
+      </p:cxnSp>
+      <p:cxnSp>
+        <p:nvCxnSpPr>
+          <p:cNvPr id="204" name="Łącznik: łamany 203">
+            <a:extLst>
+              <a:ext uri="{FF2B5EF4-FFF2-40B4-BE49-F238E27FC236}">
+                <a16:creationId xmlns:a16="http://schemas.microsoft.com/office/drawing/2014/main" id="{F4EE6ADE-DE7B-4097-965F-997382D58BFE}"/>
+              </a:ext>
+            </a:extLst>
+          </p:cNvPr>
+          <p:cNvCxnSpPr>
+            <a:cxnSpLocks/>
+          </p:cNvCxnSpPr>
+          <p:nvPr/>
+        </p:nvCxnSpPr>
+        <p:spPr>
+          <a:xfrm rot="5400000">
+            <a:off x="5735926" y="1245367"/>
+            <a:ext cx="1000980" cy="8788207"/>
+          </a:xfrm>
+          <a:prstGeom prst="bentConnector3">
+            <a:avLst>
+              <a:gd name="adj1" fmla="val 122838"/>
+            </a:avLst>
+          </a:prstGeom>
+        </p:spPr>
+        <p:style>
+          <a:lnRef idx="2">
+            <a:schemeClr val="accent1"/>
+          </a:lnRef>
+          <a:fillRef idx="0">
+            <a:schemeClr val="accent1"/>
+          </a:fillRef>
+          <a:effectRef idx="1">
+            <a:schemeClr val="accent1"/>
+          </a:effectRef>
+          <a:fontRef idx="minor">
+            <a:schemeClr val="tx1"/>
+          </a:fontRef>
+        </p:style>
+      </p:cxnSp>
+      <p:sp>
+        <p:nvSpPr>
+          <p:cNvPr id="211" name="Prostokąt 210">
+            <a:extLst>
+              <a:ext uri="{FF2B5EF4-FFF2-40B4-BE49-F238E27FC236}">
+                <a16:creationId xmlns:a16="http://schemas.microsoft.com/office/drawing/2014/main" id="{C05793F6-DCCC-420A-9258-4C31268997E3}"/>
+              </a:ext>
+            </a:extLst>
+          </p:cNvPr>
+          <p:cNvSpPr/>
+          <p:nvPr/>
+        </p:nvSpPr>
+        <p:spPr>
+          <a:xfrm>
+            <a:off x="3933809" y="435031"/>
+            <a:ext cx="1169563" cy="321735"/>
+          </a:xfrm>
+          <a:prstGeom prst="rect">
+            <a:avLst/>
+          </a:prstGeom>
+        </p:spPr>
+        <p:style>
+          <a:lnRef idx="2">
+            <a:schemeClr val="accent1">
+              <a:shade val="50000"/>
+            </a:schemeClr>
+          </a:lnRef>
+          <a:fillRef idx="1">
+            <a:schemeClr val="accent1"/>
+          </a:fillRef>
+          <a:effectRef idx="0">
+            <a:schemeClr val="accent1"/>
+          </a:effectRef>
+          <a:fontRef idx="minor">
+            <a:schemeClr val="lt1"/>
+          </a:fontRef>
+        </p:style>
+        <p:txBody>
+          <a:bodyPr rtlCol="0" anchor="ctr"/>
+          <a:lstStyle/>
+          <a:p>
+            <a:pPr algn="ctr"/>
+            <a:r>
+              <a:rPr lang="pl-PL" sz="1100" b="1" dirty="0">
+                <a:latin typeface="Tahoma" panose="020B0604030504040204" pitchFamily="34" charset="0"/>
+                <a:ea typeface="Tahoma" panose="020B0604030504040204" pitchFamily="34" charset="0"/>
+                <a:cs typeface="Tahoma" panose="020B0604030504040204" pitchFamily="34" charset="0"/>
+              </a:rPr>
+              <a:t>SERVER #1</a:t>
+            </a:r>
+          </a:p>
+        </p:txBody>
+      </p:sp>
+      <p:sp>
+        <p:nvSpPr>
+          <p:cNvPr id="213" name="Prostokąt 212">
+            <a:extLst>
+              <a:ext uri="{FF2B5EF4-FFF2-40B4-BE49-F238E27FC236}">
+                <a16:creationId xmlns:a16="http://schemas.microsoft.com/office/drawing/2014/main" id="{5EFA5B70-BE35-43DA-BB2E-3D0D5E1A03C4}"/>
+              </a:ext>
+            </a:extLst>
+          </p:cNvPr>
+          <p:cNvSpPr/>
+          <p:nvPr/>
+        </p:nvSpPr>
+        <p:spPr>
+          <a:xfrm>
+            <a:off x="7399434" y="431568"/>
+            <a:ext cx="1169563" cy="321735"/>
+          </a:xfrm>
+          <a:prstGeom prst="rect">
+            <a:avLst/>
+          </a:prstGeom>
+        </p:spPr>
+        <p:style>
+          <a:lnRef idx="2">
+            <a:schemeClr val="accent1">
+              <a:shade val="50000"/>
+            </a:schemeClr>
+          </a:lnRef>
+          <a:fillRef idx="1">
+            <a:schemeClr val="accent1"/>
+          </a:fillRef>
+          <a:effectRef idx="0">
+            <a:schemeClr val="accent1"/>
+          </a:effectRef>
+          <a:fontRef idx="minor">
+            <a:schemeClr val="lt1"/>
+          </a:fontRef>
+        </p:style>
+        <p:txBody>
+          <a:bodyPr rtlCol="0" anchor="ctr"/>
+          <a:lstStyle/>
+          <a:p>
+            <a:pPr algn="ctr"/>
+            <a:r>
+              <a:rPr lang="pl-PL" sz="1100" b="1" dirty="0">
+                <a:latin typeface="Tahoma" panose="020B0604030504040204" pitchFamily="34" charset="0"/>
+                <a:ea typeface="Tahoma" panose="020B0604030504040204" pitchFamily="34" charset="0"/>
+                <a:cs typeface="Tahoma" panose="020B0604030504040204" pitchFamily="34" charset="0"/>
+              </a:rPr>
+              <a:t>SERVER #2</a:t>
+            </a:r>
+          </a:p>
+        </p:txBody>
+      </p:sp>
+      <p:sp>
+        <p:nvSpPr>
+          <p:cNvPr id="215" name="Prostokąt 214">
+            <a:extLst>
+              <a:ext uri="{FF2B5EF4-FFF2-40B4-BE49-F238E27FC236}">
+                <a16:creationId xmlns:a16="http://schemas.microsoft.com/office/drawing/2014/main" id="{A469BF04-AB3D-4D15-9BFB-9B9A1062AAF8}"/>
+              </a:ext>
+            </a:extLst>
+          </p:cNvPr>
+          <p:cNvSpPr/>
+          <p:nvPr/>
+        </p:nvSpPr>
+        <p:spPr>
+          <a:xfrm>
+            <a:off x="2335906" y="3519991"/>
+            <a:ext cx="1169563" cy="321735"/>
+          </a:xfrm>
+          <a:prstGeom prst="rect">
+            <a:avLst/>
+          </a:prstGeom>
+        </p:spPr>
+        <p:style>
+          <a:lnRef idx="2">
+            <a:schemeClr val="accent1">
+              <a:shade val="50000"/>
+            </a:schemeClr>
+          </a:lnRef>
+          <a:fillRef idx="1">
+            <a:schemeClr val="accent1"/>
+          </a:fillRef>
+          <a:effectRef idx="0">
+            <a:schemeClr val="accent1"/>
+          </a:effectRef>
+          <a:fontRef idx="minor">
+            <a:schemeClr val="lt1"/>
+          </a:fontRef>
+        </p:style>
+        <p:txBody>
+          <a:bodyPr rtlCol="0" anchor="ctr"/>
+          <a:lstStyle/>
+          <a:p>
+            <a:pPr algn="ctr"/>
+            <a:r>
+              <a:rPr lang="pl-PL" sz="1100" b="1" dirty="0">
+                <a:latin typeface="Tahoma" panose="020B0604030504040204" pitchFamily="34" charset="0"/>
+                <a:ea typeface="Tahoma" panose="020B0604030504040204" pitchFamily="34" charset="0"/>
+                <a:cs typeface="Tahoma" panose="020B0604030504040204" pitchFamily="34" charset="0"/>
+              </a:rPr>
+              <a:t>SERVER #3</a:t>
+            </a:r>
+          </a:p>
+        </p:txBody>
+      </p:sp>
+      <p:sp>
+        <p:nvSpPr>
+          <p:cNvPr id="217" name="Prostokąt 216">
+            <a:extLst>
+              <a:ext uri="{FF2B5EF4-FFF2-40B4-BE49-F238E27FC236}">
+                <a16:creationId xmlns:a16="http://schemas.microsoft.com/office/drawing/2014/main" id="{49DC1CBF-1B78-43D6-A19F-5BF2C6E5B21F}"/>
+              </a:ext>
+            </a:extLst>
+          </p:cNvPr>
+          <p:cNvSpPr/>
+          <p:nvPr/>
+        </p:nvSpPr>
+        <p:spPr>
+          <a:xfrm>
+            <a:off x="7358807" y="3418345"/>
+            <a:ext cx="1169563" cy="321735"/>
+          </a:xfrm>
+          <a:prstGeom prst="rect">
+            <a:avLst/>
+          </a:prstGeom>
+        </p:spPr>
+        <p:style>
+          <a:lnRef idx="2">
+            <a:schemeClr val="accent1">
+              <a:shade val="50000"/>
+            </a:schemeClr>
+          </a:lnRef>
+          <a:fillRef idx="1">
+            <a:schemeClr val="accent1"/>
+          </a:fillRef>
+          <a:effectRef idx="0">
+            <a:schemeClr val="accent1"/>
+          </a:effectRef>
+          <a:fontRef idx="minor">
+            <a:schemeClr val="lt1"/>
+          </a:fontRef>
+        </p:style>
+        <p:txBody>
+          <a:bodyPr rtlCol="0" anchor="ctr"/>
+          <a:lstStyle/>
+          <a:p>
+            <a:pPr algn="ctr"/>
+            <a:r>
+              <a:rPr lang="pl-PL" sz="1100" b="1" dirty="0">
+                <a:latin typeface="Tahoma" panose="020B0604030504040204" pitchFamily="34" charset="0"/>
+                <a:ea typeface="Tahoma" panose="020B0604030504040204" pitchFamily="34" charset="0"/>
+                <a:cs typeface="Tahoma" panose="020B0604030504040204" pitchFamily="34" charset="0"/>
+              </a:rPr>
+              <a:t>SERVER #4</a:t>
+            </a:r>
+          </a:p>
+        </p:txBody>
+      </p:sp>
+      <p:sp>
+        <p:nvSpPr>
+          <p:cNvPr id="219" name="Prostokąt 218">
+            <a:extLst>
+              <a:ext uri="{FF2B5EF4-FFF2-40B4-BE49-F238E27FC236}">
+                <a16:creationId xmlns:a16="http://schemas.microsoft.com/office/drawing/2014/main" id="{58D49A96-4C30-4B68-898A-A113583AB24C}"/>
+              </a:ext>
+            </a:extLst>
+          </p:cNvPr>
+          <p:cNvSpPr/>
+          <p:nvPr/>
+        </p:nvSpPr>
+        <p:spPr>
+          <a:xfrm>
+            <a:off x="10515704" y="3387655"/>
+            <a:ext cx="1169563" cy="321735"/>
+          </a:xfrm>
+          <a:prstGeom prst="rect">
+            <a:avLst/>
+          </a:prstGeom>
+        </p:spPr>
+        <p:style>
+          <a:lnRef idx="2">
+            <a:schemeClr val="accent1">
+              <a:shade val="50000"/>
+            </a:schemeClr>
+          </a:lnRef>
+          <a:fillRef idx="1">
+            <a:schemeClr val="accent1"/>
+          </a:fillRef>
+          <a:effectRef idx="0">
+            <a:schemeClr val="accent1"/>
+          </a:effectRef>
+          <a:fontRef idx="minor">
+            <a:schemeClr val="lt1"/>
+          </a:fontRef>
+        </p:style>
+        <p:txBody>
+          <a:bodyPr rtlCol="0" anchor="ctr"/>
+          <a:lstStyle/>
+          <a:p>
+            <a:pPr algn="ctr"/>
+            <a:r>
+              <a:rPr lang="pl-PL" sz="1100" b="1" dirty="0">
+                <a:latin typeface="Tahoma" panose="020B0604030504040204" pitchFamily="34" charset="0"/>
+                <a:ea typeface="Tahoma" panose="020B0604030504040204" pitchFamily="34" charset="0"/>
+                <a:cs typeface="Tahoma" panose="020B0604030504040204" pitchFamily="34" charset="0"/>
+              </a:rPr>
+              <a:t>SERVER #5</a:t>
+            </a:r>
+          </a:p>
+        </p:txBody>
+      </p:sp>
+      <p:cxnSp>
+        <p:nvCxnSpPr>
+          <p:cNvPr id="125" name="Łącznik: łamany 124">
+            <a:extLst>
+              <a:ext uri="{FF2B5EF4-FFF2-40B4-BE49-F238E27FC236}">
+                <a16:creationId xmlns:a16="http://schemas.microsoft.com/office/drawing/2014/main" id="{56D3A92C-BB62-4661-BEFC-6646342DB4FA}"/>
+              </a:ext>
+            </a:extLst>
+          </p:cNvPr>
+          <p:cNvCxnSpPr>
+            <a:cxnSpLocks/>
+            <a:stCxn id="3" idx="0"/>
+            <a:endCxn id="129" idx="1"/>
+          </p:cNvCxnSpPr>
+          <p:nvPr/>
+        </p:nvCxnSpPr>
+        <p:spPr>
+          <a:xfrm rot="16200000" flipH="1" flipV="1">
+            <a:off x="355742" y="1311490"/>
+            <a:ext cx="3747836" cy="2345878"/>
+          </a:xfrm>
+          <a:prstGeom prst="bentConnector4">
+            <a:avLst>
+              <a:gd name="adj1" fmla="val -6100"/>
+              <a:gd name="adj2" fmla="val 109745"/>
+            </a:avLst>
+          </a:prstGeom>
+          <a:ln>
+            <a:tailEnd type="triangle"/>
+          </a:ln>
+        </p:spPr>
+        <p:style>
+          <a:lnRef idx="2">
+            <a:schemeClr val="accent2"/>
+          </a:lnRef>
+          <a:fillRef idx="0">
+            <a:schemeClr val="accent2"/>
+          </a:fillRef>
+          <a:effectRef idx="1">
+            <a:schemeClr val="accent2"/>
+          </a:effectRef>
+          <a:fontRef idx="minor">
+            <a:schemeClr val="tx1"/>
+          </a:fontRef>
+        </p:style>
+      </p:cxnSp>
+    </p:spTree>
+    <p:extLst>
+      <p:ext uri="{BB962C8B-B14F-4D97-AF65-F5344CB8AC3E}">
+        <p14:creationId xmlns:p14="http://schemas.microsoft.com/office/powerpoint/2010/main" val="2958432149"/>
+      </p:ext>
+    </p:extLst>
+  </p:cSld>
+  <p:clrMapOvr>
+    <a:masterClrMapping/>
+  </p:clrMapOvr>
+</p:sld>
+</file>
+
 <file path=ppt/theme/theme1.xml><?xml version="1.0" encoding="utf-8"?>
 <a:theme xmlns:a="http://schemas.openxmlformats.org/drawingml/2006/main" name="Motyw pakietu Office">
   <a:themeElements>

</xml_diff>

<commit_message>
Updated DCPAM RDP overview picture
</commit_message>
<xml_diff>
--- a/docs/dwh.pptx
+++ b/docs/dwh.pptx
@@ -260,7 +260,7 @@
           <a:p>
             <a:fld id="{4FD404D1-5F19-478C-80D6-07287D7F4AD9}" type="datetimeFigureOut">
               <a:rPr lang="pl-PL" smtClean="0"/>
-              <a:t>2020-08-07</a:t>
+              <a:t>2020-08-08</a:t>
             </a:fld>
             <a:endParaRPr lang="pl-PL"/>
           </a:p>
@@ -458,7 +458,7 @@
           <a:p>
             <a:fld id="{4FD404D1-5F19-478C-80D6-07287D7F4AD9}" type="datetimeFigureOut">
               <a:rPr lang="pl-PL" smtClean="0"/>
-              <a:t>2020-08-07</a:t>
+              <a:t>2020-08-08</a:t>
             </a:fld>
             <a:endParaRPr lang="pl-PL"/>
           </a:p>
@@ -666,7 +666,7 @@
           <a:p>
             <a:fld id="{4FD404D1-5F19-478C-80D6-07287D7F4AD9}" type="datetimeFigureOut">
               <a:rPr lang="pl-PL" smtClean="0"/>
-              <a:t>2020-08-07</a:t>
+              <a:t>2020-08-08</a:t>
             </a:fld>
             <a:endParaRPr lang="pl-PL"/>
           </a:p>
@@ -864,7 +864,7 @@
           <a:p>
             <a:fld id="{4FD404D1-5F19-478C-80D6-07287D7F4AD9}" type="datetimeFigureOut">
               <a:rPr lang="pl-PL" smtClean="0"/>
-              <a:t>2020-08-07</a:t>
+              <a:t>2020-08-08</a:t>
             </a:fld>
             <a:endParaRPr lang="pl-PL"/>
           </a:p>
@@ -1139,7 +1139,7 @@
           <a:p>
             <a:fld id="{4FD404D1-5F19-478C-80D6-07287D7F4AD9}" type="datetimeFigureOut">
               <a:rPr lang="pl-PL" smtClean="0"/>
-              <a:t>2020-08-07</a:t>
+              <a:t>2020-08-08</a:t>
             </a:fld>
             <a:endParaRPr lang="pl-PL"/>
           </a:p>
@@ -1404,7 +1404,7 @@
           <a:p>
             <a:fld id="{4FD404D1-5F19-478C-80D6-07287D7F4AD9}" type="datetimeFigureOut">
               <a:rPr lang="pl-PL" smtClean="0"/>
-              <a:t>2020-08-07</a:t>
+              <a:t>2020-08-08</a:t>
             </a:fld>
             <a:endParaRPr lang="pl-PL"/>
           </a:p>
@@ -1816,7 +1816,7 @@
           <a:p>
             <a:fld id="{4FD404D1-5F19-478C-80D6-07287D7F4AD9}" type="datetimeFigureOut">
               <a:rPr lang="pl-PL" smtClean="0"/>
-              <a:t>2020-08-07</a:t>
+              <a:t>2020-08-08</a:t>
             </a:fld>
             <a:endParaRPr lang="pl-PL"/>
           </a:p>
@@ -1957,7 +1957,7 @@
           <a:p>
             <a:fld id="{4FD404D1-5F19-478C-80D6-07287D7F4AD9}" type="datetimeFigureOut">
               <a:rPr lang="pl-PL" smtClean="0"/>
-              <a:t>2020-08-07</a:t>
+              <a:t>2020-08-08</a:t>
             </a:fld>
             <a:endParaRPr lang="pl-PL"/>
           </a:p>
@@ -2070,7 +2070,7 @@
           <a:p>
             <a:fld id="{4FD404D1-5F19-478C-80D6-07287D7F4AD9}" type="datetimeFigureOut">
               <a:rPr lang="pl-PL" smtClean="0"/>
-              <a:t>2020-08-07</a:t>
+              <a:t>2020-08-08</a:t>
             </a:fld>
             <a:endParaRPr lang="pl-PL"/>
           </a:p>
@@ -2381,7 +2381,7 @@
           <a:p>
             <a:fld id="{4FD404D1-5F19-478C-80D6-07287D7F4AD9}" type="datetimeFigureOut">
               <a:rPr lang="pl-PL" smtClean="0"/>
-              <a:t>2020-08-07</a:t>
+              <a:t>2020-08-08</a:t>
             </a:fld>
             <a:endParaRPr lang="pl-PL"/>
           </a:p>
@@ -2669,7 +2669,7 @@
           <a:p>
             <a:fld id="{4FD404D1-5F19-478C-80D6-07287D7F4AD9}" type="datetimeFigureOut">
               <a:rPr lang="pl-PL" smtClean="0"/>
-              <a:t>2020-08-07</a:t>
+              <a:t>2020-08-08</a:t>
             </a:fld>
             <a:endParaRPr lang="pl-PL"/>
           </a:p>
@@ -2910,7 +2910,7 @@
           <a:p>
             <a:fld id="{4FD404D1-5F19-478C-80D6-07287D7F4AD9}" type="datetimeFigureOut">
               <a:rPr lang="pl-PL" smtClean="0"/>
-              <a:t>2020-08-07</a:t>
+              <a:t>2020-08-08</a:t>
             </a:fld>
             <a:endParaRPr lang="pl-PL"/>
           </a:p>
@@ -4761,7 +4761,7 @@
                   <a:ea typeface="Tahoma" panose="020B0604030504040204" pitchFamily="34" charset="0"/>
                   <a:cs typeface="Tahoma" panose="020B0604030504040204" pitchFamily="34" charset="0"/>
                 </a:rPr>
-                <a:t>DCPAM EXEC</a:t>
+                <a:t>DCPAM RDP</a:t>
               </a:r>
               <a:endParaRPr lang="pl-PL" sz="1050" b="1" dirty="0">
                 <a:latin typeface="Tahoma" panose="020B0604030504040204" pitchFamily="34" charset="0"/>
@@ -5441,7 +5441,7 @@
                   <a:ea typeface="Tahoma" panose="020B0604030504040204" pitchFamily="34" charset="0"/>
                   <a:cs typeface="Tahoma" panose="020B0604030504040204" pitchFamily="34" charset="0"/>
                 </a:rPr>
-                <a:t>DCPAM EXEC</a:t>
+                <a:t>DCPAM RDP</a:t>
               </a:r>
               <a:endParaRPr lang="pl-PL" sz="1050" b="1" dirty="0">
                 <a:latin typeface="Tahoma" panose="020B0604030504040204" pitchFamily="34" charset="0"/>

</xml_diff>

<commit_message>
DCPAM overview picture added.
</commit_message>
<xml_diff>
--- a/docs/dwh.pptx
+++ b/docs/dwh.pptx
@@ -7,6 +7,7 @@
   <p:sldIdLst>
     <p:sldId id="256" r:id="rId2"/>
     <p:sldId id="257" r:id="rId3"/>
+    <p:sldId id="258" r:id="rId4"/>
   </p:sldIdLst>
   <p:sldSz cx="12192000" cy="6858000"/>
   <p:notesSz cx="6858000" cy="9144000"/>
@@ -260,7 +261,7 @@
           <a:p>
             <a:fld id="{4FD404D1-5F19-478C-80D6-07287D7F4AD9}" type="datetimeFigureOut">
               <a:rPr lang="pl-PL" smtClean="0"/>
-              <a:t>2020-08-08</a:t>
+              <a:t>2020-08-12</a:t>
             </a:fld>
             <a:endParaRPr lang="pl-PL"/>
           </a:p>
@@ -458,7 +459,7 @@
           <a:p>
             <a:fld id="{4FD404D1-5F19-478C-80D6-07287D7F4AD9}" type="datetimeFigureOut">
               <a:rPr lang="pl-PL" smtClean="0"/>
-              <a:t>2020-08-08</a:t>
+              <a:t>2020-08-12</a:t>
             </a:fld>
             <a:endParaRPr lang="pl-PL"/>
           </a:p>
@@ -666,7 +667,7 @@
           <a:p>
             <a:fld id="{4FD404D1-5F19-478C-80D6-07287D7F4AD9}" type="datetimeFigureOut">
               <a:rPr lang="pl-PL" smtClean="0"/>
-              <a:t>2020-08-08</a:t>
+              <a:t>2020-08-12</a:t>
             </a:fld>
             <a:endParaRPr lang="pl-PL"/>
           </a:p>
@@ -864,7 +865,7 @@
           <a:p>
             <a:fld id="{4FD404D1-5F19-478C-80D6-07287D7F4AD9}" type="datetimeFigureOut">
               <a:rPr lang="pl-PL" smtClean="0"/>
-              <a:t>2020-08-08</a:t>
+              <a:t>2020-08-12</a:t>
             </a:fld>
             <a:endParaRPr lang="pl-PL"/>
           </a:p>
@@ -1139,7 +1140,7 @@
           <a:p>
             <a:fld id="{4FD404D1-5F19-478C-80D6-07287D7F4AD9}" type="datetimeFigureOut">
               <a:rPr lang="pl-PL" smtClean="0"/>
-              <a:t>2020-08-08</a:t>
+              <a:t>2020-08-12</a:t>
             </a:fld>
             <a:endParaRPr lang="pl-PL"/>
           </a:p>
@@ -1404,7 +1405,7 @@
           <a:p>
             <a:fld id="{4FD404D1-5F19-478C-80D6-07287D7F4AD9}" type="datetimeFigureOut">
               <a:rPr lang="pl-PL" smtClean="0"/>
-              <a:t>2020-08-08</a:t>
+              <a:t>2020-08-12</a:t>
             </a:fld>
             <a:endParaRPr lang="pl-PL"/>
           </a:p>
@@ -1816,7 +1817,7 @@
           <a:p>
             <a:fld id="{4FD404D1-5F19-478C-80D6-07287D7F4AD9}" type="datetimeFigureOut">
               <a:rPr lang="pl-PL" smtClean="0"/>
-              <a:t>2020-08-08</a:t>
+              <a:t>2020-08-12</a:t>
             </a:fld>
             <a:endParaRPr lang="pl-PL"/>
           </a:p>
@@ -1957,7 +1958,7 @@
           <a:p>
             <a:fld id="{4FD404D1-5F19-478C-80D6-07287D7F4AD9}" type="datetimeFigureOut">
               <a:rPr lang="pl-PL" smtClean="0"/>
-              <a:t>2020-08-08</a:t>
+              <a:t>2020-08-12</a:t>
             </a:fld>
             <a:endParaRPr lang="pl-PL"/>
           </a:p>
@@ -2070,7 +2071,7 @@
           <a:p>
             <a:fld id="{4FD404D1-5F19-478C-80D6-07287D7F4AD9}" type="datetimeFigureOut">
               <a:rPr lang="pl-PL" smtClean="0"/>
-              <a:t>2020-08-08</a:t>
+              <a:t>2020-08-12</a:t>
             </a:fld>
             <a:endParaRPr lang="pl-PL"/>
           </a:p>
@@ -2381,7 +2382,7 @@
           <a:p>
             <a:fld id="{4FD404D1-5F19-478C-80D6-07287D7F4AD9}" type="datetimeFigureOut">
               <a:rPr lang="pl-PL" smtClean="0"/>
-              <a:t>2020-08-08</a:t>
+              <a:t>2020-08-12</a:t>
             </a:fld>
             <a:endParaRPr lang="pl-PL"/>
           </a:p>
@@ -2669,7 +2670,7 @@
           <a:p>
             <a:fld id="{4FD404D1-5F19-478C-80D6-07287D7F4AD9}" type="datetimeFigureOut">
               <a:rPr lang="pl-PL" smtClean="0"/>
-              <a:t>2020-08-08</a:t>
+              <a:t>2020-08-12</a:t>
             </a:fld>
             <a:endParaRPr lang="pl-PL"/>
           </a:p>
@@ -2910,7 +2911,7 @@
           <a:p>
             <a:fld id="{4FD404D1-5F19-478C-80D6-07287D7F4AD9}" type="datetimeFigureOut">
               <a:rPr lang="pl-PL" smtClean="0"/>
-              <a:t>2020-08-08</a:t>
+              <a:t>2020-08-12</a:t>
             </a:fld>
             <a:endParaRPr lang="pl-PL"/>
           </a:p>
@@ -4123,382 +4124,6 @@
           <a:chExt cx="0" cy="0"/>
         </a:xfrm>
       </p:grpSpPr>
-      <p:sp>
-        <p:nvSpPr>
-          <p:cNvPr id="14" name="Prostokąt: zaokrąglone rogi 13">
-            <a:extLst>
-              <a:ext uri="{FF2B5EF4-FFF2-40B4-BE49-F238E27FC236}">
-                <a16:creationId xmlns:a16="http://schemas.microsoft.com/office/drawing/2014/main" id="{DB819128-1E3E-4241-8922-CD7D0E26CBD3}"/>
-              </a:ext>
-            </a:extLst>
-          </p:cNvPr>
-          <p:cNvSpPr/>
-          <p:nvPr/>
-        </p:nvSpPr>
-        <p:spPr>
-          <a:xfrm>
-            <a:off x="1947741" y="500935"/>
-            <a:ext cx="2909717" cy="2556718"/>
-          </a:xfrm>
-          <a:prstGeom prst="roundRect">
-            <a:avLst/>
-          </a:prstGeom>
-          <a:solidFill>
-            <a:schemeClr val="accent5">
-              <a:alpha val="21000"/>
-            </a:schemeClr>
-          </a:solidFill>
-          <a:ln>
-            <a:noFill/>
-          </a:ln>
-        </p:spPr>
-        <p:style>
-          <a:lnRef idx="0">
-            <a:scrgbClr r="0" g="0" b="0"/>
-          </a:lnRef>
-          <a:fillRef idx="0">
-            <a:scrgbClr r="0" g="0" b="0"/>
-          </a:fillRef>
-          <a:effectRef idx="0">
-            <a:scrgbClr r="0" g="0" b="0"/>
-          </a:effectRef>
-          <a:fontRef idx="minor">
-            <a:schemeClr val="lt1"/>
-          </a:fontRef>
-        </p:style>
-        <p:txBody>
-          <a:bodyPr rtlCol="0" anchor="ctr"/>
-          <a:lstStyle/>
-          <a:p>
-            <a:pPr algn="ctr"/>
-            <a:endParaRPr lang="pl-PL" dirty="0">
-              <a:latin typeface="Tahoma" panose="020B0604030504040204" pitchFamily="34" charset="0"/>
-              <a:ea typeface="Tahoma" panose="020B0604030504040204" pitchFamily="34" charset="0"/>
-              <a:cs typeface="Tahoma" panose="020B0604030504040204" pitchFamily="34" charset="0"/>
-            </a:endParaRPr>
-          </a:p>
-        </p:txBody>
-      </p:sp>
-      <p:sp>
-        <p:nvSpPr>
-          <p:cNvPr id="155" name="Prostokąt 154">
-            <a:extLst>
-              <a:ext uri="{FF2B5EF4-FFF2-40B4-BE49-F238E27FC236}">
-                <a16:creationId xmlns:a16="http://schemas.microsoft.com/office/drawing/2014/main" id="{69EC0BFB-B5E0-4E53-984B-8040575228AE}"/>
-              </a:ext>
-            </a:extLst>
-          </p:cNvPr>
-          <p:cNvSpPr/>
-          <p:nvPr/>
-        </p:nvSpPr>
-        <p:spPr>
-          <a:xfrm>
-            <a:off x="2459650" y="1985079"/>
-            <a:ext cx="1964284" cy="915677"/>
-          </a:xfrm>
-          <a:prstGeom prst="rect">
-            <a:avLst/>
-          </a:prstGeom>
-          <a:solidFill>
-            <a:schemeClr val="accent5">
-              <a:alpha val="50000"/>
-            </a:schemeClr>
-          </a:solidFill>
-          <a:ln>
-            <a:noFill/>
-          </a:ln>
-        </p:spPr>
-        <p:style>
-          <a:lnRef idx="0">
-            <a:scrgbClr r="0" g="0" b="0"/>
-          </a:lnRef>
-          <a:fillRef idx="0">
-            <a:scrgbClr r="0" g="0" b="0"/>
-          </a:fillRef>
-          <a:effectRef idx="0">
-            <a:scrgbClr r="0" g="0" b="0"/>
-          </a:effectRef>
-          <a:fontRef idx="minor">
-            <a:schemeClr val="lt1"/>
-          </a:fontRef>
-        </p:style>
-        <p:txBody>
-          <a:bodyPr rtlCol="0" anchor="ctr"/>
-          <a:lstStyle/>
-          <a:p>
-            <a:pPr algn="ctr"/>
-            <a:endParaRPr lang="pl-PL">
-              <a:latin typeface="Tahoma" panose="020B0604030504040204" pitchFamily="34" charset="0"/>
-              <a:ea typeface="Tahoma" panose="020B0604030504040204" pitchFamily="34" charset="0"/>
-              <a:cs typeface="Tahoma" panose="020B0604030504040204" pitchFamily="34" charset="0"/>
-            </a:endParaRPr>
-          </a:p>
-        </p:txBody>
-      </p:sp>
-      <p:sp>
-        <p:nvSpPr>
-          <p:cNvPr id="94" name="pole tekstowe 93">
-            <a:extLst>
-              <a:ext uri="{FF2B5EF4-FFF2-40B4-BE49-F238E27FC236}">
-                <a16:creationId xmlns:a16="http://schemas.microsoft.com/office/drawing/2014/main" id="{9F2D0134-A5F2-4C6C-B59F-F258570A4A53}"/>
-              </a:ext>
-            </a:extLst>
-          </p:cNvPr>
-          <p:cNvSpPr txBox="1"/>
-          <p:nvPr/>
-        </p:nvSpPr>
-        <p:spPr>
-          <a:xfrm>
-            <a:off x="1947741" y="2525684"/>
-            <a:ext cx="2909717" cy="307777"/>
-          </a:xfrm>
-          <a:prstGeom prst="rect">
-            <a:avLst/>
-          </a:prstGeom>
-          <a:noFill/>
-        </p:spPr>
-        <p:txBody>
-          <a:bodyPr wrap="square" rtlCol="0">
-            <a:spAutoFit/>
-          </a:bodyPr>
-          <a:lstStyle/>
-          <a:p>
-            <a:pPr algn="ctr"/>
-            <a:r>
-              <a:rPr lang="pl-PL" sz="700" dirty="0">
-                <a:latin typeface="Tahoma" panose="020B0604030504040204" pitchFamily="34" charset="0"/>
-                <a:ea typeface="Tahoma" panose="020B0604030504040204" pitchFamily="34" charset="0"/>
-                <a:cs typeface="Tahoma" panose="020B0604030504040204" pitchFamily="34" charset="0"/>
-              </a:rPr>
-              <a:t>LOCAL</a:t>
-            </a:r>
-          </a:p>
-          <a:p>
-            <a:pPr algn="ctr"/>
-            <a:r>
-              <a:rPr lang="pl-PL" sz="700" dirty="0">
-                <a:latin typeface="Tahoma" panose="020B0604030504040204" pitchFamily="34" charset="0"/>
-                <a:ea typeface="Tahoma" panose="020B0604030504040204" pitchFamily="34" charset="0"/>
-                <a:cs typeface="Tahoma" panose="020B0604030504040204" pitchFamily="34" charset="0"/>
-              </a:rPr>
-              <a:t>TRANSFORM SCRIPTS/APPLICATIONS</a:t>
-            </a:r>
-          </a:p>
-        </p:txBody>
-      </p:sp>
-      <p:pic>
-        <p:nvPicPr>
-          <p:cNvPr id="3" name="Grafika 2" descr="Serwer">
-            <a:extLst>
-              <a:ext uri="{FF2B5EF4-FFF2-40B4-BE49-F238E27FC236}">
-                <a16:creationId xmlns:a16="http://schemas.microsoft.com/office/drawing/2014/main" id="{9A8521AF-C8A2-4D84-A7B8-4E28DF47D730}"/>
-              </a:ext>
-            </a:extLst>
-          </p:cNvPr>
-          <p:cNvPicPr>
-            <a:picLocks noChangeAspect="1"/>
-          </p:cNvPicPr>
-          <p:nvPr/>
-        </p:nvPicPr>
-        <p:blipFill>
-          <a:blip r:embed="rId2">
-            <a:extLst>
-              <a:ext uri="{28A0092B-C50C-407E-A947-70E740481C1C}">
-                <a14:useLocalDpi xmlns:a14="http://schemas.microsoft.com/office/drawing/2010/main" val="0"/>
-              </a:ext>
-              <a:ext uri="{96DAC541-7B7A-43D3-8B79-37D633B846F1}">
-                <asvg:svgBlip xmlns:asvg="http://schemas.microsoft.com/office/drawing/2016/SVG/main" r:embed="rId3"/>
-              </a:ext>
-            </a:extLst>
-          </a:blip>
-          <a:stretch>
-            <a:fillRect/>
-          </a:stretch>
-        </p:blipFill>
-        <p:spPr>
-          <a:xfrm>
-            <a:off x="2945399" y="610511"/>
-            <a:ext cx="914400" cy="914400"/>
-          </a:xfrm>
-          <a:prstGeom prst="rect">
-            <a:avLst/>
-          </a:prstGeom>
-        </p:spPr>
-      </p:pic>
-      <p:sp>
-        <p:nvSpPr>
-          <p:cNvPr id="4" name="pole tekstowe 3">
-            <a:extLst>
-              <a:ext uri="{FF2B5EF4-FFF2-40B4-BE49-F238E27FC236}">
-                <a16:creationId xmlns:a16="http://schemas.microsoft.com/office/drawing/2014/main" id="{EE89D9F0-A945-4533-895B-253DC4E73B08}"/>
-              </a:ext>
-            </a:extLst>
-          </p:cNvPr>
-          <p:cNvSpPr txBox="1"/>
-          <p:nvPr/>
-        </p:nvSpPr>
-        <p:spPr>
-          <a:xfrm flipH="1">
-            <a:off x="1947739" y="1524911"/>
-            <a:ext cx="2909718" cy="400110"/>
-          </a:xfrm>
-          <a:prstGeom prst="rect">
-            <a:avLst/>
-          </a:prstGeom>
-          <a:noFill/>
-        </p:spPr>
-        <p:txBody>
-          <a:bodyPr wrap="square" rtlCol="0">
-            <a:spAutoFit/>
-          </a:bodyPr>
-          <a:lstStyle/>
-          <a:p>
-            <a:pPr algn="ctr"/>
-            <a:r>
-              <a:rPr lang="pl-PL" sz="2000" b="1" dirty="0">
-                <a:latin typeface="Tahoma" panose="020B0604030504040204" pitchFamily="34" charset="0"/>
-                <a:ea typeface="Tahoma" panose="020B0604030504040204" pitchFamily="34" charset="0"/>
-                <a:cs typeface="Tahoma" panose="020B0604030504040204" pitchFamily="34" charset="0"/>
-              </a:rPr>
-              <a:t>DCPAM ETL</a:t>
-            </a:r>
-            <a:endParaRPr lang="pl-PL" sz="1400" b="1" dirty="0">
-              <a:latin typeface="Tahoma" panose="020B0604030504040204" pitchFamily="34" charset="0"/>
-              <a:ea typeface="Tahoma" panose="020B0604030504040204" pitchFamily="34" charset="0"/>
-              <a:cs typeface="Tahoma" panose="020B0604030504040204" pitchFamily="34" charset="0"/>
-            </a:endParaRPr>
-          </a:p>
-        </p:txBody>
-      </p:sp>
-      <p:pic>
-        <p:nvPicPr>
-          <p:cNvPr id="92" name="Grafika 91" descr="Priorytety">
-            <a:extLst>
-              <a:ext uri="{FF2B5EF4-FFF2-40B4-BE49-F238E27FC236}">
-                <a16:creationId xmlns:a16="http://schemas.microsoft.com/office/drawing/2014/main" id="{1EE29D95-A2E1-421D-82CD-ACE69FC69BCA}"/>
-              </a:ext>
-            </a:extLst>
-          </p:cNvPr>
-          <p:cNvPicPr>
-            <a:picLocks noChangeAspect="1"/>
-          </p:cNvPicPr>
-          <p:nvPr/>
-        </p:nvPicPr>
-        <p:blipFill>
-          <a:blip r:embed="rId4">
-            <a:extLst>
-              <a:ext uri="{28A0092B-C50C-407E-A947-70E740481C1C}">
-                <a14:useLocalDpi xmlns:a14="http://schemas.microsoft.com/office/drawing/2010/main" val="0"/>
-              </a:ext>
-              <a:ext uri="{96DAC541-7B7A-43D3-8B79-37D633B846F1}">
-                <asvg:svgBlip xmlns:asvg="http://schemas.microsoft.com/office/drawing/2016/SVG/main" r:embed="rId5"/>
-              </a:ext>
-            </a:extLst>
-          </a:blip>
-          <a:stretch>
-            <a:fillRect/>
-          </a:stretch>
-        </p:blipFill>
-        <p:spPr>
-          <a:xfrm>
-            <a:off x="3785737" y="2086593"/>
-            <a:ext cx="529022" cy="529022"/>
-          </a:xfrm>
-          <a:prstGeom prst="rect">
-            <a:avLst/>
-          </a:prstGeom>
-        </p:spPr>
-      </p:pic>
-      <p:cxnSp>
-        <p:nvCxnSpPr>
-          <p:cNvPr id="109" name="Łącznik: łamany 108">
-            <a:extLst>
-              <a:ext uri="{FF2B5EF4-FFF2-40B4-BE49-F238E27FC236}">
-                <a16:creationId xmlns:a16="http://schemas.microsoft.com/office/drawing/2014/main" id="{FB7E8BF3-A62D-422A-B95F-E11F092F7087}"/>
-              </a:ext>
-            </a:extLst>
-          </p:cNvPr>
-          <p:cNvCxnSpPr>
-            <a:cxnSpLocks/>
-            <a:stCxn id="3" idx="3"/>
-            <a:endCxn id="155" idx="3"/>
-          </p:cNvCxnSpPr>
-          <p:nvPr/>
-        </p:nvCxnSpPr>
-        <p:spPr>
-          <a:xfrm>
-            <a:off x="3859799" y="1067711"/>
-            <a:ext cx="564135" cy="1375207"/>
-          </a:xfrm>
-          <a:prstGeom prst="bentConnector3">
-            <a:avLst>
-              <a:gd name="adj1" fmla="val 140522"/>
-            </a:avLst>
-          </a:prstGeom>
-          <a:ln>
-            <a:tailEnd type="triangle"/>
-          </a:ln>
-        </p:spPr>
-        <p:style>
-          <a:lnRef idx="2">
-            <a:schemeClr val="accent2"/>
-          </a:lnRef>
-          <a:fillRef idx="0">
-            <a:schemeClr val="accent2"/>
-          </a:fillRef>
-          <a:effectRef idx="1">
-            <a:schemeClr val="accent2"/>
-          </a:effectRef>
-          <a:fontRef idx="minor">
-            <a:schemeClr val="tx1"/>
-          </a:fontRef>
-        </p:style>
-      </p:cxnSp>
-      <p:cxnSp>
-        <p:nvCxnSpPr>
-          <p:cNvPr id="111" name="Łącznik: łamany 110">
-            <a:extLst>
-              <a:ext uri="{FF2B5EF4-FFF2-40B4-BE49-F238E27FC236}">
-                <a16:creationId xmlns:a16="http://schemas.microsoft.com/office/drawing/2014/main" id="{0C804CC7-F3C5-4D73-9B06-FB953C30B2EA}"/>
-              </a:ext>
-            </a:extLst>
-          </p:cNvPr>
-          <p:cNvCxnSpPr>
-            <a:cxnSpLocks/>
-            <a:stCxn id="3" idx="1"/>
-            <a:endCxn id="155" idx="1"/>
-          </p:cNvCxnSpPr>
-          <p:nvPr/>
-        </p:nvCxnSpPr>
-        <p:spPr>
-          <a:xfrm rot="10800000" flipV="1">
-            <a:off x="2459651" y="1067710"/>
-            <a:ext cx="485749" cy="1375207"/>
-          </a:xfrm>
-          <a:prstGeom prst="bentConnector3">
-            <a:avLst>
-              <a:gd name="adj1" fmla="val 147061"/>
-            </a:avLst>
-          </a:prstGeom>
-          <a:ln>
-            <a:tailEnd type="triangle"/>
-          </a:ln>
-        </p:spPr>
-        <p:style>
-          <a:lnRef idx="2">
-            <a:schemeClr val="accent2"/>
-          </a:lnRef>
-          <a:fillRef idx="0">
-            <a:schemeClr val="accent2"/>
-          </a:fillRef>
-          <a:effectRef idx="1">
-            <a:schemeClr val="accent2"/>
-          </a:effectRef>
-          <a:fontRef idx="minor">
-            <a:schemeClr val="tx1"/>
-          </a:fontRef>
-        </p:style>
-      </p:cxnSp>
       <p:grpSp>
         <p:nvGrpSpPr>
           <p:cNvPr id="123" name="Grupa 122">
@@ -4702,13 +4327,13 @@
             <p:nvPr/>
           </p:nvPicPr>
           <p:blipFill>
-            <a:blip r:embed="rId6">
+            <a:blip r:embed="rId2">
               <a:extLst>
                 <a:ext uri="{28A0092B-C50C-407E-A947-70E740481C1C}">
                   <a14:useLocalDpi xmlns:a14="http://schemas.microsoft.com/office/drawing/2010/main" val="0"/>
                 </a:ext>
                 <a:ext uri="{96DAC541-7B7A-43D3-8B79-37D633B846F1}">
-                  <asvg:svgBlip xmlns:asvg="http://schemas.microsoft.com/office/drawing/2016/SVG/main" r:embed="rId7"/>
+                  <asvg:svgBlip xmlns:asvg="http://schemas.microsoft.com/office/drawing/2016/SVG/main" r:embed="rId3"/>
                 </a:ext>
               </a:extLst>
             </a:blip>
@@ -4792,7 +4417,7 @@
                   <a14:useLocalDpi xmlns:a14="http://schemas.microsoft.com/office/drawing/2010/main" val="0"/>
                 </a:ext>
                 <a:ext uri="{96DAC541-7B7A-43D3-8B79-37D633B846F1}">
-                  <asvg:svgBlip xmlns:asvg="http://schemas.microsoft.com/office/drawing/2016/SVG/main" r:embed="rId8"/>
+                  <asvg:svgBlip xmlns:asvg="http://schemas.microsoft.com/office/drawing/2016/SVG/main" r:embed="rId5"/>
                 </a:ext>
               </a:extLst>
             </a:blip>
@@ -4831,7 +4456,7 @@
                   <a14:useLocalDpi xmlns:a14="http://schemas.microsoft.com/office/drawing/2010/main" val="0"/>
                 </a:ext>
                 <a:ext uri="{96DAC541-7B7A-43D3-8B79-37D633B846F1}">
-                  <asvg:svgBlip xmlns:asvg="http://schemas.microsoft.com/office/drawing/2016/SVG/main" r:embed="rId8"/>
+                  <asvg:svgBlip xmlns:asvg="http://schemas.microsoft.com/office/drawing/2016/SVG/main" r:embed="rId5"/>
                 </a:ext>
               </a:extLst>
             </a:blip>
@@ -4870,7 +4495,7 @@
                   <a14:useLocalDpi xmlns:a14="http://schemas.microsoft.com/office/drawing/2010/main" val="0"/>
                 </a:ext>
                 <a:ext uri="{96DAC541-7B7A-43D3-8B79-37D633B846F1}">
-                  <asvg:svgBlip xmlns:asvg="http://schemas.microsoft.com/office/drawing/2016/SVG/main" r:embed="rId8"/>
+                  <asvg:svgBlip xmlns:asvg="http://schemas.microsoft.com/office/drawing/2016/SVG/main" r:embed="rId5"/>
                 </a:ext>
               </a:extLst>
             </a:blip>
@@ -4909,7 +4534,7 @@
                   <a14:useLocalDpi xmlns:a14="http://schemas.microsoft.com/office/drawing/2010/main" val="0"/>
                 </a:ext>
                 <a:ext uri="{96DAC541-7B7A-43D3-8B79-37D633B846F1}">
-                  <asvg:svgBlip xmlns:asvg="http://schemas.microsoft.com/office/drawing/2016/SVG/main" r:embed="rId8"/>
+                  <asvg:svgBlip xmlns:asvg="http://schemas.microsoft.com/office/drawing/2016/SVG/main" r:embed="rId5"/>
                 </a:ext>
               </a:extLst>
             </a:blip>
@@ -4948,7 +4573,7 @@
                   <a14:useLocalDpi xmlns:a14="http://schemas.microsoft.com/office/drawing/2010/main" val="0"/>
                 </a:ext>
                 <a:ext uri="{96DAC541-7B7A-43D3-8B79-37D633B846F1}">
-                  <asvg:svgBlip xmlns:asvg="http://schemas.microsoft.com/office/drawing/2016/SVG/main" r:embed="rId8"/>
+                  <asvg:svgBlip xmlns:asvg="http://schemas.microsoft.com/office/drawing/2016/SVG/main" r:embed="rId5"/>
                 </a:ext>
               </a:extLst>
             </a:blip>
@@ -5109,13 +4734,13 @@
             <p:nvPr/>
           </p:nvPicPr>
           <p:blipFill>
-            <a:blip r:embed="rId9">
+            <a:blip r:embed="rId6">
               <a:extLst>
                 <a:ext uri="{28A0092B-C50C-407E-A947-70E740481C1C}">
                   <a14:useLocalDpi xmlns:a14="http://schemas.microsoft.com/office/drawing/2010/main" val="0"/>
                 </a:ext>
                 <a:ext uri="{96DAC541-7B7A-43D3-8B79-37D633B846F1}">
-                  <asvg:svgBlip xmlns:asvg="http://schemas.microsoft.com/office/drawing/2016/SVG/main" r:embed="rId10"/>
+                  <asvg:svgBlip xmlns:asvg="http://schemas.microsoft.com/office/drawing/2016/SVG/main" r:embed="rId7"/>
                 </a:ext>
               </a:extLst>
             </a:blip>
@@ -5382,13 +5007,13 @@
             <p:nvPr/>
           </p:nvPicPr>
           <p:blipFill>
-            <a:blip r:embed="rId6">
+            <a:blip r:embed="rId2">
               <a:extLst>
                 <a:ext uri="{28A0092B-C50C-407E-A947-70E740481C1C}">
                   <a14:useLocalDpi xmlns:a14="http://schemas.microsoft.com/office/drawing/2010/main" val="0"/>
                 </a:ext>
                 <a:ext uri="{96DAC541-7B7A-43D3-8B79-37D633B846F1}">
-                  <asvg:svgBlip xmlns:asvg="http://schemas.microsoft.com/office/drawing/2016/SVG/main" r:embed="rId11"/>
+                  <asvg:svgBlip xmlns:asvg="http://schemas.microsoft.com/office/drawing/2016/SVG/main" r:embed="rId8"/>
                 </a:ext>
               </a:extLst>
             </a:blip>
@@ -5472,7 +5097,7 @@
                   <a14:useLocalDpi xmlns:a14="http://schemas.microsoft.com/office/drawing/2010/main" val="0"/>
                 </a:ext>
                 <a:ext uri="{96DAC541-7B7A-43D3-8B79-37D633B846F1}">
-                  <asvg:svgBlip xmlns:asvg="http://schemas.microsoft.com/office/drawing/2016/SVG/main" r:embed="rId12"/>
+                  <asvg:svgBlip xmlns:asvg="http://schemas.microsoft.com/office/drawing/2016/SVG/main" r:embed="rId9"/>
                 </a:ext>
               </a:extLst>
             </a:blip>
@@ -5511,7 +5136,7 @@
                   <a14:useLocalDpi xmlns:a14="http://schemas.microsoft.com/office/drawing/2010/main" val="0"/>
                 </a:ext>
                 <a:ext uri="{96DAC541-7B7A-43D3-8B79-37D633B846F1}">
-                  <asvg:svgBlip xmlns:asvg="http://schemas.microsoft.com/office/drawing/2016/SVG/main" r:embed="rId12"/>
+                  <asvg:svgBlip xmlns:asvg="http://schemas.microsoft.com/office/drawing/2016/SVG/main" r:embed="rId9"/>
                 </a:ext>
               </a:extLst>
             </a:blip>
@@ -5550,7 +5175,7 @@
                   <a14:useLocalDpi xmlns:a14="http://schemas.microsoft.com/office/drawing/2010/main" val="0"/>
                 </a:ext>
                 <a:ext uri="{96DAC541-7B7A-43D3-8B79-37D633B846F1}">
-                  <asvg:svgBlip xmlns:asvg="http://schemas.microsoft.com/office/drawing/2016/SVG/main" r:embed="rId12"/>
+                  <asvg:svgBlip xmlns:asvg="http://schemas.microsoft.com/office/drawing/2016/SVG/main" r:embed="rId9"/>
                 </a:ext>
               </a:extLst>
             </a:blip>
@@ -5589,7 +5214,7 @@
                   <a14:useLocalDpi xmlns:a14="http://schemas.microsoft.com/office/drawing/2010/main" val="0"/>
                 </a:ext>
                 <a:ext uri="{96DAC541-7B7A-43D3-8B79-37D633B846F1}">
-                  <asvg:svgBlip xmlns:asvg="http://schemas.microsoft.com/office/drawing/2016/SVG/main" r:embed="rId12"/>
+                  <asvg:svgBlip xmlns:asvg="http://schemas.microsoft.com/office/drawing/2016/SVG/main" r:embed="rId9"/>
                 </a:ext>
               </a:extLst>
             </a:blip>
@@ -5628,7 +5253,7 @@
                   <a14:useLocalDpi xmlns:a14="http://schemas.microsoft.com/office/drawing/2010/main" val="0"/>
                 </a:ext>
                 <a:ext uri="{96DAC541-7B7A-43D3-8B79-37D633B846F1}">
-                  <asvg:svgBlip xmlns:asvg="http://schemas.microsoft.com/office/drawing/2016/SVG/main" r:embed="rId12"/>
+                  <asvg:svgBlip xmlns:asvg="http://schemas.microsoft.com/office/drawing/2016/SVG/main" r:embed="rId9"/>
                 </a:ext>
               </a:extLst>
             </a:blip>
@@ -5984,13 +5609,13 @@
               <p:nvPr/>
             </p:nvPicPr>
             <p:blipFill>
-              <a:blip r:embed="rId13">
+              <a:blip r:embed="rId10">
                 <a:extLst>
                   <a:ext uri="{28A0092B-C50C-407E-A947-70E740481C1C}">
                     <a14:useLocalDpi xmlns:a14="http://schemas.microsoft.com/office/drawing/2010/main" val="0"/>
                   </a:ext>
                   <a:ext uri="{96DAC541-7B7A-43D3-8B79-37D633B846F1}">
-                    <asvg:svgBlip xmlns:asvg="http://schemas.microsoft.com/office/drawing/2016/SVG/main" r:embed="rId14"/>
+                    <asvg:svgBlip xmlns:asvg="http://schemas.microsoft.com/office/drawing/2016/SVG/main" r:embed="rId11"/>
                   </a:ext>
                 </a:extLst>
               </a:blip>
@@ -6055,84 +5680,481 @@
           </p:sp>
         </p:grpSp>
       </p:grpSp>
-      <p:pic>
-        <p:nvPicPr>
-          <p:cNvPr id="192" name="Grafika 191" descr="Priorytety">
-            <a:extLst>
-              <a:ext uri="{FF2B5EF4-FFF2-40B4-BE49-F238E27FC236}">
-                <a16:creationId xmlns:a16="http://schemas.microsoft.com/office/drawing/2014/main" id="{20310D52-DA04-4D9C-BB06-5979C6F5533A}"/>
-              </a:ext>
-            </a:extLst>
-          </p:cNvPr>
-          <p:cNvPicPr>
-            <a:picLocks noChangeAspect="1"/>
-          </p:cNvPicPr>
+      <p:grpSp>
+        <p:nvGrpSpPr>
+          <p:cNvPr id="33" name="Grupa 32">
+            <a:extLst>
+              <a:ext uri="{FF2B5EF4-FFF2-40B4-BE49-F238E27FC236}">
+                <a16:creationId xmlns:a16="http://schemas.microsoft.com/office/drawing/2014/main" id="{DDC5F3E4-7E67-4C87-A31E-F83E638F9A01}"/>
+              </a:ext>
+            </a:extLst>
+          </p:cNvPr>
+          <p:cNvGrpSpPr/>
           <p:nvPr/>
-        </p:nvPicPr>
-        <p:blipFill>
-          <a:blip r:embed="rId4">
-            <a:extLst>
-              <a:ext uri="{28A0092B-C50C-407E-A947-70E740481C1C}">
-                <a14:useLocalDpi xmlns:a14="http://schemas.microsoft.com/office/drawing/2010/main" val="0"/>
-              </a:ext>
-              <a:ext uri="{96DAC541-7B7A-43D3-8B79-37D633B846F1}">
-                <asvg:svgBlip xmlns:asvg="http://schemas.microsoft.com/office/drawing/2016/SVG/main" r:embed="rId15"/>
-              </a:ext>
-            </a:extLst>
-          </a:blip>
-          <a:stretch>
-            <a:fillRect/>
-          </a:stretch>
-        </p:blipFill>
-        <p:spPr>
+        </p:nvGrpSpPr>
+        <p:grpSpPr>
           <a:xfrm>
-            <a:off x="2562907" y="2081451"/>
-            <a:ext cx="529022" cy="529022"/>
+            <a:off x="1947739" y="500935"/>
+            <a:ext cx="2909719" cy="2556718"/>
+            <a:chOff x="1947739" y="500935"/>
+            <a:chExt cx="2909719" cy="2556718"/>
           </a:xfrm>
-          <a:prstGeom prst="rect">
-            <a:avLst/>
-          </a:prstGeom>
-        </p:spPr>
-      </p:pic>
-      <p:pic>
-        <p:nvPicPr>
-          <p:cNvPr id="195" name="Grafika 194" descr="Priorytety">
-            <a:extLst>
-              <a:ext uri="{FF2B5EF4-FFF2-40B4-BE49-F238E27FC236}">
-                <a16:creationId xmlns:a16="http://schemas.microsoft.com/office/drawing/2014/main" id="{29E43417-D22B-460A-A711-FD97DB786DD5}"/>
-              </a:ext>
-            </a:extLst>
-          </p:cNvPr>
-          <p:cNvPicPr>
-            <a:picLocks noChangeAspect="1"/>
-          </p:cNvPicPr>
-          <p:nvPr/>
-        </p:nvPicPr>
-        <p:blipFill>
-          <a:blip r:embed="rId4">
-            <a:extLst>
-              <a:ext uri="{28A0092B-C50C-407E-A947-70E740481C1C}">
-                <a14:useLocalDpi xmlns:a14="http://schemas.microsoft.com/office/drawing/2010/main" val="0"/>
-              </a:ext>
-              <a:ext uri="{96DAC541-7B7A-43D3-8B79-37D633B846F1}">
-                <asvg:svgBlip xmlns:asvg="http://schemas.microsoft.com/office/drawing/2016/SVG/main" r:embed="rId15"/>
-              </a:ext>
-            </a:extLst>
-          </a:blip>
-          <a:stretch>
-            <a:fillRect/>
-          </a:stretch>
-        </p:blipFill>
-        <p:spPr>
-          <a:xfrm>
-            <a:off x="3168233" y="2072645"/>
-            <a:ext cx="529022" cy="529022"/>
-          </a:xfrm>
-          <a:prstGeom prst="rect">
-            <a:avLst/>
-          </a:prstGeom>
-        </p:spPr>
-      </p:pic>
+        </p:grpSpPr>
+        <p:sp>
+          <p:nvSpPr>
+            <p:cNvPr id="14" name="Prostokąt: zaokrąglone rogi 13">
+              <a:extLst>
+                <a:ext uri="{FF2B5EF4-FFF2-40B4-BE49-F238E27FC236}">
+                  <a16:creationId xmlns:a16="http://schemas.microsoft.com/office/drawing/2014/main" id="{DB819128-1E3E-4241-8922-CD7D0E26CBD3}"/>
+                </a:ext>
+              </a:extLst>
+            </p:cNvPr>
+            <p:cNvSpPr/>
+            <p:nvPr/>
+          </p:nvSpPr>
+          <p:spPr>
+            <a:xfrm>
+              <a:off x="1947741" y="500935"/>
+              <a:ext cx="2909717" cy="2556718"/>
+            </a:xfrm>
+            <a:prstGeom prst="roundRect">
+              <a:avLst/>
+            </a:prstGeom>
+            <a:solidFill>
+              <a:schemeClr val="accent5">
+                <a:alpha val="21000"/>
+              </a:schemeClr>
+            </a:solidFill>
+            <a:ln>
+              <a:noFill/>
+            </a:ln>
+          </p:spPr>
+          <p:style>
+            <a:lnRef idx="0">
+              <a:scrgbClr r="0" g="0" b="0"/>
+            </a:lnRef>
+            <a:fillRef idx="0">
+              <a:scrgbClr r="0" g="0" b="0"/>
+            </a:fillRef>
+            <a:effectRef idx="0">
+              <a:scrgbClr r="0" g="0" b="0"/>
+            </a:effectRef>
+            <a:fontRef idx="minor">
+              <a:schemeClr val="lt1"/>
+            </a:fontRef>
+          </p:style>
+          <p:txBody>
+            <a:bodyPr rtlCol="0" anchor="ctr"/>
+            <a:lstStyle/>
+            <a:p>
+              <a:pPr algn="ctr"/>
+              <a:endParaRPr lang="pl-PL" dirty="0">
+                <a:latin typeface="Tahoma" panose="020B0604030504040204" pitchFamily="34" charset="0"/>
+                <a:ea typeface="Tahoma" panose="020B0604030504040204" pitchFamily="34" charset="0"/>
+                <a:cs typeface="Tahoma" panose="020B0604030504040204" pitchFamily="34" charset="0"/>
+              </a:endParaRPr>
+            </a:p>
+          </p:txBody>
+        </p:sp>
+        <p:sp>
+          <p:nvSpPr>
+            <p:cNvPr id="155" name="Prostokąt 154">
+              <a:extLst>
+                <a:ext uri="{FF2B5EF4-FFF2-40B4-BE49-F238E27FC236}">
+                  <a16:creationId xmlns:a16="http://schemas.microsoft.com/office/drawing/2014/main" id="{69EC0BFB-B5E0-4E53-984B-8040575228AE}"/>
+                </a:ext>
+              </a:extLst>
+            </p:cNvPr>
+            <p:cNvSpPr/>
+            <p:nvPr/>
+          </p:nvSpPr>
+          <p:spPr>
+            <a:xfrm>
+              <a:off x="2459650" y="1985079"/>
+              <a:ext cx="1964284" cy="915677"/>
+            </a:xfrm>
+            <a:prstGeom prst="rect">
+              <a:avLst/>
+            </a:prstGeom>
+            <a:solidFill>
+              <a:schemeClr val="accent5">
+                <a:alpha val="50000"/>
+              </a:schemeClr>
+            </a:solidFill>
+            <a:ln>
+              <a:noFill/>
+            </a:ln>
+          </p:spPr>
+          <p:style>
+            <a:lnRef idx="0">
+              <a:scrgbClr r="0" g="0" b="0"/>
+            </a:lnRef>
+            <a:fillRef idx="0">
+              <a:scrgbClr r="0" g="0" b="0"/>
+            </a:fillRef>
+            <a:effectRef idx="0">
+              <a:scrgbClr r="0" g="0" b="0"/>
+            </a:effectRef>
+            <a:fontRef idx="minor">
+              <a:schemeClr val="lt1"/>
+            </a:fontRef>
+          </p:style>
+          <p:txBody>
+            <a:bodyPr rtlCol="0" anchor="ctr"/>
+            <a:lstStyle/>
+            <a:p>
+              <a:pPr algn="ctr"/>
+              <a:endParaRPr lang="pl-PL">
+                <a:latin typeface="Tahoma" panose="020B0604030504040204" pitchFamily="34" charset="0"/>
+                <a:ea typeface="Tahoma" panose="020B0604030504040204" pitchFamily="34" charset="0"/>
+                <a:cs typeface="Tahoma" panose="020B0604030504040204" pitchFamily="34" charset="0"/>
+              </a:endParaRPr>
+            </a:p>
+          </p:txBody>
+        </p:sp>
+        <p:sp>
+          <p:nvSpPr>
+            <p:cNvPr id="94" name="pole tekstowe 93">
+              <a:extLst>
+                <a:ext uri="{FF2B5EF4-FFF2-40B4-BE49-F238E27FC236}">
+                  <a16:creationId xmlns:a16="http://schemas.microsoft.com/office/drawing/2014/main" id="{9F2D0134-A5F2-4C6C-B59F-F258570A4A53}"/>
+                </a:ext>
+              </a:extLst>
+            </p:cNvPr>
+            <p:cNvSpPr txBox="1"/>
+            <p:nvPr/>
+          </p:nvSpPr>
+          <p:spPr>
+            <a:xfrm>
+              <a:off x="1947741" y="2525684"/>
+              <a:ext cx="2909717" cy="307777"/>
+            </a:xfrm>
+            <a:prstGeom prst="rect">
+              <a:avLst/>
+            </a:prstGeom>
+            <a:noFill/>
+          </p:spPr>
+          <p:txBody>
+            <a:bodyPr wrap="square" rtlCol="0">
+              <a:spAutoFit/>
+            </a:bodyPr>
+            <a:lstStyle/>
+            <a:p>
+              <a:pPr algn="ctr"/>
+              <a:r>
+                <a:rPr lang="pl-PL" sz="700" dirty="0">
+                  <a:latin typeface="Tahoma" panose="020B0604030504040204" pitchFamily="34" charset="0"/>
+                  <a:ea typeface="Tahoma" panose="020B0604030504040204" pitchFamily="34" charset="0"/>
+                  <a:cs typeface="Tahoma" panose="020B0604030504040204" pitchFamily="34" charset="0"/>
+                </a:rPr>
+                <a:t>LOCAL</a:t>
+              </a:r>
+            </a:p>
+            <a:p>
+              <a:pPr algn="ctr"/>
+              <a:r>
+                <a:rPr lang="pl-PL" sz="700" dirty="0">
+                  <a:latin typeface="Tahoma" panose="020B0604030504040204" pitchFamily="34" charset="0"/>
+                  <a:ea typeface="Tahoma" panose="020B0604030504040204" pitchFamily="34" charset="0"/>
+                  <a:cs typeface="Tahoma" panose="020B0604030504040204" pitchFamily="34" charset="0"/>
+                </a:rPr>
+                <a:t>TRANSFORM SCRIPTS/APPLICATIONS</a:t>
+              </a:r>
+            </a:p>
+          </p:txBody>
+        </p:sp>
+        <p:pic>
+          <p:nvPicPr>
+            <p:cNvPr id="3" name="Grafika 2" descr="Serwer">
+              <a:extLst>
+                <a:ext uri="{FF2B5EF4-FFF2-40B4-BE49-F238E27FC236}">
+                  <a16:creationId xmlns:a16="http://schemas.microsoft.com/office/drawing/2014/main" id="{9A8521AF-C8A2-4D84-A7B8-4E28DF47D730}"/>
+                </a:ext>
+              </a:extLst>
+            </p:cNvPr>
+            <p:cNvPicPr>
+              <a:picLocks noChangeAspect="1"/>
+            </p:cNvPicPr>
+            <p:nvPr/>
+          </p:nvPicPr>
+          <p:blipFill>
+            <a:blip r:embed="rId12">
+              <a:extLst>
+                <a:ext uri="{28A0092B-C50C-407E-A947-70E740481C1C}">
+                  <a14:useLocalDpi xmlns:a14="http://schemas.microsoft.com/office/drawing/2010/main" val="0"/>
+                </a:ext>
+                <a:ext uri="{96DAC541-7B7A-43D3-8B79-37D633B846F1}">
+                  <asvg:svgBlip xmlns:asvg="http://schemas.microsoft.com/office/drawing/2016/SVG/main" r:embed="rId13"/>
+                </a:ext>
+              </a:extLst>
+            </a:blip>
+            <a:stretch>
+              <a:fillRect/>
+            </a:stretch>
+          </p:blipFill>
+          <p:spPr>
+            <a:xfrm>
+              <a:off x="2945399" y="610511"/>
+              <a:ext cx="914400" cy="914400"/>
+            </a:xfrm>
+            <a:prstGeom prst="rect">
+              <a:avLst/>
+            </a:prstGeom>
+          </p:spPr>
+        </p:pic>
+        <p:sp>
+          <p:nvSpPr>
+            <p:cNvPr id="4" name="pole tekstowe 3">
+              <a:extLst>
+                <a:ext uri="{FF2B5EF4-FFF2-40B4-BE49-F238E27FC236}">
+                  <a16:creationId xmlns:a16="http://schemas.microsoft.com/office/drawing/2014/main" id="{EE89D9F0-A945-4533-895B-253DC4E73B08}"/>
+                </a:ext>
+              </a:extLst>
+            </p:cNvPr>
+            <p:cNvSpPr txBox="1"/>
+            <p:nvPr/>
+          </p:nvSpPr>
+          <p:spPr>
+            <a:xfrm flipH="1">
+              <a:off x="1947739" y="1524911"/>
+              <a:ext cx="2909718" cy="400110"/>
+            </a:xfrm>
+            <a:prstGeom prst="rect">
+              <a:avLst/>
+            </a:prstGeom>
+            <a:noFill/>
+          </p:spPr>
+          <p:txBody>
+            <a:bodyPr wrap="square" rtlCol="0">
+              <a:spAutoFit/>
+            </a:bodyPr>
+            <a:lstStyle/>
+            <a:p>
+              <a:pPr algn="ctr"/>
+              <a:r>
+                <a:rPr lang="pl-PL" sz="2000" b="1" dirty="0">
+                  <a:latin typeface="Tahoma" panose="020B0604030504040204" pitchFamily="34" charset="0"/>
+                  <a:ea typeface="Tahoma" panose="020B0604030504040204" pitchFamily="34" charset="0"/>
+                  <a:cs typeface="Tahoma" panose="020B0604030504040204" pitchFamily="34" charset="0"/>
+                </a:rPr>
+                <a:t>DCPAM ETL</a:t>
+              </a:r>
+              <a:endParaRPr lang="pl-PL" sz="1400" b="1" dirty="0">
+                <a:latin typeface="Tahoma" panose="020B0604030504040204" pitchFamily="34" charset="0"/>
+                <a:ea typeface="Tahoma" panose="020B0604030504040204" pitchFamily="34" charset="0"/>
+                <a:cs typeface="Tahoma" panose="020B0604030504040204" pitchFamily="34" charset="0"/>
+              </a:endParaRPr>
+            </a:p>
+          </p:txBody>
+        </p:sp>
+        <p:pic>
+          <p:nvPicPr>
+            <p:cNvPr id="92" name="Grafika 91" descr="Priorytety">
+              <a:extLst>
+                <a:ext uri="{FF2B5EF4-FFF2-40B4-BE49-F238E27FC236}">
+                  <a16:creationId xmlns:a16="http://schemas.microsoft.com/office/drawing/2014/main" id="{1EE29D95-A2E1-421D-82CD-ACE69FC69BCA}"/>
+                </a:ext>
+              </a:extLst>
+            </p:cNvPr>
+            <p:cNvPicPr>
+              <a:picLocks noChangeAspect="1"/>
+            </p:cNvPicPr>
+            <p:nvPr/>
+          </p:nvPicPr>
+          <p:blipFill>
+            <a:blip r:embed="rId4">
+              <a:extLst>
+                <a:ext uri="{28A0092B-C50C-407E-A947-70E740481C1C}">
+                  <a14:useLocalDpi xmlns:a14="http://schemas.microsoft.com/office/drawing/2010/main" val="0"/>
+                </a:ext>
+                <a:ext uri="{96DAC541-7B7A-43D3-8B79-37D633B846F1}">
+                  <asvg:svgBlip xmlns:asvg="http://schemas.microsoft.com/office/drawing/2016/SVG/main" r:embed="rId14"/>
+                </a:ext>
+              </a:extLst>
+            </a:blip>
+            <a:stretch>
+              <a:fillRect/>
+            </a:stretch>
+          </p:blipFill>
+          <p:spPr>
+            <a:xfrm>
+              <a:off x="3785737" y="2086593"/>
+              <a:ext cx="529022" cy="529022"/>
+            </a:xfrm>
+            <a:prstGeom prst="rect">
+              <a:avLst/>
+            </a:prstGeom>
+          </p:spPr>
+        </p:pic>
+        <p:cxnSp>
+          <p:nvCxnSpPr>
+            <p:cNvPr id="109" name="Łącznik: łamany 108">
+              <a:extLst>
+                <a:ext uri="{FF2B5EF4-FFF2-40B4-BE49-F238E27FC236}">
+                  <a16:creationId xmlns:a16="http://schemas.microsoft.com/office/drawing/2014/main" id="{FB7E8BF3-A62D-422A-B95F-E11F092F7087}"/>
+                </a:ext>
+              </a:extLst>
+            </p:cNvPr>
+            <p:cNvCxnSpPr>
+              <a:cxnSpLocks/>
+              <a:stCxn id="3" idx="3"/>
+              <a:endCxn id="155" idx="3"/>
+            </p:cNvCxnSpPr>
+            <p:nvPr/>
+          </p:nvCxnSpPr>
+          <p:spPr>
+            <a:xfrm>
+              <a:off x="3859799" y="1067711"/>
+              <a:ext cx="564135" cy="1375207"/>
+            </a:xfrm>
+            <a:prstGeom prst="bentConnector3">
+              <a:avLst>
+                <a:gd name="adj1" fmla="val 140522"/>
+              </a:avLst>
+            </a:prstGeom>
+            <a:ln>
+              <a:tailEnd type="triangle"/>
+            </a:ln>
+          </p:spPr>
+          <p:style>
+            <a:lnRef idx="2">
+              <a:schemeClr val="accent2"/>
+            </a:lnRef>
+            <a:fillRef idx="0">
+              <a:schemeClr val="accent2"/>
+            </a:fillRef>
+            <a:effectRef idx="1">
+              <a:schemeClr val="accent2"/>
+            </a:effectRef>
+            <a:fontRef idx="minor">
+              <a:schemeClr val="tx1"/>
+            </a:fontRef>
+          </p:style>
+        </p:cxnSp>
+        <p:cxnSp>
+          <p:nvCxnSpPr>
+            <p:cNvPr id="111" name="Łącznik: łamany 110">
+              <a:extLst>
+                <a:ext uri="{FF2B5EF4-FFF2-40B4-BE49-F238E27FC236}">
+                  <a16:creationId xmlns:a16="http://schemas.microsoft.com/office/drawing/2014/main" id="{0C804CC7-F3C5-4D73-9B06-FB953C30B2EA}"/>
+                </a:ext>
+              </a:extLst>
+            </p:cNvPr>
+            <p:cNvCxnSpPr>
+              <a:cxnSpLocks/>
+              <a:stCxn id="3" idx="1"/>
+              <a:endCxn id="155" idx="1"/>
+            </p:cNvCxnSpPr>
+            <p:nvPr/>
+          </p:nvCxnSpPr>
+          <p:spPr>
+            <a:xfrm rot="10800000" flipV="1">
+              <a:off x="2459651" y="1067710"/>
+              <a:ext cx="485749" cy="1375207"/>
+            </a:xfrm>
+            <a:prstGeom prst="bentConnector3">
+              <a:avLst>
+                <a:gd name="adj1" fmla="val 147061"/>
+              </a:avLst>
+            </a:prstGeom>
+            <a:ln>
+              <a:tailEnd type="triangle"/>
+            </a:ln>
+          </p:spPr>
+          <p:style>
+            <a:lnRef idx="2">
+              <a:schemeClr val="accent2"/>
+            </a:lnRef>
+            <a:fillRef idx="0">
+              <a:schemeClr val="accent2"/>
+            </a:fillRef>
+            <a:effectRef idx="1">
+              <a:schemeClr val="accent2"/>
+            </a:effectRef>
+            <a:fontRef idx="minor">
+              <a:schemeClr val="tx1"/>
+            </a:fontRef>
+          </p:style>
+        </p:cxnSp>
+        <p:pic>
+          <p:nvPicPr>
+            <p:cNvPr id="192" name="Grafika 191" descr="Priorytety">
+              <a:extLst>
+                <a:ext uri="{FF2B5EF4-FFF2-40B4-BE49-F238E27FC236}">
+                  <a16:creationId xmlns:a16="http://schemas.microsoft.com/office/drawing/2014/main" id="{20310D52-DA04-4D9C-BB06-5979C6F5533A}"/>
+                </a:ext>
+              </a:extLst>
+            </p:cNvPr>
+            <p:cNvPicPr>
+              <a:picLocks noChangeAspect="1"/>
+            </p:cNvPicPr>
+            <p:nvPr/>
+          </p:nvPicPr>
+          <p:blipFill>
+            <a:blip r:embed="rId4">
+              <a:extLst>
+                <a:ext uri="{28A0092B-C50C-407E-A947-70E740481C1C}">
+                  <a14:useLocalDpi xmlns:a14="http://schemas.microsoft.com/office/drawing/2010/main" val="0"/>
+                </a:ext>
+                <a:ext uri="{96DAC541-7B7A-43D3-8B79-37D633B846F1}">
+                  <asvg:svgBlip xmlns:asvg="http://schemas.microsoft.com/office/drawing/2016/SVG/main" r:embed="rId15"/>
+                </a:ext>
+              </a:extLst>
+            </a:blip>
+            <a:stretch>
+              <a:fillRect/>
+            </a:stretch>
+          </p:blipFill>
+          <p:spPr>
+            <a:xfrm>
+              <a:off x="2562907" y="2081451"/>
+              <a:ext cx="529022" cy="529022"/>
+            </a:xfrm>
+            <a:prstGeom prst="rect">
+              <a:avLst/>
+            </a:prstGeom>
+          </p:spPr>
+        </p:pic>
+        <p:pic>
+          <p:nvPicPr>
+            <p:cNvPr id="195" name="Grafika 194" descr="Priorytety">
+              <a:extLst>
+                <a:ext uri="{FF2B5EF4-FFF2-40B4-BE49-F238E27FC236}">
+                  <a16:creationId xmlns:a16="http://schemas.microsoft.com/office/drawing/2014/main" id="{29E43417-D22B-460A-A711-FD97DB786DD5}"/>
+                </a:ext>
+              </a:extLst>
+            </p:cNvPr>
+            <p:cNvPicPr>
+              <a:picLocks noChangeAspect="1"/>
+            </p:cNvPicPr>
+            <p:nvPr/>
+          </p:nvPicPr>
+          <p:blipFill>
+            <a:blip r:embed="rId4">
+              <a:extLst>
+                <a:ext uri="{28A0092B-C50C-407E-A947-70E740481C1C}">
+                  <a14:useLocalDpi xmlns:a14="http://schemas.microsoft.com/office/drawing/2010/main" val="0"/>
+                </a:ext>
+                <a:ext uri="{96DAC541-7B7A-43D3-8B79-37D633B846F1}">
+                  <asvg:svgBlip xmlns:asvg="http://schemas.microsoft.com/office/drawing/2016/SVG/main" r:embed="rId15"/>
+                </a:ext>
+              </a:extLst>
+            </a:blip>
+            <a:stretch>
+              <a:fillRect/>
+            </a:stretch>
+          </p:blipFill>
+          <p:spPr>
+            <a:xfrm>
+              <a:off x="3168233" y="2072645"/>
+              <a:ext cx="529022" cy="529022"/>
+            </a:xfrm>
+            <a:prstGeom prst="rect">
+              <a:avLst/>
+            </a:prstGeom>
+          </p:spPr>
+        </p:pic>
+      </p:grpSp>
       <p:cxnSp>
         <p:nvCxnSpPr>
           <p:cNvPr id="200" name="Łącznik: łamany 199">
@@ -6568,6 +6590,2451 @@
     <p:extLst>
       <p:ext uri="{BB962C8B-B14F-4D97-AF65-F5344CB8AC3E}">
         <p14:creationId xmlns:p14="http://schemas.microsoft.com/office/powerpoint/2010/main" val="2958432149"/>
+      </p:ext>
+    </p:extLst>
+  </p:cSld>
+  <p:clrMapOvr>
+    <a:masterClrMapping/>
+  </p:clrMapOvr>
+</p:sld>
+</file>
+
+<file path=ppt/slides/slide3.xml><?xml version="1.0" encoding="utf-8"?>
+<p:sld xmlns:a="http://schemas.openxmlformats.org/drawingml/2006/main" xmlns:r="http://schemas.openxmlformats.org/officeDocument/2006/relationships" xmlns:p="http://schemas.openxmlformats.org/presentationml/2006/main">
+  <p:cSld>
+    <p:spTree>
+      <p:nvGrpSpPr>
+        <p:cNvPr id="1" name=""/>
+        <p:cNvGrpSpPr/>
+        <p:nvPr/>
+      </p:nvGrpSpPr>
+      <p:grpSpPr>
+        <a:xfrm>
+          <a:off x="0" y="0"/>
+          <a:ext cx="0" cy="0"/>
+          <a:chOff x="0" y="0"/>
+          <a:chExt cx="0" cy="0"/>
+        </a:xfrm>
+      </p:grpSpPr>
+      <p:sp>
+        <p:nvSpPr>
+          <p:cNvPr id="138" name="Prostokąt: zaokrąglone rogi 137">
+            <a:extLst>
+              <a:ext uri="{FF2B5EF4-FFF2-40B4-BE49-F238E27FC236}">
+                <a16:creationId xmlns:a16="http://schemas.microsoft.com/office/drawing/2014/main" id="{AC330ED0-C246-416B-8F28-D14CC98D3E4B}"/>
+              </a:ext>
+            </a:extLst>
+          </p:cNvPr>
+          <p:cNvSpPr/>
+          <p:nvPr/>
+        </p:nvSpPr>
+        <p:spPr>
+          <a:xfrm>
+            <a:off x="344129" y="335142"/>
+            <a:ext cx="11517754" cy="632986"/>
+          </a:xfrm>
+          <a:prstGeom prst="roundRect">
+            <a:avLst/>
+          </a:prstGeom>
+          <a:solidFill>
+            <a:schemeClr val="accent1">
+              <a:alpha val="12000"/>
+            </a:schemeClr>
+          </a:solidFill>
+          <a:ln>
+            <a:noFill/>
+          </a:ln>
+        </p:spPr>
+        <p:style>
+          <a:lnRef idx="0">
+            <a:scrgbClr r="0" g="0" b="0"/>
+          </a:lnRef>
+          <a:fillRef idx="0">
+            <a:scrgbClr r="0" g="0" b="0"/>
+          </a:fillRef>
+          <a:effectRef idx="0">
+            <a:scrgbClr r="0" g="0" b="0"/>
+          </a:effectRef>
+          <a:fontRef idx="minor">
+            <a:schemeClr val="lt1"/>
+          </a:fontRef>
+        </p:style>
+        <p:txBody>
+          <a:bodyPr rtlCol="0" anchor="ctr"/>
+          <a:lstStyle/>
+          <a:p>
+            <a:pPr algn="ctr"/>
+            <a:endParaRPr lang="pl-PL" dirty="0"/>
+          </a:p>
+        </p:txBody>
+      </p:sp>
+      <p:pic>
+        <p:nvPicPr>
+          <p:cNvPr id="5" name="Grafika 4" descr="Wykres Gantta">
+            <a:extLst>
+              <a:ext uri="{FF2B5EF4-FFF2-40B4-BE49-F238E27FC236}">
+                <a16:creationId xmlns:a16="http://schemas.microsoft.com/office/drawing/2014/main" id="{76316CF5-6620-49BD-89C6-F6A449E7AEBE}"/>
+              </a:ext>
+            </a:extLst>
+          </p:cNvPr>
+          <p:cNvPicPr>
+            <a:picLocks noChangeAspect="1"/>
+          </p:cNvPicPr>
+          <p:nvPr/>
+        </p:nvPicPr>
+        <p:blipFill>
+          <a:blip r:embed="rId2">
+            <a:extLst>
+              <a:ext uri="{28A0092B-C50C-407E-A947-70E740481C1C}">
+                <a14:useLocalDpi xmlns:a14="http://schemas.microsoft.com/office/drawing/2010/main" val="0"/>
+              </a:ext>
+              <a:ext uri="{96DAC541-7B7A-43D3-8B79-37D633B846F1}">
+                <asvg:svgBlip xmlns:asvg="http://schemas.microsoft.com/office/drawing/2016/SVG/main" r:embed="rId3"/>
+              </a:ext>
+            </a:extLst>
+          </a:blip>
+          <a:stretch>
+            <a:fillRect/>
+          </a:stretch>
+        </p:blipFill>
+        <p:spPr>
+          <a:xfrm>
+            <a:off x="5195983" y="375985"/>
+            <a:ext cx="554400" cy="554400"/>
+          </a:xfrm>
+          <a:prstGeom prst="rect">
+            <a:avLst/>
+          </a:prstGeom>
+        </p:spPr>
+      </p:pic>
+      <p:pic>
+        <p:nvPicPr>
+          <p:cNvPr id="7" name="Grafika 6" descr="Wykres w kształcie kija hokejowego">
+            <a:extLst>
+              <a:ext uri="{FF2B5EF4-FFF2-40B4-BE49-F238E27FC236}">
+                <a16:creationId xmlns:a16="http://schemas.microsoft.com/office/drawing/2014/main" id="{EEE58F82-8CF3-4757-A074-091923927A7E}"/>
+              </a:ext>
+            </a:extLst>
+          </p:cNvPr>
+          <p:cNvPicPr>
+            <a:picLocks noChangeAspect="1"/>
+          </p:cNvPicPr>
+          <p:nvPr/>
+        </p:nvPicPr>
+        <p:blipFill>
+          <a:blip r:embed="rId4">
+            <a:extLst>
+              <a:ext uri="{28A0092B-C50C-407E-A947-70E740481C1C}">
+                <a14:useLocalDpi xmlns:a14="http://schemas.microsoft.com/office/drawing/2010/main" val="0"/>
+              </a:ext>
+              <a:ext uri="{96DAC541-7B7A-43D3-8B79-37D633B846F1}">
+                <asvg:svgBlip xmlns:asvg="http://schemas.microsoft.com/office/drawing/2016/SVG/main" r:embed="rId5"/>
+              </a:ext>
+            </a:extLst>
+          </a:blip>
+          <a:stretch>
+            <a:fillRect/>
+          </a:stretch>
+        </p:blipFill>
+        <p:spPr>
+          <a:xfrm>
+            <a:off x="3942173" y="375985"/>
+            <a:ext cx="554400" cy="554400"/>
+          </a:xfrm>
+          <a:prstGeom prst="rect">
+            <a:avLst/>
+          </a:prstGeom>
+        </p:spPr>
+      </p:pic>
+      <p:pic>
+        <p:nvPicPr>
+          <p:cNvPr id="9" name="Grafika 8" descr="Prezentacja z wykresem słupkowym">
+            <a:extLst>
+              <a:ext uri="{FF2B5EF4-FFF2-40B4-BE49-F238E27FC236}">
+                <a16:creationId xmlns:a16="http://schemas.microsoft.com/office/drawing/2014/main" id="{8761E330-1B63-4AAE-BFD9-F256CF99AFE1}"/>
+              </a:ext>
+            </a:extLst>
+          </p:cNvPr>
+          <p:cNvPicPr>
+            <a:picLocks noChangeAspect="1"/>
+          </p:cNvPicPr>
+          <p:nvPr/>
+        </p:nvPicPr>
+        <p:blipFill>
+          <a:blip r:embed="rId6">
+            <a:extLst>
+              <a:ext uri="{28A0092B-C50C-407E-A947-70E740481C1C}">
+                <a14:useLocalDpi xmlns:a14="http://schemas.microsoft.com/office/drawing/2010/main" val="0"/>
+              </a:ext>
+              <a:ext uri="{96DAC541-7B7A-43D3-8B79-37D633B846F1}">
+                <asvg:svgBlip xmlns:asvg="http://schemas.microsoft.com/office/drawing/2016/SVG/main" r:embed="rId7"/>
+              </a:ext>
+            </a:extLst>
+          </a:blip>
+          <a:stretch>
+            <a:fillRect/>
+          </a:stretch>
+        </p:blipFill>
+        <p:spPr>
+          <a:xfrm>
+            <a:off x="6449793" y="375985"/>
+            <a:ext cx="554400" cy="554400"/>
+          </a:xfrm>
+          <a:prstGeom prst="rect">
+            <a:avLst/>
+          </a:prstGeom>
+        </p:spPr>
+      </p:pic>
+      <p:pic>
+        <p:nvPicPr>
+          <p:cNvPr id="11" name="Grafika 10" descr="Prędkościomierz — niskie wskazanie">
+            <a:extLst>
+              <a:ext uri="{FF2B5EF4-FFF2-40B4-BE49-F238E27FC236}">
+                <a16:creationId xmlns:a16="http://schemas.microsoft.com/office/drawing/2014/main" id="{B21B5E02-2238-4848-99A5-381852524089}"/>
+              </a:ext>
+            </a:extLst>
+          </p:cNvPr>
+          <p:cNvPicPr>
+            <a:picLocks noChangeAspect="1"/>
+          </p:cNvPicPr>
+          <p:nvPr/>
+        </p:nvPicPr>
+        <p:blipFill>
+          <a:blip r:embed="rId8">
+            <a:extLst>
+              <a:ext uri="{28A0092B-C50C-407E-A947-70E740481C1C}">
+                <a14:useLocalDpi xmlns:a14="http://schemas.microsoft.com/office/drawing/2010/main" val="0"/>
+              </a:ext>
+              <a:ext uri="{96DAC541-7B7A-43D3-8B79-37D633B846F1}">
+                <asvg:svgBlip xmlns:asvg="http://schemas.microsoft.com/office/drawing/2016/SVG/main" r:embed="rId9"/>
+              </a:ext>
+            </a:extLst>
+          </a:blip>
+          <a:stretch>
+            <a:fillRect/>
+          </a:stretch>
+        </p:blipFill>
+        <p:spPr>
+          <a:xfrm>
+            <a:off x="7695429" y="375985"/>
+            <a:ext cx="554400" cy="554400"/>
+          </a:xfrm>
+          <a:prstGeom prst="rect">
+            <a:avLst/>
+          </a:prstGeom>
+        </p:spPr>
+      </p:pic>
+      <p:grpSp>
+        <p:nvGrpSpPr>
+          <p:cNvPr id="24" name="Grupa 23">
+            <a:extLst>
+              <a:ext uri="{FF2B5EF4-FFF2-40B4-BE49-F238E27FC236}">
+                <a16:creationId xmlns:a16="http://schemas.microsoft.com/office/drawing/2014/main" id="{F23F978D-3C35-4547-8F2A-4A7238B8730D}"/>
+              </a:ext>
+            </a:extLst>
+          </p:cNvPr>
+          <p:cNvGrpSpPr>
+            <a:grpSpLocks noChangeAspect="1"/>
+          </p:cNvGrpSpPr>
+          <p:nvPr/>
+        </p:nvGrpSpPr>
+        <p:grpSpPr>
+          <a:xfrm>
+            <a:off x="4626457" y="1239225"/>
+            <a:ext cx="2801092" cy="1548836"/>
+            <a:chOff x="4501185" y="3478333"/>
+            <a:chExt cx="2909717" cy="1608899"/>
+          </a:xfrm>
+        </p:grpSpPr>
+        <p:sp>
+          <p:nvSpPr>
+            <p:cNvPr id="13" name="Prostokąt: zaokrąglone rogi 12">
+              <a:extLst>
+                <a:ext uri="{FF2B5EF4-FFF2-40B4-BE49-F238E27FC236}">
+                  <a16:creationId xmlns:a16="http://schemas.microsoft.com/office/drawing/2014/main" id="{6AE63931-9B96-46A3-8BAE-A07C8B133250}"/>
+                </a:ext>
+              </a:extLst>
+            </p:cNvPr>
+            <p:cNvSpPr/>
+            <p:nvPr/>
+          </p:nvSpPr>
+          <p:spPr>
+            <a:xfrm>
+              <a:off x="4501185" y="3478333"/>
+              <a:ext cx="2909717" cy="1608899"/>
+            </a:xfrm>
+            <a:prstGeom prst="roundRect">
+              <a:avLst/>
+            </a:prstGeom>
+            <a:solidFill>
+              <a:schemeClr val="accent5">
+                <a:alpha val="21000"/>
+              </a:schemeClr>
+            </a:solidFill>
+            <a:ln>
+              <a:noFill/>
+            </a:ln>
+          </p:spPr>
+          <p:style>
+            <a:lnRef idx="0">
+              <a:scrgbClr r="0" g="0" b="0"/>
+            </a:lnRef>
+            <a:fillRef idx="0">
+              <a:scrgbClr r="0" g="0" b="0"/>
+            </a:fillRef>
+            <a:effectRef idx="0">
+              <a:scrgbClr r="0" g="0" b="0"/>
+            </a:effectRef>
+            <a:fontRef idx="minor">
+              <a:schemeClr val="lt1"/>
+            </a:fontRef>
+          </p:style>
+          <p:txBody>
+            <a:bodyPr rtlCol="0" anchor="ctr"/>
+            <a:lstStyle/>
+            <a:p>
+              <a:pPr algn="ctr"/>
+              <a:endParaRPr lang="pl-PL">
+                <a:latin typeface="Tahoma" panose="020B0604030504040204" pitchFamily="34" charset="0"/>
+                <a:ea typeface="Tahoma" panose="020B0604030504040204" pitchFamily="34" charset="0"/>
+                <a:cs typeface="Tahoma" panose="020B0604030504040204" pitchFamily="34" charset="0"/>
+              </a:endParaRPr>
+            </a:p>
+          </p:txBody>
+        </p:sp>
+        <p:sp>
+          <p:nvSpPr>
+            <p:cNvPr id="15" name="Prostokąt 14">
+              <a:extLst>
+                <a:ext uri="{FF2B5EF4-FFF2-40B4-BE49-F238E27FC236}">
+                  <a16:creationId xmlns:a16="http://schemas.microsoft.com/office/drawing/2014/main" id="{D24A4FB8-1465-47AA-B0A9-5CA8258FEED5}"/>
+                </a:ext>
+              </a:extLst>
+            </p:cNvPr>
+            <p:cNvSpPr/>
+            <p:nvPr/>
+          </p:nvSpPr>
+          <p:spPr>
+            <a:xfrm>
+              <a:off x="5195652" y="3616906"/>
+              <a:ext cx="1520782" cy="1331751"/>
+            </a:xfrm>
+            <a:prstGeom prst="rect">
+              <a:avLst/>
+            </a:prstGeom>
+            <a:solidFill>
+              <a:schemeClr val="accent5">
+                <a:alpha val="50000"/>
+              </a:schemeClr>
+            </a:solidFill>
+            <a:ln>
+              <a:noFill/>
+            </a:ln>
+          </p:spPr>
+          <p:style>
+            <a:lnRef idx="0">
+              <a:scrgbClr r="0" g="0" b="0"/>
+            </a:lnRef>
+            <a:fillRef idx="0">
+              <a:scrgbClr r="0" g="0" b="0"/>
+            </a:fillRef>
+            <a:effectRef idx="0">
+              <a:scrgbClr r="0" g="0" b="0"/>
+            </a:effectRef>
+            <a:fontRef idx="minor">
+              <a:schemeClr val="lt1"/>
+            </a:fontRef>
+          </p:style>
+          <p:txBody>
+            <a:bodyPr rtlCol="0" anchor="ctr"/>
+            <a:lstStyle/>
+            <a:p>
+              <a:pPr algn="ctr"/>
+              <a:endParaRPr lang="pl-PL">
+                <a:latin typeface="Tahoma" panose="020B0604030504040204" pitchFamily="34" charset="0"/>
+                <a:ea typeface="Tahoma" panose="020B0604030504040204" pitchFamily="34" charset="0"/>
+                <a:cs typeface="Tahoma" panose="020B0604030504040204" pitchFamily="34" charset="0"/>
+              </a:endParaRPr>
+            </a:p>
+          </p:txBody>
+        </p:sp>
+        <p:pic>
+          <p:nvPicPr>
+            <p:cNvPr id="16" name="Grafika 15" descr="Serwer">
+              <a:extLst>
+                <a:ext uri="{FF2B5EF4-FFF2-40B4-BE49-F238E27FC236}">
+                  <a16:creationId xmlns:a16="http://schemas.microsoft.com/office/drawing/2014/main" id="{6B377908-3735-4F70-8313-1D6423448ABB}"/>
+                </a:ext>
+              </a:extLst>
+            </p:cNvPr>
+            <p:cNvPicPr>
+              <a:picLocks noChangeAspect="1"/>
+            </p:cNvPicPr>
+            <p:nvPr/>
+          </p:nvPicPr>
+          <p:blipFill>
+            <a:blip r:embed="rId10">
+              <a:extLst>
+                <a:ext uri="{28A0092B-C50C-407E-A947-70E740481C1C}">
+                  <a14:useLocalDpi xmlns:a14="http://schemas.microsoft.com/office/drawing/2010/main" val="0"/>
+                </a:ext>
+                <a:ext uri="{96DAC541-7B7A-43D3-8B79-37D633B846F1}">
+                  <asvg:svgBlip xmlns:asvg="http://schemas.microsoft.com/office/drawing/2016/SVG/main" r:embed="rId11"/>
+                </a:ext>
+              </a:extLst>
+            </a:blip>
+            <a:stretch>
+              <a:fillRect/>
+            </a:stretch>
+          </p:blipFill>
+          <p:spPr>
+            <a:xfrm>
+              <a:off x="5551806" y="3616906"/>
+              <a:ext cx="914400" cy="914400"/>
+            </a:xfrm>
+            <a:prstGeom prst="rect">
+              <a:avLst/>
+            </a:prstGeom>
+          </p:spPr>
+        </p:pic>
+        <p:sp>
+          <p:nvSpPr>
+            <p:cNvPr id="17" name="pole tekstowe 16">
+              <a:extLst>
+                <a:ext uri="{FF2B5EF4-FFF2-40B4-BE49-F238E27FC236}">
+                  <a16:creationId xmlns:a16="http://schemas.microsoft.com/office/drawing/2014/main" id="{D057CB63-84A6-402A-B160-BDFC8E78426B}"/>
+                </a:ext>
+              </a:extLst>
+            </p:cNvPr>
+            <p:cNvSpPr txBox="1"/>
+            <p:nvPr/>
+          </p:nvSpPr>
+          <p:spPr>
+            <a:xfrm flipH="1">
+              <a:off x="5256519" y="4515990"/>
+              <a:ext cx="1478839" cy="307777"/>
+            </a:xfrm>
+            <a:prstGeom prst="rect">
+              <a:avLst/>
+            </a:prstGeom>
+            <a:noFill/>
+          </p:spPr>
+          <p:txBody>
+            <a:bodyPr wrap="square" rtlCol="0">
+              <a:spAutoFit/>
+            </a:bodyPr>
+            <a:lstStyle/>
+            <a:p>
+              <a:pPr algn="ctr"/>
+              <a:r>
+                <a:rPr lang="pl-PL" sz="1400" b="1" dirty="0">
+                  <a:latin typeface="Tahoma" panose="020B0604030504040204" pitchFamily="34" charset="0"/>
+                  <a:ea typeface="Tahoma" panose="020B0604030504040204" pitchFamily="34" charset="0"/>
+                  <a:cs typeface="Tahoma" panose="020B0604030504040204" pitchFamily="34" charset="0"/>
+                </a:rPr>
+                <a:t>DCPAM WDS</a:t>
+              </a:r>
+              <a:endParaRPr lang="pl-PL" sz="1050" b="1" dirty="0">
+                <a:latin typeface="Tahoma" panose="020B0604030504040204" pitchFamily="34" charset="0"/>
+                <a:ea typeface="Tahoma" panose="020B0604030504040204" pitchFamily="34" charset="0"/>
+                <a:cs typeface="Tahoma" panose="020B0604030504040204" pitchFamily="34" charset="0"/>
+              </a:endParaRPr>
+            </a:p>
+          </p:txBody>
+        </p:sp>
+      </p:grpSp>
+      <p:grpSp>
+        <p:nvGrpSpPr>
+          <p:cNvPr id="25" name="Grupa 24">
+            <a:extLst>
+              <a:ext uri="{FF2B5EF4-FFF2-40B4-BE49-F238E27FC236}">
+                <a16:creationId xmlns:a16="http://schemas.microsoft.com/office/drawing/2014/main" id="{E98CDEC0-7716-46E8-A502-E534FD3C8BAF}"/>
+              </a:ext>
+            </a:extLst>
+          </p:cNvPr>
+          <p:cNvGrpSpPr/>
+          <p:nvPr/>
+        </p:nvGrpSpPr>
+        <p:grpSpPr>
+          <a:xfrm>
+            <a:off x="5254794" y="3060220"/>
+            <a:ext cx="1544421" cy="1323582"/>
+            <a:chOff x="6552657" y="975047"/>
+            <a:chExt cx="2909719" cy="2556718"/>
+          </a:xfrm>
+        </p:grpSpPr>
+        <p:sp>
+          <p:nvSpPr>
+            <p:cNvPr id="26" name="Prostokąt: zaokrąglone rogi 25">
+              <a:extLst>
+                <a:ext uri="{FF2B5EF4-FFF2-40B4-BE49-F238E27FC236}">
+                  <a16:creationId xmlns:a16="http://schemas.microsoft.com/office/drawing/2014/main" id="{BC730417-717E-47AB-9EE6-FB75A4D34D5A}"/>
+                </a:ext>
+              </a:extLst>
+            </p:cNvPr>
+            <p:cNvSpPr/>
+            <p:nvPr/>
+          </p:nvSpPr>
+          <p:spPr>
+            <a:xfrm>
+              <a:off x="6552659" y="975047"/>
+              <a:ext cx="2909717" cy="2556718"/>
+            </a:xfrm>
+            <a:prstGeom prst="roundRect">
+              <a:avLst/>
+            </a:prstGeom>
+            <a:solidFill>
+              <a:schemeClr val="accent5">
+                <a:alpha val="21000"/>
+              </a:schemeClr>
+            </a:solidFill>
+            <a:ln>
+              <a:noFill/>
+            </a:ln>
+          </p:spPr>
+          <p:style>
+            <a:lnRef idx="0">
+              <a:scrgbClr r="0" g="0" b="0"/>
+            </a:lnRef>
+            <a:fillRef idx="0">
+              <a:scrgbClr r="0" g="0" b="0"/>
+            </a:fillRef>
+            <a:effectRef idx="0">
+              <a:scrgbClr r="0" g="0" b="0"/>
+            </a:effectRef>
+            <a:fontRef idx="minor">
+              <a:schemeClr val="lt1"/>
+            </a:fontRef>
+          </p:style>
+          <p:txBody>
+            <a:bodyPr rtlCol="0" anchor="ctr"/>
+            <a:lstStyle/>
+            <a:p>
+              <a:pPr algn="ctr"/>
+              <a:endParaRPr lang="pl-PL" dirty="0">
+                <a:latin typeface="Tahoma" panose="020B0604030504040204" pitchFamily="34" charset="0"/>
+                <a:ea typeface="Tahoma" panose="020B0604030504040204" pitchFamily="34" charset="0"/>
+                <a:cs typeface="Tahoma" panose="020B0604030504040204" pitchFamily="34" charset="0"/>
+              </a:endParaRPr>
+            </a:p>
+          </p:txBody>
+        </p:sp>
+        <p:pic>
+          <p:nvPicPr>
+            <p:cNvPr id="27" name="Grafika 26" descr="Baza danych">
+              <a:extLst>
+                <a:ext uri="{FF2B5EF4-FFF2-40B4-BE49-F238E27FC236}">
+                  <a16:creationId xmlns:a16="http://schemas.microsoft.com/office/drawing/2014/main" id="{79CC92CE-FEDF-4938-90FF-9FACC6F166D2}"/>
+                </a:ext>
+              </a:extLst>
+            </p:cNvPr>
+            <p:cNvPicPr>
+              <a:picLocks noChangeAspect="1"/>
+            </p:cNvPicPr>
+            <p:nvPr/>
+          </p:nvPicPr>
+          <p:blipFill>
+            <a:blip r:embed="rId12">
+              <a:extLst>
+                <a:ext uri="{28A0092B-C50C-407E-A947-70E740481C1C}">
+                  <a14:useLocalDpi xmlns:a14="http://schemas.microsoft.com/office/drawing/2010/main" val="0"/>
+                </a:ext>
+                <a:ext uri="{96DAC541-7B7A-43D3-8B79-37D633B846F1}">
+                  <asvg:svgBlip xmlns:asvg="http://schemas.microsoft.com/office/drawing/2016/SVG/main" r:embed="rId13"/>
+                </a:ext>
+              </a:extLst>
+            </a:blip>
+            <a:stretch>
+              <a:fillRect/>
+            </a:stretch>
+          </p:blipFill>
+          <p:spPr>
+            <a:xfrm>
+              <a:off x="7124983" y="1105073"/>
+              <a:ext cx="1765065" cy="1765065"/>
+            </a:xfrm>
+            <a:prstGeom prst="rect">
+              <a:avLst/>
+            </a:prstGeom>
+          </p:spPr>
+        </p:pic>
+        <p:sp>
+          <p:nvSpPr>
+            <p:cNvPr id="28" name="pole tekstowe 27">
+              <a:extLst>
+                <a:ext uri="{FF2B5EF4-FFF2-40B4-BE49-F238E27FC236}">
+                  <a16:creationId xmlns:a16="http://schemas.microsoft.com/office/drawing/2014/main" id="{CC59948F-2A60-47FD-A7D1-82EB6ADC7C2A}"/>
+                </a:ext>
+              </a:extLst>
+            </p:cNvPr>
+            <p:cNvSpPr txBox="1"/>
+            <p:nvPr/>
+          </p:nvSpPr>
+          <p:spPr>
+            <a:xfrm flipH="1">
+              <a:off x="6552657" y="2733877"/>
+              <a:ext cx="2909717" cy="505343"/>
+            </a:xfrm>
+            <a:prstGeom prst="rect">
+              <a:avLst/>
+            </a:prstGeom>
+            <a:noFill/>
+          </p:spPr>
+          <p:txBody>
+            <a:bodyPr wrap="square" rtlCol="0">
+              <a:spAutoFit/>
+            </a:bodyPr>
+            <a:lstStyle/>
+            <a:p>
+              <a:pPr algn="ctr"/>
+              <a:r>
+                <a:rPr lang="pl-PL" sz="1100" b="1" dirty="0">
+                  <a:latin typeface="Tahoma" panose="020B0604030504040204" pitchFamily="34" charset="0"/>
+                  <a:ea typeface="Tahoma" panose="020B0604030504040204" pitchFamily="34" charset="0"/>
+                  <a:cs typeface="Tahoma" panose="020B0604030504040204" pitchFamily="34" charset="0"/>
+                </a:rPr>
+                <a:t>DCPAM DATABASE</a:t>
+              </a:r>
+              <a:endParaRPr lang="pl-PL" sz="900" b="1" dirty="0">
+                <a:latin typeface="Tahoma" panose="020B0604030504040204" pitchFamily="34" charset="0"/>
+                <a:ea typeface="Tahoma" panose="020B0604030504040204" pitchFamily="34" charset="0"/>
+                <a:cs typeface="Tahoma" panose="020B0604030504040204" pitchFamily="34" charset="0"/>
+              </a:endParaRPr>
+            </a:p>
+          </p:txBody>
+        </p:sp>
+      </p:grpSp>
+      <p:grpSp>
+        <p:nvGrpSpPr>
+          <p:cNvPr id="33" name="Grupa 32">
+            <a:extLst>
+              <a:ext uri="{FF2B5EF4-FFF2-40B4-BE49-F238E27FC236}">
+                <a16:creationId xmlns:a16="http://schemas.microsoft.com/office/drawing/2014/main" id="{3C61B0D3-6074-474A-81CE-133BC658FB75}"/>
+              </a:ext>
+            </a:extLst>
+          </p:cNvPr>
+          <p:cNvGrpSpPr/>
+          <p:nvPr/>
+        </p:nvGrpSpPr>
+        <p:grpSpPr>
+          <a:xfrm>
+            <a:off x="3406592" y="3060220"/>
+            <a:ext cx="1544421" cy="1323582"/>
+            <a:chOff x="6552657" y="975047"/>
+            <a:chExt cx="2909719" cy="2556718"/>
+          </a:xfrm>
+        </p:grpSpPr>
+        <p:sp>
+          <p:nvSpPr>
+            <p:cNvPr id="34" name="Prostokąt: zaokrąglone rogi 33">
+              <a:extLst>
+                <a:ext uri="{FF2B5EF4-FFF2-40B4-BE49-F238E27FC236}">
+                  <a16:creationId xmlns:a16="http://schemas.microsoft.com/office/drawing/2014/main" id="{E79D5C75-3498-4BCF-A6EE-6FAAD66BE4B6}"/>
+                </a:ext>
+              </a:extLst>
+            </p:cNvPr>
+            <p:cNvSpPr/>
+            <p:nvPr/>
+          </p:nvSpPr>
+          <p:spPr>
+            <a:xfrm>
+              <a:off x="6552659" y="975047"/>
+              <a:ext cx="2909717" cy="2556718"/>
+            </a:xfrm>
+            <a:prstGeom prst="roundRect">
+              <a:avLst/>
+            </a:prstGeom>
+            <a:solidFill>
+              <a:schemeClr val="accent5">
+                <a:alpha val="21000"/>
+              </a:schemeClr>
+            </a:solidFill>
+            <a:ln>
+              <a:noFill/>
+            </a:ln>
+          </p:spPr>
+          <p:style>
+            <a:lnRef idx="0">
+              <a:scrgbClr r="0" g="0" b="0"/>
+            </a:lnRef>
+            <a:fillRef idx="0">
+              <a:scrgbClr r="0" g="0" b="0"/>
+            </a:fillRef>
+            <a:effectRef idx="0">
+              <a:scrgbClr r="0" g="0" b="0"/>
+            </a:effectRef>
+            <a:fontRef idx="minor">
+              <a:schemeClr val="lt1"/>
+            </a:fontRef>
+          </p:style>
+          <p:txBody>
+            <a:bodyPr rtlCol="0" anchor="ctr"/>
+            <a:lstStyle/>
+            <a:p>
+              <a:pPr algn="ctr"/>
+              <a:endParaRPr lang="pl-PL" dirty="0">
+                <a:latin typeface="Tahoma" panose="020B0604030504040204" pitchFamily="34" charset="0"/>
+                <a:ea typeface="Tahoma" panose="020B0604030504040204" pitchFamily="34" charset="0"/>
+                <a:cs typeface="Tahoma" panose="020B0604030504040204" pitchFamily="34" charset="0"/>
+              </a:endParaRPr>
+            </a:p>
+          </p:txBody>
+        </p:sp>
+        <p:pic>
+          <p:nvPicPr>
+            <p:cNvPr id="35" name="Grafika 34" descr="Baza danych">
+              <a:extLst>
+                <a:ext uri="{FF2B5EF4-FFF2-40B4-BE49-F238E27FC236}">
+                  <a16:creationId xmlns:a16="http://schemas.microsoft.com/office/drawing/2014/main" id="{A92D8D08-0E43-4C84-AF48-7A4E000F5AD7}"/>
+                </a:ext>
+              </a:extLst>
+            </p:cNvPr>
+            <p:cNvPicPr>
+              <a:picLocks noChangeAspect="1"/>
+            </p:cNvPicPr>
+            <p:nvPr/>
+          </p:nvPicPr>
+          <p:blipFill>
+            <a:blip r:embed="rId12">
+              <a:extLst>
+                <a:ext uri="{28A0092B-C50C-407E-A947-70E740481C1C}">
+                  <a14:useLocalDpi xmlns:a14="http://schemas.microsoft.com/office/drawing/2010/main" val="0"/>
+                </a:ext>
+                <a:ext uri="{96DAC541-7B7A-43D3-8B79-37D633B846F1}">
+                  <asvg:svgBlip xmlns:asvg="http://schemas.microsoft.com/office/drawing/2016/SVG/main" r:embed="rId13"/>
+                </a:ext>
+              </a:extLst>
+            </a:blip>
+            <a:stretch>
+              <a:fillRect/>
+            </a:stretch>
+          </p:blipFill>
+          <p:spPr>
+            <a:xfrm>
+              <a:off x="7124983" y="1105073"/>
+              <a:ext cx="1765065" cy="1765065"/>
+            </a:xfrm>
+            <a:prstGeom prst="rect">
+              <a:avLst/>
+            </a:prstGeom>
+          </p:spPr>
+        </p:pic>
+        <p:sp>
+          <p:nvSpPr>
+            <p:cNvPr id="36" name="pole tekstowe 35">
+              <a:extLst>
+                <a:ext uri="{FF2B5EF4-FFF2-40B4-BE49-F238E27FC236}">
+                  <a16:creationId xmlns:a16="http://schemas.microsoft.com/office/drawing/2014/main" id="{3C75DBAC-F0A4-4FC4-B25E-12ADA74E5F88}"/>
+                </a:ext>
+              </a:extLst>
+            </p:cNvPr>
+            <p:cNvSpPr txBox="1"/>
+            <p:nvPr/>
+          </p:nvSpPr>
+          <p:spPr>
+            <a:xfrm flipH="1">
+              <a:off x="6552657" y="2733877"/>
+              <a:ext cx="2909717" cy="505343"/>
+            </a:xfrm>
+            <a:prstGeom prst="rect">
+              <a:avLst/>
+            </a:prstGeom>
+            <a:noFill/>
+          </p:spPr>
+          <p:txBody>
+            <a:bodyPr wrap="square" rtlCol="0">
+              <a:spAutoFit/>
+            </a:bodyPr>
+            <a:lstStyle/>
+            <a:p>
+              <a:pPr algn="ctr"/>
+              <a:r>
+                <a:rPr lang="pl-PL" sz="1100" b="1" dirty="0">
+                  <a:latin typeface="Tahoma" panose="020B0604030504040204" pitchFamily="34" charset="0"/>
+                  <a:ea typeface="Tahoma" panose="020B0604030504040204" pitchFamily="34" charset="0"/>
+                  <a:cs typeface="Tahoma" panose="020B0604030504040204" pitchFamily="34" charset="0"/>
+                </a:rPr>
+                <a:t>DCPAM DATABASE</a:t>
+              </a:r>
+              <a:endParaRPr lang="pl-PL" sz="900" b="1" dirty="0">
+                <a:latin typeface="Tahoma" panose="020B0604030504040204" pitchFamily="34" charset="0"/>
+                <a:ea typeface="Tahoma" panose="020B0604030504040204" pitchFamily="34" charset="0"/>
+                <a:cs typeface="Tahoma" panose="020B0604030504040204" pitchFamily="34" charset="0"/>
+              </a:endParaRPr>
+            </a:p>
+          </p:txBody>
+        </p:sp>
+      </p:grpSp>
+      <p:grpSp>
+        <p:nvGrpSpPr>
+          <p:cNvPr id="37" name="Grupa 36">
+            <a:extLst>
+              <a:ext uri="{FF2B5EF4-FFF2-40B4-BE49-F238E27FC236}">
+                <a16:creationId xmlns:a16="http://schemas.microsoft.com/office/drawing/2014/main" id="{828B38E4-E9D1-4F87-8321-F059FBA28FDC}"/>
+              </a:ext>
+            </a:extLst>
+          </p:cNvPr>
+          <p:cNvGrpSpPr/>
+          <p:nvPr/>
+        </p:nvGrpSpPr>
+        <p:grpSpPr>
+          <a:xfrm>
+            <a:off x="7102992" y="3060220"/>
+            <a:ext cx="1544421" cy="1323582"/>
+            <a:chOff x="6552657" y="975047"/>
+            <a:chExt cx="2909719" cy="2556718"/>
+          </a:xfrm>
+        </p:grpSpPr>
+        <p:sp>
+          <p:nvSpPr>
+            <p:cNvPr id="38" name="Prostokąt: zaokrąglone rogi 37">
+              <a:extLst>
+                <a:ext uri="{FF2B5EF4-FFF2-40B4-BE49-F238E27FC236}">
+                  <a16:creationId xmlns:a16="http://schemas.microsoft.com/office/drawing/2014/main" id="{B615E90D-68D8-469E-8BA8-B571ADC45E39}"/>
+                </a:ext>
+              </a:extLst>
+            </p:cNvPr>
+            <p:cNvSpPr/>
+            <p:nvPr/>
+          </p:nvSpPr>
+          <p:spPr>
+            <a:xfrm>
+              <a:off x="6552659" y="975047"/>
+              <a:ext cx="2909717" cy="2556718"/>
+            </a:xfrm>
+            <a:prstGeom prst="roundRect">
+              <a:avLst/>
+            </a:prstGeom>
+            <a:solidFill>
+              <a:schemeClr val="accent5">
+                <a:alpha val="21000"/>
+              </a:schemeClr>
+            </a:solidFill>
+            <a:ln>
+              <a:noFill/>
+            </a:ln>
+          </p:spPr>
+          <p:style>
+            <a:lnRef idx="0">
+              <a:scrgbClr r="0" g="0" b="0"/>
+            </a:lnRef>
+            <a:fillRef idx="0">
+              <a:scrgbClr r="0" g="0" b="0"/>
+            </a:fillRef>
+            <a:effectRef idx="0">
+              <a:scrgbClr r="0" g="0" b="0"/>
+            </a:effectRef>
+            <a:fontRef idx="minor">
+              <a:schemeClr val="lt1"/>
+            </a:fontRef>
+          </p:style>
+          <p:txBody>
+            <a:bodyPr rtlCol="0" anchor="ctr"/>
+            <a:lstStyle/>
+            <a:p>
+              <a:pPr algn="ctr"/>
+              <a:endParaRPr lang="pl-PL" dirty="0">
+                <a:latin typeface="Tahoma" panose="020B0604030504040204" pitchFamily="34" charset="0"/>
+                <a:ea typeface="Tahoma" panose="020B0604030504040204" pitchFamily="34" charset="0"/>
+                <a:cs typeface="Tahoma" panose="020B0604030504040204" pitchFamily="34" charset="0"/>
+              </a:endParaRPr>
+            </a:p>
+          </p:txBody>
+        </p:sp>
+        <p:pic>
+          <p:nvPicPr>
+            <p:cNvPr id="39" name="Grafika 38" descr="Baza danych">
+              <a:extLst>
+                <a:ext uri="{FF2B5EF4-FFF2-40B4-BE49-F238E27FC236}">
+                  <a16:creationId xmlns:a16="http://schemas.microsoft.com/office/drawing/2014/main" id="{AA92B100-8818-47AC-B16E-FDBE9D0AA99E}"/>
+                </a:ext>
+              </a:extLst>
+            </p:cNvPr>
+            <p:cNvPicPr>
+              <a:picLocks noChangeAspect="1"/>
+            </p:cNvPicPr>
+            <p:nvPr/>
+          </p:nvPicPr>
+          <p:blipFill>
+            <a:blip r:embed="rId12">
+              <a:extLst>
+                <a:ext uri="{28A0092B-C50C-407E-A947-70E740481C1C}">
+                  <a14:useLocalDpi xmlns:a14="http://schemas.microsoft.com/office/drawing/2010/main" val="0"/>
+                </a:ext>
+                <a:ext uri="{96DAC541-7B7A-43D3-8B79-37D633B846F1}">
+                  <asvg:svgBlip xmlns:asvg="http://schemas.microsoft.com/office/drawing/2016/SVG/main" r:embed="rId13"/>
+                </a:ext>
+              </a:extLst>
+            </a:blip>
+            <a:stretch>
+              <a:fillRect/>
+            </a:stretch>
+          </p:blipFill>
+          <p:spPr>
+            <a:xfrm>
+              <a:off x="7124983" y="1105073"/>
+              <a:ext cx="1765065" cy="1765065"/>
+            </a:xfrm>
+            <a:prstGeom prst="rect">
+              <a:avLst/>
+            </a:prstGeom>
+          </p:spPr>
+        </p:pic>
+        <p:sp>
+          <p:nvSpPr>
+            <p:cNvPr id="40" name="pole tekstowe 39">
+              <a:extLst>
+                <a:ext uri="{FF2B5EF4-FFF2-40B4-BE49-F238E27FC236}">
+                  <a16:creationId xmlns:a16="http://schemas.microsoft.com/office/drawing/2014/main" id="{226BAD45-D7E6-4AB0-83E3-D126C703946A}"/>
+                </a:ext>
+              </a:extLst>
+            </p:cNvPr>
+            <p:cNvSpPr txBox="1"/>
+            <p:nvPr/>
+          </p:nvSpPr>
+          <p:spPr>
+            <a:xfrm flipH="1">
+              <a:off x="6552657" y="2733877"/>
+              <a:ext cx="2909717" cy="505343"/>
+            </a:xfrm>
+            <a:prstGeom prst="rect">
+              <a:avLst/>
+            </a:prstGeom>
+            <a:noFill/>
+          </p:spPr>
+          <p:txBody>
+            <a:bodyPr wrap="square" rtlCol="0">
+              <a:spAutoFit/>
+            </a:bodyPr>
+            <a:lstStyle/>
+            <a:p>
+              <a:pPr algn="ctr"/>
+              <a:r>
+                <a:rPr lang="pl-PL" sz="1100" b="1" dirty="0">
+                  <a:latin typeface="Tahoma" panose="020B0604030504040204" pitchFamily="34" charset="0"/>
+                  <a:ea typeface="Tahoma" panose="020B0604030504040204" pitchFamily="34" charset="0"/>
+                  <a:cs typeface="Tahoma" panose="020B0604030504040204" pitchFamily="34" charset="0"/>
+                </a:rPr>
+                <a:t>DCPAM DATABASE</a:t>
+              </a:r>
+              <a:endParaRPr lang="pl-PL" sz="900" b="1" dirty="0">
+                <a:latin typeface="Tahoma" panose="020B0604030504040204" pitchFamily="34" charset="0"/>
+                <a:ea typeface="Tahoma" panose="020B0604030504040204" pitchFamily="34" charset="0"/>
+                <a:cs typeface="Tahoma" panose="020B0604030504040204" pitchFamily="34" charset="0"/>
+              </a:endParaRPr>
+            </a:p>
+          </p:txBody>
+        </p:sp>
+      </p:grpSp>
+      <p:cxnSp>
+        <p:nvCxnSpPr>
+          <p:cNvPr id="42" name="Łącznik: łamany 41">
+            <a:extLst>
+              <a:ext uri="{FF2B5EF4-FFF2-40B4-BE49-F238E27FC236}">
+                <a16:creationId xmlns:a16="http://schemas.microsoft.com/office/drawing/2014/main" id="{983B4502-12D9-4A02-A4EA-39EDB5FA1DDF}"/>
+              </a:ext>
+            </a:extLst>
+          </p:cNvPr>
+          <p:cNvCxnSpPr>
+            <a:stCxn id="34" idx="0"/>
+            <a:endCxn id="13" idx="1"/>
+          </p:cNvCxnSpPr>
+          <p:nvPr/>
+        </p:nvCxnSpPr>
+        <p:spPr>
+          <a:xfrm rot="5400000" flipH="1" flipV="1">
+            <a:off x="3879342" y="2313105"/>
+            <a:ext cx="1046577" cy="447654"/>
+          </a:xfrm>
+          <a:prstGeom prst="bentConnector2">
+            <a:avLst/>
+          </a:prstGeom>
+          <a:ln>
+            <a:tailEnd type="triangle"/>
+          </a:ln>
+        </p:spPr>
+        <p:style>
+          <a:lnRef idx="1">
+            <a:schemeClr val="accent1"/>
+          </a:lnRef>
+          <a:fillRef idx="0">
+            <a:schemeClr val="accent1"/>
+          </a:fillRef>
+          <a:effectRef idx="0">
+            <a:schemeClr val="accent1"/>
+          </a:effectRef>
+          <a:fontRef idx="minor">
+            <a:schemeClr val="tx1"/>
+          </a:fontRef>
+        </p:style>
+      </p:cxnSp>
+      <p:cxnSp>
+        <p:nvCxnSpPr>
+          <p:cNvPr id="44" name="Łącznik: łamany 43">
+            <a:extLst>
+              <a:ext uri="{FF2B5EF4-FFF2-40B4-BE49-F238E27FC236}">
+                <a16:creationId xmlns:a16="http://schemas.microsoft.com/office/drawing/2014/main" id="{7F87AF3F-1D30-4AD3-B78D-C42E7BEFD1D9}"/>
+              </a:ext>
+            </a:extLst>
+          </p:cNvPr>
+          <p:cNvCxnSpPr>
+            <a:stCxn id="38" idx="0"/>
+            <a:endCxn id="13" idx="3"/>
+          </p:cNvCxnSpPr>
+          <p:nvPr/>
+        </p:nvCxnSpPr>
+        <p:spPr>
+          <a:xfrm rot="16200000" flipV="1">
+            <a:off x="7128088" y="2313105"/>
+            <a:ext cx="1046577" cy="447654"/>
+          </a:xfrm>
+          <a:prstGeom prst="bentConnector2">
+            <a:avLst/>
+          </a:prstGeom>
+          <a:ln>
+            <a:tailEnd type="triangle"/>
+          </a:ln>
+        </p:spPr>
+        <p:style>
+          <a:lnRef idx="1">
+            <a:schemeClr val="accent1"/>
+          </a:lnRef>
+          <a:fillRef idx="0">
+            <a:schemeClr val="accent1"/>
+          </a:fillRef>
+          <a:effectRef idx="0">
+            <a:schemeClr val="accent1"/>
+          </a:effectRef>
+          <a:fontRef idx="minor">
+            <a:schemeClr val="tx1"/>
+          </a:fontRef>
+        </p:style>
+      </p:cxnSp>
+      <p:cxnSp>
+        <p:nvCxnSpPr>
+          <p:cNvPr id="46" name="Łącznik: łamany 45">
+            <a:extLst>
+              <a:ext uri="{FF2B5EF4-FFF2-40B4-BE49-F238E27FC236}">
+                <a16:creationId xmlns:a16="http://schemas.microsoft.com/office/drawing/2014/main" id="{FCE69E34-3BBD-48B8-B8C7-D9732B718BDA}"/>
+              </a:ext>
+            </a:extLst>
+          </p:cNvPr>
+          <p:cNvCxnSpPr>
+            <a:stCxn id="26" idx="0"/>
+            <a:endCxn id="13" idx="2"/>
+          </p:cNvCxnSpPr>
+          <p:nvPr/>
+        </p:nvCxnSpPr>
+        <p:spPr>
+          <a:xfrm rot="16200000" flipV="1">
+            <a:off x="5890925" y="2924140"/>
+            <a:ext cx="272159" cy="2"/>
+          </a:xfrm>
+          <a:prstGeom prst="bentConnector3">
+            <a:avLst/>
+          </a:prstGeom>
+          <a:ln>
+            <a:tailEnd type="triangle"/>
+          </a:ln>
+        </p:spPr>
+        <p:style>
+          <a:lnRef idx="1">
+            <a:schemeClr val="accent1"/>
+          </a:lnRef>
+          <a:fillRef idx="0">
+            <a:schemeClr val="accent1"/>
+          </a:fillRef>
+          <a:effectRef idx="0">
+            <a:schemeClr val="accent1"/>
+          </a:effectRef>
+          <a:fontRef idx="minor">
+            <a:schemeClr val="tx1"/>
+          </a:fontRef>
+        </p:style>
+      </p:cxnSp>
+      <p:grpSp>
+        <p:nvGrpSpPr>
+          <p:cNvPr id="79" name="Grupa 78">
+            <a:extLst>
+              <a:ext uri="{FF2B5EF4-FFF2-40B4-BE49-F238E27FC236}">
+                <a16:creationId xmlns:a16="http://schemas.microsoft.com/office/drawing/2014/main" id="{3594B478-7E80-4BCA-90BE-A0A8EE34C3FE}"/>
+              </a:ext>
+            </a:extLst>
+          </p:cNvPr>
+          <p:cNvGrpSpPr/>
+          <p:nvPr/>
+        </p:nvGrpSpPr>
+        <p:grpSpPr>
+          <a:xfrm>
+            <a:off x="3990709" y="4839064"/>
+            <a:ext cx="1357032" cy="910526"/>
+            <a:chOff x="5254792" y="4655961"/>
+            <a:chExt cx="1357032" cy="910526"/>
+          </a:xfrm>
+        </p:grpSpPr>
+        <p:sp>
+          <p:nvSpPr>
+            <p:cNvPr id="50" name="Prostokąt: zaokrąglone rogi 49">
+              <a:extLst>
+                <a:ext uri="{FF2B5EF4-FFF2-40B4-BE49-F238E27FC236}">
+                  <a16:creationId xmlns:a16="http://schemas.microsoft.com/office/drawing/2014/main" id="{04C52617-21B1-4A34-989E-86E4672FDEA0}"/>
+                </a:ext>
+              </a:extLst>
+            </p:cNvPr>
+            <p:cNvSpPr/>
+            <p:nvPr/>
+          </p:nvSpPr>
+          <p:spPr>
+            <a:xfrm>
+              <a:off x="5254794" y="4655961"/>
+              <a:ext cx="1357030" cy="910526"/>
+            </a:xfrm>
+            <a:prstGeom prst="roundRect">
+              <a:avLst/>
+            </a:prstGeom>
+            <a:solidFill>
+              <a:schemeClr val="accent5">
+                <a:alpha val="21000"/>
+              </a:schemeClr>
+            </a:solidFill>
+            <a:ln>
+              <a:noFill/>
+            </a:ln>
+          </p:spPr>
+          <p:style>
+            <a:lnRef idx="0">
+              <a:scrgbClr r="0" g="0" b="0"/>
+            </a:lnRef>
+            <a:fillRef idx="0">
+              <a:scrgbClr r="0" g="0" b="0"/>
+            </a:fillRef>
+            <a:effectRef idx="0">
+              <a:scrgbClr r="0" g="0" b="0"/>
+            </a:effectRef>
+            <a:fontRef idx="minor">
+              <a:schemeClr val="lt1"/>
+            </a:fontRef>
+          </p:style>
+          <p:txBody>
+            <a:bodyPr rtlCol="0" anchor="ctr"/>
+            <a:lstStyle/>
+            <a:p>
+              <a:pPr algn="ctr"/>
+              <a:endParaRPr lang="pl-PL" dirty="0">
+                <a:latin typeface="Tahoma" panose="020B0604030504040204" pitchFamily="34" charset="0"/>
+                <a:ea typeface="Tahoma" panose="020B0604030504040204" pitchFamily="34" charset="0"/>
+                <a:cs typeface="Tahoma" panose="020B0604030504040204" pitchFamily="34" charset="0"/>
+              </a:endParaRPr>
+            </a:p>
+          </p:txBody>
+        </p:sp>
+        <p:pic>
+          <p:nvPicPr>
+            <p:cNvPr id="53" name="Grafika 52" descr="Serwer">
+              <a:extLst>
+                <a:ext uri="{FF2B5EF4-FFF2-40B4-BE49-F238E27FC236}">
+                  <a16:creationId xmlns:a16="http://schemas.microsoft.com/office/drawing/2014/main" id="{1B211EF5-23E9-40EF-B655-C6AD770E8B7C}"/>
+                </a:ext>
+              </a:extLst>
+            </p:cNvPr>
+            <p:cNvPicPr>
+              <a:picLocks noChangeAspect="1"/>
+            </p:cNvPicPr>
+            <p:nvPr/>
+          </p:nvPicPr>
+          <p:blipFill>
+            <a:blip r:embed="rId14">
+              <a:extLst>
+                <a:ext uri="{28A0092B-C50C-407E-A947-70E740481C1C}">
+                  <a14:useLocalDpi xmlns:a14="http://schemas.microsoft.com/office/drawing/2010/main" val="0"/>
+                </a:ext>
+                <a:ext uri="{96DAC541-7B7A-43D3-8B79-37D633B846F1}">
+                  <asvg:svgBlip xmlns:asvg="http://schemas.microsoft.com/office/drawing/2016/SVG/main" r:embed="rId15"/>
+                </a:ext>
+              </a:extLst>
+            </a:blip>
+            <a:stretch>
+              <a:fillRect/>
+            </a:stretch>
+          </p:blipFill>
+          <p:spPr>
+            <a:xfrm>
+              <a:off x="5624334" y="4655961"/>
+              <a:ext cx="628031" cy="630503"/>
+            </a:xfrm>
+            <a:prstGeom prst="rect">
+              <a:avLst/>
+            </a:prstGeom>
+          </p:spPr>
+        </p:pic>
+        <p:sp>
+          <p:nvSpPr>
+            <p:cNvPr id="54" name="pole tekstowe 53">
+              <a:extLst>
+                <a:ext uri="{FF2B5EF4-FFF2-40B4-BE49-F238E27FC236}">
+                  <a16:creationId xmlns:a16="http://schemas.microsoft.com/office/drawing/2014/main" id="{5719B0AF-C3A4-47C0-8F31-40715F1BCA22}"/>
+                </a:ext>
+              </a:extLst>
+            </p:cNvPr>
+            <p:cNvSpPr txBox="1"/>
+            <p:nvPr/>
+          </p:nvSpPr>
+          <p:spPr>
+            <a:xfrm flipH="1">
+              <a:off x="5254792" y="5286464"/>
+              <a:ext cx="1357030" cy="261610"/>
+            </a:xfrm>
+            <a:prstGeom prst="rect">
+              <a:avLst/>
+            </a:prstGeom>
+            <a:noFill/>
+          </p:spPr>
+          <p:txBody>
+            <a:bodyPr wrap="square" rtlCol="0">
+              <a:spAutoFit/>
+            </a:bodyPr>
+            <a:lstStyle/>
+            <a:p>
+              <a:pPr algn="ctr"/>
+              <a:r>
+                <a:rPr lang="pl-PL" sz="1100" b="1" dirty="0">
+                  <a:latin typeface="Tahoma" panose="020B0604030504040204" pitchFamily="34" charset="0"/>
+                  <a:ea typeface="Tahoma" panose="020B0604030504040204" pitchFamily="34" charset="0"/>
+                  <a:cs typeface="Tahoma" panose="020B0604030504040204" pitchFamily="34" charset="0"/>
+                </a:rPr>
+                <a:t>DCPAM ETL</a:t>
+              </a:r>
+              <a:endParaRPr lang="pl-PL" sz="900" b="1" dirty="0">
+                <a:latin typeface="Tahoma" panose="020B0604030504040204" pitchFamily="34" charset="0"/>
+                <a:ea typeface="Tahoma" panose="020B0604030504040204" pitchFamily="34" charset="0"/>
+                <a:cs typeface="Tahoma" panose="020B0604030504040204" pitchFamily="34" charset="0"/>
+              </a:endParaRPr>
+            </a:p>
+          </p:txBody>
+        </p:sp>
+      </p:grpSp>
+      <p:grpSp>
+        <p:nvGrpSpPr>
+          <p:cNvPr id="80" name="Grupa 79">
+            <a:extLst>
+              <a:ext uri="{FF2B5EF4-FFF2-40B4-BE49-F238E27FC236}">
+                <a16:creationId xmlns:a16="http://schemas.microsoft.com/office/drawing/2014/main" id="{5D2FA3DB-C0B0-4B64-900A-5157D97A0940}"/>
+              </a:ext>
+            </a:extLst>
+          </p:cNvPr>
+          <p:cNvGrpSpPr/>
+          <p:nvPr/>
+        </p:nvGrpSpPr>
+        <p:grpSpPr>
+          <a:xfrm>
+            <a:off x="7258937" y="4833550"/>
+            <a:ext cx="1357032" cy="910526"/>
+            <a:chOff x="5254792" y="4655961"/>
+            <a:chExt cx="1357032" cy="910526"/>
+          </a:xfrm>
+        </p:grpSpPr>
+        <p:sp>
+          <p:nvSpPr>
+            <p:cNvPr id="81" name="Prostokąt: zaokrąglone rogi 80">
+              <a:extLst>
+                <a:ext uri="{FF2B5EF4-FFF2-40B4-BE49-F238E27FC236}">
+                  <a16:creationId xmlns:a16="http://schemas.microsoft.com/office/drawing/2014/main" id="{E92833BF-C4A4-4972-8743-53D724582780}"/>
+                </a:ext>
+              </a:extLst>
+            </p:cNvPr>
+            <p:cNvSpPr/>
+            <p:nvPr/>
+          </p:nvSpPr>
+          <p:spPr>
+            <a:xfrm>
+              <a:off x="5254794" y="4655961"/>
+              <a:ext cx="1357030" cy="910526"/>
+            </a:xfrm>
+            <a:prstGeom prst="roundRect">
+              <a:avLst/>
+            </a:prstGeom>
+            <a:solidFill>
+              <a:schemeClr val="accent5">
+                <a:alpha val="21000"/>
+              </a:schemeClr>
+            </a:solidFill>
+            <a:ln>
+              <a:noFill/>
+            </a:ln>
+          </p:spPr>
+          <p:style>
+            <a:lnRef idx="0">
+              <a:scrgbClr r="0" g="0" b="0"/>
+            </a:lnRef>
+            <a:fillRef idx="0">
+              <a:scrgbClr r="0" g="0" b="0"/>
+            </a:fillRef>
+            <a:effectRef idx="0">
+              <a:scrgbClr r="0" g="0" b="0"/>
+            </a:effectRef>
+            <a:fontRef idx="minor">
+              <a:schemeClr val="lt1"/>
+            </a:fontRef>
+          </p:style>
+          <p:txBody>
+            <a:bodyPr rtlCol="0" anchor="ctr"/>
+            <a:lstStyle/>
+            <a:p>
+              <a:pPr algn="ctr"/>
+              <a:endParaRPr lang="pl-PL" dirty="0">
+                <a:latin typeface="Tahoma" panose="020B0604030504040204" pitchFamily="34" charset="0"/>
+                <a:ea typeface="Tahoma" panose="020B0604030504040204" pitchFamily="34" charset="0"/>
+                <a:cs typeface="Tahoma" panose="020B0604030504040204" pitchFamily="34" charset="0"/>
+              </a:endParaRPr>
+            </a:p>
+          </p:txBody>
+        </p:sp>
+        <p:pic>
+          <p:nvPicPr>
+            <p:cNvPr id="82" name="Grafika 81" descr="Serwer">
+              <a:extLst>
+                <a:ext uri="{FF2B5EF4-FFF2-40B4-BE49-F238E27FC236}">
+                  <a16:creationId xmlns:a16="http://schemas.microsoft.com/office/drawing/2014/main" id="{1F273ADE-78E2-425C-81C0-C410F3802C56}"/>
+                </a:ext>
+              </a:extLst>
+            </p:cNvPr>
+            <p:cNvPicPr>
+              <a:picLocks noChangeAspect="1"/>
+            </p:cNvPicPr>
+            <p:nvPr/>
+          </p:nvPicPr>
+          <p:blipFill>
+            <a:blip r:embed="rId14">
+              <a:extLst>
+                <a:ext uri="{28A0092B-C50C-407E-A947-70E740481C1C}">
+                  <a14:useLocalDpi xmlns:a14="http://schemas.microsoft.com/office/drawing/2010/main" val="0"/>
+                </a:ext>
+                <a:ext uri="{96DAC541-7B7A-43D3-8B79-37D633B846F1}">
+                  <asvg:svgBlip xmlns:asvg="http://schemas.microsoft.com/office/drawing/2016/SVG/main" r:embed="rId15"/>
+                </a:ext>
+              </a:extLst>
+            </a:blip>
+            <a:stretch>
+              <a:fillRect/>
+            </a:stretch>
+          </p:blipFill>
+          <p:spPr>
+            <a:xfrm>
+              <a:off x="5624334" y="4655961"/>
+              <a:ext cx="628031" cy="630503"/>
+            </a:xfrm>
+            <a:prstGeom prst="rect">
+              <a:avLst/>
+            </a:prstGeom>
+          </p:spPr>
+        </p:pic>
+        <p:sp>
+          <p:nvSpPr>
+            <p:cNvPr id="83" name="pole tekstowe 82">
+              <a:extLst>
+                <a:ext uri="{FF2B5EF4-FFF2-40B4-BE49-F238E27FC236}">
+                  <a16:creationId xmlns:a16="http://schemas.microsoft.com/office/drawing/2014/main" id="{4B8CABCC-3A26-41A1-A2DD-2968D151F6B7}"/>
+                </a:ext>
+              </a:extLst>
+            </p:cNvPr>
+            <p:cNvSpPr txBox="1"/>
+            <p:nvPr/>
+          </p:nvSpPr>
+          <p:spPr>
+            <a:xfrm flipH="1">
+              <a:off x="5254792" y="5286464"/>
+              <a:ext cx="1357030" cy="261610"/>
+            </a:xfrm>
+            <a:prstGeom prst="rect">
+              <a:avLst/>
+            </a:prstGeom>
+            <a:noFill/>
+          </p:spPr>
+          <p:txBody>
+            <a:bodyPr wrap="square" rtlCol="0">
+              <a:spAutoFit/>
+            </a:bodyPr>
+            <a:lstStyle/>
+            <a:p>
+              <a:pPr algn="ctr"/>
+              <a:r>
+                <a:rPr lang="pl-PL" sz="1100" b="1" dirty="0">
+                  <a:latin typeface="Tahoma" panose="020B0604030504040204" pitchFamily="34" charset="0"/>
+                  <a:ea typeface="Tahoma" panose="020B0604030504040204" pitchFamily="34" charset="0"/>
+                  <a:cs typeface="Tahoma" panose="020B0604030504040204" pitchFamily="34" charset="0"/>
+                </a:rPr>
+                <a:t>DCPAM ETL</a:t>
+              </a:r>
+              <a:endParaRPr lang="pl-PL" sz="900" b="1" dirty="0">
+                <a:latin typeface="Tahoma" panose="020B0604030504040204" pitchFamily="34" charset="0"/>
+                <a:ea typeface="Tahoma" panose="020B0604030504040204" pitchFamily="34" charset="0"/>
+                <a:cs typeface="Tahoma" panose="020B0604030504040204" pitchFamily="34" charset="0"/>
+              </a:endParaRPr>
+            </a:p>
+          </p:txBody>
+        </p:sp>
+      </p:grpSp>
+      <p:grpSp>
+        <p:nvGrpSpPr>
+          <p:cNvPr id="84" name="Grupa 83">
+            <a:extLst>
+              <a:ext uri="{FF2B5EF4-FFF2-40B4-BE49-F238E27FC236}">
+                <a16:creationId xmlns:a16="http://schemas.microsoft.com/office/drawing/2014/main" id="{CEBC0165-3A49-49D3-8590-B0553BEB9935}"/>
+              </a:ext>
+            </a:extLst>
+          </p:cNvPr>
+          <p:cNvGrpSpPr/>
+          <p:nvPr/>
+        </p:nvGrpSpPr>
+        <p:grpSpPr>
+          <a:xfrm>
+            <a:off x="2313546" y="4839064"/>
+            <a:ext cx="1357032" cy="910526"/>
+            <a:chOff x="5254792" y="4655961"/>
+            <a:chExt cx="1357032" cy="910526"/>
+          </a:xfrm>
+        </p:grpSpPr>
+        <p:sp>
+          <p:nvSpPr>
+            <p:cNvPr id="85" name="Prostokąt: zaokrąglone rogi 84">
+              <a:extLst>
+                <a:ext uri="{FF2B5EF4-FFF2-40B4-BE49-F238E27FC236}">
+                  <a16:creationId xmlns:a16="http://schemas.microsoft.com/office/drawing/2014/main" id="{E82CDAAD-97DD-401F-AB0C-4E3A0B13F199}"/>
+                </a:ext>
+              </a:extLst>
+            </p:cNvPr>
+            <p:cNvSpPr/>
+            <p:nvPr/>
+          </p:nvSpPr>
+          <p:spPr>
+            <a:xfrm>
+              <a:off x="5254794" y="4655961"/>
+              <a:ext cx="1357030" cy="910526"/>
+            </a:xfrm>
+            <a:prstGeom prst="roundRect">
+              <a:avLst/>
+            </a:prstGeom>
+            <a:solidFill>
+              <a:schemeClr val="accent5">
+                <a:alpha val="21000"/>
+              </a:schemeClr>
+            </a:solidFill>
+            <a:ln>
+              <a:noFill/>
+            </a:ln>
+          </p:spPr>
+          <p:style>
+            <a:lnRef idx="0">
+              <a:scrgbClr r="0" g="0" b="0"/>
+            </a:lnRef>
+            <a:fillRef idx="0">
+              <a:scrgbClr r="0" g="0" b="0"/>
+            </a:fillRef>
+            <a:effectRef idx="0">
+              <a:scrgbClr r="0" g="0" b="0"/>
+            </a:effectRef>
+            <a:fontRef idx="minor">
+              <a:schemeClr val="lt1"/>
+            </a:fontRef>
+          </p:style>
+          <p:txBody>
+            <a:bodyPr rtlCol="0" anchor="ctr"/>
+            <a:lstStyle/>
+            <a:p>
+              <a:pPr algn="ctr"/>
+              <a:endParaRPr lang="pl-PL" dirty="0">
+                <a:latin typeface="Tahoma" panose="020B0604030504040204" pitchFamily="34" charset="0"/>
+                <a:ea typeface="Tahoma" panose="020B0604030504040204" pitchFamily="34" charset="0"/>
+                <a:cs typeface="Tahoma" panose="020B0604030504040204" pitchFamily="34" charset="0"/>
+              </a:endParaRPr>
+            </a:p>
+          </p:txBody>
+        </p:sp>
+        <p:pic>
+          <p:nvPicPr>
+            <p:cNvPr id="86" name="Grafika 85" descr="Serwer">
+              <a:extLst>
+                <a:ext uri="{FF2B5EF4-FFF2-40B4-BE49-F238E27FC236}">
+                  <a16:creationId xmlns:a16="http://schemas.microsoft.com/office/drawing/2014/main" id="{1976A1DB-52BD-4B52-89C6-0C3874F81C6D}"/>
+                </a:ext>
+              </a:extLst>
+            </p:cNvPr>
+            <p:cNvPicPr>
+              <a:picLocks noChangeAspect="1"/>
+            </p:cNvPicPr>
+            <p:nvPr/>
+          </p:nvPicPr>
+          <p:blipFill>
+            <a:blip r:embed="rId14">
+              <a:extLst>
+                <a:ext uri="{28A0092B-C50C-407E-A947-70E740481C1C}">
+                  <a14:useLocalDpi xmlns:a14="http://schemas.microsoft.com/office/drawing/2010/main" val="0"/>
+                </a:ext>
+                <a:ext uri="{96DAC541-7B7A-43D3-8B79-37D633B846F1}">
+                  <asvg:svgBlip xmlns:asvg="http://schemas.microsoft.com/office/drawing/2016/SVG/main" r:embed="rId15"/>
+                </a:ext>
+              </a:extLst>
+            </a:blip>
+            <a:stretch>
+              <a:fillRect/>
+            </a:stretch>
+          </p:blipFill>
+          <p:spPr>
+            <a:xfrm>
+              <a:off x="5624334" y="4655961"/>
+              <a:ext cx="628031" cy="630503"/>
+            </a:xfrm>
+            <a:prstGeom prst="rect">
+              <a:avLst/>
+            </a:prstGeom>
+          </p:spPr>
+        </p:pic>
+        <p:sp>
+          <p:nvSpPr>
+            <p:cNvPr id="87" name="pole tekstowe 86">
+              <a:extLst>
+                <a:ext uri="{FF2B5EF4-FFF2-40B4-BE49-F238E27FC236}">
+                  <a16:creationId xmlns:a16="http://schemas.microsoft.com/office/drawing/2014/main" id="{5E8F5F3B-5415-42CE-8FBC-C7A5F939EE72}"/>
+                </a:ext>
+              </a:extLst>
+            </p:cNvPr>
+            <p:cNvSpPr txBox="1"/>
+            <p:nvPr/>
+          </p:nvSpPr>
+          <p:spPr>
+            <a:xfrm flipH="1">
+              <a:off x="5254792" y="5286464"/>
+              <a:ext cx="1357030" cy="261610"/>
+            </a:xfrm>
+            <a:prstGeom prst="rect">
+              <a:avLst/>
+            </a:prstGeom>
+            <a:noFill/>
+          </p:spPr>
+          <p:txBody>
+            <a:bodyPr wrap="square" rtlCol="0">
+              <a:spAutoFit/>
+            </a:bodyPr>
+            <a:lstStyle/>
+            <a:p>
+              <a:pPr algn="ctr"/>
+              <a:r>
+                <a:rPr lang="pl-PL" sz="1100" b="1" dirty="0">
+                  <a:latin typeface="Tahoma" panose="020B0604030504040204" pitchFamily="34" charset="0"/>
+                  <a:ea typeface="Tahoma" panose="020B0604030504040204" pitchFamily="34" charset="0"/>
+                  <a:cs typeface="Tahoma" panose="020B0604030504040204" pitchFamily="34" charset="0"/>
+                </a:rPr>
+                <a:t>DCPAM ETL</a:t>
+              </a:r>
+              <a:endParaRPr lang="pl-PL" sz="900" b="1" dirty="0">
+                <a:latin typeface="Tahoma" panose="020B0604030504040204" pitchFamily="34" charset="0"/>
+                <a:ea typeface="Tahoma" panose="020B0604030504040204" pitchFamily="34" charset="0"/>
+                <a:cs typeface="Tahoma" panose="020B0604030504040204" pitchFamily="34" charset="0"/>
+              </a:endParaRPr>
+            </a:p>
+          </p:txBody>
+        </p:sp>
+      </p:grpSp>
+      <p:cxnSp>
+        <p:nvCxnSpPr>
+          <p:cNvPr id="89" name="Łącznik: łamany 88">
+            <a:extLst>
+              <a:ext uri="{FF2B5EF4-FFF2-40B4-BE49-F238E27FC236}">
+                <a16:creationId xmlns:a16="http://schemas.microsoft.com/office/drawing/2014/main" id="{92FDA903-B71B-4AAA-BC44-22810DD37461}"/>
+              </a:ext>
+            </a:extLst>
+          </p:cNvPr>
+          <p:cNvCxnSpPr>
+            <a:stCxn id="85" idx="1"/>
+            <a:endCxn id="34" idx="1"/>
+          </p:cNvCxnSpPr>
+          <p:nvPr/>
+        </p:nvCxnSpPr>
+        <p:spPr>
+          <a:xfrm rot="10800000" flipH="1">
+            <a:off x="2313547" y="3722011"/>
+            <a:ext cx="1093045" cy="1572316"/>
+          </a:xfrm>
+          <a:prstGeom prst="bentConnector3">
+            <a:avLst>
+              <a:gd name="adj1" fmla="val -20914"/>
+            </a:avLst>
+          </a:prstGeom>
+          <a:ln>
+            <a:tailEnd type="triangle"/>
+          </a:ln>
+        </p:spPr>
+        <p:style>
+          <a:lnRef idx="1">
+            <a:schemeClr val="accent1"/>
+          </a:lnRef>
+          <a:fillRef idx="0">
+            <a:schemeClr val="accent1"/>
+          </a:fillRef>
+          <a:effectRef idx="0">
+            <a:schemeClr val="accent1"/>
+          </a:effectRef>
+          <a:fontRef idx="minor">
+            <a:schemeClr val="tx1"/>
+          </a:fontRef>
+        </p:style>
+      </p:cxnSp>
+      <p:cxnSp>
+        <p:nvCxnSpPr>
+          <p:cNvPr id="91" name="Łącznik: łamany 90">
+            <a:extLst>
+              <a:ext uri="{FF2B5EF4-FFF2-40B4-BE49-F238E27FC236}">
+                <a16:creationId xmlns:a16="http://schemas.microsoft.com/office/drawing/2014/main" id="{1B240483-23B2-4007-B776-4C8C3149BF48}"/>
+              </a:ext>
+            </a:extLst>
+          </p:cNvPr>
+          <p:cNvCxnSpPr>
+            <a:stCxn id="86" idx="0"/>
+            <a:endCxn id="26" idx="2"/>
+          </p:cNvCxnSpPr>
+          <p:nvPr/>
+        </p:nvCxnSpPr>
+        <p:spPr>
+          <a:xfrm rot="5400000" flipH="1" flipV="1">
+            <a:off x="4284423" y="3096483"/>
+            <a:ext cx="455262" cy="3029901"/>
+          </a:xfrm>
+          <a:prstGeom prst="bentConnector3">
+            <a:avLst/>
+          </a:prstGeom>
+          <a:ln>
+            <a:tailEnd type="triangle"/>
+          </a:ln>
+        </p:spPr>
+        <p:style>
+          <a:lnRef idx="1">
+            <a:schemeClr val="accent1"/>
+          </a:lnRef>
+          <a:fillRef idx="0">
+            <a:schemeClr val="accent1"/>
+          </a:fillRef>
+          <a:effectRef idx="0">
+            <a:schemeClr val="accent1"/>
+          </a:effectRef>
+          <a:fontRef idx="minor">
+            <a:schemeClr val="tx1"/>
+          </a:fontRef>
+        </p:style>
+      </p:cxnSp>
+      <p:cxnSp>
+        <p:nvCxnSpPr>
+          <p:cNvPr id="93" name="Łącznik: łamany 92">
+            <a:extLst>
+              <a:ext uri="{FF2B5EF4-FFF2-40B4-BE49-F238E27FC236}">
+                <a16:creationId xmlns:a16="http://schemas.microsoft.com/office/drawing/2014/main" id="{4343BC93-B51B-4DFA-8C40-5B0E211449A6}"/>
+              </a:ext>
+            </a:extLst>
+          </p:cNvPr>
+          <p:cNvCxnSpPr>
+            <a:stCxn id="53" idx="0"/>
+            <a:endCxn id="26" idx="2"/>
+          </p:cNvCxnSpPr>
+          <p:nvPr/>
+        </p:nvCxnSpPr>
+        <p:spPr>
+          <a:xfrm rot="5400000" flipH="1" flipV="1">
+            <a:off x="5123005" y="3935064"/>
+            <a:ext cx="455262" cy="1352738"/>
+          </a:xfrm>
+          <a:prstGeom prst="bentConnector3">
+            <a:avLst/>
+          </a:prstGeom>
+          <a:ln>
+            <a:tailEnd type="triangle"/>
+          </a:ln>
+        </p:spPr>
+        <p:style>
+          <a:lnRef idx="1">
+            <a:schemeClr val="accent1"/>
+          </a:lnRef>
+          <a:fillRef idx="0">
+            <a:schemeClr val="accent1"/>
+          </a:fillRef>
+          <a:effectRef idx="0">
+            <a:schemeClr val="accent1"/>
+          </a:effectRef>
+          <a:fontRef idx="minor">
+            <a:schemeClr val="tx1"/>
+          </a:fontRef>
+        </p:style>
+      </p:cxnSp>
+      <p:cxnSp>
+        <p:nvCxnSpPr>
+          <p:cNvPr id="95" name="Łącznik: łamany 94">
+            <a:extLst>
+              <a:ext uri="{FF2B5EF4-FFF2-40B4-BE49-F238E27FC236}">
+                <a16:creationId xmlns:a16="http://schemas.microsoft.com/office/drawing/2014/main" id="{957027DA-5C2A-4EEB-A9DE-72FC50B42FD0}"/>
+              </a:ext>
+            </a:extLst>
+          </p:cNvPr>
+          <p:cNvCxnSpPr>
+            <a:cxnSpLocks/>
+            <a:stCxn id="81" idx="3"/>
+            <a:endCxn id="113" idx="1"/>
+          </p:cNvCxnSpPr>
+          <p:nvPr/>
+        </p:nvCxnSpPr>
+        <p:spPr>
+          <a:xfrm flipV="1">
+            <a:off x="8615969" y="5286997"/>
+            <a:ext cx="245585" cy="1816"/>
+          </a:xfrm>
+          <a:prstGeom prst="bentConnector3">
+            <a:avLst>
+              <a:gd name="adj1" fmla="val 50000"/>
+            </a:avLst>
+          </a:prstGeom>
+          <a:ln>
+            <a:tailEnd type="triangle"/>
+          </a:ln>
+        </p:spPr>
+        <p:style>
+          <a:lnRef idx="1">
+            <a:schemeClr val="accent1"/>
+          </a:lnRef>
+          <a:fillRef idx="0">
+            <a:schemeClr val="accent1"/>
+          </a:fillRef>
+          <a:effectRef idx="0">
+            <a:schemeClr val="accent1"/>
+          </a:effectRef>
+          <a:fontRef idx="minor">
+            <a:schemeClr val="tx1"/>
+          </a:fontRef>
+        </p:style>
+      </p:cxnSp>
+      <p:grpSp>
+        <p:nvGrpSpPr>
+          <p:cNvPr id="116" name="Grupa 115">
+            <a:extLst>
+              <a:ext uri="{FF2B5EF4-FFF2-40B4-BE49-F238E27FC236}">
+                <a16:creationId xmlns:a16="http://schemas.microsoft.com/office/drawing/2014/main" id="{099FD916-E3A4-4872-88FC-5D7CCA681F53}"/>
+              </a:ext>
+            </a:extLst>
+          </p:cNvPr>
+          <p:cNvGrpSpPr/>
+          <p:nvPr/>
+        </p:nvGrpSpPr>
+        <p:grpSpPr>
+          <a:xfrm>
+            <a:off x="8861552" y="4831734"/>
+            <a:ext cx="1357032" cy="910526"/>
+            <a:chOff x="9336398" y="4481713"/>
+            <a:chExt cx="1357032" cy="910526"/>
+          </a:xfrm>
+        </p:grpSpPr>
+        <p:sp>
+          <p:nvSpPr>
+            <p:cNvPr id="113" name="Prostokąt: zaokrąglone rogi 112">
+              <a:extLst>
+                <a:ext uri="{FF2B5EF4-FFF2-40B4-BE49-F238E27FC236}">
+                  <a16:creationId xmlns:a16="http://schemas.microsoft.com/office/drawing/2014/main" id="{2274DE16-01CF-44C8-8BBD-0E030EA40651}"/>
+                </a:ext>
+              </a:extLst>
+            </p:cNvPr>
+            <p:cNvSpPr/>
+            <p:nvPr/>
+          </p:nvSpPr>
+          <p:spPr>
+            <a:xfrm>
+              <a:off x="9336400" y="4481713"/>
+              <a:ext cx="1357030" cy="910526"/>
+            </a:xfrm>
+            <a:prstGeom prst="roundRect">
+              <a:avLst/>
+            </a:prstGeom>
+            <a:solidFill>
+              <a:schemeClr val="accent5">
+                <a:alpha val="21000"/>
+              </a:schemeClr>
+            </a:solidFill>
+            <a:ln>
+              <a:noFill/>
+            </a:ln>
+          </p:spPr>
+          <p:style>
+            <a:lnRef idx="0">
+              <a:scrgbClr r="0" g="0" b="0"/>
+            </a:lnRef>
+            <a:fillRef idx="0">
+              <a:scrgbClr r="0" g="0" b="0"/>
+            </a:fillRef>
+            <a:effectRef idx="0">
+              <a:scrgbClr r="0" g="0" b="0"/>
+            </a:effectRef>
+            <a:fontRef idx="minor">
+              <a:schemeClr val="lt1"/>
+            </a:fontRef>
+          </p:style>
+          <p:txBody>
+            <a:bodyPr rtlCol="0" anchor="ctr"/>
+            <a:lstStyle/>
+            <a:p>
+              <a:pPr algn="ctr"/>
+              <a:endParaRPr lang="pl-PL" dirty="0">
+                <a:latin typeface="Tahoma" panose="020B0604030504040204" pitchFamily="34" charset="0"/>
+                <a:ea typeface="Tahoma" panose="020B0604030504040204" pitchFamily="34" charset="0"/>
+                <a:cs typeface="Tahoma" panose="020B0604030504040204" pitchFamily="34" charset="0"/>
+              </a:endParaRPr>
+            </a:p>
+          </p:txBody>
+        </p:sp>
+        <p:pic>
+          <p:nvPicPr>
+            <p:cNvPr id="114" name="Grafika 113" descr="Serwer">
+              <a:extLst>
+                <a:ext uri="{FF2B5EF4-FFF2-40B4-BE49-F238E27FC236}">
+                  <a16:creationId xmlns:a16="http://schemas.microsoft.com/office/drawing/2014/main" id="{1F0EBC34-B06C-41FA-BFA0-00A258CF9F33}"/>
+                </a:ext>
+              </a:extLst>
+            </p:cNvPr>
+            <p:cNvPicPr>
+              <a:picLocks noChangeAspect="1"/>
+            </p:cNvPicPr>
+            <p:nvPr/>
+          </p:nvPicPr>
+          <p:blipFill>
+            <a:blip r:embed="rId16">
+              <a:extLst>
+                <a:ext uri="{28A0092B-C50C-407E-A947-70E740481C1C}">
+                  <a14:useLocalDpi xmlns:a14="http://schemas.microsoft.com/office/drawing/2010/main" val="0"/>
+                </a:ext>
+                <a:ext uri="{96DAC541-7B7A-43D3-8B79-37D633B846F1}">
+                  <asvg:svgBlip xmlns:asvg="http://schemas.microsoft.com/office/drawing/2016/SVG/main" r:embed="rId17"/>
+                </a:ext>
+              </a:extLst>
+            </a:blip>
+            <a:stretch>
+              <a:fillRect/>
+            </a:stretch>
+          </p:blipFill>
+          <p:spPr>
+            <a:xfrm>
+              <a:off x="9705940" y="4481713"/>
+              <a:ext cx="628031" cy="630503"/>
+            </a:xfrm>
+            <a:prstGeom prst="rect">
+              <a:avLst/>
+            </a:prstGeom>
+          </p:spPr>
+        </p:pic>
+        <p:sp>
+          <p:nvSpPr>
+            <p:cNvPr id="115" name="pole tekstowe 114">
+              <a:extLst>
+                <a:ext uri="{FF2B5EF4-FFF2-40B4-BE49-F238E27FC236}">
+                  <a16:creationId xmlns:a16="http://schemas.microsoft.com/office/drawing/2014/main" id="{710B3E36-FE64-46AB-80D3-D6ABB7F1966A}"/>
+                </a:ext>
+              </a:extLst>
+            </p:cNvPr>
+            <p:cNvSpPr txBox="1"/>
+            <p:nvPr/>
+          </p:nvSpPr>
+          <p:spPr>
+            <a:xfrm flipH="1">
+              <a:off x="9336398" y="5112216"/>
+              <a:ext cx="1357030" cy="261610"/>
+            </a:xfrm>
+            <a:prstGeom prst="rect">
+              <a:avLst/>
+            </a:prstGeom>
+            <a:noFill/>
+          </p:spPr>
+          <p:txBody>
+            <a:bodyPr wrap="square" rtlCol="0">
+              <a:spAutoFit/>
+            </a:bodyPr>
+            <a:lstStyle/>
+            <a:p>
+              <a:pPr algn="ctr"/>
+              <a:r>
+                <a:rPr lang="pl-PL" sz="1100" b="1" dirty="0">
+                  <a:latin typeface="Tahoma" panose="020B0604030504040204" pitchFamily="34" charset="0"/>
+                  <a:ea typeface="Tahoma" panose="020B0604030504040204" pitchFamily="34" charset="0"/>
+                  <a:cs typeface="Tahoma" panose="020B0604030504040204" pitchFamily="34" charset="0"/>
+                </a:rPr>
+                <a:t>DCPAM RDP</a:t>
+              </a:r>
+              <a:endParaRPr lang="pl-PL" sz="900" b="1" dirty="0">
+                <a:latin typeface="Tahoma" panose="020B0604030504040204" pitchFamily="34" charset="0"/>
+                <a:ea typeface="Tahoma" panose="020B0604030504040204" pitchFamily="34" charset="0"/>
+                <a:cs typeface="Tahoma" panose="020B0604030504040204" pitchFamily="34" charset="0"/>
+              </a:endParaRPr>
+            </a:p>
+          </p:txBody>
+        </p:sp>
+      </p:grpSp>
+      <p:cxnSp>
+        <p:nvCxnSpPr>
+          <p:cNvPr id="120" name="Łącznik: łamany 119">
+            <a:extLst>
+              <a:ext uri="{FF2B5EF4-FFF2-40B4-BE49-F238E27FC236}">
+                <a16:creationId xmlns:a16="http://schemas.microsoft.com/office/drawing/2014/main" id="{F8B6B1EF-AE0A-4E8E-8E9D-326BBD87A04F}"/>
+              </a:ext>
+            </a:extLst>
+          </p:cNvPr>
+          <p:cNvCxnSpPr>
+            <a:stCxn id="113" idx="3"/>
+            <a:endCxn id="38" idx="3"/>
+          </p:cNvCxnSpPr>
+          <p:nvPr/>
+        </p:nvCxnSpPr>
+        <p:spPr>
+          <a:xfrm flipH="1" flipV="1">
+            <a:off x="8647413" y="3722011"/>
+            <a:ext cx="1571171" cy="1564986"/>
+          </a:xfrm>
+          <a:prstGeom prst="bentConnector3">
+            <a:avLst>
+              <a:gd name="adj1" fmla="val -14550"/>
+            </a:avLst>
+          </a:prstGeom>
+          <a:ln>
+            <a:tailEnd type="triangle"/>
+          </a:ln>
+        </p:spPr>
+        <p:style>
+          <a:lnRef idx="1">
+            <a:schemeClr val="accent1"/>
+          </a:lnRef>
+          <a:fillRef idx="0">
+            <a:schemeClr val="accent1"/>
+          </a:fillRef>
+          <a:effectRef idx="0">
+            <a:schemeClr val="accent1"/>
+          </a:effectRef>
+          <a:fontRef idx="minor">
+            <a:schemeClr val="tx1"/>
+          </a:fontRef>
+        </p:style>
+      </p:cxnSp>
+      <p:grpSp>
+        <p:nvGrpSpPr>
+          <p:cNvPr id="121" name="Grupa 120">
+            <a:extLst>
+              <a:ext uri="{FF2B5EF4-FFF2-40B4-BE49-F238E27FC236}">
+                <a16:creationId xmlns:a16="http://schemas.microsoft.com/office/drawing/2014/main" id="{571C6067-239E-4CDF-86FE-5D51C1B7AE35}"/>
+              </a:ext>
+            </a:extLst>
+          </p:cNvPr>
+          <p:cNvGrpSpPr/>
+          <p:nvPr/>
+        </p:nvGrpSpPr>
+        <p:grpSpPr>
+          <a:xfrm>
+            <a:off x="5608350" y="4836307"/>
+            <a:ext cx="1357032" cy="910526"/>
+            <a:chOff x="9336398" y="4481713"/>
+            <a:chExt cx="1357032" cy="910526"/>
+          </a:xfrm>
+        </p:grpSpPr>
+        <p:sp>
+          <p:nvSpPr>
+            <p:cNvPr id="122" name="Prostokąt: zaokrąglone rogi 121">
+              <a:extLst>
+                <a:ext uri="{FF2B5EF4-FFF2-40B4-BE49-F238E27FC236}">
+                  <a16:creationId xmlns:a16="http://schemas.microsoft.com/office/drawing/2014/main" id="{06DBF46F-CB5B-4484-ADA5-ED9D0A432F35}"/>
+                </a:ext>
+              </a:extLst>
+            </p:cNvPr>
+            <p:cNvSpPr/>
+            <p:nvPr/>
+          </p:nvSpPr>
+          <p:spPr>
+            <a:xfrm>
+              <a:off x="9336400" y="4481713"/>
+              <a:ext cx="1357030" cy="910526"/>
+            </a:xfrm>
+            <a:prstGeom prst="roundRect">
+              <a:avLst/>
+            </a:prstGeom>
+            <a:solidFill>
+              <a:schemeClr val="accent5">
+                <a:alpha val="21000"/>
+              </a:schemeClr>
+            </a:solidFill>
+            <a:ln>
+              <a:noFill/>
+            </a:ln>
+          </p:spPr>
+          <p:style>
+            <a:lnRef idx="0">
+              <a:scrgbClr r="0" g="0" b="0"/>
+            </a:lnRef>
+            <a:fillRef idx="0">
+              <a:scrgbClr r="0" g="0" b="0"/>
+            </a:fillRef>
+            <a:effectRef idx="0">
+              <a:scrgbClr r="0" g="0" b="0"/>
+            </a:effectRef>
+            <a:fontRef idx="minor">
+              <a:schemeClr val="lt1"/>
+            </a:fontRef>
+          </p:style>
+          <p:txBody>
+            <a:bodyPr rtlCol="0" anchor="ctr"/>
+            <a:lstStyle/>
+            <a:p>
+              <a:pPr algn="ctr"/>
+              <a:endParaRPr lang="pl-PL" dirty="0">
+                <a:latin typeface="Tahoma" panose="020B0604030504040204" pitchFamily="34" charset="0"/>
+                <a:ea typeface="Tahoma" panose="020B0604030504040204" pitchFamily="34" charset="0"/>
+                <a:cs typeface="Tahoma" panose="020B0604030504040204" pitchFamily="34" charset="0"/>
+              </a:endParaRPr>
+            </a:p>
+          </p:txBody>
+        </p:sp>
+        <p:pic>
+          <p:nvPicPr>
+            <p:cNvPr id="123" name="Grafika 122" descr="Serwer">
+              <a:extLst>
+                <a:ext uri="{FF2B5EF4-FFF2-40B4-BE49-F238E27FC236}">
+                  <a16:creationId xmlns:a16="http://schemas.microsoft.com/office/drawing/2014/main" id="{1B0A0C59-C154-4D7B-ACF4-1E3386D1AF1C}"/>
+                </a:ext>
+              </a:extLst>
+            </p:cNvPr>
+            <p:cNvPicPr>
+              <a:picLocks noChangeAspect="1"/>
+            </p:cNvPicPr>
+            <p:nvPr/>
+          </p:nvPicPr>
+          <p:blipFill>
+            <a:blip r:embed="rId16">
+              <a:extLst>
+                <a:ext uri="{28A0092B-C50C-407E-A947-70E740481C1C}">
+                  <a14:useLocalDpi xmlns:a14="http://schemas.microsoft.com/office/drawing/2010/main" val="0"/>
+                </a:ext>
+                <a:ext uri="{96DAC541-7B7A-43D3-8B79-37D633B846F1}">
+                  <asvg:svgBlip xmlns:asvg="http://schemas.microsoft.com/office/drawing/2016/SVG/main" r:embed="rId17"/>
+                </a:ext>
+              </a:extLst>
+            </a:blip>
+            <a:stretch>
+              <a:fillRect/>
+            </a:stretch>
+          </p:blipFill>
+          <p:spPr>
+            <a:xfrm>
+              <a:off x="9705940" y="4481713"/>
+              <a:ext cx="628031" cy="630503"/>
+            </a:xfrm>
+            <a:prstGeom prst="rect">
+              <a:avLst/>
+            </a:prstGeom>
+          </p:spPr>
+        </p:pic>
+        <p:sp>
+          <p:nvSpPr>
+            <p:cNvPr id="124" name="pole tekstowe 123">
+              <a:extLst>
+                <a:ext uri="{FF2B5EF4-FFF2-40B4-BE49-F238E27FC236}">
+                  <a16:creationId xmlns:a16="http://schemas.microsoft.com/office/drawing/2014/main" id="{26D969E7-4D10-47FA-B60C-6C0B529F38CE}"/>
+                </a:ext>
+              </a:extLst>
+            </p:cNvPr>
+            <p:cNvSpPr txBox="1"/>
+            <p:nvPr/>
+          </p:nvSpPr>
+          <p:spPr>
+            <a:xfrm flipH="1">
+              <a:off x="9336398" y="5112216"/>
+              <a:ext cx="1357030" cy="261610"/>
+            </a:xfrm>
+            <a:prstGeom prst="rect">
+              <a:avLst/>
+            </a:prstGeom>
+            <a:noFill/>
+          </p:spPr>
+          <p:txBody>
+            <a:bodyPr wrap="square" rtlCol="0">
+              <a:spAutoFit/>
+            </a:bodyPr>
+            <a:lstStyle/>
+            <a:p>
+              <a:pPr algn="ctr"/>
+              <a:r>
+                <a:rPr lang="pl-PL" sz="1100" b="1" dirty="0">
+                  <a:latin typeface="Tahoma" panose="020B0604030504040204" pitchFamily="34" charset="0"/>
+                  <a:ea typeface="Tahoma" panose="020B0604030504040204" pitchFamily="34" charset="0"/>
+                  <a:cs typeface="Tahoma" panose="020B0604030504040204" pitchFamily="34" charset="0"/>
+                </a:rPr>
+                <a:t>DCPAM RDP</a:t>
+              </a:r>
+              <a:endParaRPr lang="pl-PL" sz="900" b="1" dirty="0">
+                <a:latin typeface="Tahoma" panose="020B0604030504040204" pitchFamily="34" charset="0"/>
+                <a:ea typeface="Tahoma" panose="020B0604030504040204" pitchFamily="34" charset="0"/>
+                <a:cs typeface="Tahoma" panose="020B0604030504040204" pitchFamily="34" charset="0"/>
+              </a:endParaRPr>
+            </a:p>
+          </p:txBody>
+        </p:sp>
+      </p:grpSp>
+      <p:cxnSp>
+        <p:nvCxnSpPr>
+          <p:cNvPr id="127" name="Łącznik: łamany 126">
+            <a:extLst>
+              <a:ext uri="{FF2B5EF4-FFF2-40B4-BE49-F238E27FC236}">
+                <a16:creationId xmlns:a16="http://schemas.microsoft.com/office/drawing/2014/main" id="{BB78BC3E-0CC9-4D53-9BC9-1A37A0F5D383}"/>
+              </a:ext>
+            </a:extLst>
+          </p:cNvPr>
+          <p:cNvCxnSpPr>
+            <a:stCxn id="81" idx="1"/>
+            <a:endCxn id="122" idx="3"/>
+          </p:cNvCxnSpPr>
+          <p:nvPr/>
+        </p:nvCxnSpPr>
+        <p:spPr>
+          <a:xfrm rot="10800000" flipV="1">
+            <a:off x="6965383" y="5288812"/>
+            <a:ext cx="293557" cy="2757"/>
+          </a:xfrm>
+          <a:prstGeom prst="bentConnector3">
+            <a:avLst/>
+          </a:prstGeom>
+          <a:ln>
+            <a:tailEnd type="triangle"/>
+          </a:ln>
+        </p:spPr>
+        <p:style>
+          <a:lnRef idx="1">
+            <a:schemeClr val="accent1"/>
+          </a:lnRef>
+          <a:fillRef idx="0">
+            <a:schemeClr val="accent1"/>
+          </a:fillRef>
+          <a:effectRef idx="0">
+            <a:schemeClr val="accent1"/>
+          </a:effectRef>
+          <a:fontRef idx="minor">
+            <a:schemeClr val="tx1"/>
+          </a:fontRef>
+        </p:style>
+      </p:cxnSp>
+      <p:cxnSp>
+        <p:nvCxnSpPr>
+          <p:cNvPr id="129" name="Łącznik: łamany 128">
+            <a:extLst>
+              <a:ext uri="{FF2B5EF4-FFF2-40B4-BE49-F238E27FC236}">
+                <a16:creationId xmlns:a16="http://schemas.microsoft.com/office/drawing/2014/main" id="{57159A0A-06A8-44FB-8E83-D046CD8C0089}"/>
+              </a:ext>
+            </a:extLst>
+          </p:cNvPr>
+          <p:cNvCxnSpPr>
+            <a:stCxn id="123" idx="0"/>
+            <a:endCxn id="26" idx="2"/>
+          </p:cNvCxnSpPr>
+          <p:nvPr/>
+        </p:nvCxnSpPr>
+        <p:spPr>
+          <a:xfrm rot="16200000" flipV="1">
+            <a:off x="5933205" y="4477603"/>
+            <a:ext cx="452505" cy="264903"/>
+          </a:xfrm>
+          <a:prstGeom prst="bentConnector3">
+            <a:avLst/>
+          </a:prstGeom>
+          <a:ln>
+            <a:tailEnd type="triangle"/>
+          </a:ln>
+        </p:spPr>
+        <p:style>
+          <a:lnRef idx="1">
+            <a:schemeClr val="accent1"/>
+          </a:lnRef>
+          <a:fillRef idx="0">
+            <a:schemeClr val="accent1"/>
+          </a:fillRef>
+          <a:effectRef idx="0">
+            <a:schemeClr val="accent1"/>
+          </a:effectRef>
+          <a:fontRef idx="minor">
+            <a:schemeClr val="tx1"/>
+          </a:fontRef>
+        </p:style>
+      </p:cxnSp>
+      <p:sp>
+        <p:nvSpPr>
+          <p:cNvPr id="130" name="Prostokąt: zaokrąglone rogi 129">
+            <a:extLst>
+              <a:ext uri="{FF2B5EF4-FFF2-40B4-BE49-F238E27FC236}">
+                <a16:creationId xmlns:a16="http://schemas.microsoft.com/office/drawing/2014/main" id="{37292A7A-9FB4-430D-8587-ECD6C3D764E3}"/>
+              </a:ext>
+            </a:extLst>
+          </p:cNvPr>
+          <p:cNvSpPr/>
+          <p:nvPr/>
+        </p:nvSpPr>
+        <p:spPr>
+          <a:xfrm>
+            <a:off x="344129" y="6057104"/>
+            <a:ext cx="11517754" cy="632986"/>
+          </a:xfrm>
+          <a:prstGeom prst="roundRect">
+            <a:avLst/>
+          </a:prstGeom>
+          <a:solidFill>
+            <a:schemeClr val="accent1"/>
+          </a:solidFill>
+          <a:ln>
+            <a:noFill/>
+          </a:ln>
+        </p:spPr>
+        <p:style>
+          <a:lnRef idx="0">
+            <a:scrgbClr r="0" g="0" b="0"/>
+          </a:lnRef>
+          <a:fillRef idx="0">
+            <a:scrgbClr r="0" g="0" b="0"/>
+          </a:fillRef>
+          <a:effectRef idx="0">
+            <a:scrgbClr r="0" g="0" b="0"/>
+          </a:effectRef>
+          <a:fontRef idx="minor">
+            <a:schemeClr val="lt1"/>
+          </a:fontRef>
+        </p:style>
+        <p:txBody>
+          <a:bodyPr rtlCol="0" anchor="ctr"/>
+          <a:lstStyle/>
+          <a:p>
+            <a:pPr algn="ctr"/>
+            <a:r>
+              <a:rPr lang="pl-PL" dirty="0"/>
+              <a:t>COMPANY DATA SOURCES</a:t>
+            </a:r>
+          </a:p>
+        </p:txBody>
+      </p:sp>
+      <p:cxnSp>
+        <p:nvCxnSpPr>
+          <p:cNvPr id="132" name="Łącznik: łamany 131">
+            <a:extLst>
+              <a:ext uri="{FF2B5EF4-FFF2-40B4-BE49-F238E27FC236}">
+                <a16:creationId xmlns:a16="http://schemas.microsoft.com/office/drawing/2014/main" id="{533FEB12-C7AA-4477-8F3B-FE3A71E68C9B}"/>
+              </a:ext>
+            </a:extLst>
+          </p:cNvPr>
+          <p:cNvCxnSpPr>
+            <a:stCxn id="130" idx="0"/>
+            <a:endCxn id="87" idx="2"/>
+          </p:cNvCxnSpPr>
+          <p:nvPr/>
+        </p:nvCxnSpPr>
+        <p:spPr>
+          <a:xfrm rot="16200000" flipV="1">
+            <a:off x="4384571" y="4338668"/>
+            <a:ext cx="325927" cy="3110945"/>
+          </a:xfrm>
+          <a:prstGeom prst="bentConnector3">
+            <a:avLst/>
+          </a:prstGeom>
+          <a:ln>
+            <a:tailEnd type="triangle"/>
+          </a:ln>
+        </p:spPr>
+        <p:style>
+          <a:lnRef idx="1">
+            <a:schemeClr val="accent1"/>
+          </a:lnRef>
+          <a:fillRef idx="0">
+            <a:schemeClr val="accent1"/>
+          </a:fillRef>
+          <a:effectRef idx="0">
+            <a:schemeClr val="accent1"/>
+          </a:effectRef>
+          <a:fontRef idx="minor">
+            <a:schemeClr val="tx1"/>
+          </a:fontRef>
+        </p:style>
+      </p:cxnSp>
+      <p:cxnSp>
+        <p:nvCxnSpPr>
+          <p:cNvPr id="134" name="Łącznik: łamany 133">
+            <a:extLst>
+              <a:ext uri="{FF2B5EF4-FFF2-40B4-BE49-F238E27FC236}">
+                <a16:creationId xmlns:a16="http://schemas.microsoft.com/office/drawing/2014/main" id="{5308E16D-E83C-4E52-8B49-73CCA06E2544}"/>
+              </a:ext>
+            </a:extLst>
+          </p:cNvPr>
+          <p:cNvCxnSpPr>
+            <a:stCxn id="130" idx="0"/>
+            <a:endCxn id="54" idx="2"/>
+          </p:cNvCxnSpPr>
+          <p:nvPr/>
+        </p:nvCxnSpPr>
+        <p:spPr>
+          <a:xfrm rot="16200000" flipV="1">
+            <a:off x="5223152" y="5177250"/>
+            <a:ext cx="325927" cy="1433782"/>
+          </a:xfrm>
+          <a:prstGeom prst="bentConnector3">
+            <a:avLst/>
+          </a:prstGeom>
+          <a:ln>
+            <a:tailEnd type="triangle"/>
+          </a:ln>
+        </p:spPr>
+        <p:style>
+          <a:lnRef idx="1">
+            <a:schemeClr val="accent1"/>
+          </a:lnRef>
+          <a:fillRef idx="0">
+            <a:schemeClr val="accent1"/>
+          </a:fillRef>
+          <a:effectRef idx="0">
+            <a:schemeClr val="accent1"/>
+          </a:effectRef>
+          <a:fontRef idx="minor">
+            <a:schemeClr val="tx1"/>
+          </a:fontRef>
+        </p:style>
+      </p:cxnSp>
+      <p:cxnSp>
+        <p:nvCxnSpPr>
+          <p:cNvPr id="136" name="Łącznik: łamany 135">
+            <a:extLst>
+              <a:ext uri="{FF2B5EF4-FFF2-40B4-BE49-F238E27FC236}">
+                <a16:creationId xmlns:a16="http://schemas.microsoft.com/office/drawing/2014/main" id="{C44619A8-09D3-4139-BFB1-F295B303B223}"/>
+              </a:ext>
+            </a:extLst>
+          </p:cNvPr>
+          <p:cNvCxnSpPr>
+            <a:stCxn id="130" idx="0"/>
+            <a:endCxn id="83" idx="2"/>
+          </p:cNvCxnSpPr>
+          <p:nvPr/>
+        </p:nvCxnSpPr>
+        <p:spPr>
+          <a:xfrm rot="5400000" flipH="1" flipV="1">
+            <a:off x="6854509" y="4974161"/>
+            <a:ext cx="331441" cy="1834446"/>
+          </a:xfrm>
+          <a:prstGeom prst="bentConnector3">
+            <a:avLst/>
+          </a:prstGeom>
+          <a:ln>
+            <a:tailEnd type="triangle"/>
+          </a:ln>
+        </p:spPr>
+        <p:style>
+          <a:lnRef idx="1">
+            <a:schemeClr val="accent1"/>
+          </a:lnRef>
+          <a:fillRef idx="0">
+            <a:schemeClr val="accent1"/>
+          </a:fillRef>
+          <a:effectRef idx="0">
+            <a:schemeClr val="accent1"/>
+          </a:effectRef>
+          <a:fontRef idx="minor">
+            <a:schemeClr val="tx1"/>
+          </a:fontRef>
+        </p:style>
+      </p:cxnSp>
+      <p:sp>
+        <p:nvSpPr>
+          <p:cNvPr id="139" name="Strzałka: w górę 138">
+            <a:extLst>
+              <a:ext uri="{FF2B5EF4-FFF2-40B4-BE49-F238E27FC236}">
+                <a16:creationId xmlns:a16="http://schemas.microsoft.com/office/drawing/2014/main" id="{F4469F9D-D200-4388-82A5-89256F47B275}"/>
+              </a:ext>
+            </a:extLst>
+          </p:cNvPr>
+          <p:cNvSpPr/>
+          <p:nvPr/>
+        </p:nvSpPr>
+        <p:spPr>
+          <a:xfrm>
+            <a:off x="5929261" y="955912"/>
+            <a:ext cx="300845" cy="419334"/>
+          </a:xfrm>
+          <a:prstGeom prst="upArrow">
+            <a:avLst/>
+          </a:prstGeom>
+          <a:solidFill>
+            <a:schemeClr val="accent4">
+              <a:alpha val="50000"/>
+            </a:schemeClr>
+          </a:solidFill>
+          <a:ln>
+            <a:noFill/>
+          </a:ln>
+        </p:spPr>
+        <p:style>
+          <a:lnRef idx="0">
+            <a:scrgbClr r="0" g="0" b="0"/>
+          </a:lnRef>
+          <a:fillRef idx="0">
+            <a:scrgbClr r="0" g="0" b="0"/>
+          </a:fillRef>
+          <a:effectRef idx="0">
+            <a:scrgbClr r="0" g="0" b="0"/>
+          </a:effectRef>
+          <a:fontRef idx="minor">
+            <a:schemeClr val="lt1"/>
+          </a:fontRef>
+        </p:style>
+        <p:txBody>
+          <a:bodyPr rtlCol="0" anchor="ctr"/>
+          <a:lstStyle/>
+          <a:p>
+            <a:pPr algn="ctr"/>
+            <a:endParaRPr lang="pl-PL"/>
+          </a:p>
+        </p:txBody>
+      </p:sp>
+      <p:sp>
+        <p:nvSpPr>
+          <p:cNvPr id="140" name="pole tekstowe 139">
+            <a:extLst>
+              <a:ext uri="{FF2B5EF4-FFF2-40B4-BE49-F238E27FC236}">
+                <a16:creationId xmlns:a16="http://schemas.microsoft.com/office/drawing/2014/main" id="{53EB2069-6C0E-4810-A457-61C9781E0C98}"/>
+              </a:ext>
+            </a:extLst>
+          </p:cNvPr>
+          <p:cNvSpPr txBox="1"/>
+          <p:nvPr/>
+        </p:nvSpPr>
+        <p:spPr>
+          <a:xfrm>
+            <a:off x="577867" y="466969"/>
+            <a:ext cx="2672097" cy="369332"/>
+          </a:xfrm>
+          <a:prstGeom prst="rect">
+            <a:avLst/>
+          </a:prstGeom>
+          <a:noFill/>
+        </p:spPr>
+        <p:txBody>
+          <a:bodyPr wrap="square" rtlCol="0">
+            <a:spAutoFit/>
+          </a:bodyPr>
+          <a:lstStyle/>
+          <a:p>
+            <a:r>
+              <a:rPr lang="pl-PL" dirty="0">
+                <a:solidFill>
+                  <a:schemeClr val="accent1">
+                    <a:lumMod val="60000"/>
+                    <a:lumOff val="40000"/>
+                  </a:schemeClr>
+                </a:solidFill>
+              </a:rPr>
+              <a:t>BUSINESS INTELLIGENCE</a:t>
+            </a:r>
+          </a:p>
+        </p:txBody>
+      </p:sp>
+    </p:spTree>
+    <p:extLst>
+      <p:ext uri="{BB962C8B-B14F-4D97-AF65-F5344CB8AC3E}">
+        <p14:creationId xmlns:p14="http://schemas.microsoft.com/office/powerpoint/2010/main" val="2974656166"/>
       </p:ext>
     </p:extLst>
   </p:cSld>

</xml_diff>

<commit_message>
DCPAM DWH and DM overview pictures added/updated.
</commit_message>
<xml_diff>
--- a/docs/dwh.pptx
+++ b/docs/dwh.pptx
@@ -8,6 +8,7 @@
     <p:sldId id="256" r:id="rId2"/>
     <p:sldId id="257" r:id="rId3"/>
     <p:sldId id="258" r:id="rId4"/>
+    <p:sldId id="259" r:id="rId5"/>
   </p:sldIdLst>
   <p:sldSz cx="12192000" cy="6858000"/>
   <p:notesSz cx="6858000" cy="9144000"/>
@@ -6638,7 +6639,7 @@
           </a:prstGeom>
           <a:solidFill>
             <a:schemeClr val="accent1">
-              <a:alpha val="12000"/>
+              <a:alpha val="22000"/>
             </a:schemeClr>
           </a:solidFill>
           <a:ln>
@@ -6824,225 +6825,146 @@
           </a:prstGeom>
         </p:spPr>
       </p:pic>
-      <p:grpSp>
-        <p:nvGrpSpPr>
-          <p:cNvPr id="24" name="Grupa 23">
-            <a:extLst>
-              <a:ext uri="{FF2B5EF4-FFF2-40B4-BE49-F238E27FC236}">
-                <a16:creationId xmlns:a16="http://schemas.microsoft.com/office/drawing/2014/main" id="{F23F978D-3C35-4547-8F2A-4A7238B8730D}"/>
-              </a:ext>
-            </a:extLst>
-          </p:cNvPr>
-          <p:cNvGrpSpPr>
-            <a:grpSpLocks noChangeAspect="1"/>
-          </p:cNvGrpSpPr>
+      <p:sp>
+        <p:nvSpPr>
+          <p:cNvPr id="13" name="Prostokąt: zaokrąglone rogi 12">
+            <a:extLst>
+              <a:ext uri="{FF2B5EF4-FFF2-40B4-BE49-F238E27FC236}">
+                <a16:creationId xmlns:a16="http://schemas.microsoft.com/office/drawing/2014/main" id="{6AE63931-9B96-46A3-8BAE-A07C8B133250}"/>
+              </a:ext>
+            </a:extLst>
+          </p:cNvPr>
+          <p:cNvSpPr/>
           <p:nvPr/>
-        </p:nvGrpSpPr>
-        <p:grpSpPr>
+        </p:nvSpPr>
+        <p:spPr>
           <a:xfrm>
             <a:off x="4626457" y="1239225"/>
             <a:ext cx="2801092" cy="1548836"/>
-            <a:chOff x="4501185" y="3478333"/>
-            <a:chExt cx="2909717" cy="1608899"/>
-          </a:xfrm>
-        </p:grpSpPr>
-        <p:sp>
-          <p:nvSpPr>
-            <p:cNvPr id="13" name="Prostokąt: zaokrąglone rogi 12">
-              <a:extLst>
-                <a:ext uri="{FF2B5EF4-FFF2-40B4-BE49-F238E27FC236}">
-                  <a16:creationId xmlns:a16="http://schemas.microsoft.com/office/drawing/2014/main" id="{6AE63931-9B96-46A3-8BAE-A07C8B133250}"/>
-                </a:ext>
-              </a:extLst>
-            </p:cNvPr>
-            <p:cNvSpPr/>
-            <p:nvPr/>
-          </p:nvSpPr>
-          <p:spPr>
-            <a:xfrm>
-              <a:off x="4501185" y="3478333"/>
-              <a:ext cx="2909717" cy="1608899"/>
-            </a:xfrm>
-            <a:prstGeom prst="roundRect">
-              <a:avLst/>
-            </a:prstGeom>
-            <a:solidFill>
-              <a:schemeClr val="accent5">
-                <a:alpha val="21000"/>
-              </a:schemeClr>
-            </a:solidFill>
-            <a:ln>
-              <a:noFill/>
-            </a:ln>
-          </p:spPr>
-          <p:style>
-            <a:lnRef idx="0">
-              <a:scrgbClr r="0" g="0" b="0"/>
-            </a:lnRef>
-            <a:fillRef idx="0">
-              <a:scrgbClr r="0" g="0" b="0"/>
-            </a:fillRef>
-            <a:effectRef idx="0">
-              <a:scrgbClr r="0" g="0" b="0"/>
-            </a:effectRef>
-            <a:fontRef idx="minor">
-              <a:schemeClr val="lt1"/>
-            </a:fontRef>
-          </p:style>
-          <p:txBody>
-            <a:bodyPr rtlCol="0" anchor="ctr"/>
-            <a:lstStyle/>
-            <a:p>
-              <a:pPr algn="ctr"/>
-              <a:endParaRPr lang="pl-PL">
+          </a:xfrm>
+          <a:prstGeom prst="roundRect">
+            <a:avLst/>
+          </a:prstGeom>
+          <a:solidFill>
+            <a:schemeClr val="accent5">
+              <a:alpha val="21000"/>
+            </a:schemeClr>
+          </a:solidFill>
+          <a:ln>
+            <a:noFill/>
+          </a:ln>
+        </p:spPr>
+        <p:style>
+          <a:lnRef idx="0">
+            <a:scrgbClr r="0" g="0" b="0"/>
+          </a:lnRef>
+          <a:fillRef idx="0">
+            <a:scrgbClr r="0" g="0" b="0"/>
+          </a:fillRef>
+          <a:effectRef idx="0">
+            <a:scrgbClr r="0" g="0" b="0"/>
+          </a:effectRef>
+          <a:fontRef idx="minor">
+            <a:schemeClr val="lt1"/>
+          </a:fontRef>
+        </p:style>
+        <p:txBody>
+          <a:bodyPr rtlCol="0" anchor="ctr"/>
+          <a:lstStyle/>
+          <a:p>
+            <a:pPr algn="ctr"/>
+            <a:endParaRPr lang="pl-PL">
+              <a:latin typeface="Tahoma" panose="020B0604030504040204" pitchFamily="34" charset="0"/>
+              <a:ea typeface="Tahoma" panose="020B0604030504040204" pitchFamily="34" charset="0"/>
+              <a:cs typeface="Tahoma" panose="020B0604030504040204" pitchFamily="34" charset="0"/>
+            </a:endParaRPr>
+          </a:p>
+        </p:txBody>
+      </p:sp>
+      <p:pic>
+        <p:nvPicPr>
+          <p:cNvPr id="16" name="Grafika 15" descr="Serwer">
+            <a:extLst>
+              <a:ext uri="{FF2B5EF4-FFF2-40B4-BE49-F238E27FC236}">
+                <a16:creationId xmlns:a16="http://schemas.microsoft.com/office/drawing/2014/main" id="{6B377908-3735-4F70-8313-1D6423448ABB}"/>
+              </a:ext>
+            </a:extLst>
+          </p:cNvPr>
+          <p:cNvPicPr>
+            <a:picLocks noChangeAspect="1"/>
+          </p:cNvPicPr>
+          <p:nvPr/>
+        </p:nvPicPr>
+        <p:blipFill>
+          <a:blip r:embed="rId10">
+            <a:extLst>
+              <a:ext uri="{28A0092B-C50C-407E-A947-70E740481C1C}">
+                <a14:useLocalDpi xmlns:a14="http://schemas.microsoft.com/office/drawing/2010/main" val="0"/>
+              </a:ext>
+              <a:ext uri="{96DAC541-7B7A-43D3-8B79-37D633B846F1}">
+                <asvg:svgBlip xmlns:asvg="http://schemas.microsoft.com/office/drawing/2016/SVG/main" r:embed="rId11"/>
+              </a:ext>
+            </a:extLst>
+          </a:blip>
+          <a:stretch>
+            <a:fillRect/>
+          </a:stretch>
+        </p:blipFill>
+        <p:spPr>
+          <a:xfrm>
+            <a:off x="5637856" y="1372625"/>
+            <a:ext cx="880264" cy="880264"/>
+          </a:xfrm>
+          <a:prstGeom prst="rect">
+            <a:avLst/>
+          </a:prstGeom>
+        </p:spPr>
+      </p:pic>
+      <p:sp>
+        <p:nvSpPr>
+          <p:cNvPr id="17" name="pole tekstowe 16">
+            <a:extLst>
+              <a:ext uri="{FF2B5EF4-FFF2-40B4-BE49-F238E27FC236}">
+                <a16:creationId xmlns:a16="http://schemas.microsoft.com/office/drawing/2014/main" id="{D057CB63-84A6-402A-B160-BDFC8E78426B}"/>
+              </a:ext>
+            </a:extLst>
+          </p:cNvPr>
+          <p:cNvSpPr txBox="1"/>
+          <p:nvPr/>
+        </p:nvSpPr>
+        <p:spPr>
+          <a:xfrm flipH="1">
+            <a:off x="5353593" y="2238144"/>
+            <a:ext cx="1423631" cy="296287"/>
+          </a:xfrm>
+          <a:prstGeom prst="rect">
+            <a:avLst/>
+          </a:prstGeom>
+          <a:noFill/>
+        </p:spPr>
+        <p:txBody>
+          <a:bodyPr wrap="square" rtlCol="0">
+            <a:spAutoFit/>
+          </a:bodyPr>
+          <a:lstStyle/>
+          <a:p>
+            <a:pPr algn="ctr"/>
+            <a:r>
+              <a:rPr lang="pl-PL" sz="1400" b="1" dirty="0">
                 <a:latin typeface="Tahoma" panose="020B0604030504040204" pitchFamily="34" charset="0"/>
                 <a:ea typeface="Tahoma" panose="020B0604030504040204" pitchFamily="34" charset="0"/>
                 <a:cs typeface="Tahoma" panose="020B0604030504040204" pitchFamily="34" charset="0"/>
-              </a:endParaRPr>
-            </a:p>
-          </p:txBody>
-        </p:sp>
-        <p:sp>
-          <p:nvSpPr>
-            <p:cNvPr id="15" name="Prostokąt 14">
-              <a:extLst>
-                <a:ext uri="{FF2B5EF4-FFF2-40B4-BE49-F238E27FC236}">
-                  <a16:creationId xmlns:a16="http://schemas.microsoft.com/office/drawing/2014/main" id="{D24A4FB8-1465-47AA-B0A9-5CA8258FEED5}"/>
-                </a:ext>
-              </a:extLst>
-            </p:cNvPr>
-            <p:cNvSpPr/>
-            <p:nvPr/>
-          </p:nvSpPr>
-          <p:spPr>
-            <a:xfrm>
-              <a:off x="5195652" y="3616906"/>
-              <a:ext cx="1520782" cy="1331751"/>
-            </a:xfrm>
-            <a:prstGeom prst="rect">
-              <a:avLst/>
-            </a:prstGeom>
-            <a:solidFill>
-              <a:schemeClr val="accent5">
-                <a:alpha val="50000"/>
-              </a:schemeClr>
-            </a:solidFill>
-            <a:ln>
-              <a:noFill/>
-            </a:ln>
-          </p:spPr>
-          <p:style>
-            <a:lnRef idx="0">
-              <a:scrgbClr r="0" g="0" b="0"/>
-            </a:lnRef>
-            <a:fillRef idx="0">
-              <a:scrgbClr r="0" g="0" b="0"/>
-            </a:fillRef>
-            <a:effectRef idx="0">
-              <a:scrgbClr r="0" g="0" b="0"/>
-            </a:effectRef>
-            <a:fontRef idx="minor">
-              <a:schemeClr val="lt1"/>
-            </a:fontRef>
-          </p:style>
-          <p:txBody>
-            <a:bodyPr rtlCol="0" anchor="ctr"/>
-            <a:lstStyle/>
-            <a:p>
-              <a:pPr algn="ctr"/>
-              <a:endParaRPr lang="pl-PL">
-                <a:latin typeface="Tahoma" panose="020B0604030504040204" pitchFamily="34" charset="0"/>
-                <a:ea typeface="Tahoma" panose="020B0604030504040204" pitchFamily="34" charset="0"/>
-                <a:cs typeface="Tahoma" panose="020B0604030504040204" pitchFamily="34" charset="0"/>
-              </a:endParaRPr>
-            </a:p>
-          </p:txBody>
-        </p:sp>
-        <p:pic>
-          <p:nvPicPr>
-            <p:cNvPr id="16" name="Grafika 15" descr="Serwer">
-              <a:extLst>
-                <a:ext uri="{FF2B5EF4-FFF2-40B4-BE49-F238E27FC236}">
-                  <a16:creationId xmlns:a16="http://schemas.microsoft.com/office/drawing/2014/main" id="{6B377908-3735-4F70-8313-1D6423448ABB}"/>
-                </a:ext>
-              </a:extLst>
-            </p:cNvPr>
-            <p:cNvPicPr>
-              <a:picLocks noChangeAspect="1"/>
-            </p:cNvPicPr>
-            <p:nvPr/>
-          </p:nvPicPr>
-          <p:blipFill>
-            <a:blip r:embed="rId10">
-              <a:extLst>
-                <a:ext uri="{28A0092B-C50C-407E-A947-70E740481C1C}">
-                  <a14:useLocalDpi xmlns:a14="http://schemas.microsoft.com/office/drawing/2010/main" val="0"/>
-                </a:ext>
-                <a:ext uri="{96DAC541-7B7A-43D3-8B79-37D633B846F1}">
-                  <asvg:svgBlip xmlns:asvg="http://schemas.microsoft.com/office/drawing/2016/SVG/main" r:embed="rId11"/>
-                </a:ext>
-              </a:extLst>
-            </a:blip>
-            <a:stretch>
-              <a:fillRect/>
-            </a:stretch>
-          </p:blipFill>
-          <p:spPr>
-            <a:xfrm>
-              <a:off x="5551806" y="3616906"/>
-              <a:ext cx="914400" cy="914400"/>
-            </a:xfrm>
-            <a:prstGeom prst="rect">
-              <a:avLst/>
-            </a:prstGeom>
-          </p:spPr>
-        </p:pic>
-        <p:sp>
-          <p:nvSpPr>
-            <p:cNvPr id="17" name="pole tekstowe 16">
-              <a:extLst>
-                <a:ext uri="{FF2B5EF4-FFF2-40B4-BE49-F238E27FC236}">
-                  <a16:creationId xmlns:a16="http://schemas.microsoft.com/office/drawing/2014/main" id="{D057CB63-84A6-402A-B160-BDFC8E78426B}"/>
-                </a:ext>
-              </a:extLst>
-            </p:cNvPr>
-            <p:cNvSpPr txBox="1"/>
-            <p:nvPr/>
-          </p:nvSpPr>
-          <p:spPr>
-            <a:xfrm flipH="1">
-              <a:off x="5256519" y="4515990"/>
-              <a:ext cx="1478839" cy="307777"/>
-            </a:xfrm>
-            <a:prstGeom prst="rect">
-              <a:avLst/>
-            </a:prstGeom>
-            <a:noFill/>
-          </p:spPr>
-          <p:txBody>
-            <a:bodyPr wrap="square" rtlCol="0">
-              <a:spAutoFit/>
-            </a:bodyPr>
-            <a:lstStyle/>
-            <a:p>
-              <a:pPr algn="ctr"/>
-              <a:r>
-                <a:rPr lang="pl-PL" sz="1400" b="1" dirty="0">
-                  <a:latin typeface="Tahoma" panose="020B0604030504040204" pitchFamily="34" charset="0"/>
-                  <a:ea typeface="Tahoma" panose="020B0604030504040204" pitchFamily="34" charset="0"/>
-                  <a:cs typeface="Tahoma" panose="020B0604030504040204" pitchFamily="34" charset="0"/>
-                </a:rPr>
-                <a:t>DCPAM WDS</a:t>
-              </a:r>
-              <a:endParaRPr lang="pl-PL" sz="1050" b="1" dirty="0">
-                <a:latin typeface="Tahoma" panose="020B0604030504040204" pitchFamily="34" charset="0"/>
-                <a:ea typeface="Tahoma" panose="020B0604030504040204" pitchFamily="34" charset="0"/>
-                <a:cs typeface="Tahoma" panose="020B0604030504040204" pitchFamily="34" charset="0"/>
-              </a:endParaRPr>
-            </a:p>
-          </p:txBody>
-        </p:sp>
-      </p:grpSp>
+              </a:rPr>
+              <a:t>DCPAM WDS</a:t>
+            </a:r>
+            <a:endParaRPr lang="pl-PL" sz="1050" b="1" dirty="0">
+              <a:latin typeface="Tahoma" panose="020B0604030504040204" pitchFamily="34" charset="0"/>
+              <a:ea typeface="Tahoma" panose="020B0604030504040204" pitchFamily="34" charset="0"/>
+              <a:cs typeface="Tahoma" panose="020B0604030504040204" pitchFamily="34" charset="0"/>
+            </a:endParaRPr>
+          </a:p>
+        </p:txBody>
+      </p:sp>
       <p:grpSp>
         <p:nvGrpSpPr>
           <p:cNvPr id="25" name="Grupa 24">
@@ -8772,14 +8694,16 @@
         </p:nvSpPr>
         <p:spPr>
           <a:xfrm>
-            <a:off x="344129" y="6057104"/>
+            <a:off x="344129" y="6074538"/>
             <a:ext cx="11517754" cy="632986"/>
           </a:xfrm>
           <a:prstGeom prst="roundRect">
             <a:avLst/>
           </a:prstGeom>
           <a:solidFill>
-            <a:schemeClr val="accent1"/>
+            <a:schemeClr val="accent1">
+              <a:alpha val="34000"/>
+            </a:schemeClr>
           </a:solidFill>
           <a:ln>
             <a:noFill/>
@@ -8828,8 +8752,8 @@
         </p:nvCxnSpPr>
         <p:spPr>
           <a:xfrm rot="16200000" flipV="1">
-            <a:off x="4384571" y="4338668"/>
-            <a:ext cx="325927" cy="3110945"/>
+            <a:off x="4375854" y="4347385"/>
+            <a:ext cx="343361" cy="3110945"/>
           </a:xfrm>
           <a:prstGeom prst="bentConnector3">
             <a:avLst/>
@@ -8870,8 +8794,8 @@
         </p:nvCxnSpPr>
         <p:spPr>
           <a:xfrm rot="16200000" flipV="1">
-            <a:off x="5223152" y="5177250"/>
-            <a:ext cx="325927" cy="1433782"/>
+            <a:off x="5214435" y="5185967"/>
+            <a:ext cx="343361" cy="1433782"/>
           </a:xfrm>
           <a:prstGeom prst="bentConnector3">
             <a:avLst/>
@@ -8912,8 +8836,8 @@
         </p:nvCxnSpPr>
         <p:spPr>
           <a:xfrm rot="5400000" flipH="1" flipV="1">
-            <a:off x="6854509" y="4974161"/>
-            <a:ext cx="331441" cy="1834446"/>
+            <a:off x="6845792" y="4982878"/>
+            <a:ext cx="348875" cy="1834446"/>
           </a:xfrm>
           <a:prstGeom prst="bentConnector3">
             <a:avLst/>
@@ -9035,6 +8959,2896 @@
     <p:extLst>
       <p:ext uri="{BB962C8B-B14F-4D97-AF65-F5344CB8AC3E}">
         <p14:creationId xmlns:p14="http://schemas.microsoft.com/office/powerpoint/2010/main" val="2974656166"/>
+      </p:ext>
+    </p:extLst>
+  </p:cSld>
+  <p:clrMapOvr>
+    <a:masterClrMapping/>
+  </p:clrMapOvr>
+</p:sld>
+</file>
+
+<file path=ppt/slides/slide4.xml><?xml version="1.0" encoding="utf-8"?>
+<p:sld xmlns:a="http://schemas.openxmlformats.org/drawingml/2006/main" xmlns:r="http://schemas.openxmlformats.org/officeDocument/2006/relationships" xmlns:p="http://schemas.openxmlformats.org/presentationml/2006/main">
+  <p:cSld>
+    <p:spTree>
+      <p:nvGrpSpPr>
+        <p:cNvPr id="1" name=""/>
+        <p:cNvGrpSpPr/>
+        <p:nvPr/>
+      </p:nvGrpSpPr>
+      <p:grpSpPr>
+        <a:xfrm>
+          <a:off x="0" y="0"/>
+          <a:ext cx="0" cy="0"/>
+          <a:chOff x="0" y="0"/>
+          <a:chExt cx="0" cy="0"/>
+        </a:xfrm>
+      </p:grpSpPr>
+      <p:sp>
+        <p:nvSpPr>
+          <p:cNvPr id="138" name="Prostokąt: zaokrąglone rogi 137">
+            <a:extLst>
+              <a:ext uri="{FF2B5EF4-FFF2-40B4-BE49-F238E27FC236}">
+                <a16:creationId xmlns:a16="http://schemas.microsoft.com/office/drawing/2014/main" id="{AC330ED0-C246-416B-8F28-D14CC98D3E4B}"/>
+              </a:ext>
+            </a:extLst>
+          </p:cNvPr>
+          <p:cNvSpPr/>
+          <p:nvPr/>
+        </p:nvSpPr>
+        <p:spPr>
+          <a:xfrm>
+            <a:off x="344129" y="335142"/>
+            <a:ext cx="11517754" cy="632986"/>
+          </a:xfrm>
+          <a:prstGeom prst="roundRect">
+            <a:avLst/>
+          </a:prstGeom>
+          <a:solidFill>
+            <a:schemeClr val="accent1">
+              <a:alpha val="22000"/>
+            </a:schemeClr>
+          </a:solidFill>
+          <a:ln>
+            <a:noFill/>
+          </a:ln>
+        </p:spPr>
+        <p:style>
+          <a:lnRef idx="0">
+            <a:scrgbClr r="0" g="0" b="0"/>
+          </a:lnRef>
+          <a:fillRef idx="0">
+            <a:scrgbClr r="0" g="0" b="0"/>
+          </a:fillRef>
+          <a:effectRef idx="0">
+            <a:scrgbClr r="0" g="0" b="0"/>
+          </a:effectRef>
+          <a:fontRef idx="minor">
+            <a:schemeClr val="lt1"/>
+          </a:fontRef>
+        </p:style>
+        <p:txBody>
+          <a:bodyPr rtlCol="0" anchor="ctr"/>
+          <a:lstStyle/>
+          <a:p>
+            <a:pPr algn="ctr"/>
+            <a:endParaRPr lang="pl-PL" dirty="0"/>
+          </a:p>
+        </p:txBody>
+      </p:sp>
+      <p:pic>
+        <p:nvPicPr>
+          <p:cNvPr id="5" name="Grafika 4" descr="Wykres Gantta">
+            <a:extLst>
+              <a:ext uri="{FF2B5EF4-FFF2-40B4-BE49-F238E27FC236}">
+                <a16:creationId xmlns:a16="http://schemas.microsoft.com/office/drawing/2014/main" id="{76316CF5-6620-49BD-89C6-F6A449E7AEBE}"/>
+              </a:ext>
+            </a:extLst>
+          </p:cNvPr>
+          <p:cNvPicPr>
+            <a:picLocks noChangeAspect="1"/>
+          </p:cNvPicPr>
+          <p:nvPr/>
+        </p:nvPicPr>
+        <p:blipFill>
+          <a:blip r:embed="rId2">
+            <a:extLst>
+              <a:ext uri="{28A0092B-C50C-407E-A947-70E740481C1C}">
+                <a14:useLocalDpi xmlns:a14="http://schemas.microsoft.com/office/drawing/2010/main" val="0"/>
+              </a:ext>
+              <a:ext uri="{96DAC541-7B7A-43D3-8B79-37D633B846F1}">
+                <asvg:svgBlip xmlns:asvg="http://schemas.microsoft.com/office/drawing/2016/SVG/main" r:embed="rId3"/>
+              </a:ext>
+            </a:extLst>
+          </a:blip>
+          <a:stretch>
+            <a:fillRect/>
+          </a:stretch>
+        </p:blipFill>
+        <p:spPr>
+          <a:xfrm>
+            <a:off x="5195983" y="375985"/>
+            <a:ext cx="554400" cy="554400"/>
+          </a:xfrm>
+          <a:prstGeom prst="rect">
+            <a:avLst/>
+          </a:prstGeom>
+        </p:spPr>
+      </p:pic>
+      <p:pic>
+        <p:nvPicPr>
+          <p:cNvPr id="7" name="Grafika 6" descr="Wykres w kształcie kija hokejowego">
+            <a:extLst>
+              <a:ext uri="{FF2B5EF4-FFF2-40B4-BE49-F238E27FC236}">
+                <a16:creationId xmlns:a16="http://schemas.microsoft.com/office/drawing/2014/main" id="{EEE58F82-8CF3-4757-A074-091923927A7E}"/>
+              </a:ext>
+            </a:extLst>
+          </p:cNvPr>
+          <p:cNvPicPr>
+            <a:picLocks noChangeAspect="1"/>
+          </p:cNvPicPr>
+          <p:nvPr/>
+        </p:nvPicPr>
+        <p:blipFill>
+          <a:blip r:embed="rId4">
+            <a:extLst>
+              <a:ext uri="{28A0092B-C50C-407E-A947-70E740481C1C}">
+                <a14:useLocalDpi xmlns:a14="http://schemas.microsoft.com/office/drawing/2010/main" val="0"/>
+              </a:ext>
+              <a:ext uri="{96DAC541-7B7A-43D3-8B79-37D633B846F1}">
+                <asvg:svgBlip xmlns:asvg="http://schemas.microsoft.com/office/drawing/2016/SVG/main" r:embed="rId5"/>
+              </a:ext>
+            </a:extLst>
+          </a:blip>
+          <a:stretch>
+            <a:fillRect/>
+          </a:stretch>
+        </p:blipFill>
+        <p:spPr>
+          <a:xfrm>
+            <a:off x="3942173" y="375985"/>
+            <a:ext cx="554400" cy="554400"/>
+          </a:xfrm>
+          <a:prstGeom prst="rect">
+            <a:avLst/>
+          </a:prstGeom>
+        </p:spPr>
+      </p:pic>
+      <p:pic>
+        <p:nvPicPr>
+          <p:cNvPr id="9" name="Grafika 8" descr="Prezentacja z wykresem słupkowym">
+            <a:extLst>
+              <a:ext uri="{FF2B5EF4-FFF2-40B4-BE49-F238E27FC236}">
+                <a16:creationId xmlns:a16="http://schemas.microsoft.com/office/drawing/2014/main" id="{8761E330-1B63-4AAE-BFD9-F256CF99AFE1}"/>
+              </a:ext>
+            </a:extLst>
+          </p:cNvPr>
+          <p:cNvPicPr>
+            <a:picLocks noChangeAspect="1"/>
+          </p:cNvPicPr>
+          <p:nvPr/>
+        </p:nvPicPr>
+        <p:blipFill>
+          <a:blip r:embed="rId6">
+            <a:extLst>
+              <a:ext uri="{28A0092B-C50C-407E-A947-70E740481C1C}">
+                <a14:useLocalDpi xmlns:a14="http://schemas.microsoft.com/office/drawing/2010/main" val="0"/>
+              </a:ext>
+              <a:ext uri="{96DAC541-7B7A-43D3-8B79-37D633B846F1}">
+                <asvg:svgBlip xmlns:asvg="http://schemas.microsoft.com/office/drawing/2016/SVG/main" r:embed="rId7"/>
+              </a:ext>
+            </a:extLst>
+          </a:blip>
+          <a:stretch>
+            <a:fillRect/>
+          </a:stretch>
+        </p:blipFill>
+        <p:spPr>
+          <a:xfrm>
+            <a:off x="6449793" y="375985"/>
+            <a:ext cx="554400" cy="554400"/>
+          </a:xfrm>
+          <a:prstGeom prst="rect">
+            <a:avLst/>
+          </a:prstGeom>
+        </p:spPr>
+      </p:pic>
+      <p:pic>
+        <p:nvPicPr>
+          <p:cNvPr id="11" name="Grafika 10" descr="Prędkościomierz — niskie wskazanie">
+            <a:extLst>
+              <a:ext uri="{FF2B5EF4-FFF2-40B4-BE49-F238E27FC236}">
+                <a16:creationId xmlns:a16="http://schemas.microsoft.com/office/drawing/2014/main" id="{B21B5E02-2238-4848-99A5-381852524089}"/>
+              </a:ext>
+            </a:extLst>
+          </p:cNvPr>
+          <p:cNvPicPr>
+            <a:picLocks noChangeAspect="1"/>
+          </p:cNvPicPr>
+          <p:nvPr/>
+        </p:nvPicPr>
+        <p:blipFill>
+          <a:blip r:embed="rId8">
+            <a:extLst>
+              <a:ext uri="{28A0092B-C50C-407E-A947-70E740481C1C}">
+                <a14:useLocalDpi xmlns:a14="http://schemas.microsoft.com/office/drawing/2010/main" val="0"/>
+              </a:ext>
+              <a:ext uri="{96DAC541-7B7A-43D3-8B79-37D633B846F1}">
+                <asvg:svgBlip xmlns:asvg="http://schemas.microsoft.com/office/drawing/2016/SVG/main" r:embed="rId9"/>
+              </a:ext>
+            </a:extLst>
+          </a:blip>
+          <a:stretch>
+            <a:fillRect/>
+          </a:stretch>
+        </p:blipFill>
+        <p:spPr>
+          <a:xfrm>
+            <a:off x="7695429" y="375985"/>
+            <a:ext cx="554400" cy="554400"/>
+          </a:xfrm>
+          <a:prstGeom prst="rect">
+            <a:avLst/>
+          </a:prstGeom>
+        </p:spPr>
+      </p:pic>
+      <p:grpSp>
+        <p:nvGrpSpPr>
+          <p:cNvPr id="19" name="Grupa 18">
+            <a:extLst>
+              <a:ext uri="{FF2B5EF4-FFF2-40B4-BE49-F238E27FC236}">
+                <a16:creationId xmlns:a16="http://schemas.microsoft.com/office/drawing/2014/main" id="{F8AF72FD-1789-44F6-AAAC-4452F97E86F2}"/>
+              </a:ext>
+            </a:extLst>
+          </p:cNvPr>
+          <p:cNvGrpSpPr/>
+          <p:nvPr/>
+        </p:nvGrpSpPr>
+        <p:grpSpPr>
+          <a:xfrm>
+            <a:off x="4626457" y="1239225"/>
+            <a:ext cx="2801092" cy="1548836"/>
+            <a:chOff x="4626457" y="1239225"/>
+            <a:chExt cx="2801092" cy="1548836"/>
+          </a:xfrm>
+        </p:grpSpPr>
+        <p:sp>
+          <p:nvSpPr>
+            <p:cNvPr id="13" name="Prostokąt: zaokrąglone rogi 12">
+              <a:extLst>
+                <a:ext uri="{FF2B5EF4-FFF2-40B4-BE49-F238E27FC236}">
+                  <a16:creationId xmlns:a16="http://schemas.microsoft.com/office/drawing/2014/main" id="{6AE63931-9B96-46A3-8BAE-A07C8B133250}"/>
+                </a:ext>
+              </a:extLst>
+            </p:cNvPr>
+            <p:cNvSpPr/>
+            <p:nvPr/>
+          </p:nvSpPr>
+          <p:spPr>
+            <a:xfrm>
+              <a:off x="4626457" y="1239225"/>
+              <a:ext cx="2801092" cy="1548836"/>
+            </a:xfrm>
+            <a:prstGeom prst="roundRect">
+              <a:avLst/>
+            </a:prstGeom>
+            <a:solidFill>
+              <a:schemeClr val="accent5">
+                <a:alpha val="21000"/>
+              </a:schemeClr>
+            </a:solidFill>
+            <a:ln>
+              <a:noFill/>
+            </a:ln>
+          </p:spPr>
+          <p:style>
+            <a:lnRef idx="0">
+              <a:scrgbClr r="0" g="0" b="0"/>
+            </a:lnRef>
+            <a:fillRef idx="0">
+              <a:scrgbClr r="0" g="0" b="0"/>
+            </a:fillRef>
+            <a:effectRef idx="0">
+              <a:scrgbClr r="0" g="0" b="0"/>
+            </a:effectRef>
+            <a:fontRef idx="minor">
+              <a:schemeClr val="lt1"/>
+            </a:fontRef>
+          </p:style>
+          <p:txBody>
+            <a:bodyPr rtlCol="0" anchor="ctr"/>
+            <a:lstStyle/>
+            <a:p>
+              <a:pPr algn="ctr"/>
+              <a:endParaRPr lang="pl-PL">
+                <a:latin typeface="Tahoma" panose="020B0604030504040204" pitchFamily="34" charset="0"/>
+                <a:ea typeface="Tahoma" panose="020B0604030504040204" pitchFamily="34" charset="0"/>
+                <a:cs typeface="Tahoma" panose="020B0604030504040204" pitchFamily="34" charset="0"/>
+              </a:endParaRPr>
+            </a:p>
+          </p:txBody>
+        </p:sp>
+        <p:pic>
+          <p:nvPicPr>
+            <p:cNvPr id="16" name="Grafika 15" descr="Serwer">
+              <a:extLst>
+                <a:ext uri="{FF2B5EF4-FFF2-40B4-BE49-F238E27FC236}">
+                  <a16:creationId xmlns:a16="http://schemas.microsoft.com/office/drawing/2014/main" id="{6B377908-3735-4F70-8313-1D6423448ABB}"/>
+                </a:ext>
+              </a:extLst>
+            </p:cNvPr>
+            <p:cNvPicPr>
+              <a:picLocks noChangeAspect="1"/>
+            </p:cNvPicPr>
+            <p:nvPr/>
+          </p:nvPicPr>
+          <p:blipFill>
+            <a:blip r:embed="rId10">
+              <a:extLst>
+                <a:ext uri="{28A0092B-C50C-407E-A947-70E740481C1C}">
+                  <a14:useLocalDpi xmlns:a14="http://schemas.microsoft.com/office/drawing/2010/main" val="0"/>
+                </a:ext>
+                <a:ext uri="{96DAC541-7B7A-43D3-8B79-37D633B846F1}">
+                  <asvg:svgBlip xmlns:asvg="http://schemas.microsoft.com/office/drawing/2016/SVG/main" r:embed="rId11"/>
+                </a:ext>
+              </a:extLst>
+            </a:blip>
+            <a:stretch>
+              <a:fillRect/>
+            </a:stretch>
+          </p:blipFill>
+          <p:spPr>
+            <a:xfrm>
+              <a:off x="5637856" y="1372625"/>
+              <a:ext cx="880264" cy="880264"/>
+            </a:xfrm>
+            <a:prstGeom prst="rect">
+              <a:avLst/>
+            </a:prstGeom>
+          </p:spPr>
+        </p:pic>
+        <p:sp>
+          <p:nvSpPr>
+            <p:cNvPr id="17" name="pole tekstowe 16">
+              <a:extLst>
+                <a:ext uri="{FF2B5EF4-FFF2-40B4-BE49-F238E27FC236}">
+                  <a16:creationId xmlns:a16="http://schemas.microsoft.com/office/drawing/2014/main" id="{D057CB63-84A6-402A-B160-BDFC8E78426B}"/>
+                </a:ext>
+              </a:extLst>
+            </p:cNvPr>
+            <p:cNvSpPr txBox="1"/>
+            <p:nvPr/>
+          </p:nvSpPr>
+          <p:spPr>
+            <a:xfrm flipH="1">
+              <a:off x="5353593" y="2238144"/>
+              <a:ext cx="1423631" cy="296287"/>
+            </a:xfrm>
+            <a:prstGeom prst="rect">
+              <a:avLst/>
+            </a:prstGeom>
+            <a:noFill/>
+          </p:spPr>
+          <p:txBody>
+            <a:bodyPr wrap="square" rtlCol="0">
+              <a:spAutoFit/>
+            </a:bodyPr>
+            <a:lstStyle/>
+            <a:p>
+              <a:pPr algn="ctr"/>
+              <a:r>
+                <a:rPr lang="pl-PL" sz="1400" b="1" dirty="0">
+                  <a:latin typeface="Tahoma" panose="020B0604030504040204" pitchFamily="34" charset="0"/>
+                  <a:ea typeface="Tahoma" panose="020B0604030504040204" pitchFamily="34" charset="0"/>
+                  <a:cs typeface="Tahoma" panose="020B0604030504040204" pitchFamily="34" charset="0"/>
+                </a:rPr>
+                <a:t>DCPAM WDS</a:t>
+              </a:r>
+              <a:endParaRPr lang="pl-PL" sz="1050" b="1" dirty="0">
+                <a:latin typeface="Tahoma" panose="020B0604030504040204" pitchFamily="34" charset="0"/>
+                <a:ea typeface="Tahoma" panose="020B0604030504040204" pitchFamily="34" charset="0"/>
+                <a:cs typeface="Tahoma" panose="020B0604030504040204" pitchFamily="34" charset="0"/>
+              </a:endParaRPr>
+            </a:p>
+          </p:txBody>
+        </p:sp>
+      </p:grpSp>
+      <p:grpSp>
+        <p:nvGrpSpPr>
+          <p:cNvPr id="25" name="Grupa 24">
+            <a:extLst>
+              <a:ext uri="{FF2B5EF4-FFF2-40B4-BE49-F238E27FC236}">
+                <a16:creationId xmlns:a16="http://schemas.microsoft.com/office/drawing/2014/main" id="{E98CDEC0-7716-46E8-A502-E534FD3C8BAF}"/>
+              </a:ext>
+            </a:extLst>
+          </p:cNvPr>
+          <p:cNvGrpSpPr/>
+          <p:nvPr/>
+        </p:nvGrpSpPr>
+        <p:grpSpPr>
+          <a:xfrm>
+            <a:off x="5254794" y="3060220"/>
+            <a:ext cx="1544421" cy="1323582"/>
+            <a:chOff x="6552657" y="975047"/>
+            <a:chExt cx="2909719" cy="2556718"/>
+          </a:xfrm>
+        </p:grpSpPr>
+        <p:sp>
+          <p:nvSpPr>
+            <p:cNvPr id="26" name="Prostokąt: zaokrąglone rogi 25">
+              <a:extLst>
+                <a:ext uri="{FF2B5EF4-FFF2-40B4-BE49-F238E27FC236}">
+                  <a16:creationId xmlns:a16="http://schemas.microsoft.com/office/drawing/2014/main" id="{BC730417-717E-47AB-9EE6-FB75A4D34D5A}"/>
+                </a:ext>
+              </a:extLst>
+            </p:cNvPr>
+            <p:cNvSpPr/>
+            <p:nvPr/>
+          </p:nvSpPr>
+          <p:spPr>
+            <a:xfrm>
+              <a:off x="6552659" y="975047"/>
+              <a:ext cx="2909717" cy="2556718"/>
+            </a:xfrm>
+            <a:prstGeom prst="roundRect">
+              <a:avLst/>
+            </a:prstGeom>
+            <a:solidFill>
+              <a:schemeClr val="accent5">
+                <a:alpha val="21000"/>
+              </a:schemeClr>
+            </a:solidFill>
+            <a:ln>
+              <a:noFill/>
+            </a:ln>
+          </p:spPr>
+          <p:style>
+            <a:lnRef idx="0">
+              <a:scrgbClr r="0" g="0" b="0"/>
+            </a:lnRef>
+            <a:fillRef idx="0">
+              <a:scrgbClr r="0" g="0" b="0"/>
+            </a:fillRef>
+            <a:effectRef idx="0">
+              <a:scrgbClr r="0" g="0" b="0"/>
+            </a:effectRef>
+            <a:fontRef idx="minor">
+              <a:schemeClr val="lt1"/>
+            </a:fontRef>
+          </p:style>
+          <p:txBody>
+            <a:bodyPr rtlCol="0" anchor="ctr"/>
+            <a:lstStyle/>
+            <a:p>
+              <a:pPr algn="ctr"/>
+              <a:endParaRPr lang="pl-PL" dirty="0">
+                <a:latin typeface="Tahoma" panose="020B0604030504040204" pitchFamily="34" charset="0"/>
+                <a:ea typeface="Tahoma" panose="020B0604030504040204" pitchFamily="34" charset="0"/>
+                <a:cs typeface="Tahoma" panose="020B0604030504040204" pitchFamily="34" charset="0"/>
+              </a:endParaRPr>
+            </a:p>
+          </p:txBody>
+        </p:sp>
+        <p:pic>
+          <p:nvPicPr>
+            <p:cNvPr id="27" name="Grafika 26" descr="Baza danych">
+              <a:extLst>
+                <a:ext uri="{FF2B5EF4-FFF2-40B4-BE49-F238E27FC236}">
+                  <a16:creationId xmlns:a16="http://schemas.microsoft.com/office/drawing/2014/main" id="{79CC92CE-FEDF-4938-90FF-9FACC6F166D2}"/>
+                </a:ext>
+              </a:extLst>
+            </p:cNvPr>
+            <p:cNvPicPr>
+              <a:picLocks noChangeAspect="1"/>
+            </p:cNvPicPr>
+            <p:nvPr/>
+          </p:nvPicPr>
+          <p:blipFill>
+            <a:blip r:embed="rId12">
+              <a:extLst>
+                <a:ext uri="{28A0092B-C50C-407E-A947-70E740481C1C}">
+                  <a14:useLocalDpi xmlns:a14="http://schemas.microsoft.com/office/drawing/2010/main" val="0"/>
+                </a:ext>
+                <a:ext uri="{96DAC541-7B7A-43D3-8B79-37D633B846F1}">
+                  <asvg:svgBlip xmlns:asvg="http://schemas.microsoft.com/office/drawing/2016/SVG/main" r:embed="rId13"/>
+                </a:ext>
+              </a:extLst>
+            </a:blip>
+            <a:stretch>
+              <a:fillRect/>
+            </a:stretch>
+          </p:blipFill>
+          <p:spPr>
+            <a:xfrm>
+              <a:off x="7124983" y="1105073"/>
+              <a:ext cx="1765065" cy="1765065"/>
+            </a:xfrm>
+            <a:prstGeom prst="rect">
+              <a:avLst/>
+            </a:prstGeom>
+          </p:spPr>
+        </p:pic>
+        <p:sp>
+          <p:nvSpPr>
+            <p:cNvPr id="28" name="pole tekstowe 27">
+              <a:extLst>
+                <a:ext uri="{FF2B5EF4-FFF2-40B4-BE49-F238E27FC236}">
+                  <a16:creationId xmlns:a16="http://schemas.microsoft.com/office/drawing/2014/main" id="{CC59948F-2A60-47FD-A7D1-82EB6ADC7C2A}"/>
+                </a:ext>
+              </a:extLst>
+            </p:cNvPr>
+            <p:cNvSpPr txBox="1"/>
+            <p:nvPr/>
+          </p:nvSpPr>
+          <p:spPr>
+            <a:xfrm flipH="1">
+              <a:off x="6552657" y="2733877"/>
+              <a:ext cx="2909717" cy="505343"/>
+            </a:xfrm>
+            <a:prstGeom prst="rect">
+              <a:avLst/>
+            </a:prstGeom>
+            <a:noFill/>
+          </p:spPr>
+          <p:txBody>
+            <a:bodyPr wrap="square" rtlCol="0">
+              <a:spAutoFit/>
+            </a:bodyPr>
+            <a:lstStyle/>
+            <a:p>
+              <a:pPr algn="ctr"/>
+              <a:r>
+                <a:rPr lang="pl-PL" sz="1100" b="1" dirty="0">
+                  <a:latin typeface="Tahoma" panose="020B0604030504040204" pitchFamily="34" charset="0"/>
+                  <a:ea typeface="Tahoma" panose="020B0604030504040204" pitchFamily="34" charset="0"/>
+                  <a:cs typeface="Tahoma" panose="020B0604030504040204" pitchFamily="34" charset="0"/>
+                </a:rPr>
+                <a:t>DCPAM DATABASE</a:t>
+              </a:r>
+              <a:endParaRPr lang="pl-PL" sz="900" b="1" dirty="0">
+                <a:latin typeface="Tahoma" panose="020B0604030504040204" pitchFamily="34" charset="0"/>
+                <a:ea typeface="Tahoma" panose="020B0604030504040204" pitchFamily="34" charset="0"/>
+                <a:cs typeface="Tahoma" panose="020B0604030504040204" pitchFamily="34" charset="0"/>
+              </a:endParaRPr>
+            </a:p>
+          </p:txBody>
+        </p:sp>
+      </p:grpSp>
+      <p:grpSp>
+        <p:nvGrpSpPr>
+          <p:cNvPr id="33" name="Grupa 32">
+            <a:extLst>
+              <a:ext uri="{FF2B5EF4-FFF2-40B4-BE49-F238E27FC236}">
+                <a16:creationId xmlns:a16="http://schemas.microsoft.com/office/drawing/2014/main" id="{3C61B0D3-6074-474A-81CE-133BC658FB75}"/>
+              </a:ext>
+            </a:extLst>
+          </p:cNvPr>
+          <p:cNvGrpSpPr/>
+          <p:nvPr/>
+        </p:nvGrpSpPr>
+        <p:grpSpPr>
+          <a:xfrm>
+            <a:off x="3406592" y="3060220"/>
+            <a:ext cx="1544421" cy="1323582"/>
+            <a:chOff x="6552657" y="975047"/>
+            <a:chExt cx="2909719" cy="2556718"/>
+          </a:xfrm>
+        </p:grpSpPr>
+        <p:sp>
+          <p:nvSpPr>
+            <p:cNvPr id="34" name="Prostokąt: zaokrąglone rogi 33">
+              <a:extLst>
+                <a:ext uri="{FF2B5EF4-FFF2-40B4-BE49-F238E27FC236}">
+                  <a16:creationId xmlns:a16="http://schemas.microsoft.com/office/drawing/2014/main" id="{E79D5C75-3498-4BCF-A6EE-6FAAD66BE4B6}"/>
+                </a:ext>
+              </a:extLst>
+            </p:cNvPr>
+            <p:cNvSpPr/>
+            <p:nvPr/>
+          </p:nvSpPr>
+          <p:spPr>
+            <a:xfrm>
+              <a:off x="6552659" y="975047"/>
+              <a:ext cx="2909717" cy="2556718"/>
+            </a:xfrm>
+            <a:prstGeom prst="roundRect">
+              <a:avLst/>
+            </a:prstGeom>
+            <a:solidFill>
+              <a:schemeClr val="accent5">
+                <a:alpha val="21000"/>
+              </a:schemeClr>
+            </a:solidFill>
+            <a:ln>
+              <a:noFill/>
+            </a:ln>
+          </p:spPr>
+          <p:style>
+            <a:lnRef idx="0">
+              <a:scrgbClr r="0" g="0" b="0"/>
+            </a:lnRef>
+            <a:fillRef idx="0">
+              <a:scrgbClr r="0" g="0" b="0"/>
+            </a:fillRef>
+            <a:effectRef idx="0">
+              <a:scrgbClr r="0" g="0" b="0"/>
+            </a:effectRef>
+            <a:fontRef idx="minor">
+              <a:schemeClr val="lt1"/>
+            </a:fontRef>
+          </p:style>
+          <p:txBody>
+            <a:bodyPr rtlCol="0" anchor="ctr"/>
+            <a:lstStyle/>
+            <a:p>
+              <a:pPr algn="ctr"/>
+              <a:endParaRPr lang="pl-PL" dirty="0">
+                <a:latin typeface="Tahoma" panose="020B0604030504040204" pitchFamily="34" charset="0"/>
+                <a:ea typeface="Tahoma" panose="020B0604030504040204" pitchFamily="34" charset="0"/>
+                <a:cs typeface="Tahoma" panose="020B0604030504040204" pitchFamily="34" charset="0"/>
+              </a:endParaRPr>
+            </a:p>
+          </p:txBody>
+        </p:sp>
+        <p:pic>
+          <p:nvPicPr>
+            <p:cNvPr id="35" name="Grafika 34" descr="Baza danych">
+              <a:extLst>
+                <a:ext uri="{FF2B5EF4-FFF2-40B4-BE49-F238E27FC236}">
+                  <a16:creationId xmlns:a16="http://schemas.microsoft.com/office/drawing/2014/main" id="{A92D8D08-0E43-4C84-AF48-7A4E000F5AD7}"/>
+                </a:ext>
+              </a:extLst>
+            </p:cNvPr>
+            <p:cNvPicPr>
+              <a:picLocks noChangeAspect="1"/>
+            </p:cNvPicPr>
+            <p:nvPr/>
+          </p:nvPicPr>
+          <p:blipFill>
+            <a:blip r:embed="rId12">
+              <a:extLst>
+                <a:ext uri="{28A0092B-C50C-407E-A947-70E740481C1C}">
+                  <a14:useLocalDpi xmlns:a14="http://schemas.microsoft.com/office/drawing/2010/main" val="0"/>
+                </a:ext>
+                <a:ext uri="{96DAC541-7B7A-43D3-8B79-37D633B846F1}">
+                  <asvg:svgBlip xmlns:asvg="http://schemas.microsoft.com/office/drawing/2016/SVG/main" r:embed="rId13"/>
+                </a:ext>
+              </a:extLst>
+            </a:blip>
+            <a:stretch>
+              <a:fillRect/>
+            </a:stretch>
+          </p:blipFill>
+          <p:spPr>
+            <a:xfrm>
+              <a:off x="7124983" y="1105073"/>
+              <a:ext cx="1765065" cy="1765065"/>
+            </a:xfrm>
+            <a:prstGeom prst="rect">
+              <a:avLst/>
+            </a:prstGeom>
+          </p:spPr>
+        </p:pic>
+        <p:sp>
+          <p:nvSpPr>
+            <p:cNvPr id="36" name="pole tekstowe 35">
+              <a:extLst>
+                <a:ext uri="{FF2B5EF4-FFF2-40B4-BE49-F238E27FC236}">
+                  <a16:creationId xmlns:a16="http://schemas.microsoft.com/office/drawing/2014/main" id="{3C75DBAC-F0A4-4FC4-B25E-12ADA74E5F88}"/>
+                </a:ext>
+              </a:extLst>
+            </p:cNvPr>
+            <p:cNvSpPr txBox="1"/>
+            <p:nvPr/>
+          </p:nvSpPr>
+          <p:spPr>
+            <a:xfrm flipH="1">
+              <a:off x="6552657" y="2733877"/>
+              <a:ext cx="2909717" cy="505343"/>
+            </a:xfrm>
+            <a:prstGeom prst="rect">
+              <a:avLst/>
+            </a:prstGeom>
+            <a:noFill/>
+          </p:spPr>
+          <p:txBody>
+            <a:bodyPr wrap="square" rtlCol="0">
+              <a:spAutoFit/>
+            </a:bodyPr>
+            <a:lstStyle/>
+            <a:p>
+              <a:pPr algn="ctr"/>
+              <a:r>
+                <a:rPr lang="pl-PL" sz="1100" b="1" dirty="0">
+                  <a:latin typeface="Tahoma" panose="020B0604030504040204" pitchFamily="34" charset="0"/>
+                  <a:ea typeface="Tahoma" panose="020B0604030504040204" pitchFamily="34" charset="0"/>
+                  <a:cs typeface="Tahoma" panose="020B0604030504040204" pitchFamily="34" charset="0"/>
+                </a:rPr>
+                <a:t>DCPAM DATABASE</a:t>
+              </a:r>
+              <a:endParaRPr lang="pl-PL" sz="900" b="1" dirty="0">
+                <a:latin typeface="Tahoma" panose="020B0604030504040204" pitchFamily="34" charset="0"/>
+                <a:ea typeface="Tahoma" panose="020B0604030504040204" pitchFamily="34" charset="0"/>
+                <a:cs typeface="Tahoma" panose="020B0604030504040204" pitchFamily="34" charset="0"/>
+              </a:endParaRPr>
+            </a:p>
+          </p:txBody>
+        </p:sp>
+      </p:grpSp>
+      <p:grpSp>
+        <p:nvGrpSpPr>
+          <p:cNvPr id="37" name="Grupa 36">
+            <a:extLst>
+              <a:ext uri="{FF2B5EF4-FFF2-40B4-BE49-F238E27FC236}">
+                <a16:creationId xmlns:a16="http://schemas.microsoft.com/office/drawing/2014/main" id="{828B38E4-E9D1-4F87-8321-F059FBA28FDC}"/>
+              </a:ext>
+            </a:extLst>
+          </p:cNvPr>
+          <p:cNvGrpSpPr/>
+          <p:nvPr/>
+        </p:nvGrpSpPr>
+        <p:grpSpPr>
+          <a:xfrm>
+            <a:off x="7102992" y="3060220"/>
+            <a:ext cx="1544421" cy="1323582"/>
+            <a:chOff x="6552657" y="975047"/>
+            <a:chExt cx="2909719" cy="2556718"/>
+          </a:xfrm>
+        </p:grpSpPr>
+        <p:sp>
+          <p:nvSpPr>
+            <p:cNvPr id="38" name="Prostokąt: zaokrąglone rogi 37">
+              <a:extLst>
+                <a:ext uri="{FF2B5EF4-FFF2-40B4-BE49-F238E27FC236}">
+                  <a16:creationId xmlns:a16="http://schemas.microsoft.com/office/drawing/2014/main" id="{B615E90D-68D8-469E-8BA8-B571ADC45E39}"/>
+                </a:ext>
+              </a:extLst>
+            </p:cNvPr>
+            <p:cNvSpPr/>
+            <p:nvPr/>
+          </p:nvSpPr>
+          <p:spPr>
+            <a:xfrm>
+              <a:off x="6552659" y="975047"/>
+              <a:ext cx="2909717" cy="2556718"/>
+            </a:xfrm>
+            <a:prstGeom prst="roundRect">
+              <a:avLst/>
+            </a:prstGeom>
+            <a:solidFill>
+              <a:schemeClr val="accent5">
+                <a:alpha val="21000"/>
+              </a:schemeClr>
+            </a:solidFill>
+            <a:ln>
+              <a:noFill/>
+            </a:ln>
+          </p:spPr>
+          <p:style>
+            <a:lnRef idx="0">
+              <a:scrgbClr r="0" g="0" b="0"/>
+            </a:lnRef>
+            <a:fillRef idx="0">
+              <a:scrgbClr r="0" g="0" b="0"/>
+            </a:fillRef>
+            <a:effectRef idx="0">
+              <a:scrgbClr r="0" g="0" b="0"/>
+            </a:effectRef>
+            <a:fontRef idx="minor">
+              <a:schemeClr val="lt1"/>
+            </a:fontRef>
+          </p:style>
+          <p:txBody>
+            <a:bodyPr rtlCol="0" anchor="ctr"/>
+            <a:lstStyle/>
+            <a:p>
+              <a:pPr algn="ctr"/>
+              <a:endParaRPr lang="pl-PL" dirty="0">
+                <a:latin typeface="Tahoma" panose="020B0604030504040204" pitchFamily="34" charset="0"/>
+                <a:ea typeface="Tahoma" panose="020B0604030504040204" pitchFamily="34" charset="0"/>
+                <a:cs typeface="Tahoma" panose="020B0604030504040204" pitchFamily="34" charset="0"/>
+              </a:endParaRPr>
+            </a:p>
+          </p:txBody>
+        </p:sp>
+        <p:pic>
+          <p:nvPicPr>
+            <p:cNvPr id="39" name="Grafika 38" descr="Baza danych">
+              <a:extLst>
+                <a:ext uri="{FF2B5EF4-FFF2-40B4-BE49-F238E27FC236}">
+                  <a16:creationId xmlns:a16="http://schemas.microsoft.com/office/drawing/2014/main" id="{AA92B100-8818-47AC-B16E-FDBE9D0AA99E}"/>
+                </a:ext>
+              </a:extLst>
+            </p:cNvPr>
+            <p:cNvPicPr>
+              <a:picLocks noChangeAspect="1"/>
+            </p:cNvPicPr>
+            <p:nvPr/>
+          </p:nvPicPr>
+          <p:blipFill>
+            <a:blip r:embed="rId12">
+              <a:extLst>
+                <a:ext uri="{28A0092B-C50C-407E-A947-70E740481C1C}">
+                  <a14:useLocalDpi xmlns:a14="http://schemas.microsoft.com/office/drawing/2010/main" val="0"/>
+                </a:ext>
+                <a:ext uri="{96DAC541-7B7A-43D3-8B79-37D633B846F1}">
+                  <asvg:svgBlip xmlns:asvg="http://schemas.microsoft.com/office/drawing/2016/SVG/main" r:embed="rId13"/>
+                </a:ext>
+              </a:extLst>
+            </a:blip>
+            <a:stretch>
+              <a:fillRect/>
+            </a:stretch>
+          </p:blipFill>
+          <p:spPr>
+            <a:xfrm>
+              <a:off x="7124983" y="1105073"/>
+              <a:ext cx="1765065" cy="1765065"/>
+            </a:xfrm>
+            <a:prstGeom prst="rect">
+              <a:avLst/>
+            </a:prstGeom>
+          </p:spPr>
+        </p:pic>
+        <p:sp>
+          <p:nvSpPr>
+            <p:cNvPr id="40" name="pole tekstowe 39">
+              <a:extLst>
+                <a:ext uri="{FF2B5EF4-FFF2-40B4-BE49-F238E27FC236}">
+                  <a16:creationId xmlns:a16="http://schemas.microsoft.com/office/drawing/2014/main" id="{226BAD45-D7E6-4AB0-83E3-D126C703946A}"/>
+                </a:ext>
+              </a:extLst>
+            </p:cNvPr>
+            <p:cNvSpPr txBox="1"/>
+            <p:nvPr/>
+          </p:nvSpPr>
+          <p:spPr>
+            <a:xfrm flipH="1">
+              <a:off x="6552657" y="2733877"/>
+              <a:ext cx="2909717" cy="505343"/>
+            </a:xfrm>
+            <a:prstGeom prst="rect">
+              <a:avLst/>
+            </a:prstGeom>
+            <a:noFill/>
+          </p:spPr>
+          <p:txBody>
+            <a:bodyPr wrap="square" rtlCol="0">
+              <a:spAutoFit/>
+            </a:bodyPr>
+            <a:lstStyle/>
+            <a:p>
+              <a:pPr algn="ctr"/>
+              <a:r>
+                <a:rPr lang="pl-PL" sz="1100" b="1" dirty="0">
+                  <a:latin typeface="Tahoma" panose="020B0604030504040204" pitchFamily="34" charset="0"/>
+                  <a:ea typeface="Tahoma" panose="020B0604030504040204" pitchFamily="34" charset="0"/>
+                  <a:cs typeface="Tahoma" panose="020B0604030504040204" pitchFamily="34" charset="0"/>
+                </a:rPr>
+                <a:t>DCPAM DATABASE</a:t>
+              </a:r>
+              <a:endParaRPr lang="pl-PL" sz="900" b="1" dirty="0">
+                <a:latin typeface="Tahoma" panose="020B0604030504040204" pitchFamily="34" charset="0"/>
+                <a:ea typeface="Tahoma" panose="020B0604030504040204" pitchFamily="34" charset="0"/>
+                <a:cs typeface="Tahoma" panose="020B0604030504040204" pitchFamily="34" charset="0"/>
+              </a:endParaRPr>
+            </a:p>
+          </p:txBody>
+        </p:sp>
+      </p:grpSp>
+      <p:cxnSp>
+        <p:nvCxnSpPr>
+          <p:cNvPr id="46" name="Łącznik: łamany 45">
+            <a:extLst>
+              <a:ext uri="{FF2B5EF4-FFF2-40B4-BE49-F238E27FC236}">
+                <a16:creationId xmlns:a16="http://schemas.microsoft.com/office/drawing/2014/main" id="{FCE69E34-3BBD-48B8-B8C7-D9732B718BDA}"/>
+              </a:ext>
+            </a:extLst>
+          </p:cNvPr>
+          <p:cNvCxnSpPr>
+            <a:stCxn id="26" idx="0"/>
+            <a:endCxn id="13" idx="2"/>
+          </p:cNvCxnSpPr>
+          <p:nvPr/>
+        </p:nvCxnSpPr>
+        <p:spPr>
+          <a:xfrm rot="16200000" flipV="1">
+            <a:off x="5890925" y="2924140"/>
+            <a:ext cx="272159" cy="2"/>
+          </a:xfrm>
+          <a:prstGeom prst="bentConnector3">
+            <a:avLst/>
+          </a:prstGeom>
+          <a:ln>
+            <a:tailEnd type="triangle"/>
+          </a:ln>
+        </p:spPr>
+        <p:style>
+          <a:lnRef idx="1">
+            <a:schemeClr val="accent1"/>
+          </a:lnRef>
+          <a:fillRef idx="0">
+            <a:schemeClr val="accent1"/>
+          </a:fillRef>
+          <a:effectRef idx="0">
+            <a:schemeClr val="accent1"/>
+          </a:effectRef>
+          <a:fontRef idx="minor">
+            <a:schemeClr val="tx1"/>
+          </a:fontRef>
+        </p:style>
+      </p:cxnSp>
+      <p:grpSp>
+        <p:nvGrpSpPr>
+          <p:cNvPr id="79" name="Grupa 78">
+            <a:extLst>
+              <a:ext uri="{FF2B5EF4-FFF2-40B4-BE49-F238E27FC236}">
+                <a16:creationId xmlns:a16="http://schemas.microsoft.com/office/drawing/2014/main" id="{3594B478-7E80-4BCA-90BE-A0A8EE34C3FE}"/>
+              </a:ext>
+            </a:extLst>
+          </p:cNvPr>
+          <p:cNvGrpSpPr/>
+          <p:nvPr/>
+        </p:nvGrpSpPr>
+        <p:grpSpPr>
+          <a:xfrm>
+            <a:off x="3990709" y="4839064"/>
+            <a:ext cx="1357032" cy="910526"/>
+            <a:chOff x="5254792" y="4655961"/>
+            <a:chExt cx="1357032" cy="910526"/>
+          </a:xfrm>
+        </p:grpSpPr>
+        <p:sp>
+          <p:nvSpPr>
+            <p:cNvPr id="50" name="Prostokąt: zaokrąglone rogi 49">
+              <a:extLst>
+                <a:ext uri="{FF2B5EF4-FFF2-40B4-BE49-F238E27FC236}">
+                  <a16:creationId xmlns:a16="http://schemas.microsoft.com/office/drawing/2014/main" id="{04C52617-21B1-4A34-989E-86E4672FDEA0}"/>
+                </a:ext>
+              </a:extLst>
+            </p:cNvPr>
+            <p:cNvSpPr/>
+            <p:nvPr/>
+          </p:nvSpPr>
+          <p:spPr>
+            <a:xfrm>
+              <a:off x="5254794" y="4655961"/>
+              <a:ext cx="1357030" cy="910526"/>
+            </a:xfrm>
+            <a:prstGeom prst="roundRect">
+              <a:avLst/>
+            </a:prstGeom>
+            <a:solidFill>
+              <a:schemeClr val="accent5">
+                <a:alpha val="21000"/>
+              </a:schemeClr>
+            </a:solidFill>
+            <a:ln>
+              <a:noFill/>
+            </a:ln>
+          </p:spPr>
+          <p:style>
+            <a:lnRef idx="0">
+              <a:scrgbClr r="0" g="0" b="0"/>
+            </a:lnRef>
+            <a:fillRef idx="0">
+              <a:scrgbClr r="0" g="0" b="0"/>
+            </a:fillRef>
+            <a:effectRef idx="0">
+              <a:scrgbClr r="0" g="0" b="0"/>
+            </a:effectRef>
+            <a:fontRef idx="minor">
+              <a:schemeClr val="lt1"/>
+            </a:fontRef>
+          </p:style>
+          <p:txBody>
+            <a:bodyPr rtlCol="0" anchor="ctr"/>
+            <a:lstStyle/>
+            <a:p>
+              <a:pPr algn="ctr"/>
+              <a:endParaRPr lang="pl-PL" dirty="0">
+                <a:latin typeface="Tahoma" panose="020B0604030504040204" pitchFamily="34" charset="0"/>
+                <a:ea typeface="Tahoma" panose="020B0604030504040204" pitchFamily="34" charset="0"/>
+                <a:cs typeface="Tahoma" panose="020B0604030504040204" pitchFamily="34" charset="0"/>
+              </a:endParaRPr>
+            </a:p>
+          </p:txBody>
+        </p:sp>
+        <p:pic>
+          <p:nvPicPr>
+            <p:cNvPr id="53" name="Grafika 52" descr="Serwer">
+              <a:extLst>
+                <a:ext uri="{FF2B5EF4-FFF2-40B4-BE49-F238E27FC236}">
+                  <a16:creationId xmlns:a16="http://schemas.microsoft.com/office/drawing/2014/main" id="{1B211EF5-23E9-40EF-B655-C6AD770E8B7C}"/>
+                </a:ext>
+              </a:extLst>
+            </p:cNvPr>
+            <p:cNvPicPr>
+              <a:picLocks noChangeAspect="1"/>
+            </p:cNvPicPr>
+            <p:nvPr/>
+          </p:nvPicPr>
+          <p:blipFill>
+            <a:blip r:embed="rId14">
+              <a:extLst>
+                <a:ext uri="{28A0092B-C50C-407E-A947-70E740481C1C}">
+                  <a14:useLocalDpi xmlns:a14="http://schemas.microsoft.com/office/drawing/2010/main" val="0"/>
+                </a:ext>
+                <a:ext uri="{96DAC541-7B7A-43D3-8B79-37D633B846F1}">
+                  <asvg:svgBlip xmlns:asvg="http://schemas.microsoft.com/office/drawing/2016/SVG/main" r:embed="rId15"/>
+                </a:ext>
+              </a:extLst>
+            </a:blip>
+            <a:stretch>
+              <a:fillRect/>
+            </a:stretch>
+          </p:blipFill>
+          <p:spPr>
+            <a:xfrm>
+              <a:off x="5624334" y="4655961"/>
+              <a:ext cx="628031" cy="630503"/>
+            </a:xfrm>
+            <a:prstGeom prst="rect">
+              <a:avLst/>
+            </a:prstGeom>
+          </p:spPr>
+        </p:pic>
+        <p:sp>
+          <p:nvSpPr>
+            <p:cNvPr id="54" name="pole tekstowe 53">
+              <a:extLst>
+                <a:ext uri="{FF2B5EF4-FFF2-40B4-BE49-F238E27FC236}">
+                  <a16:creationId xmlns:a16="http://schemas.microsoft.com/office/drawing/2014/main" id="{5719B0AF-C3A4-47C0-8F31-40715F1BCA22}"/>
+                </a:ext>
+              </a:extLst>
+            </p:cNvPr>
+            <p:cNvSpPr txBox="1"/>
+            <p:nvPr/>
+          </p:nvSpPr>
+          <p:spPr>
+            <a:xfrm flipH="1">
+              <a:off x="5254792" y="5286464"/>
+              <a:ext cx="1357030" cy="261610"/>
+            </a:xfrm>
+            <a:prstGeom prst="rect">
+              <a:avLst/>
+            </a:prstGeom>
+            <a:noFill/>
+          </p:spPr>
+          <p:txBody>
+            <a:bodyPr wrap="square" rtlCol="0">
+              <a:spAutoFit/>
+            </a:bodyPr>
+            <a:lstStyle/>
+            <a:p>
+              <a:pPr algn="ctr"/>
+              <a:r>
+                <a:rPr lang="pl-PL" sz="1100" b="1" dirty="0">
+                  <a:latin typeface="Tahoma" panose="020B0604030504040204" pitchFamily="34" charset="0"/>
+                  <a:ea typeface="Tahoma" panose="020B0604030504040204" pitchFamily="34" charset="0"/>
+                  <a:cs typeface="Tahoma" panose="020B0604030504040204" pitchFamily="34" charset="0"/>
+                </a:rPr>
+                <a:t>DCPAM ETL</a:t>
+              </a:r>
+              <a:endParaRPr lang="pl-PL" sz="900" b="1" dirty="0">
+                <a:latin typeface="Tahoma" panose="020B0604030504040204" pitchFamily="34" charset="0"/>
+                <a:ea typeface="Tahoma" panose="020B0604030504040204" pitchFamily="34" charset="0"/>
+                <a:cs typeface="Tahoma" panose="020B0604030504040204" pitchFamily="34" charset="0"/>
+              </a:endParaRPr>
+            </a:p>
+          </p:txBody>
+        </p:sp>
+      </p:grpSp>
+      <p:grpSp>
+        <p:nvGrpSpPr>
+          <p:cNvPr id="80" name="Grupa 79">
+            <a:extLst>
+              <a:ext uri="{FF2B5EF4-FFF2-40B4-BE49-F238E27FC236}">
+                <a16:creationId xmlns:a16="http://schemas.microsoft.com/office/drawing/2014/main" id="{5D2FA3DB-C0B0-4B64-900A-5157D97A0940}"/>
+              </a:ext>
+            </a:extLst>
+          </p:cNvPr>
+          <p:cNvGrpSpPr/>
+          <p:nvPr/>
+        </p:nvGrpSpPr>
+        <p:grpSpPr>
+          <a:xfrm>
+            <a:off x="7258937" y="4833550"/>
+            <a:ext cx="1357032" cy="910526"/>
+            <a:chOff x="5254792" y="4655961"/>
+            <a:chExt cx="1357032" cy="910526"/>
+          </a:xfrm>
+        </p:grpSpPr>
+        <p:sp>
+          <p:nvSpPr>
+            <p:cNvPr id="81" name="Prostokąt: zaokrąglone rogi 80">
+              <a:extLst>
+                <a:ext uri="{FF2B5EF4-FFF2-40B4-BE49-F238E27FC236}">
+                  <a16:creationId xmlns:a16="http://schemas.microsoft.com/office/drawing/2014/main" id="{E92833BF-C4A4-4972-8743-53D724582780}"/>
+                </a:ext>
+              </a:extLst>
+            </p:cNvPr>
+            <p:cNvSpPr/>
+            <p:nvPr/>
+          </p:nvSpPr>
+          <p:spPr>
+            <a:xfrm>
+              <a:off x="5254794" y="4655961"/>
+              <a:ext cx="1357030" cy="910526"/>
+            </a:xfrm>
+            <a:prstGeom prst="roundRect">
+              <a:avLst/>
+            </a:prstGeom>
+            <a:solidFill>
+              <a:schemeClr val="accent5">
+                <a:alpha val="21000"/>
+              </a:schemeClr>
+            </a:solidFill>
+            <a:ln>
+              <a:noFill/>
+            </a:ln>
+          </p:spPr>
+          <p:style>
+            <a:lnRef idx="0">
+              <a:scrgbClr r="0" g="0" b="0"/>
+            </a:lnRef>
+            <a:fillRef idx="0">
+              <a:scrgbClr r="0" g="0" b="0"/>
+            </a:fillRef>
+            <a:effectRef idx="0">
+              <a:scrgbClr r="0" g="0" b="0"/>
+            </a:effectRef>
+            <a:fontRef idx="minor">
+              <a:schemeClr val="lt1"/>
+            </a:fontRef>
+          </p:style>
+          <p:txBody>
+            <a:bodyPr rtlCol="0" anchor="ctr"/>
+            <a:lstStyle/>
+            <a:p>
+              <a:pPr algn="ctr"/>
+              <a:endParaRPr lang="pl-PL" dirty="0">
+                <a:latin typeface="Tahoma" panose="020B0604030504040204" pitchFamily="34" charset="0"/>
+                <a:ea typeface="Tahoma" panose="020B0604030504040204" pitchFamily="34" charset="0"/>
+                <a:cs typeface="Tahoma" panose="020B0604030504040204" pitchFamily="34" charset="0"/>
+              </a:endParaRPr>
+            </a:p>
+          </p:txBody>
+        </p:sp>
+        <p:pic>
+          <p:nvPicPr>
+            <p:cNvPr id="82" name="Grafika 81" descr="Serwer">
+              <a:extLst>
+                <a:ext uri="{FF2B5EF4-FFF2-40B4-BE49-F238E27FC236}">
+                  <a16:creationId xmlns:a16="http://schemas.microsoft.com/office/drawing/2014/main" id="{1F273ADE-78E2-425C-81C0-C410F3802C56}"/>
+                </a:ext>
+              </a:extLst>
+            </p:cNvPr>
+            <p:cNvPicPr>
+              <a:picLocks noChangeAspect="1"/>
+            </p:cNvPicPr>
+            <p:nvPr/>
+          </p:nvPicPr>
+          <p:blipFill>
+            <a:blip r:embed="rId14">
+              <a:extLst>
+                <a:ext uri="{28A0092B-C50C-407E-A947-70E740481C1C}">
+                  <a14:useLocalDpi xmlns:a14="http://schemas.microsoft.com/office/drawing/2010/main" val="0"/>
+                </a:ext>
+                <a:ext uri="{96DAC541-7B7A-43D3-8B79-37D633B846F1}">
+                  <asvg:svgBlip xmlns:asvg="http://schemas.microsoft.com/office/drawing/2016/SVG/main" r:embed="rId15"/>
+                </a:ext>
+              </a:extLst>
+            </a:blip>
+            <a:stretch>
+              <a:fillRect/>
+            </a:stretch>
+          </p:blipFill>
+          <p:spPr>
+            <a:xfrm>
+              <a:off x="5624334" y="4655961"/>
+              <a:ext cx="628031" cy="630503"/>
+            </a:xfrm>
+            <a:prstGeom prst="rect">
+              <a:avLst/>
+            </a:prstGeom>
+          </p:spPr>
+        </p:pic>
+        <p:sp>
+          <p:nvSpPr>
+            <p:cNvPr id="83" name="pole tekstowe 82">
+              <a:extLst>
+                <a:ext uri="{FF2B5EF4-FFF2-40B4-BE49-F238E27FC236}">
+                  <a16:creationId xmlns:a16="http://schemas.microsoft.com/office/drawing/2014/main" id="{4B8CABCC-3A26-41A1-A2DD-2968D151F6B7}"/>
+                </a:ext>
+              </a:extLst>
+            </p:cNvPr>
+            <p:cNvSpPr txBox="1"/>
+            <p:nvPr/>
+          </p:nvSpPr>
+          <p:spPr>
+            <a:xfrm flipH="1">
+              <a:off x="5254792" y="5286464"/>
+              <a:ext cx="1357030" cy="261610"/>
+            </a:xfrm>
+            <a:prstGeom prst="rect">
+              <a:avLst/>
+            </a:prstGeom>
+            <a:noFill/>
+          </p:spPr>
+          <p:txBody>
+            <a:bodyPr wrap="square" rtlCol="0">
+              <a:spAutoFit/>
+            </a:bodyPr>
+            <a:lstStyle/>
+            <a:p>
+              <a:pPr algn="ctr"/>
+              <a:r>
+                <a:rPr lang="pl-PL" sz="1100" b="1" dirty="0">
+                  <a:latin typeface="Tahoma" panose="020B0604030504040204" pitchFamily="34" charset="0"/>
+                  <a:ea typeface="Tahoma" panose="020B0604030504040204" pitchFamily="34" charset="0"/>
+                  <a:cs typeface="Tahoma" panose="020B0604030504040204" pitchFamily="34" charset="0"/>
+                </a:rPr>
+                <a:t>DCPAM ETL</a:t>
+              </a:r>
+              <a:endParaRPr lang="pl-PL" sz="900" b="1" dirty="0">
+                <a:latin typeface="Tahoma" panose="020B0604030504040204" pitchFamily="34" charset="0"/>
+                <a:ea typeface="Tahoma" panose="020B0604030504040204" pitchFamily="34" charset="0"/>
+                <a:cs typeface="Tahoma" panose="020B0604030504040204" pitchFamily="34" charset="0"/>
+              </a:endParaRPr>
+            </a:p>
+          </p:txBody>
+        </p:sp>
+      </p:grpSp>
+      <p:grpSp>
+        <p:nvGrpSpPr>
+          <p:cNvPr id="84" name="Grupa 83">
+            <a:extLst>
+              <a:ext uri="{FF2B5EF4-FFF2-40B4-BE49-F238E27FC236}">
+                <a16:creationId xmlns:a16="http://schemas.microsoft.com/office/drawing/2014/main" id="{CEBC0165-3A49-49D3-8590-B0553BEB9935}"/>
+              </a:ext>
+            </a:extLst>
+          </p:cNvPr>
+          <p:cNvGrpSpPr/>
+          <p:nvPr/>
+        </p:nvGrpSpPr>
+        <p:grpSpPr>
+          <a:xfrm>
+            <a:off x="2313546" y="4839064"/>
+            <a:ext cx="1357032" cy="910526"/>
+            <a:chOff x="5254792" y="4655961"/>
+            <a:chExt cx="1357032" cy="910526"/>
+          </a:xfrm>
+        </p:grpSpPr>
+        <p:sp>
+          <p:nvSpPr>
+            <p:cNvPr id="85" name="Prostokąt: zaokrąglone rogi 84">
+              <a:extLst>
+                <a:ext uri="{FF2B5EF4-FFF2-40B4-BE49-F238E27FC236}">
+                  <a16:creationId xmlns:a16="http://schemas.microsoft.com/office/drawing/2014/main" id="{E82CDAAD-97DD-401F-AB0C-4E3A0B13F199}"/>
+                </a:ext>
+              </a:extLst>
+            </p:cNvPr>
+            <p:cNvSpPr/>
+            <p:nvPr/>
+          </p:nvSpPr>
+          <p:spPr>
+            <a:xfrm>
+              <a:off x="5254794" y="4655961"/>
+              <a:ext cx="1357030" cy="910526"/>
+            </a:xfrm>
+            <a:prstGeom prst="roundRect">
+              <a:avLst/>
+            </a:prstGeom>
+            <a:solidFill>
+              <a:schemeClr val="accent5">
+                <a:alpha val="21000"/>
+              </a:schemeClr>
+            </a:solidFill>
+            <a:ln>
+              <a:noFill/>
+            </a:ln>
+          </p:spPr>
+          <p:style>
+            <a:lnRef idx="0">
+              <a:scrgbClr r="0" g="0" b="0"/>
+            </a:lnRef>
+            <a:fillRef idx="0">
+              <a:scrgbClr r="0" g="0" b="0"/>
+            </a:fillRef>
+            <a:effectRef idx="0">
+              <a:scrgbClr r="0" g="0" b="0"/>
+            </a:effectRef>
+            <a:fontRef idx="minor">
+              <a:schemeClr val="lt1"/>
+            </a:fontRef>
+          </p:style>
+          <p:txBody>
+            <a:bodyPr rtlCol="0" anchor="ctr"/>
+            <a:lstStyle/>
+            <a:p>
+              <a:pPr algn="ctr"/>
+              <a:endParaRPr lang="pl-PL" dirty="0">
+                <a:latin typeface="Tahoma" panose="020B0604030504040204" pitchFamily="34" charset="0"/>
+                <a:ea typeface="Tahoma" panose="020B0604030504040204" pitchFamily="34" charset="0"/>
+                <a:cs typeface="Tahoma" panose="020B0604030504040204" pitchFamily="34" charset="0"/>
+              </a:endParaRPr>
+            </a:p>
+          </p:txBody>
+        </p:sp>
+        <p:pic>
+          <p:nvPicPr>
+            <p:cNvPr id="86" name="Grafika 85" descr="Serwer">
+              <a:extLst>
+                <a:ext uri="{FF2B5EF4-FFF2-40B4-BE49-F238E27FC236}">
+                  <a16:creationId xmlns:a16="http://schemas.microsoft.com/office/drawing/2014/main" id="{1976A1DB-52BD-4B52-89C6-0C3874F81C6D}"/>
+                </a:ext>
+              </a:extLst>
+            </p:cNvPr>
+            <p:cNvPicPr>
+              <a:picLocks noChangeAspect="1"/>
+            </p:cNvPicPr>
+            <p:nvPr/>
+          </p:nvPicPr>
+          <p:blipFill>
+            <a:blip r:embed="rId14">
+              <a:extLst>
+                <a:ext uri="{28A0092B-C50C-407E-A947-70E740481C1C}">
+                  <a14:useLocalDpi xmlns:a14="http://schemas.microsoft.com/office/drawing/2010/main" val="0"/>
+                </a:ext>
+                <a:ext uri="{96DAC541-7B7A-43D3-8B79-37D633B846F1}">
+                  <asvg:svgBlip xmlns:asvg="http://schemas.microsoft.com/office/drawing/2016/SVG/main" r:embed="rId15"/>
+                </a:ext>
+              </a:extLst>
+            </a:blip>
+            <a:stretch>
+              <a:fillRect/>
+            </a:stretch>
+          </p:blipFill>
+          <p:spPr>
+            <a:xfrm>
+              <a:off x="5624334" y="4655961"/>
+              <a:ext cx="628031" cy="630503"/>
+            </a:xfrm>
+            <a:prstGeom prst="rect">
+              <a:avLst/>
+            </a:prstGeom>
+          </p:spPr>
+        </p:pic>
+        <p:sp>
+          <p:nvSpPr>
+            <p:cNvPr id="87" name="pole tekstowe 86">
+              <a:extLst>
+                <a:ext uri="{FF2B5EF4-FFF2-40B4-BE49-F238E27FC236}">
+                  <a16:creationId xmlns:a16="http://schemas.microsoft.com/office/drawing/2014/main" id="{5E8F5F3B-5415-42CE-8FBC-C7A5F939EE72}"/>
+                </a:ext>
+              </a:extLst>
+            </p:cNvPr>
+            <p:cNvSpPr txBox="1"/>
+            <p:nvPr/>
+          </p:nvSpPr>
+          <p:spPr>
+            <a:xfrm flipH="1">
+              <a:off x="5254792" y="5286464"/>
+              <a:ext cx="1357030" cy="261610"/>
+            </a:xfrm>
+            <a:prstGeom prst="rect">
+              <a:avLst/>
+            </a:prstGeom>
+            <a:noFill/>
+          </p:spPr>
+          <p:txBody>
+            <a:bodyPr wrap="square" rtlCol="0">
+              <a:spAutoFit/>
+            </a:bodyPr>
+            <a:lstStyle/>
+            <a:p>
+              <a:pPr algn="ctr"/>
+              <a:r>
+                <a:rPr lang="pl-PL" sz="1100" b="1" dirty="0">
+                  <a:latin typeface="Tahoma" panose="020B0604030504040204" pitchFamily="34" charset="0"/>
+                  <a:ea typeface="Tahoma" panose="020B0604030504040204" pitchFamily="34" charset="0"/>
+                  <a:cs typeface="Tahoma" panose="020B0604030504040204" pitchFamily="34" charset="0"/>
+                </a:rPr>
+                <a:t>DCPAM ETL</a:t>
+              </a:r>
+              <a:endParaRPr lang="pl-PL" sz="900" b="1" dirty="0">
+                <a:latin typeface="Tahoma" panose="020B0604030504040204" pitchFamily="34" charset="0"/>
+                <a:ea typeface="Tahoma" panose="020B0604030504040204" pitchFamily="34" charset="0"/>
+                <a:cs typeface="Tahoma" panose="020B0604030504040204" pitchFamily="34" charset="0"/>
+              </a:endParaRPr>
+            </a:p>
+          </p:txBody>
+        </p:sp>
+      </p:grpSp>
+      <p:cxnSp>
+        <p:nvCxnSpPr>
+          <p:cNvPr id="89" name="Łącznik: łamany 88">
+            <a:extLst>
+              <a:ext uri="{FF2B5EF4-FFF2-40B4-BE49-F238E27FC236}">
+                <a16:creationId xmlns:a16="http://schemas.microsoft.com/office/drawing/2014/main" id="{92FDA903-B71B-4AAA-BC44-22810DD37461}"/>
+              </a:ext>
+            </a:extLst>
+          </p:cNvPr>
+          <p:cNvCxnSpPr>
+            <a:stCxn id="85" idx="1"/>
+            <a:endCxn id="34" idx="1"/>
+          </p:cNvCxnSpPr>
+          <p:nvPr/>
+        </p:nvCxnSpPr>
+        <p:spPr>
+          <a:xfrm rot="10800000" flipH="1">
+            <a:off x="2313547" y="3722011"/>
+            <a:ext cx="1093045" cy="1572316"/>
+          </a:xfrm>
+          <a:prstGeom prst="bentConnector3">
+            <a:avLst>
+              <a:gd name="adj1" fmla="val -20914"/>
+            </a:avLst>
+          </a:prstGeom>
+          <a:ln>
+            <a:tailEnd type="triangle"/>
+          </a:ln>
+        </p:spPr>
+        <p:style>
+          <a:lnRef idx="1">
+            <a:schemeClr val="accent1"/>
+          </a:lnRef>
+          <a:fillRef idx="0">
+            <a:schemeClr val="accent1"/>
+          </a:fillRef>
+          <a:effectRef idx="0">
+            <a:schemeClr val="accent1"/>
+          </a:effectRef>
+          <a:fontRef idx="minor">
+            <a:schemeClr val="tx1"/>
+          </a:fontRef>
+        </p:style>
+      </p:cxnSp>
+      <p:cxnSp>
+        <p:nvCxnSpPr>
+          <p:cNvPr id="91" name="Łącznik: łamany 90">
+            <a:extLst>
+              <a:ext uri="{FF2B5EF4-FFF2-40B4-BE49-F238E27FC236}">
+                <a16:creationId xmlns:a16="http://schemas.microsoft.com/office/drawing/2014/main" id="{1B240483-23B2-4007-B776-4C8C3149BF48}"/>
+              </a:ext>
+            </a:extLst>
+          </p:cNvPr>
+          <p:cNvCxnSpPr>
+            <a:stCxn id="86" idx="0"/>
+            <a:endCxn id="26" idx="2"/>
+          </p:cNvCxnSpPr>
+          <p:nvPr/>
+        </p:nvCxnSpPr>
+        <p:spPr>
+          <a:xfrm rot="5400000" flipH="1" flipV="1">
+            <a:off x="4284423" y="3096483"/>
+            <a:ext cx="455262" cy="3029901"/>
+          </a:xfrm>
+          <a:prstGeom prst="bentConnector3">
+            <a:avLst/>
+          </a:prstGeom>
+          <a:ln>
+            <a:tailEnd type="triangle"/>
+          </a:ln>
+        </p:spPr>
+        <p:style>
+          <a:lnRef idx="1">
+            <a:schemeClr val="accent1"/>
+          </a:lnRef>
+          <a:fillRef idx="0">
+            <a:schemeClr val="accent1"/>
+          </a:fillRef>
+          <a:effectRef idx="0">
+            <a:schemeClr val="accent1"/>
+          </a:effectRef>
+          <a:fontRef idx="minor">
+            <a:schemeClr val="tx1"/>
+          </a:fontRef>
+        </p:style>
+      </p:cxnSp>
+      <p:cxnSp>
+        <p:nvCxnSpPr>
+          <p:cNvPr id="93" name="Łącznik: łamany 92">
+            <a:extLst>
+              <a:ext uri="{FF2B5EF4-FFF2-40B4-BE49-F238E27FC236}">
+                <a16:creationId xmlns:a16="http://schemas.microsoft.com/office/drawing/2014/main" id="{4343BC93-B51B-4DFA-8C40-5B0E211449A6}"/>
+              </a:ext>
+            </a:extLst>
+          </p:cNvPr>
+          <p:cNvCxnSpPr>
+            <a:stCxn id="53" idx="0"/>
+            <a:endCxn id="26" idx="2"/>
+          </p:cNvCxnSpPr>
+          <p:nvPr/>
+        </p:nvCxnSpPr>
+        <p:spPr>
+          <a:xfrm rot="5400000" flipH="1" flipV="1">
+            <a:off x="5123005" y="3935064"/>
+            <a:ext cx="455262" cy="1352738"/>
+          </a:xfrm>
+          <a:prstGeom prst="bentConnector3">
+            <a:avLst/>
+          </a:prstGeom>
+          <a:ln>
+            <a:tailEnd type="triangle"/>
+          </a:ln>
+        </p:spPr>
+        <p:style>
+          <a:lnRef idx="1">
+            <a:schemeClr val="accent1"/>
+          </a:lnRef>
+          <a:fillRef idx="0">
+            <a:schemeClr val="accent1"/>
+          </a:fillRef>
+          <a:effectRef idx="0">
+            <a:schemeClr val="accent1"/>
+          </a:effectRef>
+          <a:fontRef idx="minor">
+            <a:schemeClr val="tx1"/>
+          </a:fontRef>
+        </p:style>
+      </p:cxnSp>
+      <p:cxnSp>
+        <p:nvCxnSpPr>
+          <p:cNvPr id="95" name="Łącznik: łamany 94">
+            <a:extLst>
+              <a:ext uri="{FF2B5EF4-FFF2-40B4-BE49-F238E27FC236}">
+                <a16:creationId xmlns:a16="http://schemas.microsoft.com/office/drawing/2014/main" id="{957027DA-5C2A-4EEB-A9DE-72FC50B42FD0}"/>
+              </a:ext>
+            </a:extLst>
+          </p:cNvPr>
+          <p:cNvCxnSpPr>
+            <a:cxnSpLocks/>
+            <a:stCxn id="81" idx="3"/>
+            <a:endCxn id="113" idx="1"/>
+          </p:cNvCxnSpPr>
+          <p:nvPr/>
+        </p:nvCxnSpPr>
+        <p:spPr>
+          <a:xfrm flipV="1">
+            <a:off x="8615969" y="5286997"/>
+            <a:ext cx="245585" cy="1816"/>
+          </a:xfrm>
+          <a:prstGeom prst="bentConnector3">
+            <a:avLst>
+              <a:gd name="adj1" fmla="val 50000"/>
+            </a:avLst>
+          </a:prstGeom>
+          <a:ln>
+            <a:tailEnd type="triangle"/>
+          </a:ln>
+        </p:spPr>
+        <p:style>
+          <a:lnRef idx="1">
+            <a:schemeClr val="accent1"/>
+          </a:lnRef>
+          <a:fillRef idx="0">
+            <a:schemeClr val="accent1"/>
+          </a:fillRef>
+          <a:effectRef idx="0">
+            <a:schemeClr val="accent1"/>
+          </a:effectRef>
+          <a:fontRef idx="minor">
+            <a:schemeClr val="tx1"/>
+          </a:fontRef>
+        </p:style>
+      </p:cxnSp>
+      <p:grpSp>
+        <p:nvGrpSpPr>
+          <p:cNvPr id="116" name="Grupa 115">
+            <a:extLst>
+              <a:ext uri="{FF2B5EF4-FFF2-40B4-BE49-F238E27FC236}">
+                <a16:creationId xmlns:a16="http://schemas.microsoft.com/office/drawing/2014/main" id="{099FD916-E3A4-4872-88FC-5D7CCA681F53}"/>
+              </a:ext>
+            </a:extLst>
+          </p:cNvPr>
+          <p:cNvGrpSpPr/>
+          <p:nvPr/>
+        </p:nvGrpSpPr>
+        <p:grpSpPr>
+          <a:xfrm>
+            <a:off x="8861552" y="4831734"/>
+            <a:ext cx="1357032" cy="910526"/>
+            <a:chOff x="9336398" y="4481713"/>
+            <a:chExt cx="1357032" cy="910526"/>
+          </a:xfrm>
+        </p:grpSpPr>
+        <p:sp>
+          <p:nvSpPr>
+            <p:cNvPr id="113" name="Prostokąt: zaokrąglone rogi 112">
+              <a:extLst>
+                <a:ext uri="{FF2B5EF4-FFF2-40B4-BE49-F238E27FC236}">
+                  <a16:creationId xmlns:a16="http://schemas.microsoft.com/office/drawing/2014/main" id="{2274DE16-01CF-44C8-8BBD-0E030EA40651}"/>
+                </a:ext>
+              </a:extLst>
+            </p:cNvPr>
+            <p:cNvSpPr/>
+            <p:nvPr/>
+          </p:nvSpPr>
+          <p:spPr>
+            <a:xfrm>
+              <a:off x="9336400" y="4481713"/>
+              <a:ext cx="1357030" cy="910526"/>
+            </a:xfrm>
+            <a:prstGeom prst="roundRect">
+              <a:avLst/>
+            </a:prstGeom>
+            <a:solidFill>
+              <a:schemeClr val="accent5">
+                <a:alpha val="21000"/>
+              </a:schemeClr>
+            </a:solidFill>
+            <a:ln>
+              <a:noFill/>
+            </a:ln>
+          </p:spPr>
+          <p:style>
+            <a:lnRef idx="0">
+              <a:scrgbClr r="0" g="0" b="0"/>
+            </a:lnRef>
+            <a:fillRef idx="0">
+              <a:scrgbClr r="0" g="0" b="0"/>
+            </a:fillRef>
+            <a:effectRef idx="0">
+              <a:scrgbClr r="0" g="0" b="0"/>
+            </a:effectRef>
+            <a:fontRef idx="minor">
+              <a:schemeClr val="lt1"/>
+            </a:fontRef>
+          </p:style>
+          <p:txBody>
+            <a:bodyPr rtlCol="0" anchor="ctr"/>
+            <a:lstStyle/>
+            <a:p>
+              <a:pPr algn="ctr"/>
+              <a:endParaRPr lang="pl-PL" dirty="0">
+                <a:latin typeface="Tahoma" panose="020B0604030504040204" pitchFamily="34" charset="0"/>
+                <a:ea typeface="Tahoma" panose="020B0604030504040204" pitchFamily="34" charset="0"/>
+                <a:cs typeface="Tahoma" panose="020B0604030504040204" pitchFamily="34" charset="0"/>
+              </a:endParaRPr>
+            </a:p>
+          </p:txBody>
+        </p:sp>
+        <p:pic>
+          <p:nvPicPr>
+            <p:cNvPr id="114" name="Grafika 113" descr="Serwer">
+              <a:extLst>
+                <a:ext uri="{FF2B5EF4-FFF2-40B4-BE49-F238E27FC236}">
+                  <a16:creationId xmlns:a16="http://schemas.microsoft.com/office/drawing/2014/main" id="{1F0EBC34-B06C-41FA-BFA0-00A258CF9F33}"/>
+                </a:ext>
+              </a:extLst>
+            </p:cNvPr>
+            <p:cNvPicPr>
+              <a:picLocks noChangeAspect="1"/>
+            </p:cNvPicPr>
+            <p:nvPr/>
+          </p:nvPicPr>
+          <p:blipFill>
+            <a:blip r:embed="rId16">
+              <a:extLst>
+                <a:ext uri="{28A0092B-C50C-407E-A947-70E740481C1C}">
+                  <a14:useLocalDpi xmlns:a14="http://schemas.microsoft.com/office/drawing/2010/main" val="0"/>
+                </a:ext>
+                <a:ext uri="{96DAC541-7B7A-43D3-8B79-37D633B846F1}">
+                  <asvg:svgBlip xmlns:asvg="http://schemas.microsoft.com/office/drawing/2016/SVG/main" r:embed="rId17"/>
+                </a:ext>
+              </a:extLst>
+            </a:blip>
+            <a:stretch>
+              <a:fillRect/>
+            </a:stretch>
+          </p:blipFill>
+          <p:spPr>
+            <a:xfrm>
+              <a:off x="9705940" y="4481713"/>
+              <a:ext cx="628031" cy="630503"/>
+            </a:xfrm>
+            <a:prstGeom prst="rect">
+              <a:avLst/>
+            </a:prstGeom>
+          </p:spPr>
+        </p:pic>
+        <p:sp>
+          <p:nvSpPr>
+            <p:cNvPr id="115" name="pole tekstowe 114">
+              <a:extLst>
+                <a:ext uri="{FF2B5EF4-FFF2-40B4-BE49-F238E27FC236}">
+                  <a16:creationId xmlns:a16="http://schemas.microsoft.com/office/drawing/2014/main" id="{710B3E36-FE64-46AB-80D3-D6ABB7F1966A}"/>
+                </a:ext>
+              </a:extLst>
+            </p:cNvPr>
+            <p:cNvSpPr txBox="1"/>
+            <p:nvPr/>
+          </p:nvSpPr>
+          <p:spPr>
+            <a:xfrm flipH="1">
+              <a:off x="9336398" y="5112216"/>
+              <a:ext cx="1357030" cy="261610"/>
+            </a:xfrm>
+            <a:prstGeom prst="rect">
+              <a:avLst/>
+            </a:prstGeom>
+            <a:noFill/>
+          </p:spPr>
+          <p:txBody>
+            <a:bodyPr wrap="square" rtlCol="0">
+              <a:spAutoFit/>
+            </a:bodyPr>
+            <a:lstStyle/>
+            <a:p>
+              <a:pPr algn="ctr"/>
+              <a:r>
+                <a:rPr lang="pl-PL" sz="1100" b="1" dirty="0">
+                  <a:latin typeface="Tahoma" panose="020B0604030504040204" pitchFamily="34" charset="0"/>
+                  <a:ea typeface="Tahoma" panose="020B0604030504040204" pitchFamily="34" charset="0"/>
+                  <a:cs typeface="Tahoma" panose="020B0604030504040204" pitchFamily="34" charset="0"/>
+                </a:rPr>
+                <a:t>DCPAM RDP</a:t>
+              </a:r>
+              <a:endParaRPr lang="pl-PL" sz="900" b="1" dirty="0">
+                <a:latin typeface="Tahoma" panose="020B0604030504040204" pitchFamily="34" charset="0"/>
+                <a:ea typeface="Tahoma" panose="020B0604030504040204" pitchFamily="34" charset="0"/>
+                <a:cs typeface="Tahoma" panose="020B0604030504040204" pitchFamily="34" charset="0"/>
+              </a:endParaRPr>
+            </a:p>
+          </p:txBody>
+        </p:sp>
+      </p:grpSp>
+      <p:cxnSp>
+        <p:nvCxnSpPr>
+          <p:cNvPr id="120" name="Łącznik: łamany 119">
+            <a:extLst>
+              <a:ext uri="{FF2B5EF4-FFF2-40B4-BE49-F238E27FC236}">
+                <a16:creationId xmlns:a16="http://schemas.microsoft.com/office/drawing/2014/main" id="{F8B6B1EF-AE0A-4E8E-8E9D-326BBD87A04F}"/>
+              </a:ext>
+            </a:extLst>
+          </p:cNvPr>
+          <p:cNvCxnSpPr>
+            <a:stCxn id="113" idx="3"/>
+            <a:endCxn id="38" idx="3"/>
+          </p:cNvCxnSpPr>
+          <p:nvPr/>
+        </p:nvCxnSpPr>
+        <p:spPr>
+          <a:xfrm flipH="1" flipV="1">
+            <a:off x="8647413" y="3722011"/>
+            <a:ext cx="1571171" cy="1564986"/>
+          </a:xfrm>
+          <a:prstGeom prst="bentConnector3">
+            <a:avLst>
+              <a:gd name="adj1" fmla="val -14550"/>
+            </a:avLst>
+          </a:prstGeom>
+          <a:ln>
+            <a:tailEnd type="triangle"/>
+          </a:ln>
+        </p:spPr>
+        <p:style>
+          <a:lnRef idx="1">
+            <a:schemeClr val="accent1"/>
+          </a:lnRef>
+          <a:fillRef idx="0">
+            <a:schemeClr val="accent1"/>
+          </a:fillRef>
+          <a:effectRef idx="0">
+            <a:schemeClr val="accent1"/>
+          </a:effectRef>
+          <a:fontRef idx="minor">
+            <a:schemeClr val="tx1"/>
+          </a:fontRef>
+        </p:style>
+      </p:cxnSp>
+      <p:grpSp>
+        <p:nvGrpSpPr>
+          <p:cNvPr id="121" name="Grupa 120">
+            <a:extLst>
+              <a:ext uri="{FF2B5EF4-FFF2-40B4-BE49-F238E27FC236}">
+                <a16:creationId xmlns:a16="http://schemas.microsoft.com/office/drawing/2014/main" id="{571C6067-239E-4CDF-86FE-5D51C1B7AE35}"/>
+              </a:ext>
+            </a:extLst>
+          </p:cNvPr>
+          <p:cNvGrpSpPr/>
+          <p:nvPr/>
+        </p:nvGrpSpPr>
+        <p:grpSpPr>
+          <a:xfrm>
+            <a:off x="5608350" y="4836307"/>
+            <a:ext cx="1357032" cy="910526"/>
+            <a:chOff x="9336398" y="4481713"/>
+            <a:chExt cx="1357032" cy="910526"/>
+          </a:xfrm>
+        </p:grpSpPr>
+        <p:sp>
+          <p:nvSpPr>
+            <p:cNvPr id="122" name="Prostokąt: zaokrąglone rogi 121">
+              <a:extLst>
+                <a:ext uri="{FF2B5EF4-FFF2-40B4-BE49-F238E27FC236}">
+                  <a16:creationId xmlns:a16="http://schemas.microsoft.com/office/drawing/2014/main" id="{06DBF46F-CB5B-4484-ADA5-ED9D0A432F35}"/>
+                </a:ext>
+              </a:extLst>
+            </p:cNvPr>
+            <p:cNvSpPr/>
+            <p:nvPr/>
+          </p:nvSpPr>
+          <p:spPr>
+            <a:xfrm>
+              <a:off x="9336400" y="4481713"/>
+              <a:ext cx="1357030" cy="910526"/>
+            </a:xfrm>
+            <a:prstGeom prst="roundRect">
+              <a:avLst/>
+            </a:prstGeom>
+            <a:solidFill>
+              <a:schemeClr val="accent5">
+                <a:alpha val="21000"/>
+              </a:schemeClr>
+            </a:solidFill>
+            <a:ln>
+              <a:noFill/>
+            </a:ln>
+          </p:spPr>
+          <p:style>
+            <a:lnRef idx="0">
+              <a:scrgbClr r="0" g="0" b="0"/>
+            </a:lnRef>
+            <a:fillRef idx="0">
+              <a:scrgbClr r="0" g="0" b="0"/>
+            </a:fillRef>
+            <a:effectRef idx="0">
+              <a:scrgbClr r="0" g="0" b="0"/>
+            </a:effectRef>
+            <a:fontRef idx="minor">
+              <a:schemeClr val="lt1"/>
+            </a:fontRef>
+          </p:style>
+          <p:txBody>
+            <a:bodyPr rtlCol="0" anchor="ctr"/>
+            <a:lstStyle/>
+            <a:p>
+              <a:pPr algn="ctr"/>
+              <a:endParaRPr lang="pl-PL" dirty="0">
+                <a:latin typeface="Tahoma" panose="020B0604030504040204" pitchFamily="34" charset="0"/>
+                <a:ea typeface="Tahoma" panose="020B0604030504040204" pitchFamily="34" charset="0"/>
+                <a:cs typeface="Tahoma" panose="020B0604030504040204" pitchFamily="34" charset="0"/>
+              </a:endParaRPr>
+            </a:p>
+          </p:txBody>
+        </p:sp>
+        <p:pic>
+          <p:nvPicPr>
+            <p:cNvPr id="123" name="Grafika 122" descr="Serwer">
+              <a:extLst>
+                <a:ext uri="{FF2B5EF4-FFF2-40B4-BE49-F238E27FC236}">
+                  <a16:creationId xmlns:a16="http://schemas.microsoft.com/office/drawing/2014/main" id="{1B0A0C59-C154-4D7B-ACF4-1E3386D1AF1C}"/>
+                </a:ext>
+              </a:extLst>
+            </p:cNvPr>
+            <p:cNvPicPr>
+              <a:picLocks noChangeAspect="1"/>
+            </p:cNvPicPr>
+            <p:nvPr/>
+          </p:nvPicPr>
+          <p:blipFill>
+            <a:blip r:embed="rId16">
+              <a:extLst>
+                <a:ext uri="{28A0092B-C50C-407E-A947-70E740481C1C}">
+                  <a14:useLocalDpi xmlns:a14="http://schemas.microsoft.com/office/drawing/2010/main" val="0"/>
+                </a:ext>
+                <a:ext uri="{96DAC541-7B7A-43D3-8B79-37D633B846F1}">
+                  <asvg:svgBlip xmlns:asvg="http://schemas.microsoft.com/office/drawing/2016/SVG/main" r:embed="rId17"/>
+                </a:ext>
+              </a:extLst>
+            </a:blip>
+            <a:stretch>
+              <a:fillRect/>
+            </a:stretch>
+          </p:blipFill>
+          <p:spPr>
+            <a:xfrm>
+              <a:off x="9705940" y="4481713"/>
+              <a:ext cx="628031" cy="630503"/>
+            </a:xfrm>
+            <a:prstGeom prst="rect">
+              <a:avLst/>
+            </a:prstGeom>
+          </p:spPr>
+        </p:pic>
+        <p:sp>
+          <p:nvSpPr>
+            <p:cNvPr id="124" name="pole tekstowe 123">
+              <a:extLst>
+                <a:ext uri="{FF2B5EF4-FFF2-40B4-BE49-F238E27FC236}">
+                  <a16:creationId xmlns:a16="http://schemas.microsoft.com/office/drawing/2014/main" id="{26D969E7-4D10-47FA-B60C-6C0B529F38CE}"/>
+                </a:ext>
+              </a:extLst>
+            </p:cNvPr>
+            <p:cNvSpPr txBox="1"/>
+            <p:nvPr/>
+          </p:nvSpPr>
+          <p:spPr>
+            <a:xfrm flipH="1">
+              <a:off x="9336398" y="5112216"/>
+              <a:ext cx="1357030" cy="261610"/>
+            </a:xfrm>
+            <a:prstGeom prst="rect">
+              <a:avLst/>
+            </a:prstGeom>
+            <a:noFill/>
+          </p:spPr>
+          <p:txBody>
+            <a:bodyPr wrap="square" rtlCol="0">
+              <a:spAutoFit/>
+            </a:bodyPr>
+            <a:lstStyle/>
+            <a:p>
+              <a:pPr algn="ctr"/>
+              <a:r>
+                <a:rPr lang="pl-PL" sz="1100" b="1" dirty="0">
+                  <a:latin typeface="Tahoma" panose="020B0604030504040204" pitchFamily="34" charset="0"/>
+                  <a:ea typeface="Tahoma" panose="020B0604030504040204" pitchFamily="34" charset="0"/>
+                  <a:cs typeface="Tahoma" panose="020B0604030504040204" pitchFamily="34" charset="0"/>
+                </a:rPr>
+                <a:t>DCPAM RDP</a:t>
+              </a:r>
+              <a:endParaRPr lang="pl-PL" sz="900" b="1" dirty="0">
+                <a:latin typeface="Tahoma" panose="020B0604030504040204" pitchFamily="34" charset="0"/>
+                <a:ea typeface="Tahoma" panose="020B0604030504040204" pitchFamily="34" charset="0"/>
+                <a:cs typeface="Tahoma" panose="020B0604030504040204" pitchFamily="34" charset="0"/>
+              </a:endParaRPr>
+            </a:p>
+          </p:txBody>
+        </p:sp>
+      </p:grpSp>
+      <p:cxnSp>
+        <p:nvCxnSpPr>
+          <p:cNvPr id="127" name="Łącznik: łamany 126">
+            <a:extLst>
+              <a:ext uri="{FF2B5EF4-FFF2-40B4-BE49-F238E27FC236}">
+                <a16:creationId xmlns:a16="http://schemas.microsoft.com/office/drawing/2014/main" id="{BB78BC3E-0CC9-4D53-9BC9-1A37A0F5D383}"/>
+              </a:ext>
+            </a:extLst>
+          </p:cNvPr>
+          <p:cNvCxnSpPr>
+            <a:stCxn id="81" idx="1"/>
+            <a:endCxn id="122" idx="3"/>
+          </p:cNvCxnSpPr>
+          <p:nvPr/>
+        </p:nvCxnSpPr>
+        <p:spPr>
+          <a:xfrm rot="10800000" flipV="1">
+            <a:off x="6965383" y="5288812"/>
+            <a:ext cx="293557" cy="2757"/>
+          </a:xfrm>
+          <a:prstGeom prst="bentConnector3">
+            <a:avLst/>
+          </a:prstGeom>
+          <a:ln>
+            <a:tailEnd type="triangle"/>
+          </a:ln>
+        </p:spPr>
+        <p:style>
+          <a:lnRef idx="1">
+            <a:schemeClr val="accent1"/>
+          </a:lnRef>
+          <a:fillRef idx="0">
+            <a:schemeClr val="accent1"/>
+          </a:fillRef>
+          <a:effectRef idx="0">
+            <a:schemeClr val="accent1"/>
+          </a:effectRef>
+          <a:fontRef idx="minor">
+            <a:schemeClr val="tx1"/>
+          </a:fontRef>
+        </p:style>
+      </p:cxnSp>
+      <p:cxnSp>
+        <p:nvCxnSpPr>
+          <p:cNvPr id="129" name="Łącznik: łamany 128">
+            <a:extLst>
+              <a:ext uri="{FF2B5EF4-FFF2-40B4-BE49-F238E27FC236}">
+                <a16:creationId xmlns:a16="http://schemas.microsoft.com/office/drawing/2014/main" id="{57159A0A-06A8-44FB-8E83-D046CD8C0089}"/>
+              </a:ext>
+            </a:extLst>
+          </p:cNvPr>
+          <p:cNvCxnSpPr>
+            <a:stCxn id="123" idx="0"/>
+            <a:endCxn id="26" idx="2"/>
+          </p:cNvCxnSpPr>
+          <p:nvPr/>
+        </p:nvCxnSpPr>
+        <p:spPr>
+          <a:xfrm rot="16200000" flipV="1">
+            <a:off x="5933205" y="4477603"/>
+            <a:ext cx="452505" cy="264903"/>
+          </a:xfrm>
+          <a:prstGeom prst="bentConnector3">
+            <a:avLst/>
+          </a:prstGeom>
+          <a:ln>
+            <a:tailEnd type="triangle"/>
+          </a:ln>
+        </p:spPr>
+        <p:style>
+          <a:lnRef idx="1">
+            <a:schemeClr val="accent1"/>
+          </a:lnRef>
+          <a:fillRef idx="0">
+            <a:schemeClr val="accent1"/>
+          </a:fillRef>
+          <a:effectRef idx="0">
+            <a:schemeClr val="accent1"/>
+          </a:effectRef>
+          <a:fontRef idx="minor">
+            <a:schemeClr val="tx1"/>
+          </a:fontRef>
+        </p:style>
+      </p:cxnSp>
+      <p:sp>
+        <p:nvSpPr>
+          <p:cNvPr id="130" name="Prostokąt: zaokrąglone rogi 129">
+            <a:extLst>
+              <a:ext uri="{FF2B5EF4-FFF2-40B4-BE49-F238E27FC236}">
+                <a16:creationId xmlns:a16="http://schemas.microsoft.com/office/drawing/2014/main" id="{37292A7A-9FB4-430D-8587-ECD6C3D764E3}"/>
+              </a:ext>
+            </a:extLst>
+          </p:cNvPr>
+          <p:cNvSpPr/>
+          <p:nvPr/>
+        </p:nvSpPr>
+        <p:spPr>
+          <a:xfrm>
+            <a:off x="344129" y="6074538"/>
+            <a:ext cx="11517754" cy="632986"/>
+          </a:xfrm>
+          <a:prstGeom prst="roundRect">
+            <a:avLst/>
+          </a:prstGeom>
+          <a:solidFill>
+            <a:schemeClr val="accent1">
+              <a:alpha val="34000"/>
+            </a:schemeClr>
+          </a:solidFill>
+          <a:ln>
+            <a:noFill/>
+          </a:ln>
+        </p:spPr>
+        <p:style>
+          <a:lnRef idx="0">
+            <a:scrgbClr r="0" g="0" b="0"/>
+          </a:lnRef>
+          <a:fillRef idx="0">
+            <a:scrgbClr r="0" g="0" b="0"/>
+          </a:fillRef>
+          <a:effectRef idx="0">
+            <a:scrgbClr r="0" g="0" b="0"/>
+          </a:effectRef>
+          <a:fontRef idx="minor">
+            <a:schemeClr val="lt1"/>
+          </a:fontRef>
+        </p:style>
+        <p:txBody>
+          <a:bodyPr rtlCol="0" anchor="ctr"/>
+          <a:lstStyle/>
+          <a:p>
+            <a:pPr algn="ctr"/>
+            <a:r>
+              <a:rPr lang="pl-PL" dirty="0"/>
+              <a:t>DCPAM DATA WAREHOUSE</a:t>
+            </a:r>
+          </a:p>
+        </p:txBody>
+      </p:sp>
+      <p:cxnSp>
+        <p:nvCxnSpPr>
+          <p:cNvPr id="132" name="Łącznik: łamany 131">
+            <a:extLst>
+              <a:ext uri="{FF2B5EF4-FFF2-40B4-BE49-F238E27FC236}">
+                <a16:creationId xmlns:a16="http://schemas.microsoft.com/office/drawing/2014/main" id="{533FEB12-C7AA-4477-8F3B-FE3A71E68C9B}"/>
+              </a:ext>
+            </a:extLst>
+          </p:cNvPr>
+          <p:cNvCxnSpPr>
+            <a:stCxn id="130" idx="0"/>
+            <a:endCxn id="87" idx="2"/>
+          </p:cNvCxnSpPr>
+          <p:nvPr/>
+        </p:nvCxnSpPr>
+        <p:spPr>
+          <a:xfrm rot="16200000" flipV="1">
+            <a:off x="4375854" y="4347385"/>
+            <a:ext cx="343361" cy="3110945"/>
+          </a:xfrm>
+          <a:prstGeom prst="bentConnector3">
+            <a:avLst/>
+          </a:prstGeom>
+          <a:ln>
+            <a:tailEnd type="triangle"/>
+          </a:ln>
+        </p:spPr>
+        <p:style>
+          <a:lnRef idx="1">
+            <a:schemeClr val="accent1"/>
+          </a:lnRef>
+          <a:fillRef idx="0">
+            <a:schemeClr val="accent1"/>
+          </a:fillRef>
+          <a:effectRef idx="0">
+            <a:schemeClr val="accent1"/>
+          </a:effectRef>
+          <a:fontRef idx="minor">
+            <a:schemeClr val="tx1"/>
+          </a:fontRef>
+        </p:style>
+      </p:cxnSp>
+      <p:cxnSp>
+        <p:nvCxnSpPr>
+          <p:cNvPr id="134" name="Łącznik: łamany 133">
+            <a:extLst>
+              <a:ext uri="{FF2B5EF4-FFF2-40B4-BE49-F238E27FC236}">
+                <a16:creationId xmlns:a16="http://schemas.microsoft.com/office/drawing/2014/main" id="{5308E16D-E83C-4E52-8B49-73CCA06E2544}"/>
+              </a:ext>
+            </a:extLst>
+          </p:cNvPr>
+          <p:cNvCxnSpPr>
+            <a:stCxn id="130" idx="0"/>
+            <a:endCxn id="54" idx="2"/>
+          </p:cNvCxnSpPr>
+          <p:nvPr/>
+        </p:nvCxnSpPr>
+        <p:spPr>
+          <a:xfrm rot="16200000" flipV="1">
+            <a:off x="5214435" y="5185967"/>
+            <a:ext cx="343361" cy="1433782"/>
+          </a:xfrm>
+          <a:prstGeom prst="bentConnector3">
+            <a:avLst/>
+          </a:prstGeom>
+          <a:ln>
+            <a:tailEnd type="triangle"/>
+          </a:ln>
+        </p:spPr>
+        <p:style>
+          <a:lnRef idx="1">
+            <a:schemeClr val="accent1"/>
+          </a:lnRef>
+          <a:fillRef idx="0">
+            <a:schemeClr val="accent1"/>
+          </a:fillRef>
+          <a:effectRef idx="0">
+            <a:schemeClr val="accent1"/>
+          </a:effectRef>
+          <a:fontRef idx="minor">
+            <a:schemeClr val="tx1"/>
+          </a:fontRef>
+        </p:style>
+      </p:cxnSp>
+      <p:cxnSp>
+        <p:nvCxnSpPr>
+          <p:cNvPr id="136" name="Łącznik: łamany 135">
+            <a:extLst>
+              <a:ext uri="{FF2B5EF4-FFF2-40B4-BE49-F238E27FC236}">
+                <a16:creationId xmlns:a16="http://schemas.microsoft.com/office/drawing/2014/main" id="{C44619A8-09D3-4139-BFB1-F295B303B223}"/>
+              </a:ext>
+            </a:extLst>
+          </p:cNvPr>
+          <p:cNvCxnSpPr>
+            <a:stCxn id="130" idx="0"/>
+            <a:endCxn id="83" idx="2"/>
+          </p:cNvCxnSpPr>
+          <p:nvPr/>
+        </p:nvCxnSpPr>
+        <p:spPr>
+          <a:xfrm rot="5400000" flipH="1" flipV="1">
+            <a:off x="6845792" y="4982878"/>
+            <a:ext cx="348875" cy="1834446"/>
+          </a:xfrm>
+          <a:prstGeom prst="bentConnector3">
+            <a:avLst/>
+          </a:prstGeom>
+          <a:ln>
+            <a:tailEnd type="triangle"/>
+          </a:ln>
+        </p:spPr>
+        <p:style>
+          <a:lnRef idx="1">
+            <a:schemeClr val="accent1"/>
+          </a:lnRef>
+          <a:fillRef idx="0">
+            <a:schemeClr val="accent1"/>
+          </a:fillRef>
+          <a:effectRef idx="0">
+            <a:schemeClr val="accent1"/>
+          </a:effectRef>
+          <a:fontRef idx="minor">
+            <a:schemeClr val="tx1"/>
+          </a:fontRef>
+        </p:style>
+      </p:cxnSp>
+      <p:sp>
+        <p:nvSpPr>
+          <p:cNvPr id="139" name="Strzałka: w górę 138">
+            <a:extLst>
+              <a:ext uri="{FF2B5EF4-FFF2-40B4-BE49-F238E27FC236}">
+                <a16:creationId xmlns:a16="http://schemas.microsoft.com/office/drawing/2014/main" id="{F4469F9D-D200-4388-82A5-89256F47B275}"/>
+              </a:ext>
+            </a:extLst>
+          </p:cNvPr>
+          <p:cNvSpPr/>
+          <p:nvPr/>
+        </p:nvSpPr>
+        <p:spPr>
+          <a:xfrm>
+            <a:off x="5929261" y="955912"/>
+            <a:ext cx="300845" cy="419334"/>
+          </a:xfrm>
+          <a:prstGeom prst="upArrow">
+            <a:avLst/>
+          </a:prstGeom>
+          <a:solidFill>
+            <a:schemeClr val="accent4">
+              <a:alpha val="50000"/>
+            </a:schemeClr>
+          </a:solidFill>
+          <a:ln>
+            <a:noFill/>
+          </a:ln>
+        </p:spPr>
+        <p:style>
+          <a:lnRef idx="0">
+            <a:scrgbClr r="0" g="0" b="0"/>
+          </a:lnRef>
+          <a:fillRef idx="0">
+            <a:scrgbClr r="0" g="0" b="0"/>
+          </a:fillRef>
+          <a:effectRef idx="0">
+            <a:scrgbClr r="0" g="0" b="0"/>
+          </a:effectRef>
+          <a:fontRef idx="minor">
+            <a:schemeClr val="lt1"/>
+          </a:fontRef>
+        </p:style>
+        <p:txBody>
+          <a:bodyPr rtlCol="0" anchor="ctr"/>
+          <a:lstStyle/>
+          <a:p>
+            <a:pPr algn="ctr"/>
+            <a:endParaRPr lang="pl-PL"/>
+          </a:p>
+        </p:txBody>
+      </p:sp>
+      <p:sp>
+        <p:nvSpPr>
+          <p:cNvPr id="140" name="pole tekstowe 139">
+            <a:extLst>
+              <a:ext uri="{FF2B5EF4-FFF2-40B4-BE49-F238E27FC236}">
+                <a16:creationId xmlns:a16="http://schemas.microsoft.com/office/drawing/2014/main" id="{53EB2069-6C0E-4810-A457-61C9781E0C98}"/>
+              </a:ext>
+            </a:extLst>
+          </p:cNvPr>
+          <p:cNvSpPr txBox="1"/>
+          <p:nvPr/>
+        </p:nvSpPr>
+        <p:spPr>
+          <a:xfrm>
+            <a:off x="577867" y="466969"/>
+            <a:ext cx="2672097" cy="369332"/>
+          </a:xfrm>
+          <a:prstGeom prst="rect">
+            <a:avLst/>
+          </a:prstGeom>
+          <a:noFill/>
+        </p:spPr>
+        <p:txBody>
+          <a:bodyPr wrap="square" rtlCol="0">
+            <a:spAutoFit/>
+          </a:bodyPr>
+          <a:lstStyle/>
+          <a:p>
+            <a:r>
+              <a:rPr lang="pl-PL" dirty="0">
+                <a:solidFill>
+                  <a:schemeClr val="accent1">
+                    <a:lumMod val="60000"/>
+                    <a:lumOff val="40000"/>
+                  </a:schemeClr>
+                </a:solidFill>
+              </a:rPr>
+              <a:t>BUSINESS INTELLIGENCE</a:t>
+            </a:r>
+          </a:p>
+        </p:txBody>
+      </p:sp>
+      <p:grpSp>
+        <p:nvGrpSpPr>
+          <p:cNvPr id="70" name="Grupa 69">
+            <a:extLst>
+              <a:ext uri="{FF2B5EF4-FFF2-40B4-BE49-F238E27FC236}">
+                <a16:creationId xmlns:a16="http://schemas.microsoft.com/office/drawing/2014/main" id="{715BF691-E46D-488B-91EC-E3CF6E7D6CF0}"/>
+              </a:ext>
+            </a:extLst>
+          </p:cNvPr>
+          <p:cNvGrpSpPr/>
+          <p:nvPr/>
+        </p:nvGrpSpPr>
+        <p:grpSpPr>
+          <a:xfrm>
+            <a:off x="7695429" y="1246419"/>
+            <a:ext cx="2801092" cy="1548836"/>
+            <a:chOff x="4626457" y="1239225"/>
+            <a:chExt cx="2801092" cy="1548836"/>
+          </a:xfrm>
+        </p:grpSpPr>
+        <p:sp>
+          <p:nvSpPr>
+            <p:cNvPr id="71" name="Prostokąt: zaokrąglone rogi 70">
+              <a:extLst>
+                <a:ext uri="{FF2B5EF4-FFF2-40B4-BE49-F238E27FC236}">
+                  <a16:creationId xmlns:a16="http://schemas.microsoft.com/office/drawing/2014/main" id="{D5AB1A98-EB3B-4C01-AA10-69B1137B7FD3}"/>
+                </a:ext>
+              </a:extLst>
+            </p:cNvPr>
+            <p:cNvSpPr/>
+            <p:nvPr/>
+          </p:nvSpPr>
+          <p:spPr>
+            <a:xfrm>
+              <a:off x="4626457" y="1239225"/>
+              <a:ext cx="2801092" cy="1548836"/>
+            </a:xfrm>
+            <a:prstGeom prst="roundRect">
+              <a:avLst/>
+            </a:prstGeom>
+            <a:solidFill>
+              <a:schemeClr val="accent5">
+                <a:alpha val="21000"/>
+              </a:schemeClr>
+            </a:solidFill>
+            <a:ln>
+              <a:noFill/>
+            </a:ln>
+          </p:spPr>
+          <p:style>
+            <a:lnRef idx="0">
+              <a:scrgbClr r="0" g="0" b="0"/>
+            </a:lnRef>
+            <a:fillRef idx="0">
+              <a:scrgbClr r="0" g="0" b="0"/>
+            </a:fillRef>
+            <a:effectRef idx="0">
+              <a:scrgbClr r="0" g="0" b="0"/>
+            </a:effectRef>
+            <a:fontRef idx="minor">
+              <a:schemeClr val="lt1"/>
+            </a:fontRef>
+          </p:style>
+          <p:txBody>
+            <a:bodyPr rtlCol="0" anchor="ctr"/>
+            <a:lstStyle/>
+            <a:p>
+              <a:pPr algn="ctr"/>
+              <a:endParaRPr lang="pl-PL">
+                <a:latin typeface="Tahoma" panose="020B0604030504040204" pitchFamily="34" charset="0"/>
+                <a:ea typeface="Tahoma" panose="020B0604030504040204" pitchFamily="34" charset="0"/>
+                <a:cs typeface="Tahoma" panose="020B0604030504040204" pitchFamily="34" charset="0"/>
+              </a:endParaRPr>
+            </a:p>
+          </p:txBody>
+        </p:sp>
+        <p:pic>
+          <p:nvPicPr>
+            <p:cNvPr id="72" name="Grafika 71" descr="Serwer">
+              <a:extLst>
+                <a:ext uri="{FF2B5EF4-FFF2-40B4-BE49-F238E27FC236}">
+                  <a16:creationId xmlns:a16="http://schemas.microsoft.com/office/drawing/2014/main" id="{2965C226-F6DC-47AF-829D-E7C7C3E59B62}"/>
+                </a:ext>
+              </a:extLst>
+            </p:cNvPr>
+            <p:cNvPicPr>
+              <a:picLocks noChangeAspect="1"/>
+            </p:cNvPicPr>
+            <p:nvPr/>
+          </p:nvPicPr>
+          <p:blipFill>
+            <a:blip r:embed="rId10">
+              <a:extLst>
+                <a:ext uri="{28A0092B-C50C-407E-A947-70E740481C1C}">
+                  <a14:useLocalDpi xmlns:a14="http://schemas.microsoft.com/office/drawing/2010/main" val="0"/>
+                </a:ext>
+                <a:ext uri="{96DAC541-7B7A-43D3-8B79-37D633B846F1}">
+                  <asvg:svgBlip xmlns:asvg="http://schemas.microsoft.com/office/drawing/2016/SVG/main" r:embed="rId11"/>
+                </a:ext>
+              </a:extLst>
+            </a:blip>
+            <a:stretch>
+              <a:fillRect/>
+            </a:stretch>
+          </p:blipFill>
+          <p:spPr>
+            <a:xfrm>
+              <a:off x="5637856" y="1372625"/>
+              <a:ext cx="880264" cy="880264"/>
+            </a:xfrm>
+            <a:prstGeom prst="rect">
+              <a:avLst/>
+            </a:prstGeom>
+          </p:spPr>
+        </p:pic>
+        <p:sp>
+          <p:nvSpPr>
+            <p:cNvPr id="73" name="pole tekstowe 72">
+              <a:extLst>
+                <a:ext uri="{FF2B5EF4-FFF2-40B4-BE49-F238E27FC236}">
+                  <a16:creationId xmlns:a16="http://schemas.microsoft.com/office/drawing/2014/main" id="{5ED751A2-EE91-4DF6-8B6F-B269F61CAB26}"/>
+                </a:ext>
+              </a:extLst>
+            </p:cNvPr>
+            <p:cNvSpPr txBox="1"/>
+            <p:nvPr/>
+          </p:nvSpPr>
+          <p:spPr>
+            <a:xfrm flipH="1">
+              <a:off x="5353593" y="2238144"/>
+              <a:ext cx="1423631" cy="296287"/>
+            </a:xfrm>
+            <a:prstGeom prst="rect">
+              <a:avLst/>
+            </a:prstGeom>
+            <a:noFill/>
+          </p:spPr>
+          <p:txBody>
+            <a:bodyPr wrap="square" rtlCol="0">
+              <a:spAutoFit/>
+            </a:bodyPr>
+            <a:lstStyle/>
+            <a:p>
+              <a:pPr algn="ctr"/>
+              <a:r>
+                <a:rPr lang="pl-PL" sz="1400" b="1" dirty="0">
+                  <a:latin typeface="Tahoma" panose="020B0604030504040204" pitchFamily="34" charset="0"/>
+                  <a:ea typeface="Tahoma" panose="020B0604030504040204" pitchFamily="34" charset="0"/>
+                  <a:cs typeface="Tahoma" panose="020B0604030504040204" pitchFamily="34" charset="0"/>
+                </a:rPr>
+                <a:t>DCPAM WDS</a:t>
+              </a:r>
+              <a:endParaRPr lang="pl-PL" sz="1050" b="1" dirty="0">
+                <a:latin typeface="Tahoma" panose="020B0604030504040204" pitchFamily="34" charset="0"/>
+                <a:ea typeface="Tahoma" panose="020B0604030504040204" pitchFamily="34" charset="0"/>
+                <a:cs typeface="Tahoma" panose="020B0604030504040204" pitchFamily="34" charset="0"/>
+              </a:endParaRPr>
+            </a:p>
+          </p:txBody>
+        </p:sp>
+      </p:grpSp>
+      <p:grpSp>
+        <p:nvGrpSpPr>
+          <p:cNvPr id="74" name="Grupa 73">
+            <a:extLst>
+              <a:ext uri="{FF2B5EF4-FFF2-40B4-BE49-F238E27FC236}">
+                <a16:creationId xmlns:a16="http://schemas.microsoft.com/office/drawing/2014/main" id="{8FBDF79F-118E-41ED-A2E4-C790D1FD1F24}"/>
+              </a:ext>
+            </a:extLst>
+          </p:cNvPr>
+          <p:cNvGrpSpPr/>
+          <p:nvPr/>
+        </p:nvGrpSpPr>
+        <p:grpSpPr>
+          <a:xfrm>
+            <a:off x="1557485" y="1232618"/>
+            <a:ext cx="2801092" cy="1548836"/>
+            <a:chOff x="4626457" y="1239225"/>
+            <a:chExt cx="2801092" cy="1548836"/>
+          </a:xfrm>
+        </p:grpSpPr>
+        <p:sp>
+          <p:nvSpPr>
+            <p:cNvPr id="75" name="Prostokąt: zaokrąglone rogi 74">
+              <a:extLst>
+                <a:ext uri="{FF2B5EF4-FFF2-40B4-BE49-F238E27FC236}">
+                  <a16:creationId xmlns:a16="http://schemas.microsoft.com/office/drawing/2014/main" id="{4A45BB99-E7EB-4438-854F-D2E64B9B14D7}"/>
+                </a:ext>
+              </a:extLst>
+            </p:cNvPr>
+            <p:cNvSpPr/>
+            <p:nvPr/>
+          </p:nvSpPr>
+          <p:spPr>
+            <a:xfrm>
+              <a:off x="4626457" y="1239225"/>
+              <a:ext cx="2801092" cy="1548836"/>
+            </a:xfrm>
+            <a:prstGeom prst="roundRect">
+              <a:avLst/>
+            </a:prstGeom>
+            <a:solidFill>
+              <a:schemeClr val="accent5">
+                <a:alpha val="21000"/>
+              </a:schemeClr>
+            </a:solidFill>
+            <a:ln>
+              <a:noFill/>
+            </a:ln>
+          </p:spPr>
+          <p:style>
+            <a:lnRef idx="0">
+              <a:scrgbClr r="0" g="0" b="0"/>
+            </a:lnRef>
+            <a:fillRef idx="0">
+              <a:scrgbClr r="0" g="0" b="0"/>
+            </a:fillRef>
+            <a:effectRef idx="0">
+              <a:scrgbClr r="0" g="0" b="0"/>
+            </a:effectRef>
+            <a:fontRef idx="minor">
+              <a:schemeClr val="lt1"/>
+            </a:fontRef>
+          </p:style>
+          <p:txBody>
+            <a:bodyPr rtlCol="0" anchor="ctr"/>
+            <a:lstStyle/>
+            <a:p>
+              <a:pPr algn="ctr"/>
+              <a:endParaRPr lang="pl-PL">
+                <a:latin typeface="Tahoma" panose="020B0604030504040204" pitchFamily="34" charset="0"/>
+                <a:ea typeface="Tahoma" panose="020B0604030504040204" pitchFamily="34" charset="0"/>
+                <a:cs typeface="Tahoma" panose="020B0604030504040204" pitchFamily="34" charset="0"/>
+              </a:endParaRPr>
+            </a:p>
+          </p:txBody>
+        </p:sp>
+        <p:pic>
+          <p:nvPicPr>
+            <p:cNvPr id="76" name="Grafika 75" descr="Serwer">
+              <a:extLst>
+                <a:ext uri="{FF2B5EF4-FFF2-40B4-BE49-F238E27FC236}">
+                  <a16:creationId xmlns:a16="http://schemas.microsoft.com/office/drawing/2014/main" id="{DC776780-9D3C-466D-8FDB-10DA2C90E788}"/>
+                </a:ext>
+              </a:extLst>
+            </p:cNvPr>
+            <p:cNvPicPr>
+              <a:picLocks noChangeAspect="1"/>
+            </p:cNvPicPr>
+            <p:nvPr/>
+          </p:nvPicPr>
+          <p:blipFill>
+            <a:blip r:embed="rId10">
+              <a:extLst>
+                <a:ext uri="{28A0092B-C50C-407E-A947-70E740481C1C}">
+                  <a14:useLocalDpi xmlns:a14="http://schemas.microsoft.com/office/drawing/2010/main" val="0"/>
+                </a:ext>
+                <a:ext uri="{96DAC541-7B7A-43D3-8B79-37D633B846F1}">
+                  <asvg:svgBlip xmlns:asvg="http://schemas.microsoft.com/office/drawing/2016/SVG/main" r:embed="rId11"/>
+                </a:ext>
+              </a:extLst>
+            </a:blip>
+            <a:stretch>
+              <a:fillRect/>
+            </a:stretch>
+          </p:blipFill>
+          <p:spPr>
+            <a:xfrm>
+              <a:off x="5637856" y="1372625"/>
+              <a:ext cx="880264" cy="880264"/>
+            </a:xfrm>
+            <a:prstGeom prst="rect">
+              <a:avLst/>
+            </a:prstGeom>
+          </p:spPr>
+        </p:pic>
+        <p:sp>
+          <p:nvSpPr>
+            <p:cNvPr id="77" name="pole tekstowe 76">
+              <a:extLst>
+                <a:ext uri="{FF2B5EF4-FFF2-40B4-BE49-F238E27FC236}">
+                  <a16:creationId xmlns:a16="http://schemas.microsoft.com/office/drawing/2014/main" id="{C0CC6B31-3C17-4FAA-9751-B1F8F8B6862A}"/>
+                </a:ext>
+              </a:extLst>
+            </p:cNvPr>
+            <p:cNvSpPr txBox="1"/>
+            <p:nvPr/>
+          </p:nvSpPr>
+          <p:spPr>
+            <a:xfrm flipH="1">
+              <a:off x="5353593" y="2238144"/>
+              <a:ext cx="1423631" cy="296287"/>
+            </a:xfrm>
+            <a:prstGeom prst="rect">
+              <a:avLst/>
+            </a:prstGeom>
+            <a:noFill/>
+          </p:spPr>
+          <p:txBody>
+            <a:bodyPr wrap="square" rtlCol="0">
+              <a:spAutoFit/>
+            </a:bodyPr>
+            <a:lstStyle/>
+            <a:p>
+              <a:pPr algn="ctr"/>
+              <a:r>
+                <a:rPr lang="pl-PL" sz="1400" b="1" dirty="0">
+                  <a:latin typeface="Tahoma" panose="020B0604030504040204" pitchFamily="34" charset="0"/>
+                  <a:ea typeface="Tahoma" panose="020B0604030504040204" pitchFamily="34" charset="0"/>
+                  <a:cs typeface="Tahoma" panose="020B0604030504040204" pitchFamily="34" charset="0"/>
+                </a:rPr>
+                <a:t>DCPAM WDS</a:t>
+              </a:r>
+              <a:endParaRPr lang="pl-PL" sz="1050" b="1" dirty="0">
+                <a:latin typeface="Tahoma" panose="020B0604030504040204" pitchFamily="34" charset="0"/>
+                <a:ea typeface="Tahoma" panose="020B0604030504040204" pitchFamily="34" charset="0"/>
+                <a:cs typeface="Tahoma" panose="020B0604030504040204" pitchFamily="34" charset="0"/>
+              </a:endParaRPr>
+            </a:p>
+          </p:txBody>
+        </p:sp>
+      </p:grpSp>
+      <p:sp>
+        <p:nvSpPr>
+          <p:cNvPr id="20" name="Strzałka: w górę 19">
+            <a:extLst>
+              <a:ext uri="{FF2B5EF4-FFF2-40B4-BE49-F238E27FC236}">
+                <a16:creationId xmlns:a16="http://schemas.microsoft.com/office/drawing/2014/main" id="{40FF9167-FE97-43B9-B608-593FDAA4E8CA}"/>
+              </a:ext>
+            </a:extLst>
+          </p:cNvPr>
+          <p:cNvSpPr/>
+          <p:nvPr/>
+        </p:nvSpPr>
+        <p:spPr>
+          <a:xfrm>
+            <a:off x="2883786" y="950968"/>
+            <a:ext cx="300845" cy="419334"/>
+          </a:xfrm>
+          <a:prstGeom prst="upArrow">
+            <a:avLst/>
+          </a:prstGeom>
+          <a:solidFill>
+            <a:schemeClr val="accent4">
+              <a:alpha val="50000"/>
+            </a:schemeClr>
+          </a:solidFill>
+          <a:ln>
+            <a:noFill/>
+          </a:ln>
+        </p:spPr>
+        <p:style>
+          <a:lnRef idx="0">
+            <a:scrgbClr r="0" g="0" b="0"/>
+          </a:lnRef>
+          <a:fillRef idx="0">
+            <a:scrgbClr r="0" g="0" b="0"/>
+          </a:fillRef>
+          <a:effectRef idx="0">
+            <a:scrgbClr r="0" g="0" b="0"/>
+          </a:effectRef>
+          <a:fontRef idx="minor">
+            <a:schemeClr val="lt1"/>
+          </a:fontRef>
+        </p:style>
+        <p:txBody>
+          <a:bodyPr rtlCol="0" anchor="ctr"/>
+          <a:lstStyle/>
+          <a:p>
+            <a:pPr algn="ctr"/>
+            <a:endParaRPr lang="pl-PL"/>
+          </a:p>
+        </p:txBody>
+      </p:sp>
+      <p:sp>
+        <p:nvSpPr>
+          <p:cNvPr id="21" name="Strzałka: w górę 20">
+            <a:extLst>
+              <a:ext uri="{FF2B5EF4-FFF2-40B4-BE49-F238E27FC236}">
+                <a16:creationId xmlns:a16="http://schemas.microsoft.com/office/drawing/2014/main" id="{3F303392-1725-4F33-B551-15943D4C397B}"/>
+              </a:ext>
+            </a:extLst>
+          </p:cNvPr>
+          <p:cNvSpPr/>
+          <p:nvPr/>
+        </p:nvSpPr>
+        <p:spPr>
+          <a:xfrm>
+            <a:off x="9007369" y="956765"/>
+            <a:ext cx="300845" cy="419334"/>
+          </a:xfrm>
+          <a:prstGeom prst="upArrow">
+            <a:avLst/>
+          </a:prstGeom>
+          <a:solidFill>
+            <a:schemeClr val="accent4">
+              <a:alpha val="50000"/>
+            </a:schemeClr>
+          </a:solidFill>
+          <a:ln>
+            <a:noFill/>
+          </a:ln>
+        </p:spPr>
+        <p:style>
+          <a:lnRef idx="0">
+            <a:scrgbClr r="0" g="0" b="0"/>
+          </a:lnRef>
+          <a:fillRef idx="0">
+            <a:scrgbClr r="0" g="0" b="0"/>
+          </a:fillRef>
+          <a:effectRef idx="0">
+            <a:scrgbClr r="0" g="0" b="0"/>
+          </a:effectRef>
+          <a:fontRef idx="minor">
+            <a:schemeClr val="lt1"/>
+          </a:fontRef>
+        </p:style>
+        <p:txBody>
+          <a:bodyPr rtlCol="0" anchor="ctr"/>
+          <a:lstStyle/>
+          <a:p>
+            <a:pPr algn="ctr"/>
+            <a:endParaRPr lang="pl-PL"/>
+          </a:p>
+        </p:txBody>
+      </p:sp>
+      <p:sp>
+        <p:nvSpPr>
+          <p:cNvPr id="23" name="Prostokąt 22">
+            <a:extLst>
+              <a:ext uri="{FF2B5EF4-FFF2-40B4-BE49-F238E27FC236}">
+                <a16:creationId xmlns:a16="http://schemas.microsoft.com/office/drawing/2014/main" id="{90D5395A-9305-4898-B5C8-AD2822F5E4B1}"/>
+              </a:ext>
+            </a:extLst>
+          </p:cNvPr>
+          <p:cNvSpPr/>
+          <p:nvPr/>
+        </p:nvSpPr>
+        <p:spPr>
+          <a:xfrm>
+            <a:off x="3449148" y="1156236"/>
+            <a:ext cx="1063239" cy="321735"/>
+          </a:xfrm>
+          <a:prstGeom prst="rect">
+            <a:avLst/>
+          </a:prstGeom>
+        </p:spPr>
+        <p:style>
+          <a:lnRef idx="2">
+            <a:schemeClr val="accent1">
+              <a:shade val="50000"/>
+            </a:schemeClr>
+          </a:lnRef>
+          <a:fillRef idx="1">
+            <a:schemeClr val="accent1"/>
+          </a:fillRef>
+          <a:effectRef idx="0">
+            <a:schemeClr val="accent1"/>
+          </a:effectRef>
+          <a:fontRef idx="minor">
+            <a:schemeClr val="lt1"/>
+          </a:fontRef>
+        </p:style>
+        <p:txBody>
+          <a:bodyPr rtlCol="0" anchor="ctr"/>
+          <a:lstStyle/>
+          <a:p>
+            <a:pPr algn="ctr"/>
+            <a:r>
+              <a:rPr lang="pl-PL" sz="900" b="1" dirty="0">
+                <a:latin typeface="Tahoma" panose="020B0604030504040204" pitchFamily="34" charset="0"/>
+                <a:ea typeface="Tahoma" panose="020B0604030504040204" pitchFamily="34" charset="0"/>
+                <a:cs typeface="Tahoma" panose="020B0604030504040204" pitchFamily="34" charset="0"/>
+              </a:rPr>
+              <a:t>DATA MART #1</a:t>
+            </a:r>
+          </a:p>
+        </p:txBody>
+      </p:sp>
+      <p:sp>
+        <p:nvSpPr>
+          <p:cNvPr id="24" name="Prostokąt 23">
+            <a:extLst>
+              <a:ext uri="{FF2B5EF4-FFF2-40B4-BE49-F238E27FC236}">
+                <a16:creationId xmlns:a16="http://schemas.microsoft.com/office/drawing/2014/main" id="{F7E14698-C960-40C4-882F-9B4971D8CE29}"/>
+              </a:ext>
+            </a:extLst>
+          </p:cNvPr>
+          <p:cNvSpPr/>
+          <p:nvPr/>
+        </p:nvSpPr>
+        <p:spPr>
+          <a:xfrm>
+            <a:off x="6533445" y="1166497"/>
+            <a:ext cx="1063239" cy="321735"/>
+          </a:xfrm>
+          <a:prstGeom prst="rect">
+            <a:avLst/>
+          </a:prstGeom>
+        </p:spPr>
+        <p:style>
+          <a:lnRef idx="2">
+            <a:schemeClr val="accent1">
+              <a:shade val="50000"/>
+            </a:schemeClr>
+          </a:lnRef>
+          <a:fillRef idx="1">
+            <a:schemeClr val="accent1"/>
+          </a:fillRef>
+          <a:effectRef idx="0">
+            <a:schemeClr val="accent1"/>
+          </a:effectRef>
+          <a:fontRef idx="minor">
+            <a:schemeClr val="lt1"/>
+          </a:fontRef>
+        </p:style>
+        <p:txBody>
+          <a:bodyPr rtlCol="0" anchor="ctr"/>
+          <a:lstStyle/>
+          <a:p>
+            <a:pPr algn="ctr"/>
+            <a:r>
+              <a:rPr lang="pl-PL" sz="900" b="1" dirty="0">
+                <a:latin typeface="Tahoma" panose="020B0604030504040204" pitchFamily="34" charset="0"/>
+                <a:ea typeface="Tahoma" panose="020B0604030504040204" pitchFamily="34" charset="0"/>
+                <a:cs typeface="Tahoma" panose="020B0604030504040204" pitchFamily="34" charset="0"/>
+              </a:rPr>
+              <a:t>DATA MART #2</a:t>
+            </a:r>
+          </a:p>
+        </p:txBody>
+      </p:sp>
+      <p:sp>
+        <p:nvSpPr>
+          <p:cNvPr id="29" name="Prostokąt 28">
+            <a:extLst>
+              <a:ext uri="{FF2B5EF4-FFF2-40B4-BE49-F238E27FC236}">
+                <a16:creationId xmlns:a16="http://schemas.microsoft.com/office/drawing/2014/main" id="{7116DC9D-BBFC-4A99-BD3D-E1035B845911}"/>
+              </a:ext>
+            </a:extLst>
+          </p:cNvPr>
+          <p:cNvSpPr/>
+          <p:nvPr/>
+        </p:nvSpPr>
+        <p:spPr>
+          <a:xfrm>
+            <a:off x="9610246" y="1166497"/>
+            <a:ext cx="1063239" cy="321735"/>
+          </a:xfrm>
+          <a:prstGeom prst="rect">
+            <a:avLst/>
+          </a:prstGeom>
+        </p:spPr>
+        <p:style>
+          <a:lnRef idx="2">
+            <a:schemeClr val="accent1">
+              <a:shade val="50000"/>
+            </a:schemeClr>
+          </a:lnRef>
+          <a:fillRef idx="1">
+            <a:schemeClr val="accent1"/>
+          </a:fillRef>
+          <a:effectRef idx="0">
+            <a:schemeClr val="accent1"/>
+          </a:effectRef>
+          <a:fontRef idx="minor">
+            <a:schemeClr val="lt1"/>
+          </a:fontRef>
+        </p:style>
+        <p:txBody>
+          <a:bodyPr rtlCol="0" anchor="ctr"/>
+          <a:lstStyle/>
+          <a:p>
+            <a:pPr algn="ctr"/>
+            <a:r>
+              <a:rPr lang="pl-PL" sz="900" b="1" dirty="0">
+                <a:latin typeface="Tahoma" panose="020B0604030504040204" pitchFamily="34" charset="0"/>
+                <a:ea typeface="Tahoma" panose="020B0604030504040204" pitchFamily="34" charset="0"/>
+                <a:cs typeface="Tahoma" panose="020B0604030504040204" pitchFamily="34" charset="0"/>
+              </a:rPr>
+              <a:t>DATA MART #3</a:t>
+            </a:r>
+          </a:p>
+        </p:txBody>
+      </p:sp>
+    </p:spTree>
+    <p:extLst>
+      <p:ext uri="{BB962C8B-B14F-4D97-AF65-F5344CB8AC3E}">
+        <p14:creationId xmlns:p14="http://schemas.microsoft.com/office/powerpoint/2010/main" val="3570676732"/>
       </p:ext>
     </p:extLst>
   </p:cSld>

</xml_diff>